<commit_message>
add pretier version of poster design.
this might break something. we'll find out.
</commit_message>
<xml_diff>
--- a/Senior Design Poster.pptx
+++ b/Senior Design Poster.pptx
@@ -3086,6 +3086,14 @@
 <file path=ppt/slides/slide1.xml><?xml version="1.0" encoding="utf-8"?>
 <p:sld xmlns:a="http://schemas.openxmlformats.org/drawingml/2006/main" xmlns:r="http://schemas.openxmlformats.org/officeDocument/2006/relationships" xmlns:p="http://schemas.openxmlformats.org/presentationml/2006/main">
   <p:cSld>
+    <p:bg>
+      <p:bgPr>
+        <a:solidFill>
+          <a:schemeClr val="tx1"/>
+        </a:solidFill>
+        <a:effectLst/>
+      </p:bgPr>
+    </p:bg>
     <p:spTree>
       <p:nvGrpSpPr>
         <p:cNvPr id="1" name=""/>
@@ -3102,49 +3110,23 @@
       </p:grpSpPr>
       <p:sp>
         <p:nvSpPr>
-          <p:cNvPr id="4" name="TextBox 3"/>
-          <p:cNvSpPr txBox="1"/>
+          <p:cNvPr id="34" name="Rounded Rectangle 33"/>
+          <p:cNvSpPr/>
           <p:nvPr/>
         </p:nvSpPr>
         <p:spPr>
           <a:xfrm>
-            <a:off x="-76201" y="1612683"/>
-            <a:ext cx="43891200" cy="1938992"/>
+            <a:off x="91440" y="4610325"/>
+            <a:ext cx="10515600" cy="11848875"/>
           </a:xfrm>
-          <a:prstGeom prst="rect">
+          <a:prstGeom prst="roundRect">
             <a:avLst/>
           </a:prstGeom>
-          <a:noFill/>
-        </p:spPr>
-        <p:txBody>
-          <a:bodyPr wrap="square" rtlCol="0">
-            <a:spAutoFit/>
-          </a:bodyPr>
-          <a:lstStyle/>
-          <a:p>
-            <a:pPr algn="ctr"/>
-            <a:r>
-              <a:rPr lang="en-US" sz="12000" dirty="0" smtClean="0"/>
-              <a:t>Starcraft2 AI</a:t>
-            </a:r>
-            <a:endParaRPr lang="en-US" sz="12000" dirty="0"/>
-          </a:p>
-        </p:txBody>
-      </p:sp>
-      <p:sp>
-        <p:nvSpPr>
-          <p:cNvPr id="6" name="Rectangle 5"/>
-          <p:cNvSpPr/>
-          <p:nvPr/>
-        </p:nvSpPr>
-        <p:spPr>
-          <a:xfrm>
-            <a:off x="1828798" y="447136"/>
-            <a:ext cx="4648200" cy="4550229"/>
-          </a:xfrm>
-          <a:prstGeom prst="rect">
-            <a:avLst/>
-          </a:prstGeom>
+          <a:solidFill>
+            <a:schemeClr val="bg1">
+              <a:alpha val="75000"/>
+            </a:schemeClr>
+          </a:solidFill>
         </p:spPr>
         <p:style>
           <a:lnRef idx="2">
@@ -3173,134 +3155,14 @@
       </p:sp>
       <p:sp>
         <p:nvSpPr>
-          <p:cNvPr id="10" name="Rectangle 9"/>
-          <p:cNvSpPr/>
-          <p:nvPr/>
-        </p:nvSpPr>
-        <p:spPr>
-          <a:xfrm>
-            <a:off x="10972798" y="447135"/>
-            <a:ext cx="4648200" cy="4550229"/>
-          </a:xfrm>
-          <a:prstGeom prst="rect">
-            <a:avLst/>
-          </a:prstGeom>
-        </p:spPr>
-        <p:style>
-          <a:lnRef idx="2">
-            <a:schemeClr val="accent1">
-              <a:shade val="50000"/>
-            </a:schemeClr>
-          </a:lnRef>
-          <a:fillRef idx="1">
-            <a:schemeClr val="accent1"/>
-          </a:fillRef>
-          <a:effectRef idx="0">
-            <a:schemeClr val="accent1"/>
-          </a:effectRef>
-          <a:fontRef idx="minor">
-            <a:schemeClr val="lt1"/>
-          </a:fontRef>
-        </p:style>
-        <p:txBody>
-          <a:bodyPr rtlCol="0" anchor="ctr"/>
-          <a:lstStyle/>
-          <a:p>
-            <a:pPr algn="ctr"/>
-            <a:endParaRPr lang="en-US"/>
-          </a:p>
-        </p:txBody>
-      </p:sp>
-      <p:sp>
-        <p:nvSpPr>
-          <p:cNvPr id="11" name="Rectangle 10"/>
-          <p:cNvSpPr/>
-          <p:nvPr/>
-        </p:nvSpPr>
-        <p:spPr>
-          <a:xfrm>
-            <a:off x="28270199" y="599536"/>
-            <a:ext cx="4648200" cy="4550229"/>
-          </a:xfrm>
-          <a:prstGeom prst="rect">
-            <a:avLst/>
-          </a:prstGeom>
-        </p:spPr>
-        <p:style>
-          <a:lnRef idx="2">
-            <a:schemeClr val="accent1">
-              <a:shade val="50000"/>
-            </a:schemeClr>
-          </a:lnRef>
-          <a:fillRef idx="1">
-            <a:schemeClr val="accent1"/>
-          </a:fillRef>
-          <a:effectRef idx="0">
-            <a:schemeClr val="accent1"/>
-          </a:effectRef>
-          <a:fontRef idx="minor">
-            <a:schemeClr val="lt1"/>
-          </a:fontRef>
-        </p:style>
-        <p:txBody>
-          <a:bodyPr rtlCol="0" anchor="ctr"/>
-          <a:lstStyle/>
-          <a:p>
-            <a:pPr algn="ctr"/>
-            <a:endParaRPr lang="en-US"/>
-          </a:p>
-        </p:txBody>
-      </p:sp>
-      <p:sp>
-        <p:nvSpPr>
-          <p:cNvPr id="12" name="Rectangle 11"/>
-          <p:cNvSpPr/>
-          <p:nvPr/>
-        </p:nvSpPr>
-        <p:spPr>
-          <a:xfrm>
-            <a:off x="37414199" y="599534"/>
-            <a:ext cx="4648200" cy="4550229"/>
-          </a:xfrm>
-          <a:prstGeom prst="rect">
-            <a:avLst/>
-          </a:prstGeom>
-        </p:spPr>
-        <p:style>
-          <a:lnRef idx="2">
-            <a:schemeClr val="accent1">
-              <a:shade val="50000"/>
-            </a:schemeClr>
-          </a:lnRef>
-          <a:fillRef idx="1">
-            <a:schemeClr val="accent1"/>
-          </a:fillRef>
-          <a:effectRef idx="0">
-            <a:schemeClr val="accent1"/>
-          </a:effectRef>
-          <a:fontRef idx="minor">
-            <a:schemeClr val="lt1"/>
-          </a:fontRef>
-        </p:style>
-        <p:txBody>
-          <a:bodyPr rtlCol="0" anchor="ctr"/>
-          <a:lstStyle/>
-          <a:p>
-            <a:pPr algn="ctr"/>
-            <a:endParaRPr lang="en-US"/>
-          </a:p>
-        </p:txBody>
-      </p:sp>
-      <p:sp>
-        <p:nvSpPr>
           <p:cNvPr id="14" name="Rounded Rectangle 13"/>
           <p:cNvSpPr/>
           <p:nvPr/>
         </p:nvSpPr>
         <p:spPr>
           <a:xfrm>
-            <a:off x="10972799" y="28247340"/>
-            <a:ext cx="21945600" cy="4556760"/>
+            <a:off x="10972799" y="26746200"/>
+            <a:ext cx="21945600" cy="5152876"/>
           </a:xfrm>
           <a:prstGeom prst="roundRect">
             <a:avLst/>
@@ -3404,12 +3266,17 @@
         </p:nvSpPr>
         <p:spPr>
           <a:xfrm>
-            <a:off x="10972800" y="7315200"/>
-            <a:ext cx="21945599" cy="20193000"/>
+            <a:off x="10972800" y="4693580"/>
+            <a:ext cx="21945599" cy="21747820"/>
           </a:xfrm>
           <a:prstGeom prst="roundRect">
             <a:avLst/>
           </a:prstGeom>
+          <a:solidFill>
+            <a:schemeClr val="bg1">
+              <a:alpha val="75000"/>
+            </a:schemeClr>
+          </a:solidFill>
         </p:spPr>
         <p:style>
           <a:lnRef idx="2">
@@ -3551,18 +3418,23 @@
       </p:sp>
       <p:sp>
         <p:nvSpPr>
-          <p:cNvPr id="18" name="Rounded Rectangle 17"/>
+          <p:cNvPr id="19" name="Rounded Rectangle 18"/>
           <p:cNvSpPr/>
           <p:nvPr/>
         </p:nvSpPr>
         <p:spPr>
           <a:xfrm>
-            <a:off x="0" y="7315200"/>
-            <a:ext cx="10515600" cy="13639800"/>
+            <a:off x="33375600" y="12420600"/>
+            <a:ext cx="10515600" cy="8610600"/>
           </a:xfrm>
           <a:prstGeom prst="roundRect">
             <a:avLst/>
           </a:prstGeom>
+          <a:solidFill>
+            <a:schemeClr val="bg1">
+              <a:alpha val="75000"/>
+            </a:schemeClr>
+          </a:solidFill>
         </p:spPr>
         <p:style>
           <a:lnRef idx="2">
@@ -3591,18 +3463,838 @@
       </p:sp>
       <p:sp>
         <p:nvSpPr>
-          <p:cNvPr id="19" name="Rounded Rectangle 18"/>
+          <p:cNvPr id="20" name="Rectangle 19"/>
           <p:cNvSpPr/>
           <p:nvPr/>
         </p:nvSpPr>
         <p:spPr>
           <a:xfrm>
-            <a:off x="33375600" y="7391400"/>
-            <a:ext cx="10515600" cy="13639800"/>
+            <a:off x="30480" y="5101040"/>
+            <a:ext cx="10500360" cy="8309967"/>
+          </a:xfrm>
+          <a:prstGeom prst="rect">
+            <a:avLst/>
+          </a:prstGeom>
+          <a:noFill/>
+        </p:spPr>
+        <p:txBody>
+          <a:bodyPr wrap="square" lIns="91440" tIns="45720" rIns="91440" bIns="45720">
+            <a:spAutoFit/>
+          </a:bodyPr>
+          <a:lstStyle/>
+          <a:p>
+            <a:pPr algn="ctr"/>
+            <a:r>
+              <a:rPr lang="en-US" sz="5400" b="0" cap="none" spc="0" dirty="0" smtClean="0">
+                <a:ln w="18415" cmpd="sng">
+                  <a:solidFill>
+                    <a:srgbClr val="FFFFFF"/>
+                  </a:solidFill>
+                  <a:prstDash val="solid"/>
+                </a:ln>
+                <a:solidFill>
+                  <a:schemeClr val="bg1"/>
+                </a:solidFill>
+                <a:effectLst>
+                  <a:outerShdw blurRad="63500" dir="3600000" algn="tl" rotWithShape="0">
+                    <a:srgbClr val="000000">
+                      <a:alpha val="70000"/>
+                    </a:srgbClr>
+                  </a:outerShdw>
+                </a:effectLst>
+              </a:rPr>
+              <a:t>Background / Problem Statement?</a:t>
+            </a:r>
+          </a:p>
+          <a:p>
+            <a:r>
+              <a:rPr lang="en-US" sz="4800" dirty="0">
+                <a:solidFill>
+                  <a:schemeClr val="bg1"/>
+                </a:solidFill>
+              </a:rPr>
+              <a:t>Lorem ipsum dolor sit </a:t>
+            </a:r>
+            <a:r>
+              <a:rPr lang="en-US" sz="4800" dirty="0" err="1">
+                <a:solidFill>
+                  <a:schemeClr val="bg1"/>
+                </a:solidFill>
+              </a:rPr>
+              <a:t>amet</a:t>
+            </a:r>
+            <a:r>
+              <a:rPr lang="en-US" sz="4800" dirty="0">
+                <a:solidFill>
+                  <a:schemeClr val="bg1"/>
+                </a:solidFill>
+              </a:rPr>
+              <a:t>, </a:t>
+            </a:r>
+            <a:r>
+              <a:rPr lang="en-US" sz="4800" dirty="0" err="1">
+                <a:solidFill>
+                  <a:schemeClr val="bg1"/>
+                </a:solidFill>
+              </a:rPr>
+              <a:t>consectetur</a:t>
+            </a:r>
+            <a:r>
+              <a:rPr lang="en-US" sz="4800" dirty="0">
+                <a:solidFill>
+                  <a:schemeClr val="bg1"/>
+                </a:solidFill>
+              </a:rPr>
+              <a:t> </a:t>
+            </a:r>
+            <a:r>
+              <a:rPr lang="en-US" sz="4800" dirty="0" err="1">
+                <a:solidFill>
+                  <a:schemeClr val="bg1"/>
+                </a:solidFill>
+              </a:rPr>
+              <a:t>adipiscing</a:t>
+            </a:r>
+            <a:r>
+              <a:rPr lang="en-US" sz="4800" dirty="0">
+                <a:solidFill>
+                  <a:schemeClr val="bg1"/>
+                </a:solidFill>
+              </a:rPr>
+              <a:t> </a:t>
+            </a:r>
+            <a:r>
+              <a:rPr lang="en-US" sz="4800" dirty="0" err="1">
+                <a:solidFill>
+                  <a:schemeClr val="bg1"/>
+                </a:solidFill>
+              </a:rPr>
+              <a:t>elit</a:t>
+            </a:r>
+            <a:r>
+              <a:rPr lang="en-US" sz="4800" dirty="0">
+                <a:solidFill>
+                  <a:schemeClr val="bg1"/>
+                </a:solidFill>
+              </a:rPr>
+              <a:t>. Integer </a:t>
+            </a:r>
+            <a:r>
+              <a:rPr lang="en-US" sz="4800" dirty="0" err="1">
+                <a:solidFill>
+                  <a:schemeClr val="bg1"/>
+                </a:solidFill>
+              </a:rPr>
+              <a:t>finibus</a:t>
+            </a:r>
+            <a:r>
+              <a:rPr lang="en-US" sz="4800" dirty="0">
+                <a:solidFill>
+                  <a:schemeClr val="bg1"/>
+                </a:solidFill>
+              </a:rPr>
+              <a:t> vitae </a:t>
+            </a:r>
+            <a:r>
+              <a:rPr lang="en-US" sz="4800" dirty="0" err="1">
+                <a:solidFill>
+                  <a:schemeClr val="bg1"/>
+                </a:solidFill>
+              </a:rPr>
+              <a:t>est</a:t>
+            </a:r>
+            <a:r>
+              <a:rPr lang="en-US" sz="4800" dirty="0">
+                <a:solidFill>
+                  <a:schemeClr val="bg1"/>
+                </a:solidFill>
+              </a:rPr>
+              <a:t> convallis </a:t>
+            </a:r>
+            <a:r>
+              <a:rPr lang="en-US" sz="4800" dirty="0" err="1">
+                <a:solidFill>
+                  <a:schemeClr val="bg1"/>
+                </a:solidFill>
+              </a:rPr>
+              <a:t>tristique</a:t>
+            </a:r>
+            <a:r>
+              <a:rPr lang="en-US" sz="4800" dirty="0">
+                <a:solidFill>
+                  <a:schemeClr val="bg1"/>
+                </a:solidFill>
+              </a:rPr>
+              <a:t>. </a:t>
+            </a:r>
+            <a:r>
+              <a:rPr lang="en-US" sz="4800" dirty="0" err="1">
+                <a:solidFill>
+                  <a:schemeClr val="bg1"/>
+                </a:solidFill>
+              </a:rPr>
+              <a:t>Morbi</a:t>
+            </a:r>
+            <a:r>
+              <a:rPr lang="en-US" sz="4800" dirty="0">
+                <a:solidFill>
+                  <a:schemeClr val="bg1"/>
+                </a:solidFill>
+              </a:rPr>
+              <a:t> </a:t>
+            </a:r>
+            <a:r>
+              <a:rPr lang="en-US" sz="4800" dirty="0" err="1">
+                <a:solidFill>
+                  <a:schemeClr val="bg1"/>
+                </a:solidFill>
+              </a:rPr>
+              <a:t>quis</a:t>
+            </a:r>
+            <a:r>
+              <a:rPr lang="en-US" sz="4800" dirty="0">
+                <a:solidFill>
+                  <a:schemeClr val="bg1"/>
+                </a:solidFill>
+              </a:rPr>
+              <a:t> </a:t>
+            </a:r>
+            <a:r>
+              <a:rPr lang="en-US" sz="4800" dirty="0" err="1">
+                <a:solidFill>
+                  <a:schemeClr val="bg1"/>
+                </a:solidFill>
+              </a:rPr>
+              <a:t>nunc</a:t>
+            </a:r>
+            <a:r>
+              <a:rPr lang="en-US" sz="4800" dirty="0">
+                <a:solidFill>
+                  <a:schemeClr val="bg1"/>
+                </a:solidFill>
+              </a:rPr>
+              <a:t> id lorem </a:t>
+            </a:r>
+            <a:r>
+              <a:rPr lang="en-US" sz="4800" dirty="0" err="1">
+                <a:solidFill>
+                  <a:schemeClr val="bg1"/>
+                </a:solidFill>
+              </a:rPr>
+              <a:t>iaculis</a:t>
+            </a:r>
+            <a:r>
+              <a:rPr lang="en-US" sz="4800" dirty="0">
+                <a:solidFill>
+                  <a:schemeClr val="bg1"/>
+                </a:solidFill>
+              </a:rPr>
+              <a:t> </a:t>
+            </a:r>
+            <a:r>
+              <a:rPr lang="en-US" sz="4800" dirty="0" err="1">
+                <a:solidFill>
+                  <a:schemeClr val="bg1"/>
+                </a:solidFill>
+              </a:rPr>
+              <a:t>mattis</a:t>
+            </a:r>
+            <a:r>
+              <a:rPr lang="en-US" sz="4800" dirty="0">
+                <a:solidFill>
+                  <a:schemeClr val="bg1"/>
+                </a:solidFill>
+              </a:rPr>
+              <a:t> vitae </a:t>
+            </a:r>
+            <a:r>
+              <a:rPr lang="en-US" sz="4800" dirty="0" err="1">
+                <a:solidFill>
+                  <a:schemeClr val="bg1"/>
+                </a:solidFill>
+              </a:rPr>
+              <a:t>sed</a:t>
+            </a:r>
+            <a:r>
+              <a:rPr lang="en-US" sz="4800" dirty="0">
+                <a:solidFill>
+                  <a:schemeClr val="bg1"/>
+                </a:solidFill>
+              </a:rPr>
+              <a:t> </a:t>
+            </a:r>
+            <a:r>
+              <a:rPr lang="en-US" sz="4800" dirty="0" err="1">
+                <a:solidFill>
+                  <a:schemeClr val="bg1"/>
+                </a:solidFill>
+              </a:rPr>
+              <a:t>eros</a:t>
+            </a:r>
+            <a:r>
+              <a:rPr lang="en-US" sz="4800" dirty="0">
+                <a:solidFill>
+                  <a:schemeClr val="bg1"/>
+                </a:solidFill>
+              </a:rPr>
+              <a:t>. Nam </a:t>
+            </a:r>
+            <a:r>
+              <a:rPr lang="en-US" sz="4800" dirty="0" err="1">
+                <a:solidFill>
+                  <a:schemeClr val="bg1"/>
+                </a:solidFill>
+              </a:rPr>
+              <a:t>sed</a:t>
+            </a:r>
+            <a:r>
+              <a:rPr lang="en-US" sz="4800" dirty="0">
+                <a:solidFill>
+                  <a:schemeClr val="bg1"/>
+                </a:solidFill>
+              </a:rPr>
+              <a:t> </a:t>
+            </a:r>
+            <a:r>
+              <a:rPr lang="en-US" sz="4800" dirty="0" err="1">
+                <a:solidFill>
+                  <a:schemeClr val="bg1"/>
+                </a:solidFill>
+              </a:rPr>
+              <a:t>tristique</a:t>
+            </a:r>
+            <a:r>
+              <a:rPr lang="en-US" sz="4800" dirty="0">
+                <a:solidFill>
+                  <a:schemeClr val="bg1"/>
+                </a:solidFill>
+              </a:rPr>
+              <a:t> ante. </a:t>
+            </a:r>
+            <a:r>
+              <a:rPr lang="en-US" sz="4800" dirty="0" err="1">
+                <a:solidFill>
+                  <a:schemeClr val="bg1"/>
+                </a:solidFill>
+              </a:rPr>
+              <a:t>Curabitur</a:t>
+            </a:r>
+            <a:r>
+              <a:rPr lang="en-US" sz="4800" dirty="0">
+                <a:solidFill>
+                  <a:schemeClr val="bg1"/>
+                </a:solidFill>
+              </a:rPr>
+              <a:t> </a:t>
+            </a:r>
+            <a:r>
+              <a:rPr lang="en-US" sz="4800" dirty="0" err="1">
+                <a:solidFill>
+                  <a:schemeClr val="bg1"/>
+                </a:solidFill>
+              </a:rPr>
+              <a:t>commodo</a:t>
+            </a:r>
+            <a:r>
+              <a:rPr lang="en-US" sz="4800" dirty="0">
+                <a:solidFill>
+                  <a:schemeClr val="bg1"/>
+                </a:solidFill>
+              </a:rPr>
+              <a:t> ligula at ex </a:t>
+            </a:r>
+            <a:r>
+              <a:rPr lang="en-US" sz="4800" dirty="0" err="1">
+                <a:solidFill>
+                  <a:schemeClr val="bg1"/>
+                </a:solidFill>
+              </a:rPr>
+              <a:t>placerat</a:t>
+            </a:r>
+            <a:r>
+              <a:rPr lang="en-US" sz="4800" dirty="0">
+                <a:solidFill>
+                  <a:schemeClr val="bg1"/>
+                </a:solidFill>
+              </a:rPr>
+              <a:t> </a:t>
+            </a:r>
+            <a:r>
+              <a:rPr lang="en-US" sz="4800" dirty="0" err="1">
+                <a:solidFill>
+                  <a:schemeClr val="bg1"/>
+                </a:solidFill>
+              </a:rPr>
+              <a:t>fringilla</a:t>
+            </a:r>
+            <a:r>
+              <a:rPr lang="en-US" sz="4800" dirty="0">
+                <a:solidFill>
+                  <a:schemeClr val="bg1"/>
+                </a:solidFill>
+              </a:rPr>
+              <a:t>. </a:t>
+            </a:r>
+            <a:r>
+              <a:rPr lang="en-US" sz="4800" dirty="0" err="1">
+                <a:solidFill>
+                  <a:schemeClr val="bg1"/>
+                </a:solidFill>
+              </a:rPr>
+              <a:t>Ut</a:t>
+            </a:r>
+            <a:r>
+              <a:rPr lang="en-US" sz="4800" dirty="0">
+                <a:solidFill>
+                  <a:schemeClr val="bg1"/>
+                </a:solidFill>
+              </a:rPr>
+              <a:t> </a:t>
+            </a:r>
+            <a:r>
+              <a:rPr lang="en-US" sz="4800" dirty="0" err="1">
+                <a:solidFill>
+                  <a:schemeClr val="bg1"/>
+                </a:solidFill>
+              </a:rPr>
+              <a:t>venenatis</a:t>
+            </a:r>
+            <a:r>
+              <a:rPr lang="en-US" sz="4800" dirty="0">
+                <a:solidFill>
+                  <a:schemeClr val="bg1"/>
+                </a:solidFill>
+              </a:rPr>
+              <a:t> maximus </a:t>
+            </a:r>
+            <a:r>
+              <a:rPr lang="en-US" sz="4800" dirty="0" err="1">
+                <a:solidFill>
+                  <a:schemeClr val="bg1"/>
+                </a:solidFill>
+              </a:rPr>
+              <a:t>metus</a:t>
+            </a:r>
+            <a:r>
+              <a:rPr lang="en-US" sz="4800" dirty="0">
+                <a:solidFill>
+                  <a:schemeClr val="bg1"/>
+                </a:solidFill>
+              </a:rPr>
+              <a:t> </a:t>
+            </a:r>
+            <a:r>
+              <a:rPr lang="en-US" sz="4800" dirty="0" err="1">
+                <a:solidFill>
+                  <a:schemeClr val="bg1"/>
+                </a:solidFill>
+              </a:rPr>
+              <a:t>eu</a:t>
+            </a:r>
+            <a:r>
+              <a:rPr lang="en-US" sz="4800" dirty="0">
+                <a:solidFill>
+                  <a:schemeClr val="bg1"/>
+                </a:solidFill>
+              </a:rPr>
+              <a:t> </a:t>
+            </a:r>
+            <a:r>
+              <a:rPr lang="en-US" sz="4800" dirty="0" err="1">
+                <a:solidFill>
+                  <a:schemeClr val="bg1"/>
+                </a:solidFill>
+              </a:rPr>
+              <a:t>sodales</a:t>
+            </a:r>
+            <a:r>
+              <a:rPr lang="en-US" sz="4800" dirty="0">
+                <a:solidFill>
+                  <a:schemeClr val="bg1"/>
+                </a:solidFill>
+              </a:rPr>
+              <a:t>. </a:t>
+            </a:r>
+            <a:r>
+              <a:rPr lang="en-US" sz="4800" dirty="0" err="1">
+                <a:solidFill>
+                  <a:schemeClr val="bg1"/>
+                </a:solidFill>
+              </a:rPr>
+              <a:t>Ut</a:t>
+            </a:r>
+            <a:r>
+              <a:rPr lang="en-US" sz="4800" dirty="0">
+                <a:solidFill>
+                  <a:schemeClr val="bg1"/>
+                </a:solidFill>
+              </a:rPr>
+              <a:t> </a:t>
+            </a:r>
+            <a:r>
+              <a:rPr lang="en-US" sz="4800" dirty="0" err="1">
+                <a:solidFill>
+                  <a:schemeClr val="bg1"/>
+                </a:solidFill>
+              </a:rPr>
+              <a:t>metus</a:t>
+            </a:r>
+            <a:r>
+              <a:rPr lang="en-US" sz="4800" dirty="0">
+                <a:solidFill>
+                  <a:schemeClr val="bg1"/>
+                </a:solidFill>
+              </a:rPr>
+              <a:t> </a:t>
+            </a:r>
+            <a:r>
+              <a:rPr lang="en-US" sz="4800" dirty="0" err="1">
+                <a:solidFill>
+                  <a:schemeClr val="bg1"/>
+                </a:solidFill>
+              </a:rPr>
+              <a:t>erat</a:t>
+            </a:r>
+            <a:r>
+              <a:rPr lang="en-US" sz="4800" dirty="0">
+                <a:solidFill>
+                  <a:schemeClr val="bg1"/>
+                </a:solidFill>
+              </a:rPr>
+              <a:t>, </a:t>
+            </a:r>
+            <a:r>
+              <a:rPr lang="en-US" sz="4800" dirty="0" err="1">
+                <a:solidFill>
+                  <a:schemeClr val="bg1"/>
+                </a:solidFill>
+              </a:rPr>
+              <a:t>sodales</a:t>
+            </a:r>
+            <a:r>
+              <a:rPr lang="en-US" sz="4800" dirty="0">
+                <a:solidFill>
+                  <a:schemeClr val="bg1"/>
+                </a:solidFill>
+              </a:rPr>
+              <a:t> </a:t>
+            </a:r>
+            <a:r>
+              <a:rPr lang="en-US" sz="4800" dirty="0" err="1">
+                <a:solidFill>
+                  <a:schemeClr val="bg1"/>
+                </a:solidFill>
+              </a:rPr>
+              <a:t>nec</a:t>
+            </a:r>
+            <a:r>
+              <a:rPr lang="en-US" sz="4800" dirty="0">
+                <a:solidFill>
+                  <a:schemeClr val="bg1"/>
+                </a:solidFill>
+              </a:rPr>
+              <a:t> </a:t>
+            </a:r>
+            <a:r>
+              <a:rPr lang="en-US" sz="4800" dirty="0" err="1">
+                <a:solidFill>
+                  <a:schemeClr val="bg1"/>
+                </a:solidFill>
+              </a:rPr>
+              <a:t>dapibus</a:t>
+            </a:r>
+            <a:r>
+              <a:rPr lang="en-US" sz="4800" dirty="0">
+                <a:solidFill>
+                  <a:schemeClr val="bg1"/>
+                </a:solidFill>
+              </a:rPr>
+              <a:t> </a:t>
+            </a:r>
+            <a:r>
+              <a:rPr lang="en-US" sz="4800" dirty="0" err="1">
+                <a:solidFill>
+                  <a:schemeClr val="bg1"/>
+                </a:solidFill>
+              </a:rPr>
+              <a:t>nec</a:t>
+            </a:r>
+            <a:r>
+              <a:rPr lang="en-US" sz="4800" dirty="0">
+                <a:solidFill>
+                  <a:schemeClr val="bg1"/>
+                </a:solidFill>
+              </a:rPr>
+              <a:t>, </a:t>
+            </a:r>
+            <a:r>
+              <a:rPr lang="en-US" sz="4800" dirty="0" err="1">
+                <a:solidFill>
+                  <a:schemeClr val="bg1"/>
+                </a:solidFill>
+              </a:rPr>
+              <a:t>molestie</a:t>
+            </a:r>
+            <a:r>
+              <a:rPr lang="en-US" sz="4800" dirty="0">
+                <a:solidFill>
+                  <a:schemeClr val="bg1"/>
+                </a:solidFill>
+              </a:rPr>
+              <a:t> </a:t>
+            </a:r>
+            <a:r>
+              <a:rPr lang="en-US" sz="4800" dirty="0" err="1">
+                <a:solidFill>
+                  <a:schemeClr val="bg1"/>
+                </a:solidFill>
+              </a:rPr>
+              <a:t>quis</a:t>
+            </a:r>
+            <a:r>
+              <a:rPr lang="en-US" sz="4800" dirty="0">
+                <a:solidFill>
+                  <a:schemeClr val="bg1"/>
+                </a:solidFill>
+              </a:rPr>
+              <a:t> </a:t>
+            </a:r>
+            <a:r>
+              <a:rPr lang="en-US" sz="4800" dirty="0" err="1">
+                <a:solidFill>
+                  <a:schemeClr val="bg1"/>
+                </a:solidFill>
+              </a:rPr>
+              <a:t>elit</a:t>
+            </a:r>
+            <a:r>
+              <a:rPr lang="en-US" sz="4800" dirty="0">
+                <a:solidFill>
+                  <a:schemeClr val="bg1"/>
+                </a:solidFill>
+              </a:rPr>
+              <a:t>. </a:t>
+            </a:r>
+            <a:r>
+              <a:rPr lang="en-US" sz="4800" dirty="0" err="1">
+                <a:solidFill>
+                  <a:schemeClr val="bg1"/>
+                </a:solidFill>
+              </a:rPr>
+              <a:t>Vestibulum</a:t>
+            </a:r>
+            <a:r>
+              <a:rPr lang="en-US" sz="4800" dirty="0">
+                <a:solidFill>
+                  <a:schemeClr val="bg1"/>
+                </a:solidFill>
+              </a:rPr>
+              <a:t> </a:t>
+            </a:r>
+            <a:r>
+              <a:rPr lang="en-US" sz="4800" dirty="0" err="1">
+                <a:solidFill>
+                  <a:schemeClr val="bg1"/>
+                </a:solidFill>
+              </a:rPr>
+              <a:t>vel</a:t>
+            </a:r>
+            <a:r>
+              <a:rPr lang="en-US" sz="4800" dirty="0">
+                <a:solidFill>
+                  <a:schemeClr val="bg1"/>
+                </a:solidFill>
+              </a:rPr>
+              <a:t> </a:t>
+            </a:r>
+            <a:r>
+              <a:rPr lang="en-US" sz="4800" dirty="0" err="1">
+                <a:solidFill>
+                  <a:schemeClr val="bg1"/>
+                </a:solidFill>
+              </a:rPr>
+              <a:t>nibh</a:t>
+            </a:r>
+            <a:r>
+              <a:rPr lang="en-US" sz="4800" dirty="0">
+                <a:solidFill>
+                  <a:schemeClr val="bg1"/>
+                </a:solidFill>
+              </a:rPr>
+              <a:t> </a:t>
+            </a:r>
+            <a:r>
+              <a:rPr lang="en-US" sz="4800" dirty="0" err="1">
+                <a:solidFill>
+                  <a:schemeClr val="bg1"/>
+                </a:solidFill>
+              </a:rPr>
+              <a:t>mauris</a:t>
+            </a:r>
+            <a:r>
+              <a:rPr lang="en-US" sz="4800" dirty="0">
+                <a:solidFill>
+                  <a:schemeClr val="bg1"/>
+                </a:solidFill>
+              </a:rPr>
+              <a:t>. </a:t>
+            </a:r>
+            <a:r>
+              <a:rPr lang="en-US" sz="4800" dirty="0" err="1">
+                <a:solidFill>
+                  <a:schemeClr val="bg1"/>
+                </a:solidFill>
+              </a:rPr>
+              <a:t>Cras</a:t>
+            </a:r>
+            <a:r>
+              <a:rPr lang="en-US" sz="4800" dirty="0">
+                <a:solidFill>
+                  <a:schemeClr val="bg1"/>
+                </a:solidFill>
+              </a:rPr>
+              <a:t> </a:t>
+            </a:r>
+            <a:r>
+              <a:rPr lang="en-US" sz="4800" dirty="0" err="1">
+                <a:solidFill>
+                  <a:schemeClr val="bg1"/>
+                </a:solidFill>
+              </a:rPr>
+              <a:t>ut</a:t>
+            </a:r>
+            <a:r>
+              <a:rPr lang="en-US" sz="4800" dirty="0">
+                <a:solidFill>
+                  <a:schemeClr val="bg1"/>
+                </a:solidFill>
+              </a:rPr>
+              <a:t> </a:t>
+            </a:r>
+            <a:r>
+              <a:rPr lang="en-US" sz="4800" dirty="0" err="1">
+                <a:solidFill>
+                  <a:schemeClr val="bg1"/>
+                </a:solidFill>
+              </a:rPr>
+              <a:t>feugiat</a:t>
+            </a:r>
+            <a:r>
+              <a:rPr lang="en-US" sz="4800" dirty="0">
+                <a:solidFill>
+                  <a:schemeClr val="bg1"/>
+                </a:solidFill>
+              </a:rPr>
+              <a:t> </a:t>
+            </a:r>
+            <a:r>
+              <a:rPr lang="en-US" sz="4800" dirty="0" err="1">
+                <a:solidFill>
+                  <a:schemeClr val="bg1"/>
+                </a:solidFill>
+              </a:rPr>
+              <a:t>augue</a:t>
+            </a:r>
+            <a:r>
+              <a:rPr lang="en-US" sz="4800" dirty="0" smtClean="0">
+                <a:solidFill>
+                  <a:schemeClr val="bg1"/>
+                </a:solidFill>
+              </a:rPr>
+              <a:t>.</a:t>
+            </a:r>
+            <a:endParaRPr lang="en-US" sz="4800" dirty="0">
+              <a:solidFill>
+                <a:schemeClr val="bg1"/>
+              </a:solidFill>
+            </a:endParaRPr>
+          </a:p>
+        </p:txBody>
+      </p:sp>
+      <p:sp>
+        <p:nvSpPr>
+          <p:cNvPr id="21" name="Rectangle 20"/>
+          <p:cNvSpPr/>
+          <p:nvPr/>
+        </p:nvSpPr>
+        <p:spPr>
+          <a:xfrm>
+            <a:off x="33345120" y="12578238"/>
+            <a:ext cx="10500360" cy="923330"/>
+          </a:xfrm>
+          <a:prstGeom prst="rect">
+            <a:avLst/>
+          </a:prstGeom>
+          <a:noFill/>
+        </p:spPr>
+        <p:txBody>
+          <a:bodyPr wrap="square" lIns="91440" tIns="45720" rIns="91440" bIns="45720">
+            <a:spAutoFit/>
+          </a:bodyPr>
+          <a:lstStyle/>
+          <a:p>
+            <a:pPr algn="ctr"/>
+            <a:r>
+              <a:rPr lang="en-US" sz="5400" b="0" cap="none" spc="0" dirty="0" smtClean="0">
+                <a:ln w="18415" cmpd="sng">
+                  <a:solidFill>
+                    <a:srgbClr val="FFFFFF"/>
+                  </a:solidFill>
+                  <a:prstDash val="solid"/>
+                </a:ln>
+                <a:solidFill>
+                  <a:srgbClr val="FFFFFF"/>
+                </a:solidFill>
+                <a:effectLst>
+                  <a:outerShdw blurRad="63500" dir="3600000" algn="tl" rotWithShape="0">
+                    <a:srgbClr val="000000">
+                      <a:alpha val="70000"/>
+                    </a:srgbClr>
+                  </a:outerShdw>
+                </a:effectLst>
+              </a:rPr>
+              <a:t>Milestones / Achievement List</a:t>
+            </a:r>
+            <a:endParaRPr lang="en-US" sz="5400" b="0" cap="none" spc="0" dirty="0">
+              <a:ln w="18415" cmpd="sng">
+                <a:solidFill>
+                  <a:srgbClr val="FFFFFF"/>
+                </a:solidFill>
+                <a:prstDash val="solid"/>
+              </a:ln>
+              <a:solidFill>
+                <a:srgbClr val="FFFFFF"/>
+              </a:solidFill>
+              <a:effectLst>
+                <a:outerShdw blurRad="63500" dir="3600000" algn="tl" rotWithShape="0">
+                  <a:srgbClr val="000000">
+                    <a:alpha val="70000"/>
+                  </a:srgbClr>
+                </a:outerShdw>
+              </a:effectLst>
+            </a:endParaRPr>
+          </a:p>
+        </p:txBody>
+      </p:sp>
+      <p:sp>
+        <p:nvSpPr>
+          <p:cNvPr id="22" name="Rounded Rectangle 21"/>
+          <p:cNvSpPr/>
+          <p:nvPr/>
+        </p:nvSpPr>
+        <p:spPr>
+          <a:xfrm>
+            <a:off x="-30481" y="16725900"/>
+            <a:ext cx="10515600" cy="16040100"/>
           </a:xfrm>
           <a:prstGeom prst="roundRect">
             <a:avLst/>
           </a:prstGeom>
+          <a:solidFill>
+            <a:schemeClr val="bg1">
+              <a:alpha val="75000"/>
+            </a:schemeClr>
+          </a:solidFill>
         </p:spPr>
         <p:style>
           <a:lnRef idx="2">
@@ -3631,14 +4323,14 @@
       </p:sp>
       <p:sp>
         <p:nvSpPr>
-          <p:cNvPr id="20" name="Rectangle 19"/>
+          <p:cNvPr id="23" name="Rectangle 22"/>
           <p:cNvSpPr/>
           <p:nvPr/>
         </p:nvSpPr>
         <p:spPr>
           <a:xfrm>
-            <a:off x="15240" y="9906000"/>
-            <a:ext cx="10500360" cy="923330"/>
+            <a:off x="30480" y="23164800"/>
+            <a:ext cx="10485120" cy="1754326"/>
           </a:xfrm>
           <a:prstGeom prst="rect">
             <a:avLst/>
@@ -3671,7 +4363,31 @@
                   </a:outerShdw>
                 </a:effectLst>
               </a:rPr>
-              <a:t>Background / Problem Statement?</a:t>
+              <a:t>Scope limitation / design decisions</a:t>
+            </a:r>
+          </a:p>
+          <a:p>
+            <a:pPr algn="ctr"/>
+            <a:r>
+              <a:rPr lang="en-US" sz="5400" dirty="0" smtClean="0">
+                <a:ln w="18415" cmpd="sng">
+                  <a:solidFill>
+                    <a:srgbClr val="FFFFFF"/>
+                  </a:solidFill>
+                  <a:prstDash val="solid"/>
+                </a:ln>
+                <a:solidFill>
+                  <a:srgbClr val="FFFFFF"/>
+                </a:solidFill>
+                <a:effectLst>
+                  <a:outerShdw blurRad="63500" dir="3600000" algn="tl" rotWithShape="0">
+                    <a:srgbClr val="000000">
+                      <a:alpha val="70000"/>
+                    </a:srgbClr>
+                  </a:outerShdw>
+                </a:effectLst>
+              </a:rPr>
+              <a:t>Challenges/roadblocks?</a:t>
             </a:r>
             <a:endParaRPr lang="en-US" sz="5400" b="0" cap="none" spc="0" dirty="0">
               <a:ln w="18415" cmpd="sng">
@@ -3696,83 +4412,23 @@
       </p:sp>
       <p:sp>
         <p:nvSpPr>
-          <p:cNvPr id="21" name="Rectangle 20"/>
+          <p:cNvPr id="24" name="Rounded Rectangle 23"/>
           <p:cNvSpPr/>
           <p:nvPr/>
         </p:nvSpPr>
         <p:spPr>
           <a:xfrm>
-            <a:off x="33390840" y="9596735"/>
-            <a:ext cx="10500360" cy="923330"/>
-          </a:xfrm>
-          <a:prstGeom prst="rect">
-            <a:avLst/>
-          </a:prstGeom>
-          <a:noFill/>
-        </p:spPr>
-        <p:txBody>
-          <a:bodyPr wrap="square" lIns="91440" tIns="45720" rIns="91440" bIns="45720">
-            <a:spAutoFit/>
-          </a:bodyPr>
-          <a:lstStyle/>
-          <a:p>
-            <a:pPr algn="ctr"/>
-            <a:r>
-              <a:rPr lang="en-US" sz="5400" b="0" cap="none" spc="0" dirty="0" smtClean="0">
-                <a:ln w="18415" cmpd="sng">
-                  <a:solidFill>
-                    <a:srgbClr val="FFFFFF"/>
-                  </a:solidFill>
-                  <a:prstDash val="solid"/>
-                </a:ln>
-                <a:solidFill>
-                  <a:srgbClr val="FFFFFF"/>
-                </a:solidFill>
-                <a:effectLst>
-                  <a:outerShdw blurRad="63500" dir="3600000" algn="tl" rotWithShape="0">
-                    <a:srgbClr val="000000">
-                      <a:alpha val="70000"/>
-                    </a:srgbClr>
-                  </a:outerShdw>
-                </a:effectLst>
-              </a:rPr>
-              <a:t>Milestones / Achievement List</a:t>
-            </a:r>
-            <a:endParaRPr lang="en-US" sz="5400" b="0" cap="none" spc="0" dirty="0">
-              <a:ln w="18415" cmpd="sng">
-                <a:solidFill>
-                  <a:srgbClr val="FFFFFF"/>
-                </a:solidFill>
-                <a:prstDash val="solid"/>
-              </a:ln>
-              <a:solidFill>
-                <a:srgbClr val="FFFFFF"/>
-              </a:solidFill>
-              <a:effectLst>
-                <a:outerShdw blurRad="63500" dir="3600000" algn="tl" rotWithShape="0">
-                  <a:srgbClr val="000000">
-                    <a:alpha val="70000"/>
-                  </a:srgbClr>
-                </a:outerShdw>
-              </a:effectLst>
-            </a:endParaRPr>
-          </a:p>
-        </p:txBody>
-      </p:sp>
-      <p:sp>
-        <p:nvSpPr>
-          <p:cNvPr id="22" name="Rounded Rectangle 21"/>
-          <p:cNvSpPr/>
-          <p:nvPr/>
-        </p:nvSpPr>
-        <p:spPr>
-          <a:xfrm>
-            <a:off x="-30481" y="21869400"/>
+            <a:off x="33299399" y="21717000"/>
             <a:ext cx="10515600" cy="11049000"/>
           </a:xfrm>
           <a:prstGeom prst="roundRect">
             <a:avLst/>
           </a:prstGeom>
+          <a:solidFill>
+            <a:schemeClr val="bg1">
+              <a:alpha val="75000"/>
+            </a:schemeClr>
+          </a:solidFill>
         </p:spPr>
         <p:style>
           <a:lnRef idx="2">
@@ -3801,13 +4457,13 @@
       </p:sp>
       <p:sp>
         <p:nvSpPr>
-          <p:cNvPr id="23" name="Rectangle 22"/>
+          <p:cNvPr id="25" name="Rectangle 24"/>
           <p:cNvSpPr/>
           <p:nvPr/>
         </p:nvSpPr>
         <p:spPr>
           <a:xfrm>
-            <a:off x="30480" y="23164800"/>
+            <a:off x="33360360" y="23195280"/>
             <a:ext cx="10485120" cy="923330"/>
           </a:xfrm>
           <a:prstGeom prst="rect">
@@ -3841,7 +4497,28 @@
                   </a:outerShdw>
                 </a:effectLst>
               </a:rPr>
-              <a:t>Scope limitation / design decisions</a:t>
+              <a:t>The </a:t>
+            </a:r>
+            <a:r>
+              <a:rPr lang="en-US" sz="5400" b="0" cap="none" spc="0" dirty="0" err="1" smtClean="0">
+                <a:ln w="18415" cmpd="sng">
+                  <a:solidFill>
+                    <a:srgbClr val="FFFFFF"/>
+                  </a:solidFill>
+                  <a:prstDash val="solid"/>
+                </a:ln>
+                <a:solidFill>
+                  <a:srgbClr val="FFFFFF"/>
+                </a:solidFill>
+                <a:effectLst>
+                  <a:outerShdw blurRad="63500" dir="3600000" algn="tl" rotWithShape="0">
+                    <a:srgbClr val="000000">
+                      <a:alpha val="70000"/>
+                    </a:srgbClr>
+                  </a:outerShdw>
+                </a:effectLst>
+              </a:rPr>
+              <a:t>futureeee</a:t>
             </a:r>
             <a:endParaRPr lang="en-US" sz="5400" b="0" cap="none" spc="0" dirty="0">
               <a:ln w="18415" cmpd="sng">
@@ -3866,54 +4543,14 @@
       </p:sp>
       <p:sp>
         <p:nvSpPr>
-          <p:cNvPr id="24" name="Rounded Rectangle 23"/>
-          <p:cNvSpPr/>
+          <p:cNvPr id="31" name="TextBox 30"/>
+          <p:cNvSpPr txBox="1"/>
           <p:nvPr/>
         </p:nvSpPr>
         <p:spPr>
           <a:xfrm>
-            <a:off x="33299399" y="21899880"/>
-            <a:ext cx="10515600" cy="11049000"/>
-          </a:xfrm>
-          <a:prstGeom prst="roundRect">
-            <a:avLst/>
-          </a:prstGeom>
-        </p:spPr>
-        <p:style>
-          <a:lnRef idx="2">
-            <a:schemeClr val="accent1">
-              <a:shade val="50000"/>
-            </a:schemeClr>
-          </a:lnRef>
-          <a:fillRef idx="1">
-            <a:schemeClr val="accent1"/>
-          </a:fillRef>
-          <a:effectRef idx="0">
-            <a:schemeClr val="accent1"/>
-          </a:effectRef>
-          <a:fontRef idx="minor">
-            <a:schemeClr val="lt1"/>
-          </a:fontRef>
-        </p:style>
-        <p:txBody>
-          <a:bodyPr rtlCol="0" anchor="ctr"/>
-          <a:lstStyle/>
-          <a:p>
-            <a:pPr algn="ctr"/>
-            <a:endParaRPr lang="en-US"/>
-          </a:p>
-        </p:txBody>
-      </p:sp>
-      <p:sp>
-        <p:nvSpPr>
-          <p:cNvPr id="25" name="Rectangle 24"/>
-          <p:cNvSpPr/>
-          <p:nvPr/>
-        </p:nvSpPr>
-        <p:spPr>
-          <a:xfrm>
-            <a:off x="33360360" y="23195280"/>
-            <a:ext cx="10485120" cy="923330"/>
+            <a:off x="38541959" y="4639375"/>
+            <a:ext cx="4648198" cy="923330"/>
           </a:xfrm>
           <a:prstGeom prst="rect">
             <a:avLst/>
@@ -3921,70 +4558,65 @@
           <a:noFill/>
         </p:spPr>
         <p:txBody>
-          <a:bodyPr wrap="square" lIns="91440" tIns="45720" rIns="91440" bIns="45720">
+          <a:bodyPr wrap="square" rtlCol="0">
             <a:spAutoFit/>
           </a:bodyPr>
           <a:lstStyle/>
           <a:p>
-            <a:pPr algn="ctr"/>
-            <a:r>
-              <a:rPr lang="en-US" sz="5400" b="0" cap="none" spc="0" dirty="0" smtClean="0">
-                <a:ln w="18415" cmpd="sng">
+            <a:pPr lvl="0"/>
+            <a:r>
+              <a:rPr lang="en-US" sz="5400" b="1" dirty="0" smtClean="0">
+                <a:ln w="900" cmpd="sng">
                   <a:solidFill>
-                    <a:srgbClr val="FFFFFF"/>
+                    <a:srgbClr val="4F81BD">
+                      <a:satMod val="190000"/>
+                      <a:alpha val="55000"/>
+                    </a:srgbClr>
                   </a:solidFill>
                   <a:prstDash val="solid"/>
                 </a:ln>
                 <a:solidFill>
-                  <a:srgbClr val="FFFFFF"/>
+                  <a:srgbClr val="4F81BD">
+                    <a:satMod val="200000"/>
+                    <a:tint val="3000"/>
+                  </a:srgbClr>
                 </a:solidFill>
                 <a:effectLst>
-                  <a:outerShdw blurRad="63500" dir="3600000" algn="tl" rotWithShape="0">
-                    <a:srgbClr val="000000">
-                      <a:alpha val="70000"/>
+                  <a:innerShdw blurRad="101600" dist="76200" dir="5400000">
+                    <a:srgbClr val="4F81BD">
+                      <a:satMod val="190000"/>
+                      <a:tint val="100000"/>
+                      <a:alpha val="74000"/>
                     </a:srgbClr>
-                  </a:outerShdw>
+                  </a:innerShdw>
                 </a:effectLst>
               </a:rPr>
-              <a:t>The </a:t>
-            </a:r>
-            <a:r>
-              <a:rPr lang="en-US" sz="5400" b="0" cap="none" spc="0" dirty="0" err="1" smtClean="0">
-                <a:ln w="18415" cmpd="sng">
-                  <a:solidFill>
-                    <a:srgbClr val="FFFFFF"/>
-                  </a:solidFill>
-                  <a:prstDash val="solid"/>
-                </a:ln>
-                <a:solidFill>
-                  <a:srgbClr val="FFFFFF"/>
-                </a:solidFill>
-                <a:effectLst>
-                  <a:outerShdw blurRad="63500" dir="3600000" algn="tl" rotWithShape="0">
-                    <a:srgbClr val="000000">
-                      <a:alpha val="70000"/>
-                    </a:srgbClr>
-                  </a:outerShdw>
-                </a:effectLst>
-              </a:rPr>
-              <a:t>futureeee</a:t>
-            </a:r>
-            <a:endParaRPr lang="en-US" sz="5400" b="0" cap="none" spc="0" dirty="0">
-              <a:ln w="18415" cmpd="sng">
-                <a:solidFill>
-                  <a:srgbClr val="FFFFFF"/>
+              <a:t>Ryan Benner</a:t>
+            </a:r>
+            <a:endParaRPr lang="en-US" sz="5400" b="1" dirty="0">
+              <a:ln w="900" cmpd="sng">
+                <a:solidFill>
+                  <a:srgbClr val="4F81BD">
+                    <a:satMod val="190000"/>
+                    <a:alpha val="55000"/>
+                  </a:srgbClr>
                 </a:solidFill>
                 <a:prstDash val="solid"/>
               </a:ln>
               <a:solidFill>
-                <a:srgbClr val="FFFFFF"/>
+                <a:srgbClr val="4F81BD">
+                  <a:satMod val="200000"/>
+                  <a:tint val="3000"/>
+                </a:srgbClr>
               </a:solidFill>
               <a:effectLst>
-                <a:outerShdw blurRad="63500" dir="3600000" algn="tl" rotWithShape="0">
-                  <a:srgbClr val="000000">
-                    <a:alpha val="70000"/>
+                <a:innerShdw blurRad="101600" dist="76200" dir="5400000">
+                  <a:srgbClr val="4F81BD">
+                    <a:satMod val="190000"/>
+                    <a:tint val="100000"/>
+                    <a:alpha val="74000"/>
                   </a:srgbClr>
-                </a:outerShdw>
+                </a:innerShdw>
               </a:effectLst>
             </a:endParaRPr>
           </a:p>
@@ -3992,14 +4624,14 @@
       </p:sp>
       <p:sp>
         <p:nvSpPr>
-          <p:cNvPr id="26" name="Rectangle 25"/>
+          <p:cNvPr id="35" name="Rectangle 34"/>
           <p:cNvSpPr/>
           <p:nvPr/>
         </p:nvSpPr>
         <p:spPr>
           <a:xfrm>
-            <a:off x="2823046" y="2582179"/>
-            <a:ext cx="2659703" cy="923330"/>
+            <a:off x="33268919" y="4666131"/>
+            <a:ext cx="4617719" cy="1754326"/>
           </a:xfrm>
           <a:prstGeom prst="rect">
             <a:avLst/>
@@ -4007,64 +4639,137 @@
           <a:noFill/>
         </p:spPr>
         <p:txBody>
-          <a:bodyPr wrap="none" lIns="91440" tIns="45720" rIns="91440" bIns="45720">
+          <a:bodyPr wrap="square" lIns="91440" tIns="45720" rIns="91440" bIns="45720">
             <a:spAutoFit/>
           </a:bodyPr>
           <a:lstStyle/>
           <a:p>
-            <a:pPr algn="ctr"/>
-            <a:r>
-              <a:rPr lang="en-US" sz="5400" b="0" cap="none" spc="0" dirty="0" smtClean="0">
-                <a:ln w="18415" cmpd="sng">
+            <a:r>
+              <a:rPr lang="en-US" sz="5400" b="1" dirty="0" smtClean="0">
+                <a:ln w="900" cmpd="sng">
                   <a:solidFill>
-                    <a:srgbClr val="FFFFFF"/>
+                    <a:schemeClr val="accent1">
+                      <a:satMod val="190000"/>
+                      <a:alpha val="55000"/>
+                    </a:schemeClr>
                   </a:solidFill>
                   <a:prstDash val="solid"/>
                 </a:ln>
                 <a:solidFill>
-                  <a:srgbClr val="FFFFFF"/>
+                  <a:schemeClr val="accent1">
+                    <a:satMod val="200000"/>
+                    <a:tint val="3000"/>
+                  </a:schemeClr>
                 </a:solidFill>
                 <a:effectLst>
-                  <a:outerShdw blurRad="63500" dir="3600000" algn="tl" rotWithShape="0">
-                    <a:srgbClr val="000000">
-                      <a:alpha val="70000"/>
-                    </a:srgbClr>
-                  </a:outerShdw>
+                  <a:innerShdw blurRad="101600" dist="76200" dir="5400000">
+                    <a:schemeClr val="accent1">
+                      <a:satMod val="190000"/>
+                      <a:tint val="100000"/>
+                      <a:alpha val="74000"/>
+                    </a:schemeClr>
+                  </a:innerShdw>
                 </a:effectLst>
               </a:rPr>
-              <a:t>mugshot</a:t>
-            </a:r>
-            <a:endParaRPr lang="en-US" sz="5400" b="0" cap="none" spc="0" dirty="0">
-              <a:ln w="18415" cmpd="sng">
-                <a:solidFill>
-                  <a:srgbClr val="FFFFFF"/>
+              <a:t>Kyle </a:t>
+            </a:r>
+            <a:r>
+              <a:rPr lang="en-US" sz="5400" b="1" dirty="0" err="1" smtClean="0">
+                <a:ln w="900" cmpd="sng">
+                  <a:solidFill>
+                    <a:schemeClr val="accent1">
+                      <a:satMod val="190000"/>
+                      <a:alpha val="55000"/>
+                    </a:schemeClr>
+                  </a:solidFill>
+                  <a:prstDash val="solid"/>
+                </a:ln>
+                <a:solidFill>
+                  <a:schemeClr val="accent1">
+                    <a:satMod val="200000"/>
+                    <a:tint val="3000"/>
+                  </a:schemeClr>
+                </a:solidFill>
+                <a:effectLst>
+                  <a:innerShdw blurRad="101600" dist="76200" dir="5400000">
+                    <a:schemeClr val="accent1">
+                      <a:satMod val="190000"/>
+                      <a:tint val="100000"/>
+                      <a:alpha val="74000"/>
+                    </a:schemeClr>
+                  </a:innerShdw>
+                </a:effectLst>
+              </a:rPr>
+              <a:t>Arens</a:t>
+            </a:r>
+            <a:endParaRPr lang="en-US" sz="5400" b="1" dirty="0" smtClean="0">
+              <a:ln w="900" cmpd="sng">
+                <a:solidFill>
+                  <a:schemeClr val="accent1">
+                    <a:satMod val="190000"/>
+                    <a:alpha val="55000"/>
+                  </a:schemeClr>
                 </a:solidFill>
                 <a:prstDash val="solid"/>
               </a:ln>
               <a:solidFill>
-                <a:srgbClr val="FFFFFF"/>
+                <a:schemeClr val="accent1">
+                  <a:satMod val="200000"/>
+                  <a:tint val="3000"/>
+                </a:schemeClr>
               </a:solidFill>
               <a:effectLst>
-                <a:outerShdw blurRad="63500" dir="3600000" algn="tl" rotWithShape="0">
-                  <a:srgbClr val="000000">
-                    <a:alpha val="70000"/>
-                  </a:srgbClr>
-                </a:outerShdw>
+                <a:innerShdw blurRad="101600" dist="76200" dir="5400000">
+                  <a:schemeClr val="accent1">
+                    <a:satMod val="190000"/>
+                    <a:tint val="100000"/>
+                    <a:alpha val="74000"/>
+                  </a:schemeClr>
+                </a:innerShdw>
               </a:effectLst>
             </a:endParaRPr>
           </a:p>
-        </p:txBody>
-      </p:sp>
-      <p:sp>
-        <p:nvSpPr>
-          <p:cNvPr id="27" name="Rectangle 26"/>
-          <p:cNvSpPr/>
+          <a:p>
+            <a:pPr algn="ctr"/>
+            <a:endParaRPr lang="en-US" sz="5400" b="1" dirty="0">
+              <a:ln w="900" cmpd="sng">
+                <a:solidFill>
+                  <a:schemeClr val="accent1">
+                    <a:satMod val="190000"/>
+                    <a:alpha val="55000"/>
+                  </a:schemeClr>
+                </a:solidFill>
+                <a:prstDash val="solid"/>
+              </a:ln>
+              <a:solidFill>
+                <a:schemeClr val="accent1">
+                  <a:satMod val="200000"/>
+                  <a:tint val="3000"/>
+                </a:schemeClr>
+              </a:solidFill>
+              <a:effectLst>
+                <a:innerShdw blurRad="101600" dist="76200" dir="5400000">
+                  <a:schemeClr val="accent1">
+                    <a:satMod val="190000"/>
+                    <a:tint val="100000"/>
+                    <a:alpha val="74000"/>
+                  </a:schemeClr>
+                </a:innerShdw>
+              </a:effectLst>
+            </a:endParaRPr>
+          </a:p>
+        </p:txBody>
+      </p:sp>
+      <p:sp>
+        <p:nvSpPr>
+          <p:cNvPr id="36" name="TextBox 35"/>
+          <p:cNvSpPr txBox="1"/>
           <p:nvPr/>
         </p:nvSpPr>
         <p:spPr>
           <a:xfrm>
-            <a:off x="11967044" y="2272914"/>
-            <a:ext cx="2659703" cy="923330"/>
+            <a:off x="33238438" y="10214575"/>
+            <a:ext cx="4648200" cy="923330"/>
           </a:xfrm>
           <a:prstGeom prst="rect">
             <a:avLst/>
@@ -4072,49 +4777,94 @@
           <a:noFill/>
         </p:spPr>
         <p:txBody>
-          <a:bodyPr wrap="none" lIns="91440" tIns="45720" rIns="91440" bIns="45720">
+          <a:bodyPr wrap="square" rtlCol="0">
             <a:spAutoFit/>
           </a:bodyPr>
           <a:lstStyle/>
           <a:p>
-            <a:pPr algn="ctr"/>
-            <a:r>
-              <a:rPr lang="en-US" sz="5400" b="0" cap="none" spc="0" dirty="0" smtClean="0">
-                <a:ln w="18415" cmpd="sng">
+            <a:pPr lvl="0"/>
+            <a:r>
+              <a:rPr lang="en-US" sz="5400" b="1" dirty="0" smtClean="0">
+                <a:ln w="900" cmpd="sng">
                   <a:solidFill>
-                    <a:srgbClr val="FFFFFF"/>
+                    <a:srgbClr val="4F81BD">
+                      <a:satMod val="190000"/>
+                      <a:alpha val="55000"/>
+                    </a:srgbClr>
                   </a:solidFill>
                   <a:prstDash val="solid"/>
                 </a:ln>
                 <a:solidFill>
-                  <a:srgbClr val="FFFFFF"/>
+                  <a:srgbClr val="4F81BD">
+                    <a:satMod val="200000"/>
+                    <a:tint val="3000"/>
+                  </a:srgbClr>
                 </a:solidFill>
                 <a:effectLst>
-                  <a:outerShdw blurRad="63500" dir="3600000" algn="tl" rotWithShape="0">
-                    <a:srgbClr val="000000">
-                      <a:alpha val="70000"/>
+                  <a:innerShdw blurRad="101600" dist="76200" dir="5400000">
+                    <a:srgbClr val="4F81BD">
+                      <a:satMod val="190000"/>
+                      <a:tint val="100000"/>
+                      <a:alpha val="74000"/>
                     </a:srgbClr>
-                  </a:outerShdw>
+                  </a:innerShdw>
                 </a:effectLst>
               </a:rPr>
-              <a:t>mugshot</a:t>
-            </a:r>
-            <a:endParaRPr lang="en-US" sz="5400" b="0" cap="none" spc="0" dirty="0">
-              <a:ln w="18415" cmpd="sng">
-                <a:solidFill>
-                  <a:srgbClr val="FFFFFF"/>
+              <a:t>Jon </a:t>
+            </a:r>
+            <a:r>
+              <a:rPr lang="en-US" sz="5400" b="1" dirty="0" err="1" smtClean="0">
+                <a:ln w="900" cmpd="sng">
+                  <a:solidFill>
+                    <a:srgbClr val="4F81BD">
+                      <a:satMod val="190000"/>
+                      <a:alpha val="55000"/>
+                    </a:srgbClr>
+                  </a:solidFill>
+                  <a:prstDash val="solid"/>
+                </a:ln>
+                <a:solidFill>
+                  <a:srgbClr val="4F81BD">
+                    <a:satMod val="200000"/>
+                    <a:tint val="3000"/>
+                  </a:srgbClr>
+                </a:solidFill>
+                <a:effectLst>
+                  <a:innerShdw blurRad="101600" dist="76200" dir="5400000">
+                    <a:srgbClr val="4F81BD">
+                      <a:satMod val="190000"/>
+                      <a:tint val="100000"/>
+                      <a:alpha val="74000"/>
+                    </a:srgbClr>
+                  </a:innerShdw>
+                </a:effectLst>
+              </a:rPr>
+              <a:t>Deibel</a:t>
+            </a:r>
+            <a:endParaRPr lang="en-US" sz="5400" b="1" dirty="0">
+              <a:ln w="900" cmpd="sng">
+                <a:solidFill>
+                  <a:srgbClr val="4F81BD">
+                    <a:satMod val="190000"/>
+                    <a:alpha val="55000"/>
+                  </a:srgbClr>
                 </a:solidFill>
                 <a:prstDash val="solid"/>
               </a:ln>
               <a:solidFill>
-                <a:srgbClr val="FFFFFF"/>
+                <a:srgbClr val="4F81BD">
+                  <a:satMod val="200000"/>
+                  <a:tint val="3000"/>
+                </a:srgbClr>
               </a:solidFill>
               <a:effectLst>
-                <a:outerShdw blurRad="63500" dir="3600000" algn="tl" rotWithShape="0">
-                  <a:srgbClr val="000000">
-                    <a:alpha val="70000"/>
+                <a:innerShdw blurRad="101600" dist="76200" dir="5400000">
+                  <a:srgbClr val="4F81BD">
+                    <a:satMod val="190000"/>
+                    <a:tint val="100000"/>
+                    <a:alpha val="74000"/>
                   </a:srgbClr>
-                </a:outerShdw>
+                </a:innerShdw>
               </a:effectLst>
             </a:endParaRPr>
           </a:p>
@@ -4122,14 +4872,14 @@
       </p:sp>
       <p:sp>
         <p:nvSpPr>
-          <p:cNvPr id="28" name="Rectangle 27"/>
-          <p:cNvSpPr/>
+          <p:cNvPr id="37" name="TextBox 36"/>
+          <p:cNvSpPr txBox="1"/>
           <p:nvPr/>
         </p:nvSpPr>
         <p:spPr>
           <a:xfrm>
-            <a:off x="29264447" y="2412985"/>
-            <a:ext cx="2659703" cy="923330"/>
+            <a:off x="38541957" y="9958355"/>
+            <a:ext cx="4869184" cy="1754326"/>
           </a:xfrm>
           <a:prstGeom prst="rect">
             <a:avLst/>
@@ -4137,239 +4887,380 @@
           <a:noFill/>
         </p:spPr>
         <p:txBody>
-          <a:bodyPr wrap="none" lIns="91440" tIns="45720" rIns="91440" bIns="45720">
+          <a:bodyPr wrap="square" rtlCol="0">
             <a:spAutoFit/>
           </a:bodyPr>
           <a:lstStyle/>
           <a:p>
-            <a:pPr algn="ctr"/>
-            <a:r>
-              <a:rPr lang="en-US" sz="5400" b="0" cap="none" spc="0" dirty="0" smtClean="0">
-                <a:ln w="18415" cmpd="sng">
+            <a:pPr lvl="0"/>
+            <a:r>
+              <a:rPr lang="en-US" sz="5400" b="1" dirty="0" smtClean="0">
+                <a:ln w="900" cmpd="sng">
                   <a:solidFill>
-                    <a:srgbClr val="FFFFFF"/>
+                    <a:srgbClr val="4F81BD">
+                      <a:satMod val="190000"/>
+                      <a:alpha val="55000"/>
+                    </a:srgbClr>
                   </a:solidFill>
                   <a:prstDash val="solid"/>
                 </a:ln>
                 <a:solidFill>
-                  <a:srgbClr val="FFFFFF"/>
+                  <a:srgbClr val="4F81BD">
+                    <a:satMod val="200000"/>
+                    <a:tint val="3000"/>
+                  </a:srgbClr>
                 </a:solidFill>
                 <a:effectLst>
-                  <a:outerShdw blurRad="63500" dir="3600000" algn="tl" rotWithShape="0">
-                    <a:srgbClr val="000000">
-                      <a:alpha val="70000"/>
+                  <a:innerShdw blurRad="101600" dist="76200" dir="5400000">
+                    <a:srgbClr val="4F81BD">
+                      <a:satMod val="190000"/>
+                      <a:tint val="100000"/>
+                      <a:alpha val="74000"/>
                     </a:srgbClr>
-                  </a:outerShdw>
+                  </a:innerShdw>
                 </a:effectLst>
               </a:rPr>
-              <a:t>mugshot</a:t>
-            </a:r>
-            <a:endParaRPr lang="en-US" sz="5400" b="0" cap="none" spc="0" dirty="0">
-              <a:ln w="18415" cmpd="sng">
-                <a:solidFill>
-                  <a:srgbClr val="FFFFFF"/>
+              <a:t>Dr. Ali </a:t>
+            </a:r>
+            <a:r>
+              <a:rPr lang="en-US" sz="5400" b="1" dirty="0" err="1" smtClean="0">
+                <a:ln w="900" cmpd="sng">
+                  <a:solidFill>
+                    <a:srgbClr val="4F81BD">
+                      <a:satMod val="190000"/>
+                      <a:alpha val="55000"/>
+                    </a:srgbClr>
+                  </a:solidFill>
+                  <a:prstDash val="solid"/>
+                </a:ln>
+                <a:solidFill>
+                  <a:srgbClr val="4F81BD">
+                    <a:satMod val="200000"/>
+                    <a:tint val="3000"/>
+                  </a:srgbClr>
+                </a:solidFill>
+                <a:effectLst>
+                  <a:innerShdw blurRad="101600" dist="76200" dir="5400000">
+                    <a:srgbClr val="4F81BD">
+                      <a:satMod val="190000"/>
+                      <a:tint val="100000"/>
+                      <a:alpha val="74000"/>
+                    </a:srgbClr>
+                  </a:innerShdw>
+                </a:effectLst>
+              </a:rPr>
+              <a:t>Minai</a:t>
+            </a:r>
+            <a:endParaRPr lang="en-US" sz="5400" b="1" dirty="0">
+              <a:ln w="900" cmpd="sng">
+                <a:solidFill>
+                  <a:srgbClr val="4F81BD">
+                    <a:satMod val="190000"/>
+                    <a:alpha val="55000"/>
+                  </a:srgbClr>
                 </a:solidFill>
                 <a:prstDash val="solid"/>
               </a:ln>
               <a:solidFill>
-                <a:srgbClr val="FFFFFF"/>
+                <a:srgbClr val="4F81BD">
+                  <a:satMod val="200000"/>
+                  <a:tint val="3000"/>
+                </a:srgbClr>
               </a:solidFill>
               <a:effectLst>
-                <a:outerShdw blurRad="63500" dir="3600000" algn="tl" rotWithShape="0">
-                  <a:srgbClr val="000000">
-                    <a:alpha val="70000"/>
+                <a:innerShdw blurRad="101600" dist="76200" dir="5400000">
+                  <a:srgbClr val="4F81BD">
+                    <a:satMod val="190000"/>
+                    <a:tint val="100000"/>
+                    <a:alpha val="74000"/>
                   </a:srgbClr>
-                </a:outerShdw>
+                </a:innerShdw>
               </a:effectLst>
             </a:endParaRPr>
           </a:p>
-        </p:txBody>
-      </p:sp>
-      <p:sp>
-        <p:nvSpPr>
-          <p:cNvPr id="29" name="Rectangle 28"/>
-          <p:cNvSpPr/>
+          <a:p>
+            <a:pPr lvl="0"/>
+            <a:r>
+              <a:rPr lang="en-US" sz="5400" b="1" dirty="0" smtClean="0">
+                <a:ln w="900" cmpd="sng">
+                  <a:solidFill>
+                    <a:srgbClr val="4F81BD">
+                      <a:satMod val="190000"/>
+                      <a:alpha val="55000"/>
+                    </a:srgbClr>
+                  </a:solidFill>
+                  <a:prstDash val="solid"/>
+                </a:ln>
+                <a:solidFill>
+                  <a:srgbClr val="4F81BD">
+                    <a:satMod val="200000"/>
+                    <a:tint val="3000"/>
+                  </a:srgbClr>
+                </a:solidFill>
+                <a:effectLst>
+                  <a:innerShdw blurRad="101600" dist="76200" dir="5400000">
+                    <a:srgbClr val="4F81BD">
+                      <a:satMod val="190000"/>
+                      <a:tint val="100000"/>
+                      <a:alpha val="74000"/>
+                    </a:srgbClr>
+                  </a:innerShdw>
+                </a:effectLst>
+              </a:rPr>
+              <a:t>Advisor</a:t>
+            </a:r>
+            <a:endParaRPr lang="en-US" sz="5400" b="1" dirty="0">
+              <a:ln w="900" cmpd="sng">
+                <a:solidFill>
+                  <a:srgbClr val="4F81BD">
+                    <a:satMod val="190000"/>
+                    <a:alpha val="55000"/>
+                  </a:srgbClr>
+                </a:solidFill>
+                <a:prstDash val="solid"/>
+              </a:ln>
+              <a:solidFill>
+                <a:srgbClr val="4F81BD">
+                  <a:satMod val="200000"/>
+                  <a:tint val="3000"/>
+                </a:srgbClr>
+              </a:solidFill>
+              <a:effectLst>
+                <a:innerShdw blurRad="101600" dist="76200" dir="5400000">
+                  <a:srgbClr val="4F81BD">
+                    <a:satMod val="190000"/>
+                    <a:tint val="100000"/>
+                    <a:alpha val="74000"/>
+                  </a:srgbClr>
+                </a:innerShdw>
+              </a:effectLst>
+            </a:endParaRPr>
+          </a:p>
+        </p:txBody>
+      </p:sp>
+      <p:pic>
+        <p:nvPicPr>
+          <p:cNvPr id="1026" name="Picture 2" descr="C:\Users\rbenner\Downloads\coollogo_com-3116346.png"/>
+          <p:cNvPicPr>
+            <a:picLocks noChangeAspect="1" noChangeArrowheads="1"/>
+          </p:cNvPicPr>
           <p:nvPr/>
-        </p:nvSpPr>
-        <p:spPr>
+        </p:nvPicPr>
+        <p:blipFill>
+          <a:blip r:embed="rId2">
+            <a:extLst>
+              <a:ext uri="{28A0092B-C50C-407E-A947-70E740481C1C}">
+                <a14:useLocalDpi xmlns:a14="http://schemas.microsoft.com/office/drawing/2010/main" val="0"/>
+              </a:ext>
+            </a:extLst>
+          </a:blip>
+          <a:srcRect/>
+          <a:stretch>
+            <a:fillRect/>
+          </a:stretch>
+        </p:blipFill>
+        <p:spPr bwMode="auto">
           <a:xfrm>
-            <a:off x="38408447" y="2412985"/>
-            <a:ext cx="2659703" cy="923330"/>
+            <a:off x="914400" y="448462"/>
+            <a:ext cx="31299994" cy="4245118"/>
           </a:xfrm>
           <a:prstGeom prst="rect">
             <a:avLst/>
           </a:prstGeom>
           <a:noFill/>
+          <a:extLst>
+            <a:ext uri="{909E8E84-426E-40DD-AFC4-6F175D3DCCD1}">
+              <a14:hiddenFill xmlns:a14="http://schemas.microsoft.com/office/drawing/2010/main">
+                <a:solidFill>
+                  <a:srgbClr val="FFFFFF"/>
+                </a:solidFill>
+              </a14:hiddenFill>
+            </a:ext>
+          </a:extLst>
         </p:spPr>
-        <p:txBody>
-          <a:bodyPr wrap="none" lIns="91440" tIns="45720" rIns="91440" bIns="45720">
-            <a:spAutoFit/>
-          </a:bodyPr>
-          <a:lstStyle/>
-          <a:p>
-            <a:pPr algn="ctr"/>
-            <a:r>
-              <a:rPr lang="en-US" sz="5400" b="0" cap="none" spc="0" dirty="0" smtClean="0">
-                <a:ln w="18415" cmpd="sng">
-                  <a:solidFill>
-                    <a:srgbClr val="FFFFFF"/>
-                  </a:solidFill>
-                  <a:prstDash val="solid"/>
-                </a:ln>
-                <a:solidFill>
-                  <a:srgbClr val="FFFFFF"/>
-                </a:solidFill>
-                <a:effectLst>
-                  <a:outerShdw blurRad="63500" dir="3600000" algn="tl" rotWithShape="0">
-                    <a:srgbClr val="000000">
-                      <a:alpha val="70000"/>
-                    </a:srgbClr>
-                  </a:outerShdw>
-                </a:effectLst>
-              </a:rPr>
-              <a:t>mugshot</a:t>
-            </a:r>
-            <a:endParaRPr lang="en-US" sz="5400" b="0" cap="none" spc="0" dirty="0">
-              <a:ln w="18415" cmpd="sng">
-                <a:solidFill>
-                  <a:srgbClr val="FFFFFF"/>
-                </a:solidFill>
-                <a:prstDash val="solid"/>
-              </a:ln>
-              <a:solidFill>
-                <a:srgbClr val="FFFFFF"/>
-              </a:solidFill>
-              <a:effectLst>
-                <a:outerShdw blurRad="63500" dir="3600000" algn="tl" rotWithShape="0">
-                  <a:srgbClr val="000000">
-                    <a:alpha val="70000"/>
-                  </a:srgbClr>
-                </a:outerShdw>
-              </a:effectLst>
-            </a:endParaRPr>
-          </a:p>
-        </p:txBody>
-      </p:sp>
-      <p:sp>
-        <p:nvSpPr>
-          <p:cNvPr id="30" name="TextBox 29"/>
-          <p:cNvSpPr txBox="1"/>
+      </p:pic>
+      <p:pic>
+        <p:nvPicPr>
+          <p:cNvPr id="40" name="Picture 39"/>
+          <p:cNvPicPr>
+            <a:picLocks/>
+          </p:cNvPicPr>
           <p:nvPr/>
-        </p:nvSpPr>
+        </p:nvPicPr>
+        <p:blipFill>
+          <a:blip r:embed="rId3">
+            <a:extLst>
+              <a:ext uri="{28A0092B-C50C-407E-A947-70E740481C1C}">
+                <a14:useLocalDpi xmlns:a14="http://schemas.microsoft.com/office/drawing/2010/main" val="0"/>
+              </a:ext>
+            </a:extLst>
+          </a:blip>
+          <a:stretch>
+            <a:fillRect/>
+          </a:stretch>
+        </p:blipFill>
         <p:spPr>
           <a:xfrm>
-            <a:off x="1828798" y="4997364"/>
-            <a:ext cx="4648200" cy="830997"/>
+            <a:off x="33553715" y="531717"/>
+            <a:ext cx="4078224" cy="4078224"/>
           </a:xfrm>
-          <a:prstGeom prst="rect">
-            <a:avLst/>
+          <a:prstGeom prst="round2DiagRect">
+            <a:avLst>
+              <a:gd name="adj1" fmla="val 16667"/>
+              <a:gd name="adj2" fmla="val 0"/>
+            </a:avLst>
           </a:prstGeom>
-          <a:noFill/>
+          <a:ln w="88900" cap="sq">
+            <a:solidFill>
+              <a:srgbClr val="FFFFFF"/>
+            </a:solidFill>
+            <a:miter lim="800000"/>
+          </a:ln>
+          <a:effectLst>
+            <a:outerShdw blurRad="254000" algn="tl" rotWithShape="0">
+              <a:srgbClr val="000000">
+                <a:alpha val="43000"/>
+              </a:srgbClr>
+            </a:outerShdw>
+          </a:effectLst>
         </p:spPr>
-        <p:txBody>
-          <a:bodyPr wrap="square" rtlCol="0">
-            <a:spAutoFit/>
-          </a:bodyPr>
-          <a:lstStyle/>
-          <a:p>
-            <a:r>
-              <a:rPr lang="en-US" sz="4800" dirty="0" smtClean="0"/>
-              <a:t>email</a:t>
-            </a:r>
-            <a:endParaRPr lang="en-US" sz="4800" dirty="0"/>
-          </a:p>
-        </p:txBody>
-      </p:sp>
-      <p:sp>
-        <p:nvSpPr>
-          <p:cNvPr id="31" name="TextBox 30"/>
-          <p:cNvSpPr txBox="1"/>
+      </p:pic>
+      <p:pic>
+        <p:nvPicPr>
+          <p:cNvPr id="42" name="Picture 41"/>
+          <p:cNvPicPr preferRelativeResize="0">
+            <a:picLocks/>
+          </p:cNvPicPr>
           <p:nvPr/>
-        </p:nvSpPr>
+        </p:nvPicPr>
+        <p:blipFill rotWithShape="1">
+          <a:blip r:embed="rId4">
+            <a:extLst>
+              <a:ext uri="{28A0092B-C50C-407E-A947-70E740481C1C}">
+                <a14:useLocalDpi xmlns:a14="http://schemas.microsoft.com/office/drawing/2010/main" val="0"/>
+              </a:ext>
+            </a:extLst>
+          </a:blip>
+          <a:srcRect l="23929" t="10791" r="16821"/>
+          <a:stretch/>
+        </p:blipFill>
         <p:spPr>
           <a:xfrm>
-            <a:off x="10972800" y="5004046"/>
-            <a:ext cx="4648200" cy="830997"/>
+            <a:off x="38826946" y="448462"/>
+            <a:ext cx="4078224" cy="4078608"/>
           </a:xfrm>
-          <a:prstGeom prst="rect">
-            <a:avLst/>
+          <a:prstGeom prst="round2DiagRect">
+            <a:avLst>
+              <a:gd name="adj1" fmla="val 16667"/>
+              <a:gd name="adj2" fmla="val 0"/>
+            </a:avLst>
           </a:prstGeom>
-          <a:noFill/>
+          <a:ln w="88900" cap="sq">
+            <a:solidFill>
+              <a:srgbClr val="FFFFFF"/>
+            </a:solidFill>
+            <a:miter lim="800000"/>
+          </a:ln>
+          <a:effectLst>
+            <a:outerShdw blurRad="254000" algn="tl" rotWithShape="0">
+              <a:srgbClr val="000000">
+                <a:alpha val="43000"/>
+              </a:srgbClr>
+            </a:outerShdw>
+          </a:effectLst>
         </p:spPr>
-        <p:txBody>
-          <a:bodyPr wrap="square" rtlCol="0">
-            <a:spAutoFit/>
-          </a:bodyPr>
-          <a:lstStyle/>
-          <a:p>
-            <a:r>
-              <a:rPr lang="en-US" sz="4800" dirty="0" smtClean="0"/>
-              <a:t>email</a:t>
-            </a:r>
-            <a:endParaRPr lang="en-US" sz="4800" dirty="0"/>
-          </a:p>
-        </p:txBody>
-      </p:sp>
-      <p:sp>
-        <p:nvSpPr>
-          <p:cNvPr id="32" name="TextBox 31"/>
-          <p:cNvSpPr txBox="1"/>
+      </p:pic>
+      <p:pic>
+        <p:nvPicPr>
+          <p:cNvPr id="43" name="Picture 42"/>
+          <p:cNvPicPr>
+            <a:picLocks noChangeAspect="1"/>
+          </p:cNvPicPr>
           <p:nvPr/>
-        </p:nvSpPr>
+        </p:nvPicPr>
+        <p:blipFill>
+          <a:blip r:embed="rId5">
+            <a:extLst>
+              <a:ext uri="{28A0092B-C50C-407E-A947-70E740481C1C}">
+                <a14:useLocalDpi xmlns:a14="http://schemas.microsoft.com/office/drawing/2010/main" val="0"/>
+              </a:ext>
+            </a:extLst>
+          </a:blip>
+          <a:stretch>
+            <a:fillRect/>
+          </a:stretch>
+        </p:blipFill>
         <p:spPr>
           <a:xfrm>
-            <a:off x="28270199" y="5156446"/>
-            <a:ext cx="4648200" cy="830997"/>
+            <a:off x="33660396" y="5868573"/>
+            <a:ext cx="4078608" cy="4078608"/>
           </a:xfrm>
-          <a:prstGeom prst="rect">
-            <a:avLst/>
+          <a:prstGeom prst="round2DiagRect">
+            <a:avLst>
+              <a:gd name="adj1" fmla="val 16667"/>
+              <a:gd name="adj2" fmla="val 0"/>
+            </a:avLst>
           </a:prstGeom>
-          <a:noFill/>
+          <a:ln w="88900" cap="sq">
+            <a:solidFill>
+              <a:srgbClr val="FFFFFF"/>
+            </a:solidFill>
+            <a:miter lim="800000"/>
+          </a:ln>
+          <a:effectLst>
+            <a:outerShdw blurRad="254000" algn="tl" rotWithShape="0">
+              <a:srgbClr val="000000">
+                <a:alpha val="43000"/>
+              </a:srgbClr>
+            </a:outerShdw>
+          </a:effectLst>
         </p:spPr>
-        <p:txBody>
-          <a:bodyPr wrap="square" rtlCol="0">
-            <a:spAutoFit/>
-          </a:bodyPr>
-          <a:lstStyle/>
-          <a:p>
-            <a:r>
-              <a:rPr lang="en-US" sz="4800" dirty="0" smtClean="0"/>
-              <a:t>email</a:t>
-            </a:r>
-            <a:endParaRPr lang="en-US" sz="4800" dirty="0"/>
-          </a:p>
-        </p:txBody>
-      </p:sp>
-      <p:sp>
-        <p:nvSpPr>
-          <p:cNvPr id="33" name="TextBox 32"/>
-          <p:cNvSpPr txBox="1"/>
+      </p:pic>
+      <p:pic>
+        <p:nvPicPr>
+          <p:cNvPr id="44" name="Picture 43"/>
+          <p:cNvPicPr>
+            <a:picLocks/>
+          </p:cNvPicPr>
           <p:nvPr/>
-        </p:nvSpPr>
+        </p:nvPicPr>
+        <p:blipFill rotWithShape="1">
+          <a:blip r:embed="rId6">
+            <a:extLst>
+              <a:ext uri="{28A0092B-C50C-407E-A947-70E740481C1C}">
+                <a14:useLocalDpi xmlns:a14="http://schemas.microsoft.com/office/drawing/2010/main" val="0"/>
+              </a:ext>
+            </a:extLst>
+          </a:blip>
+          <a:srcRect l="31487" t="8645" r="39325" b="46783"/>
+          <a:stretch/>
+        </p:blipFill>
         <p:spPr>
           <a:xfrm>
-            <a:off x="37414199" y="5124089"/>
-            <a:ext cx="4648200" cy="830997"/>
+            <a:off x="38541957" y="5821785"/>
+            <a:ext cx="4078224" cy="4078224"/>
           </a:xfrm>
-          <a:prstGeom prst="rect">
-            <a:avLst/>
+          <a:prstGeom prst="round2DiagRect">
+            <a:avLst>
+              <a:gd name="adj1" fmla="val 16667"/>
+              <a:gd name="adj2" fmla="val 0"/>
+            </a:avLst>
           </a:prstGeom>
-          <a:noFill/>
+          <a:ln w="88900" cap="sq">
+            <a:solidFill>
+              <a:srgbClr val="FFFFFF"/>
+            </a:solidFill>
+            <a:miter lim="800000"/>
+          </a:ln>
+          <a:effectLst>
+            <a:outerShdw blurRad="254000" algn="tl" rotWithShape="0">
+              <a:srgbClr val="000000">
+                <a:alpha val="43000"/>
+              </a:srgbClr>
+            </a:outerShdw>
+          </a:effectLst>
         </p:spPr>
-        <p:txBody>
-          <a:bodyPr wrap="square" rtlCol="0">
-            <a:spAutoFit/>
-          </a:bodyPr>
-          <a:lstStyle/>
-          <a:p>
-            <a:r>
-              <a:rPr lang="en-US" sz="4800" dirty="0" smtClean="0"/>
-              <a:t>email</a:t>
-            </a:r>
-            <a:endParaRPr lang="en-US" sz="4800" dirty="0"/>
-          </a:p>
-        </p:txBody>
-      </p:sp>
+      </p:pic>
     </p:spTree>
     <p:extLst>
       <p:ext uri="{BB962C8B-B14F-4D97-AF65-F5344CB8AC3E}">

</xml_diff>

<commit_message>
added some content and photos
</commit_message>
<xml_diff>
--- a/Senior Design Poster.pptx
+++ b/Senior Design Poster.pptx
@@ -3116,8 +3116,8 @@
         </p:nvSpPr>
         <p:spPr>
           <a:xfrm>
-            <a:off x="91440" y="4610325"/>
-            <a:ext cx="10515600" cy="11848875"/>
+            <a:off x="91440" y="4610326"/>
+            <a:ext cx="10515600" cy="8429578"/>
           </a:xfrm>
           <a:prstGeom prst="roundRect">
             <a:avLst/>
@@ -3161,12 +3161,17 @@
         </p:nvSpPr>
         <p:spPr>
           <a:xfrm>
-            <a:off x="10972799" y="26746200"/>
+            <a:off x="10957559" y="27078846"/>
             <a:ext cx="21945600" cy="5152876"/>
           </a:xfrm>
           <a:prstGeom prst="roundRect">
             <a:avLst/>
           </a:prstGeom>
+          <a:solidFill>
+            <a:schemeClr val="bg1">
+              <a:alpha val="75000"/>
+            </a:schemeClr>
+          </a:solidFill>
         </p:spPr>
         <p:style>
           <a:lnRef idx="2">
@@ -3190,71 +3195,6 @@
           <a:p>
             <a:pPr algn="ctr"/>
             <a:endParaRPr lang="en-US"/>
-          </a:p>
-        </p:txBody>
-      </p:sp>
-      <p:sp>
-        <p:nvSpPr>
-          <p:cNvPr id="15" name="Rectangle 14"/>
-          <p:cNvSpPr/>
-          <p:nvPr/>
-        </p:nvSpPr>
-        <p:spPr>
-          <a:xfrm>
-            <a:off x="11701402" y="29655284"/>
-            <a:ext cx="21934468" cy="1938992"/>
-          </a:xfrm>
-          <a:prstGeom prst="rect">
-            <a:avLst/>
-          </a:prstGeom>
-          <a:noFill/>
-        </p:spPr>
-        <p:txBody>
-          <a:bodyPr wrap="square" lIns="91440" tIns="45720" rIns="91440" bIns="45720">
-            <a:spAutoFit/>
-          </a:bodyPr>
-          <a:lstStyle/>
-          <a:p>
-            <a:pPr algn="ctr"/>
-            <a:r>
-              <a:rPr lang="en-US" sz="12000" b="0" cap="none" spc="0" dirty="0" smtClean="0">
-                <a:ln w="18415" cmpd="sng">
-                  <a:solidFill>
-                    <a:srgbClr val="FFFFFF"/>
-                  </a:solidFill>
-                  <a:prstDash val="solid"/>
-                </a:ln>
-                <a:solidFill>
-                  <a:srgbClr val="FFFFFF"/>
-                </a:solidFill>
-                <a:effectLst>
-                  <a:outerShdw blurRad="63500" dir="3600000" algn="tl" rotWithShape="0">
-                    <a:srgbClr val="000000">
-                      <a:alpha val="70000"/>
-                    </a:srgbClr>
-                  </a:outerShdw>
-                </a:effectLst>
-              </a:rPr>
-              <a:t>Technologies</a:t>
-            </a:r>
-            <a:endParaRPr lang="en-US" sz="12000" b="0" cap="none" spc="0" dirty="0">
-              <a:ln w="18415" cmpd="sng">
-                <a:solidFill>
-                  <a:srgbClr val="FFFFFF"/>
-                </a:solidFill>
-                <a:prstDash val="solid"/>
-              </a:ln>
-              <a:solidFill>
-                <a:srgbClr val="FFFFFF"/>
-              </a:solidFill>
-              <a:effectLst>
-                <a:outerShdw blurRad="63500" dir="3600000" algn="tl" rotWithShape="0">
-                  <a:srgbClr val="000000">
-                    <a:alpha val="70000"/>
-                  </a:srgbClr>
-                </a:outerShdw>
-              </a:effectLst>
-            </a:endParaRPr>
           </a:p>
         </p:txBody>
       </p:sp>
@@ -3424,8 +3364,8 @@
         </p:nvSpPr>
         <p:spPr>
           <a:xfrm>
-            <a:off x="33375600" y="12420600"/>
-            <a:ext cx="10515600" cy="8610600"/>
+            <a:off x="33375600" y="12420599"/>
+            <a:ext cx="10515600" cy="11132091"/>
           </a:xfrm>
           <a:prstGeom prst="roundRect">
             <a:avLst/>
@@ -3469,8 +3409,8 @@
         </p:nvSpPr>
         <p:spPr>
           <a:xfrm>
-            <a:off x="30480" y="5101040"/>
-            <a:ext cx="10500360" cy="8309967"/>
+            <a:off x="586740" y="5101040"/>
+            <a:ext cx="9525000" cy="7571303"/>
           </a:xfrm>
           <a:prstGeom prst="rect">
             <a:avLst/>
@@ -3483,9 +3423,8 @@
           </a:bodyPr>
           <a:lstStyle/>
           <a:p>
-            <a:pPr algn="ctr"/>
-            <a:r>
-              <a:rPr lang="en-US" sz="5400" b="0" cap="none" spc="0" dirty="0" smtClean="0">
+            <a:r>
+              <a:rPr lang="en-US" sz="5400" b="1" cap="none" spc="0" dirty="0" smtClean="0">
                 <a:ln w="18415" cmpd="sng">
                   <a:solidFill>
                     <a:srgbClr val="FFFFFF"/>
@@ -3503,705 +3442,65 @@
                   </a:outerShdw>
                 </a:effectLst>
               </a:rPr>
-              <a:t>Background / Problem Statement?</a:t>
-            </a:r>
-          </a:p>
-          <a:p>
-            <a:r>
-              <a:rPr lang="en-US" sz="4800" dirty="0">
+              <a:t>Background</a:t>
+            </a:r>
+          </a:p>
+          <a:p>
+            <a:r>
+              <a:rPr lang="en-US" sz="4800" dirty="0" smtClean="0">
                 <a:solidFill>
                   <a:schemeClr val="bg1"/>
                 </a:solidFill>
               </a:rPr>
-              <a:t>Lorem ipsum dolor sit </a:t>
-            </a:r>
-            <a:r>
-              <a:rPr lang="en-US" sz="4800" dirty="0" err="1">
+              <a:t>There have been many recent advances in game-playing AIs, such as the </a:t>
+            </a:r>
+            <a:r>
+              <a:rPr lang="en-US" sz="4800" dirty="0" err="1" smtClean="0">
                 <a:solidFill>
                   <a:schemeClr val="bg1"/>
                 </a:solidFill>
               </a:rPr>
-              <a:t>amet</a:t>
-            </a:r>
-            <a:r>
-              <a:rPr lang="en-US" sz="4800" dirty="0">
+              <a:t>Dota</a:t>
+            </a:r>
+            <a:r>
+              <a:rPr lang="en-US" sz="4800" dirty="0" smtClean="0">
                 <a:solidFill>
                   <a:schemeClr val="bg1"/>
                 </a:solidFill>
               </a:rPr>
-              <a:t>, </a:t>
-            </a:r>
-            <a:r>
-              <a:rPr lang="en-US" sz="4800" dirty="0" err="1">
+              <a:t> 2 AI and </a:t>
+            </a:r>
+            <a:r>
+              <a:rPr lang="en-US" sz="4800" dirty="0" err="1" smtClean="0">
                 <a:solidFill>
                   <a:schemeClr val="bg1"/>
                 </a:solidFill>
               </a:rPr>
-              <a:t>consectetur</a:t>
-            </a:r>
-            <a:r>
-              <a:rPr lang="en-US" sz="4800" dirty="0">
+              <a:t>AlphaGo</a:t>
+            </a:r>
+            <a:r>
+              <a:rPr lang="en-US" sz="4800" dirty="0" smtClean="0">
                 <a:solidFill>
                   <a:schemeClr val="bg1"/>
                 </a:solidFill>
               </a:rPr>
-              <a:t> </a:t>
-            </a:r>
-            <a:r>
-              <a:rPr lang="en-US" sz="4800" dirty="0" err="1">
+              <a:t>. With this project, we aim to explore the use of conventional and cutting edge machine learning techniques to create a self-learning </a:t>
+            </a:r>
+            <a:r>
+              <a:rPr lang="en-US" sz="4800" dirty="0" err="1" smtClean="0">
                 <a:solidFill>
                   <a:schemeClr val="bg1"/>
                 </a:solidFill>
               </a:rPr>
-              <a:t>adipiscing</a:t>
-            </a:r>
-            <a:r>
-              <a:rPr lang="en-US" sz="4800" dirty="0">
+              <a:t>Starcraft</a:t>
+            </a:r>
+            <a:r>
+              <a:rPr lang="en-US" sz="4800" dirty="0" smtClean="0">
                 <a:solidFill>
                   <a:schemeClr val="bg1"/>
                 </a:solidFill>
               </a:rPr>
-              <a:t> </a:t>
-            </a:r>
-            <a:r>
-              <a:rPr lang="en-US" sz="4800" dirty="0" err="1">
-                <a:solidFill>
-                  <a:schemeClr val="bg1"/>
-                </a:solidFill>
-              </a:rPr>
-              <a:t>elit</a:t>
-            </a:r>
-            <a:r>
-              <a:rPr lang="en-US" sz="4800" dirty="0">
-                <a:solidFill>
-                  <a:schemeClr val="bg1"/>
-                </a:solidFill>
-              </a:rPr>
-              <a:t>. Integer </a:t>
-            </a:r>
-            <a:r>
-              <a:rPr lang="en-US" sz="4800" dirty="0" err="1">
-                <a:solidFill>
-                  <a:schemeClr val="bg1"/>
-                </a:solidFill>
-              </a:rPr>
-              <a:t>finibus</a:t>
-            </a:r>
-            <a:r>
-              <a:rPr lang="en-US" sz="4800" dirty="0">
-                <a:solidFill>
-                  <a:schemeClr val="bg1"/>
-                </a:solidFill>
-              </a:rPr>
-              <a:t> vitae </a:t>
-            </a:r>
-            <a:r>
-              <a:rPr lang="en-US" sz="4800" dirty="0" err="1">
-                <a:solidFill>
-                  <a:schemeClr val="bg1"/>
-                </a:solidFill>
-              </a:rPr>
-              <a:t>est</a:t>
-            </a:r>
-            <a:r>
-              <a:rPr lang="en-US" sz="4800" dirty="0">
-                <a:solidFill>
-                  <a:schemeClr val="bg1"/>
-                </a:solidFill>
-              </a:rPr>
-              <a:t> convallis </a:t>
-            </a:r>
-            <a:r>
-              <a:rPr lang="en-US" sz="4800" dirty="0" err="1">
-                <a:solidFill>
-                  <a:schemeClr val="bg1"/>
-                </a:solidFill>
-              </a:rPr>
-              <a:t>tristique</a:t>
-            </a:r>
-            <a:r>
-              <a:rPr lang="en-US" sz="4800" dirty="0">
-                <a:solidFill>
-                  <a:schemeClr val="bg1"/>
-                </a:solidFill>
-              </a:rPr>
-              <a:t>. </a:t>
-            </a:r>
-            <a:r>
-              <a:rPr lang="en-US" sz="4800" dirty="0" err="1">
-                <a:solidFill>
-                  <a:schemeClr val="bg1"/>
-                </a:solidFill>
-              </a:rPr>
-              <a:t>Morbi</a:t>
-            </a:r>
-            <a:r>
-              <a:rPr lang="en-US" sz="4800" dirty="0">
-                <a:solidFill>
-                  <a:schemeClr val="bg1"/>
-                </a:solidFill>
-              </a:rPr>
-              <a:t> </a:t>
-            </a:r>
-            <a:r>
-              <a:rPr lang="en-US" sz="4800" dirty="0" err="1">
-                <a:solidFill>
-                  <a:schemeClr val="bg1"/>
-                </a:solidFill>
-              </a:rPr>
-              <a:t>quis</a:t>
-            </a:r>
-            <a:r>
-              <a:rPr lang="en-US" sz="4800" dirty="0">
-                <a:solidFill>
-                  <a:schemeClr val="bg1"/>
-                </a:solidFill>
-              </a:rPr>
-              <a:t> </a:t>
-            </a:r>
-            <a:r>
-              <a:rPr lang="en-US" sz="4800" dirty="0" err="1">
-                <a:solidFill>
-                  <a:schemeClr val="bg1"/>
-                </a:solidFill>
-              </a:rPr>
-              <a:t>nunc</a:t>
-            </a:r>
-            <a:r>
-              <a:rPr lang="en-US" sz="4800" dirty="0">
-                <a:solidFill>
-                  <a:schemeClr val="bg1"/>
-                </a:solidFill>
-              </a:rPr>
-              <a:t> id lorem </a:t>
-            </a:r>
-            <a:r>
-              <a:rPr lang="en-US" sz="4800" dirty="0" err="1">
-                <a:solidFill>
-                  <a:schemeClr val="bg1"/>
-                </a:solidFill>
-              </a:rPr>
-              <a:t>iaculis</a:t>
-            </a:r>
-            <a:r>
-              <a:rPr lang="en-US" sz="4800" dirty="0">
-                <a:solidFill>
-                  <a:schemeClr val="bg1"/>
-                </a:solidFill>
-              </a:rPr>
-              <a:t> </a:t>
-            </a:r>
-            <a:r>
-              <a:rPr lang="en-US" sz="4800" dirty="0" err="1">
-                <a:solidFill>
-                  <a:schemeClr val="bg1"/>
-                </a:solidFill>
-              </a:rPr>
-              <a:t>mattis</a:t>
-            </a:r>
-            <a:r>
-              <a:rPr lang="en-US" sz="4800" dirty="0">
-                <a:solidFill>
-                  <a:schemeClr val="bg1"/>
-                </a:solidFill>
-              </a:rPr>
-              <a:t> vitae </a:t>
-            </a:r>
-            <a:r>
-              <a:rPr lang="en-US" sz="4800" dirty="0" err="1">
-                <a:solidFill>
-                  <a:schemeClr val="bg1"/>
-                </a:solidFill>
-              </a:rPr>
-              <a:t>sed</a:t>
-            </a:r>
-            <a:r>
-              <a:rPr lang="en-US" sz="4800" dirty="0">
-                <a:solidFill>
-                  <a:schemeClr val="bg1"/>
-                </a:solidFill>
-              </a:rPr>
-              <a:t> </a:t>
-            </a:r>
-            <a:r>
-              <a:rPr lang="en-US" sz="4800" dirty="0" err="1">
-                <a:solidFill>
-                  <a:schemeClr val="bg1"/>
-                </a:solidFill>
-              </a:rPr>
-              <a:t>eros</a:t>
-            </a:r>
-            <a:r>
-              <a:rPr lang="en-US" sz="4800" dirty="0">
-                <a:solidFill>
-                  <a:schemeClr val="bg1"/>
-                </a:solidFill>
-              </a:rPr>
-              <a:t>. Nam </a:t>
-            </a:r>
-            <a:r>
-              <a:rPr lang="en-US" sz="4800" dirty="0" err="1">
-                <a:solidFill>
-                  <a:schemeClr val="bg1"/>
-                </a:solidFill>
-              </a:rPr>
-              <a:t>sed</a:t>
-            </a:r>
-            <a:r>
-              <a:rPr lang="en-US" sz="4800" dirty="0">
-                <a:solidFill>
-                  <a:schemeClr val="bg1"/>
-                </a:solidFill>
-              </a:rPr>
-              <a:t> </a:t>
-            </a:r>
-            <a:r>
-              <a:rPr lang="en-US" sz="4800" dirty="0" err="1">
-                <a:solidFill>
-                  <a:schemeClr val="bg1"/>
-                </a:solidFill>
-              </a:rPr>
-              <a:t>tristique</a:t>
-            </a:r>
-            <a:r>
-              <a:rPr lang="en-US" sz="4800" dirty="0">
-                <a:solidFill>
-                  <a:schemeClr val="bg1"/>
-                </a:solidFill>
-              </a:rPr>
-              <a:t> ante. </a:t>
-            </a:r>
-            <a:r>
-              <a:rPr lang="en-US" sz="4800" dirty="0" err="1">
-                <a:solidFill>
-                  <a:schemeClr val="bg1"/>
-                </a:solidFill>
-              </a:rPr>
-              <a:t>Curabitur</a:t>
-            </a:r>
-            <a:r>
-              <a:rPr lang="en-US" sz="4800" dirty="0">
-                <a:solidFill>
-                  <a:schemeClr val="bg1"/>
-                </a:solidFill>
-              </a:rPr>
-              <a:t> </a:t>
-            </a:r>
-            <a:r>
-              <a:rPr lang="en-US" sz="4800" dirty="0" err="1">
-                <a:solidFill>
-                  <a:schemeClr val="bg1"/>
-                </a:solidFill>
-              </a:rPr>
-              <a:t>commodo</a:t>
-            </a:r>
-            <a:r>
-              <a:rPr lang="en-US" sz="4800" dirty="0">
-                <a:solidFill>
-                  <a:schemeClr val="bg1"/>
-                </a:solidFill>
-              </a:rPr>
-              <a:t> ligula at ex </a:t>
-            </a:r>
-            <a:r>
-              <a:rPr lang="en-US" sz="4800" dirty="0" err="1">
-                <a:solidFill>
-                  <a:schemeClr val="bg1"/>
-                </a:solidFill>
-              </a:rPr>
-              <a:t>placerat</a:t>
-            </a:r>
-            <a:r>
-              <a:rPr lang="en-US" sz="4800" dirty="0">
-                <a:solidFill>
-                  <a:schemeClr val="bg1"/>
-                </a:solidFill>
-              </a:rPr>
-              <a:t> </a:t>
-            </a:r>
-            <a:r>
-              <a:rPr lang="en-US" sz="4800" dirty="0" err="1">
-                <a:solidFill>
-                  <a:schemeClr val="bg1"/>
-                </a:solidFill>
-              </a:rPr>
-              <a:t>fringilla</a:t>
-            </a:r>
-            <a:r>
-              <a:rPr lang="en-US" sz="4800" dirty="0">
-                <a:solidFill>
-                  <a:schemeClr val="bg1"/>
-                </a:solidFill>
-              </a:rPr>
-              <a:t>. </a:t>
-            </a:r>
-            <a:r>
-              <a:rPr lang="en-US" sz="4800" dirty="0" err="1">
-                <a:solidFill>
-                  <a:schemeClr val="bg1"/>
-                </a:solidFill>
-              </a:rPr>
-              <a:t>Ut</a:t>
-            </a:r>
-            <a:r>
-              <a:rPr lang="en-US" sz="4800" dirty="0">
-                <a:solidFill>
-                  <a:schemeClr val="bg1"/>
-                </a:solidFill>
-              </a:rPr>
-              <a:t> </a:t>
-            </a:r>
-            <a:r>
-              <a:rPr lang="en-US" sz="4800" dirty="0" err="1">
-                <a:solidFill>
-                  <a:schemeClr val="bg1"/>
-                </a:solidFill>
-              </a:rPr>
-              <a:t>venenatis</a:t>
-            </a:r>
-            <a:r>
-              <a:rPr lang="en-US" sz="4800" dirty="0">
-                <a:solidFill>
-                  <a:schemeClr val="bg1"/>
-                </a:solidFill>
-              </a:rPr>
-              <a:t> maximus </a:t>
-            </a:r>
-            <a:r>
-              <a:rPr lang="en-US" sz="4800" dirty="0" err="1">
-                <a:solidFill>
-                  <a:schemeClr val="bg1"/>
-                </a:solidFill>
-              </a:rPr>
-              <a:t>metus</a:t>
-            </a:r>
-            <a:r>
-              <a:rPr lang="en-US" sz="4800" dirty="0">
-                <a:solidFill>
-                  <a:schemeClr val="bg1"/>
-                </a:solidFill>
-              </a:rPr>
-              <a:t> </a:t>
-            </a:r>
-            <a:r>
-              <a:rPr lang="en-US" sz="4800" dirty="0" err="1">
-                <a:solidFill>
-                  <a:schemeClr val="bg1"/>
-                </a:solidFill>
-              </a:rPr>
-              <a:t>eu</a:t>
-            </a:r>
-            <a:r>
-              <a:rPr lang="en-US" sz="4800" dirty="0">
-                <a:solidFill>
-                  <a:schemeClr val="bg1"/>
-                </a:solidFill>
-              </a:rPr>
-              <a:t> </a:t>
-            </a:r>
-            <a:r>
-              <a:rPr lang="en-US" sz="4800" dirty="0" err="1">
-                <a:solidFill>
-                  <a:schemeClr val="bg1"/>
-                </a:solidFill>
-              </a:rPr>
-              <a:t>sodales</a:t>
-            </a:r>
-            <a:r>
-              <a:rPr lang="en-US" sz="4800" dirty="0">
-                <a:solidFill>
-                  <a:schemeClr val="bg1"/>
-                </a:solidFill>
-              </a:rPr>
-              <a:t>. </a:t>
-            </a:r>
-            <a:r>
-              <a:rPr lang="en-US" sz="4800" dirty="0" err="1">
-                <a:solidFill>
-                  <a:schemeClr val="bg1"/>
-                </a:solidFill>
-              </a:rPr>
-              <a:t>Ut</a:t>
-            </a:r>
-            <a:r>
-              <a:rPr lang="en-US" sz="4800" dirty="0">
-                <a:solidFill>
-                  <a:schemeClr val="bg1"/>
-                </a:solidFill>
-              </a:rPr>
-              <a:t> </a:t>
-            </a:r>
-            <a:r>
-              <a:rPr lang="en-US" sz="4800" dirty="0" err="1">
-                <a:solidFill>
-                  <a:schemeClr val="bg1"/>
-                </a:solidFill>
-              </a:rPr>
-              <a:t>metus</a:t>
-            </a:r>
-            <a:r>
-              <a:rPr lang="en-US" sz="4800" dirty="0">
-                <a:solidFill>
-                  <a:schemeClr val="bg1"/>
-                </a:solidFill>
-              </a:rPr>
-              <a:t> </a:t>
-            </a:r>
-            <a:r>
-              <a:rPr lang="en-US" sz="4800" dirty="0" err="1">
-                <a:solidFill>
-                  <a:schemeClr val="bg1"/>
-                </a:solidFill>
-              </a:rPr>
-              <a:t>erat</a:t>
-            </a:r>
-            <a:r>
-              <a:rPr lang="en-US" sz="4800" dirty="0">
-                <a:solidFill>
-                  <a:schemeClr val="bg1"/>
-                </a:solidFill>
-              </a:rPr>
-              <a:t>, </a:t>
-            </a:r>
-            <a:r>
-              <a:rPr lang="en-US" sz="4800" dirty="0" err="1">
-                <a:solidFill>
-                  <a:schemeClr val="bg1"/>
-                </a:solidFill>
-              </a:rPr>
-              <a:t>sodales</a:t>
-            </a:r>
-            <a:r>
-              <a:rPr lang="en-US" sz="4800" dirty="0">
-                <a:solidFill>
-                  <a:schemeClr val="bg1"/>
-                </a:solidFill>
-              </a:rPr>
-              <a:t> </a:t>
-            </a:r>
-            <a:r>
-              <a:rPr lang="en-US" sz="4800" dirty="0" err="1">
-                <a:solidFill>
-                  <a:schemeClr val="bg1"/>
-                </a:solidFill>
-              </a:rPr>
-              <a:t>nec</a:t>
-            </a:r>
-            <a:r>
-              <a:rPr lang="en-US" sz="4800" dirty="0">
-                <a:solidFill>
-                  <a:schemeClr val="bg1"/>
-                </a:solidFill>
-              </a:rPr>
-              <a:t> </a:t>
-            </a:r>
-            <a:r>
-              <a:rPr lang="en-US" sz="4800" dirty="0" err="1">
-                <a:solidFill>
-                  <a:schemeClr val="bg1"/>
-                </a:solidFill>
-              </a:rPr>
-              <a:t>dapibus</a:t>
-            </a:r>
-            <a:r>
-              <a:rPr lang="en-US" sz="4800" dirty="0">
-                <a:solidFill>
-                  <a:schemeClr val="bg1"/>
-                </a:solidFill>
-              </a:rPr>
-              <a:t> </a:t>
-            </a:r>
-            <a:r>
-              <a:rPr lang="en-US" sz="4800" dirty="0" err="1">
-                <a:solidFill>
-                  <a:schemeClr val="bg1"/>
-                </a:solidFill>
-              </a:rPr>
-              <a:t>nec</a:t>
-            </a:r>
-            <a:r>
-              <a:rPr lang="en-US" sz="4800" dirty="0">
-                <a:solidFill>
-                  <a:schemeClr val="bg1"/>
-                </a:solidFill>
-              </a:rPr>
-              <a:t>, </a:t>
-            </a:r>
-            <a:r>
-              <a:rPr lang="en-US" sz="4800" dirty="0" err="1">
-                <a:solidFill>
-                  <a:schemeClr val="bg1"/>
-                </a:solidFill>
-              </a:rPr>
-              <a:t>molestie</a:t>
-            </a:r>
-            <a:r>
-              <a:rPr lang="en-US" sz="4800" dirty="0">
-                <a:solidFill>
-                  <a:schemeClr val="bg1"/>
-                </a:solidFill>
-              </a:rPr>
-              <a:t> </a:t>
-            </a:r>
-            <a:r>
-              <a:rPr lang="en-US" sz="4800" dirty="0" err="1">
-                <a:solidFill>
-                  <a:schemeClr val="bg1"/>
-                </a:solidFill>
-              </a:rPr>
-              <a:t>quis</a:t>
-            </a:r>
-            <a:r>
-              <a:rPr lang="en-US" sz="4800" dirty="0">
-                <a:solidFill>
-                  <a:schemeClr val="bg1"/>
-                </a:solidFill>
-              </a:rPr>
-              <a:t> </a:t>
-            </a:r>
-            <a:r>
-              <a:rPr lang="en-US" sz="4800" dirty="0" err="1">
-                <a:solidFill>
-                  <a:schemeClr val="bg1"/>
-                </a:solidFill>
-              </a:rPr>
-              <a:t>elit</a:t>
-            </a:r>
-            <a:r>
-              <a:rPr lang="en-US" sz="4800" dirty="0">
-                <a:solidFill>
-                  <a:schemeClr val="bg1"/>
-                </a:solidFill>
-              </a:rPr>
-              <a:t>. </a:t>
-            </a:r>
-            <a:r>
-              <a:rPr lang="en-US" sz="4800" dirty="0" err="1">
-                <a:solidFill>
-                  <a:schemeClr val="bg1"/>
-                </a:solidFill>
-              </a:rPr>
-              <a:t>Vestibulum</a:t>
-            </a:r>
-            <a:r>
-              <a:rPr lang="en-US" sz="4800" dirty="0">
-                <a:solidFill>
-                  <a:schemeClr val="bg1"/>
-                </a:solidFill>
-              </a:rPr>
-              <a:t> </a:t>
-            </a:r>
-            <a:r>
-              <a:rPr lang="en-US" sz="4800" dirty="0" err="1">
-                <a:solidFill>
-                  <a:schemeClr val="bg1"/>
-                </a:solidFill>
-              </a:rPr>
-              <a:t>vel</a:t>
-            </a:r>
-            <a:r>
-              <a:rPr lang="en-US" sz="4800" dirty="0">
-                <a:solidFill>
-                  <a:schemeClr val="bg1"/>
-                </a:solidFill>
-              </a:rPr>
-              <a:t> </a:t>
-            </a:r>
-            <a:r>
-              <a:rPr lang="en-US" sz="4800" dirty="0" err="1">
-                <a:solidFill>
-                  <a:schemeClr val="bg1"/>
-                </a:solidFill>
-              </a:rPr>
-              <a:t>nibh</a:t>
-            </a:r>
-            <a:r>
-              <a:rPr lang="en-US" sz="4800" dirty="0">
-                <a:solidFill>
-                  <a:schemeClr val="bg1"/>
-                </a:solidFill>
-              </a:rPr>
-              <a:t> </a:t>
-            </a:r>
-            <a:r>
-              <a:rPr lang="en-US" sz="4800" dirty="0" err="1">
-                <a:solidFill>
-                  <a:schemeClr val="bg1"/>
-                </a:solidFill>
-              </a:rPr>
-              <a:t>mauris</a:t>
-            </a:r>
-            <a:r>
-              <a:rPr lang="en-US" sz="4800" dirty="0">
-                <a:solidFill>
-                  <a:schemeClr val="bg1"/>
-                </a:solidFill>
-              </a:rPr>
-              <a:t>. </a:t>
-            </a:r>
-            <a:r>
-              <a:rPr lang="en-US" sz="4800" dirty="0" err="1">
-                <a:solidFill>
-                  <a:schemeClr val="bg1"/>
-                </a:solidFill>
-              </a:rPr>
-              <a:t>Cras</a:t>
-            </a:r>
-            <a:r>
-              <a:rPr lang="en-US" sz="4800" dirty="0">
-                <a:solidFill>
-                  <a:schemeClr val="bg1"/>
-                </a:solidFill>
-              </a:rPr>
-              <a:t> </a:t>
-            </a:r>
-            <a:r>
-              <a:rPr lang="en-US" sz="4800" dirty="0" err="1">
-                <a:solidFill>
-                  <a:schemeClr val="bg1"/>
-                </a:solidFill>
-              </a:rPr>
-              <a:t>ut</a:t>
-            </a:r>
-            <a:r>
-              <a:rPr lang="en-US" sz="4800" dirty="0">
-                <a:solidFill>
-                  <a:schemeClr val="bg1"/>
-                </a:solidFill>
-              </a:rPr>
-              <a:t> </a:t>
-            </a:r>
-            <a:r>
-              <a:rPr lang="en-US" sz="4800" dirty="0" err="1">
-                <a:solidFill>
-                  <a:schemeClr val="bg1"/>
-                </a:solidFill>
-              </a:rPr>
-              <a:t>feugiat</a:t>
-            </a:r>
-            <a:r>
-              <a:rPr lang="en-US" sz="4800" dirty="0">
-                <a:solidFill>
-                  <a:schemeClr val="bg1"/>
-                </a:solidFill>
-              </a:rPr>
-              <a:t> </a:t>
-            </a:r>
-            <a:r>
-              <a:rPr lang="en-US" sz="4800" dirty="0" err="1">
-                <a:solidFill>
-                  <a:schemeClr val="bg1"/>
-                </a:solidFill>
-              </a:rPr>
-              <a:t>augue</a:t>
-            </a:r>
-            <a:r>
-              <a:rPr lang="en-US" sz="4800" dirty="0" smtClean="0">
-                <a:solidFill>
-                  <a:schemeClr val="bg1"/>
-                </a:solidFill>
-              </a:rPr>
-              <a:t>.</a:t>
+              <a:t> 2AI agent that is capable of playing against Blizzard’s built-in AI.</a:t>
             </a:r>
             <a:endParaRPr lang="en-US" sz="4800" dirty="0">
               <a:solidFill>
@@ -4213,79 +3512,14 @@
       </p:sp>
       <p:sp>
         <p:nvSpPr>
-          <p:cNvPr id="21" name="Rectangle 20"/>
-          <p:cNvSpPr/>
-          <p:nvPr/>
-        </p:nvSpPr>
-        <p:spPr>
-          <a:xfrm>
-            <a:off x="33345120" y="12578238"/>
-            <a:ext cx="10500360" cy="923330"/>
-          </a:xfrm>
-          <a:prstGeom prst="rect">
-            <a:avLst/>
-          </a:prstGeom>
-          <a:noFill/>
-        </p:spPr>
-        <p:txBody>
-          <a:bodyPr wrap="square" lIns="91440" tIns="45720" rIns="91440" bIns="45720">
-            <a:spAutoFit/>
-          </a:bodyPr>
-          <a:lstStyle/>
-          <a:p>
-            <a:pPr algn="ctr"/>
-            <a:r>
-              <a:rPr lang="en-US" sz="5400" b="0" cap="none" spc="0" dirty="0" smtClean="0">
-                <a:ln w="18415" cmpd="sng">
-                  <a:solidFill>
-                    <a:srgbClr val="FFFFFF"/>
-                  </a:solidFill>
-                  <a:prstDash val="solid"/>
-                </a:ln>
-                <a:solidFill>
-                  <a:srgbClr val="FFFFFF"/>
-                </a:solidFill>
-                <a:effectLst>
-                  <a:outerShdw blurRad="63500" dir="3600000" algn="tl" rotWithShape="0">
-                    <a:srgbClr val="000000">
-                      <a:alpha val="70000"/>
-                    </a:srgbClr>
-                  </a:outerShdw>
-                </a:effectLst>
-              </a:rPr>
-              <a:t>Milestones / Achievement List</a:t>
-            </a:r>
-            <a:endParaRPr lang="en-US" sz="5400" b="0" cap="none" spc="0" dirty="0">
-              <a:ln w="18415" cmpd="sng">
-                <a:solidFill>
-                  <a:srgbClr val="FFFFFF"/>
-                </a:solidFill>
-                <a:prstDash val="solid"/>
-              </a:ln>
-              <a:solidFill>
-                <a:srgbClr val="FFFFFF"/>
-              </a:solidFill>
-              <a:effectLst>
-                <a:outerShdw blurRad="63500" dir="3600000" algn="tl" rotWithShape="0">
-                  <a:srgbClr val="000000">
-                    <a:alpha val="70000"/>
-                  </a:srgbClr>
-                </a:outerShdw>
-              </a:effectLst>
-            </a:endParaRPr>
-          </a:p>
-        </p:txBody>
-      </p:sp>
-      <p:sp>
-        <p:nvSpPr>
           <p:cNvPr id="22" name="Rounded Rectangle 21"/>
           <p:cNvSpPr/>
           <p:nvPr/>
         </p:nvSpPr>
         <p:spPr>
           <a:xfrm>
-            <a:off x="-30481" y="16725900"/>
-            <a:ext cx="10515600" cy="16040100"/>
+            <a:off x="-30481" y="13501568"/>
+            <a:ext cx="10515600" cy="19264432"/>
           </a:xfrm>
           <a:prstGeom prst="roundRect">
             <a:avLst/>
@@ -4329,7 +3563,7 @@
         </p:nvSpPr>
         <p:spPr>
           <a:xfrm>
-            <a:off x="30480" y="23164800"/>
+            <a:off x="-45721" y="31021913"/>
             <a:ext cx="10485120" cy="1754326"/>
           </a:xfrm>
           <a:prstGeom prst="rect">
@@ -4418,8 +3652,8 @@
         </p:nvSpPr>
         <p:spPr>
           <a:xfrm>
-            <a:off x="33299399" y="21717000"/>
-            <a:ext cx="10515600" cy="11049000"/>
+            <a:off x="33299399" y="23926800"/>
+            <a:ext cx="10515600" cy="8839200"/>
           </a:xfrm>
           <a:prstGeom prst="roundRect">
             <a:avLst/>
@@ -4452,92 +3686,6 @@
           <a:p>
             <a:pPr algn="ctr"/>
             <a:endParaRPr lang="en-US"/>
-          </a:p>
-        </p:txBody>
-      </p:sp>
-      <p:sp>
-        <p:nvSpPr>
-          <p:cNvPr id="25" name="Rectangle 24"/>
-          <p:cNvSpPr/>
-          <p:nvPr/>
-        </p:nvSpPr>
-        <p:spPr>
-          <a:xfrm>
-            <a:off x="33360360" y="23195280"/>
-            <a:ext cx="10485120" cy="923330"/>
-          </a:xfrm>
-          <a:prstGeom prst="rect">
-            <a:avLst/>
-          </a:prstGeom>
-          <a:noFill/>
-        </p:spPr>
-        <p:txBody>
-          <a:bodyPr wrap="square" lIns="91440" tIns="45720" rIns="91440" bIns="45720">
-            <a:spAutoFit/>
-          </a:bodyPr>
-          <a:lstStyle/>
-          <a:p>
-            <a:pPr algn="ctr"/>
-            <a:r>
-              <a:rPr lang="en-US" sz="5400" b="0" cap="none" spc="0" dirty="0" smtClean="0">
-                <a:ln w="18415" cmpd="sng">
-                  <a:solidFill>
-                    <a:srgbClr val="FFFFFF"/>
-                  </a:solidFill>
-                  <a:prstDash val="solid"/>
-                </a:ln>
-                <a:solidFill>
-                  <a:srgbClr val="FFFFFF"/>
-                </a:solidFill>
-                <a:effectLst>
-                  <a:outerShdw blurRad="63500" dir="3600000" algn="tl" rotWithShape="0">
-                    <a:srgbClr val="000000">
-                      <a:alpha val="70000"/>
-                    </a:srgbClr>
-                  </a:outerShdw>
-                </a:effectLst>
-              </a:rPr>
-              <a:t>The </a:t>
-            </a:r>
-            <a:r>
-              <a:rPr lang="en-US" sz="5400" b="0" cap="none" spc="0" dirty="0" err="1" smtClean="0">
-                <a:ln w="18415" cmpd="sng">
-                  <a:solidFill>
-                    <a:srgbClr val="FFFFFF"/>
-                  </a:solidFill>
-                  <a:prstDash val="solid"/>
-                </a:ln>
-                <a:solidFill>
-                  <a:srgbClr val="FFFFFF"/>
-                </a:solidFill>
-                <a:effectLst>
-                  <a:outerShdw blurRad="63500" dir="3600000" algn="tl" rotWithShape="0">
-                    <a:srgbClr val="000000">
-                      <a:alpha val="70000"/>
-                    </a:srgbClr>
-                  </a:outerShdw>
-                </a:effectLst>
-              </a:rPr>
-              <a:t>futureeee</a:t>
-            </a:r>
-            <a:endParaRPr lang="en-US" sz="5400" b="0" cap="none" spc="0" dirty="0">
-              <a:ln w="18415" cmpd="sng">
-                <a:solidFill>
-                  <a:srgbClr val="FFFFFF"/>
-                </a:solidFill>
-                <a:prstDash val="solid"/>
-              </a:ln>
-              <a:solidFill>
-                <a:srgbClr val="FFFFFF"/>
-              </a:solidFill>
-              <a:effectLst>
-                <a:outerShdw blurRad="63500" dir="3600000" algn="tl" rotWithShape="0">
-                  <a:srgbClr val="000000">
-                    <a:alpha val="70000"/>
-                  </a:srgbClr>
-                </a:outerShdw>
-              </a:effectLst>
-            </a:endParaRPr>
           </a:p>
         </p:txBody>
       </p:sp>
@@ -5259,6 +4407,660 @@
               </a:srgbClr>
             </a:outerShdw>
           </a:effectLst>
+        </p:spPr>
+      </p:pic>
+      <p:sp>
+        <p:nvSpPr>
+          <p:cNvPr id="46" name="Rectangle 45"/>
+          <p:cNvSpPr/>
+          <p:nvPr/>
+        </p:nvSpPr>
+        <p:spPr>
+          <a:xfrm>
+            <a:off x="434339" y="14099738"/>
+            <a:ext cx="9525000" cy="12003286"/>
+          </a:xfrm>
+          <a:prstGeom prst="rect">
+            <a:avLst/>
+          </a:prstGeom>
+          <a:noFill/>
+        </p:spPr>
+        <p:txBody>
+          <a:bodyPr wrap="square" lIns="91440" tIns="45720" rIns="91440" bIns="45720">
+            <a:spAutoFit/>
+          </a:bodyPr>
+          <a:lstStyle/>
+          <a:p>
+            <a:r>
+              <a:rPr lang="en-US" sz="5400" b="1" cap="none" spc="0" dirty="0" smtClean="0">
+                <a:ln w="18415" cmpd="sng">
+                  <a:solidFill>
+                    <a:srgbClr val="FFFFFF"/>
+                  </a:solidFill>
+                  <a:prstDash val="solid"/>
+                </a:ln>
+                <a:solidFill>
+                  <a:schemeClr val="bg1"/>
+                </a:solidFill>
+                <a:effectLst>
+                  <a:outerShdw blurRad="63500" dir="3600000" algn="tl" rotWithShape="0">
+                    <a:srgbClr val="000000">
+                      <a:alpha val="70000"/>
+                    </a:srgbClr>
+                  </a:outerShdw>
+                </a:effectLst>
+              </a:rPr>
+              <a:t>Scope &amp; Decisions</a:t>
+            </a:r>
+          </a:p>
+          <a:p>
+            <a:r>
+              <a:rPr lang="en-US" sz="4800" dirty="0" smtClean="0">
+                <a:solidFill>
+                  <a:schemeClr val="bg1"/>
+                </a:solidFill>
+              </a:rPr>
+              <a:t>With 3 distinct factions to play as and an action space of ~10</a:t>
+            </a:r>
+            <a:r>
+              <a:rPr lang="en-US" sz="4800" baseline="30000" dirty="0" smtClean="0">
+                <a:solidFill>
+                  <a:schemeClr val="bg1"/>
+                </a:solidFill>
+              </a:rPr>
+              <a:t>8</a:t>
+            </a:r>
+            <a:r>
+              <a:rPr lang="en-US" sz="4800" dirty="0" smtClean="0">
+                <a:solidFill>
+                  <a:schemeClr val="bg1"/>
+                </a:solidFill>
+              </a:rPr>
+              <a:t> possibilities, we limited our project in the following ways:</a:t>
+            </a:r>
+          </a:p>
+          <a:p>
+            <a:pPr marL="685800" indent="-685800">
+              <a:buFont typeface="Arial" panose="020B0604020202020204" pitchFamily="34" charset="0"/>
+              <a:buChar char="•"/>
+            </a:pPr>
+            <a:r>
+              <a:rPr lang="en-US" sz="4800" dirty="0" smtClean="0">
+                <a:solidFill>
+                  <a:schemeClr val="bg1"/>
+                </a:solidFill>
+              </a:rPr>
+              <a:t>Only train as </a:t>
+            </a:r>
+            <a:r>
+              <a:rPr lang="en-US" sz="4800" dirty="0" err="1" smtClean="0">
+                <a:solidFill>
+                  <a:schemeClr val="bg1"/>
+                </a:solidFill>
+              </a:rPr>
+              <a:t>Terran</a:t>
+            </a:r>
+            <a:r>
+              <a:rPr lang="en-US" sz="4800" dirty="0" smtClean="0">
+                <a:solidFill>
+                  <a:schemeClr val="bg1"/>
+                </a:solidFill>
+              </a:rPr>
+              <a:t>.</a:t>
+            </a:r>
+          </a:p>
+          <a:p>
+            <a:pPr marL="685800" indent="-685800">
+              <a:buFont typeface="Arial" panose="020B0604020202020204" pitchFamily="34" charset="0"/>
+              <a:buChar char="•"/>
+            </a:pPr>
+            <a:r>
+              <a:rPr lang="en-US" sz="4800" dirty="0" smtClean="0">
+                <a:solidFill>
+                  <a:schemeClr val="bg1"/>
+                </a:solidFill>
+              </a:rPr>
+              <a:t>Only train on a small 64x64 map.</a:t>
+            </a:r>
+          </a:p>
+          <a:p>
+            <a:pPr marL="685800" indent="-685800">
+              <a:buFont typeface="Arial" panose="020B0604020202020204" pitchFamily="34" charset="0"/>
+              <a:buChar char="•"/>
+            </a:pPr>
+            <a:r>
+              <a:rPr lang="en-US" sz="4800" dirty="0" smtClean="0">
+                <a:solidFill>
+                  <a:schemeClr val="bg1"/>
+                </a:solidFill>
+              </a:rPr>
+              <a:t>Train via reinforcement only against Blizzard AI.</a:t>
+            </a:r>
+          </a:p>
+          <a:p>
+            <a:pPr marL="685800" indent="-685800">
+              <a:buFont typeface="Arial" panose="020B0604020202020204" pitchFamily="34" charset="0"/>
+              <a:buChar char="•"/>
+            </a:pPr>
+            <a:r>
+              <a:rPr lang="en-US" sz="4800" dirty="0" smtClean="0">
+                <a:solidFill>
+                  <a:schemeClr val="bg1"/>
+                </a:solidFill>
+              </a:rPr>
+              <a:t>Reduce action space of our AI to about 6 actions.</a:t>
+            </a:r>
+          </a:p>
+          <a:p>
+            <a:pPr marL="685800" indent="-685800">
+              <a:buFont typeface="Arial" panose="020B0604020202020204" pitchFamily="34" charset="0"/>
+              <a:buChar char="•"/>
+            </a:pPr>
+            <a:r>
+              <a:rPr lang="en-US" sz="4800" dirty="0" smtClean="0">
+                <a:solidFill>
+                  <a:schemeClr val="bg1"/>
+                </a:solidFill>
+              </a:rPr>
+              <a:t>Prevent training bot to move camera.</a:t>
+            </a:r>
+          </a:p>
+          <a:p>
+            <a:pPr marL="685800" indent="-685800">
+              <a:buFont typeface="Arial" panose="020B0604020202020204" pitchFamily="34" charset="0"/>
+              <a:buChar char="•"/>
+            </a:pPr>
+            <a:r>
+              <a:rPr lang="en-US" sz="4800" dirty="0" smtClean="0">
+                <a:solidFill>
+                  <a:schemeClr val="bg1"/>
+                </a:solidFill>
+              </a:rPr>
+              <a:t>Feed the AI the current screen region and 7 distinct </a:t>
+            </a:r>
+            <a:r>
+              <a:rPr lang="en-US" sz="4800" dirty="0" err="1" smtClean="0">
+                <a:solidFill>
+                  <a:schemeClr val="bg1"/>
+                </a:solidFill>
+              </a:rPr>
+              <a:t>minimap</a:t>
+            </a:r>
+            <a:r>
+              <a:rPr lang="en-US" sz="4800" dirty="0" smtClean="0">
+                <a:solidFill>
+                  <a:schemeClr val="bg1"/>
+                </a:solidFill>
+              </a:rPr>
+              <a:t> layers.</a:t>
+            </a:r>
+            <a:endParaRPr lang="en-US" sz="4800" dirty="0">
+              <a:solidFill>
+                <a:schemeClr val="bg1"/>
+              </a:solidFill>
+            </a:endParaRPr>
+          </a:p>
+        </p:txBody>
+      </p:sp>
+      <p:sp>
+        <p:nvSpPr>
+          <p:cNvPr id="47" name="Rectangle 46"/>
+          <p:cNvSpPr/>
+          <p:nvPr/>
+        </p:nvSpPr>
+        <p:spPr>
+          <a:xfrm>
+            <a:off x="33886141" y="13026733"/>
+            <a:ext cx="9525000" cy="10525958"/>
+          </a:xfrm>
+          <a:prstGeom prst="rect">
+            <a:avLst/>
+          </a:prstGeom>
+          <a:noFill/>
+        </p:spPr>
+        <p:txBody>
+          <a:bodyPr wrap="square" lIns="91440" tIns="45720" rIns="91440" bIns="45720">
+            <a:spAutoFit/>
+          </a:bodyPr>
+          <a:lstStyle/>
+          <a:p>
+            <a:r>
+              <a:rPr lang="en-US" sz="5400" b="1" cap="none" spc="0" dirty="0" smtClean="0">
+                <a:ln w="18415" cmpd="sng">
+                  <a:solidFill>
+                    <a:srgbClr val="FFFFFF"/>
+                  </a:solidFill>
+                  <a:prstDash val="solid"/>
+                </a:ln>
+                <a:solidFill>
+                  <a:schemeClr val="bg1"/>
+                </a:solidFill>
+                <a:effectLst>
+                  <a:outerShdw blurRad="63500" dir="3600000" algn="tl" rotWithShape="0">
+                    <a:srgbClr val="000000">
+                      <a:alpha val="70000"/>
+                    </a:srgbClr>
+                  </a:outerShdw>
+                </a:effectLst>
+              </a:rPr>
+              <a:t>Milestone Achievements</a:t>
+            </a:r>
+          </a:p>
+          <a:p>
+            <a:pPr marL="685800" lvl="0" indent="-685800">
+              <a:buFont typeface="Arial" panose="020B0604020202020204" pitchFamily="34" charset="0"/>
+              <a:buChar char="•"/>
+            </a:pPr>
+            <a:r>
+              <a:rPr lang="en-US" sz="4800" dirty="0" smtClean="0">
+                <a:solidFill>
+                  <a:prstClr val="white"/>
+                </a:solidFill>
+              </a:rPr>
+              <a:t>10/31 – Develop a scripted AI using capable of defeating Medium AI opponents.</a:t>
+            </a:r>
+            <a:endParaRPr lang="en-US" sz="4800" dirty="0">
+              <a:solidFill>
+                <a:prstClr val="white"/>
+              </a:solidFill>
+            </a:endParaRPr>
+          </a:p>
+          <a:p>
+            <a:pPr marL="685800" lvl="0" indent="-685800">
+              <a:buFont typeface="Arial" panose="020B0604020202020204" pitchFamily="34" charset="0"/>
+              <a:buChar char="•"/>
+            </a:pPr>
+            <a:r>
+              <a:rPr lang="en-US" sz="4800" dirty="0" smtClean="0">
+                <a:solidFill>
+                  <a:prstClr val="white"/>
+                </a:solidFill>
+              </a:rPr>
+              <a:t>12/05 – Implemented a simple Q-learned model capable of occasionally winning against Very Easy AI.</a:t>
+            </a:r>
+          </a:p>
+          <a:p>
+            <a:pPr marL="685800" lvl="0" indent="-685800">
+              <a:buFont typeface="Arial" panose="020B0604020202020204" pitchFamily="34" charset="0"/>
+              <a:buChar char="•"/>
+            </a:pPr>
+            <a:r>
+              <a:rPr lang="en-US" sz="4800" dirty="0" smtClean="0">
+                <a:solidFill>
+                  <a:prstClr val="white"/>
+                </a:solidFill>
+              </a:rPr>
+              <a:t>1/13 – Update to a deep-learned model with better success than Q-learned.</a:t>
+            </a:r>
+          </a:p>
+          <a:p>
+            <a:pPr marL="685800" lvl="0" indent="-685800">
+              <a:buFont typeface="Arial" panose="020B0604020202020204" pitchFamily="34" charset="0"/>
+              <a:buChar char="•"/>
+            </a:pPr>
+            <a:r>
+              <a:rPr lang="en-US" sz="4800" dirty="0" smtClean="0">
+                <a:solidFill>
+                  <a:prstClr val="white"/>
+                </a:solidFill>
+              </a:rPr>
+              <a:t>2/5 – Update reward algorithm to use player score. No noticeable change.</a:t>
+            </a:r>
+          </a:p>
+        </p:txBody>
+      </p:sp>
+      <p:sp>
+        <p:nvSpPr>
+          <p:cNvPr id="49" name="Rectangle 48"/>
+          <p:cNvSpPr/>
+          <p:nvPr/>
+        </p:nvSpPr>
+        <p:spPr>
+          <a:xfrm>
+            <a:off x="33794699" y="24191416"/>
+            <a:ext cx="9395458" cy="8309967"/>
+          </a:xfrm>
+          <a:prstGeom prst="rect">
+            <a:avLst/>
+          </a:prstGeom>
+          <a:noFill/>
+        </p:spPr>
+        <p:txBody>
+          <a:bodyPr wrap="square" lIns="91440" tIns="45720" rIns="91440" bIns="45720">
+            <a:spAutoFit/>
+          </a:bodyPr>
+          <a:lstStyle/>
+          <a:p>
+            <a:r>
+              <a:rPr lang="en-US" sz="5400" b="1" cap="none" spc="0" dirty="0" smtClean="0">
+                <a:ln w="18415" cmpd="sng">
+                  <a:solidFill>
+                    <a:srgbClr val="FFFFFF"/>
+                  </a:solidFill>
+                  <a:prstDash val="solid"/>
+                </a:ln>
+                <a:solidFill>
+                  <a:schemeClr val="bg1"/>
+                </a:solidFill>
+                <a:effectLst>
+                  <a:outerShdw blurRad="63500" dir="3600000" algn="tl" rotWithShape="0">
+                    <a:srgbClr val="000000">
+                      <a:alpha val="70000"/>
+                    </a:srgbClr>
+                  </a:outerShdw>
+                </a:effectLst>
+              </a:rPr>
+              <a:t>Future Work</a:t>
+            </a:r>
+          </a:p>
+          <a:p>
+            <a:pPr marL="685800" lvl="0" indent="-685800">
+              <a:buFont typeface="Arial" panose="020B0604020202020204" pitchFamily="34" charset="0"/>
+              <a:buChar char="•"/>
+            </a:pPr>
+            <a:r>
+              <a:rPr lang="en-US" sz="4800" dirty="0" smtClean="0">
+                <a:solidFill>
+                  <a:prstClr val="white"/>
+                </a:solidFill>
+              </a:rPr>
+              <a:t>Expand action space to the full possibility of </a:t>
+            </a:r>
+            <a:r>
+              <a:rPr lang="en-US" sz="4800" dirty="0" err="1" smtClean="0">
+                <a:solidFill>
+                  <a:prstClr val="white"/>
+                </a:solidFill>
+              </a:rPr>
+              <a:t>Terran’s</a:t>
+            </a:r>
+            <a:r>
+              <a:rPr lang="en-US" sz="4800" dirty="0" smtClean="0">
+                <a:solidFill>
+                  <a:prstClr val="white"/>
+                </a:solidFill>
+              </a:rPr>
+              <a:t> actions.</a:t>
+            </a:r>
+          </a:p>
+          <a:p>
+            <a:pPr marL="685800" lvl="0" indent="-685800">
+              <a:buFont typeface="Arial" panose="020B0604020202020204" pitchFamily="34" charset="0"/>
+              <a:buChar char="•"/>
+            </a:pPr>
+            <a:r>
+              <a:rPr lang="en-US" sz="4800" dirty="0" smtClean="0">
+                <a:solidFill>
+                  <a:prstClr val="white"/>
+                </a:solidFill>
+              </a:rPr>
+              <a:t>Train against multiple maps.</a:t>
+            </a:r>
+          </a:p>
+          <a:p>
+            <a:pPr marL="685800" lvl="0" indent="-685800">
+              <a:buFont typeface="Arial" panose="020B0604020202020204" pitchFamily="34" charset="0"/>
+              <a:buChar char="•"/>
+            </a:pPr>
+            <a:r>
+              <a:rPr lang="en-US" sz="4800" dirty="0" smtClean="0">
+                <a:solidFill>
+                  <a:prstClr val="white"/>
+                </a:solidFill>
+              </a:rPr>
+              <a:t>Train AI to change camera location.</a:t>
+            </a:r>
+          </a:p>
+          <a:p>
+            <a:pPr marL="685800" lvl="0" indent="-685800">
+              <a:buFont typeface="Arial" panose="020B0604020202020204" pitchFamily="34" charset="0"/>
+              <a:buChar char="•"/>
+            </a:pPr>
+            <a:r>
+              <a:rPr lang="en-US" sz="4800" dirty="0" smtClean="0">
+                <a:solidFill>
+                  <a:prstClr val="white"/>
+                </a:solidFill>
+              </a:rPr>
+              <a:t>Utilize Pro-player replay data.</a:t>
+            </a:r>
+          </a:p>
+          <a:p>
+            <a:pPr marL="685800" lvl="0" indent="-685800">
+              <a:buFont typeface="Arial" panose="020B0604020202020204" pitchFamily="34" charset="0"/>
+              <a:buChar char="•"/>
+            </a:pPr>
+            <a:r>
+              <a:rPr lang="en-US" sz="4800" dirty="0" smtClean="0">
+                <a:solidFill>
+                  <a:prstClr val="white"/>
+                </a:solidFill>
+              </a:rPr>
+              <a:t>Expand input space to include all mini-map layers.</a:t>
+            </a:r>
+          </a:p>
+          <a:p>
+            <a:pPr marL="685800" lvl="0" indent="-685800">
+              <a:buFont typeface="Arial" panose="020B0604020202020204" pitchFamily="34" charset="0"/>
+              <a:buChar char="•"/>
+            </a:pPr>
+            <a:r>
+              <a:rPr lang="en-US" sz="4800" dirty="0" smtClean="0">
+                <a:solidFill>
+                  <a:prstClr val="white"/>
+                </a:solidFill>
+              </a:rPr>
+              <a:t>Train AI to play as </a:t>
+            </a:r>
+            <a:r>
+              <a:rPr lang="en-US" sz="4800" dirty="0" err="1" smtClean="0">
+                <a:solidFill>
+                  <a:prstClr val="white"/>
+                </a:solidFill>
+              </a:rPr>
+              <a:t>Protoss</a:t>
+            </a:r>
+            <a:r>
+              <a:rPr lang="en-US" sz="4800" dirty="0" smtClean="0">
+                <a:solidFill>
+                  <a:prstClr val="white"/>
+                </a:solidFill>
+              </a:rPr>
+              <a:t> and </a:t>
+            </a:r>
+            <a:r>
+              <a:rPr lang="en-US" sz="4800" dirty="0" err="1" smtClean="0">
+                <a:solidFill>
+                  <a:prstClr val="white"/>
+                </a:solidFill>
+              </a:rPr>
+              <a:t>Zerg</a:t>
+            </a:r>
+            <a:r>
+              <a:rPr lang="en-US" sz="4800" dirty="0" smtClean="0">
+                <a:solidFill>
+                  <a:prstClr val="white"/>
+                </a:solidFill>
+              </a:rPr>
+              <a:t>.</a:t>
+            </a:r>
+          </a:p>
+        </p:txBody>
+      </p:sp>
+      <p:pic>
+        <p:nvPicPr>
+          <p:cNvPr id="1030" name="Picture 6" descr="Image result for python logo"/>
+          <p:cNvPicPr>
+            <a:picLocks noChangeAspect="1" noChangeArrowheads="1"/>
+          </p:cNvPicPr>
+          <p:nvPr/>
+        </p:nvPicPr>
+        <p:blipFill>
+          <a:blip r:embed="rId7" cstate="print">
+            <a:extLst>
+              <a:ext uri="{28A0092B-C50C-407E-A947-70E740481C1C}">
+                <a14:useLocalDpi xmlns:a14="http://schemas.microsoft.com/office/drawing/2010/main" val="0"/>
+              </a:ext>
+            </a:extLst>
+          </a:blip>
+          <a:srcRect/>
+          <a:stretch>
+            <a:fillRect/>
+          </a:stretch>
+        </p:blipFill>
+        <p:spPr bwMode="auto">
+          <a:xfrm>
+            <a:off x="13072404" y="27750284"/>
+            <a:ext cx="3909343" cy="3909343"/>
+          </a:xfrm>
+          <a:prstGeom prst="rect">
+            <a:avLst/>
+          </a:prstGeom>
+          <a:noFill/>
+          <a:extLst>
+            <a:ext uri="{909E8E84-426E-40DD-AFC4-6F175D3DCCD1}">
+              <a14:hiddenFill xmlns:a14="http://schemas.microsoft.com/office/drawing/2010/main">
+                <a:solidFill>
+                  <a:srgbClr val="FFFFFF"/>
+                </a:solidFill>
+              </a14:hiddenFill>
+            </a:ext>
+          </a:extLst>
+        </p:spPr>
+      </p:pic>
+      <p:pic>
+        <p:nvPicPr>
+          <p:cNvPr id="1032" name="Picture 8" descr="Image result for pytorch logo"/>
+          <p:cNvPicPr>
+            <a:picLocks noChangeAspect="1" noChangeArrowheads="1"/>
+          </p:cNvPicPr>
+          <p:nvPr/>
+        </p:nvPicPr>
+        <p:blipFill>
+          <a:blip r:embed="rId8">
+            <a:extLst>
+              <a:ext uri="{28A0092B-C50C-407E-A947-70E740481C1C}">
+                <a14:useLocalDpi xmlns:a14="http://schemas.microsoft.com/office/drawing/2010/main" val="0"/>
+              </a:ext>
+            </a:extLst>
+          </a:blip>
+          <a:srcRect/>
+          <a:stretch>
+            <a:fillRect/>
+          </a:stretch>
+        </p:blipFill>
+        <p:spPr bwMode="auto">
+          <a:xfrm>
+            <a:off x="17133866" y="27204715"/>
+            <a:ext cx="4876800" cy="4876801"/>
+          </a:xfrm>
+          <a:prstGeom prst="rect">
+            <a:avLst/>
+          </a:prstGeom>
+          <a:noFill/>
+          <a:extLst>
+            <a:ext uri="{909E8E84-426E-40DD-AFC4-6F175D3DCCD1}">
+              <a14:hiddenFill xmlns:a14="http://schemas.microsoft.com/office/drawing/2010/main">
+                <a:solidFill>
+                  <a:srgbClr val="FFFFFF"/>
+                </a:solidFill>
+              </a14:hiddenFill>
+            </a:ext>
+          </a:extLst>
+        </p:spPr>
+      </p:pic>
+      <p:pic>
+        <p:nvPicPr>
+          <p:cNvPr id="1034" name="Picture 10" descr="Image result for deepmind logo transparent"/>
+          <p:cNvPicPr>
+            <a:picLocks noChangeAspect="1" noChangeArrowheads="1"/>
+          </p:cNvPicPr>
+          <p:nvPr/>
+        </p:nvPicPr>
+        <p:blipFill>
+          <a:blip r:embed="rId9">
+            <a:extLst>
+              <a:ext uri="{BEBA8EAE-BF5A-486C-A8C5-ECC9F3942E4B}">
+                <a14:imgProps xmlns:a14="http://schemas.microsoft.com/office/drawing/2010/main">
+                  <a14:imgLayer r:embed="rId10">
+                    <a14:imgEffect>
+                      <a14:backgroundRemoval t="4500" b="95250" l="5750" r="94750">
+                        <a14:foregroundMark x1="32500" y1="56250" x2="27500" y2="41750"/>
+                        <a14:foregroundMark x1="41500" y1="24000" x2="43250" y2="24000"/>
+                        <a14:foregroundMark x1="51750" y1="21750" x2="66250" y2="25750"/>
+                        <a14:foregroundMark x1="75000" y1="30500" x2="87750" y2="60750"/>
+                      </a14:backgroundRemoval>
+                    </a14:imgEffect>
+                  </a14:imgLayer>
+                </a14:imgProps>
+              </a:ext>
+              <a:ext uri="{28A0092B-C50C-407E-A947-70E740481C1C}">
+                <a14:useLocalDpi xmlns:a14="http://schemas.microsoft.com/office/drawing/2010/main" val="0"/>
+              </a:ext>
+            </a:extLst>
+          </a:blip>
+          <a:srcRect/>
+          <a:stretch>
+            <a:fillRect/>
+          </a:stretch>
+        </p:blipFill>
+        <p:spPr bwMode="auto">
+          <a:xfrm>
+            <a:off x="22345015" y="27750284"/>
+            <a:ext cx="3810000" cy="3810000"/>
+          </a:xfrm>
+          <a:prstGeom prst="rect">
+            <a:avLst/>
+          </a:prstGeom>
+          <a:noFill/>
+          <a:extLst>
+            <a:ext uri="{909E8E84-426E-40DD-AFC4-6F175D3DCCD1}">
+              <a14:hiddenFill xmlns:a14="http://schemas.microsoft.com/office/drawing/2010/main">
+                <a:solidFill>
+                  <a:srgbClr val="FFFFFF"/>
+                </a:solidFill>
+              </a14:hiddenFill>
+            </a:ext>
+          </a:extLst>
+        </p:spPr>
+      </p:pic>
+      <p:pic>
+        <p:nvPicPr>
+          <p:cNvPr id="1036" name="Picture 12" descr="Image result for numpy logo"/>
+          <p:cNvPicPr>
+            <a:picLocks noChangeAspect="1" noChangeArrowheads="1"/>
+          </p:cNvPicPr>
+          <p:nvPr/>
+        </p:nvPicPr>
+        <p:blipFill rotWithShape="1">
+          <a:blip r:embed="rId11">
+            <a:extLst>
+              <a:ext uri="{28A0092B-C50C-407E-A947-70E740481C1C}">
+                <a14:useLocalDpi xmlns:a14="http://schemas.microsoft.com/office/drawing/2010/main" val="0"/>
+              </a:ext>
+            </a:extLst>
+          </a:blip>
+          <a:srcRect t="-1066" r="60576" b="1066"/>
+          <a:stretch/>
+        </p:blipFill>
+        <p:spPr bwMode="auto">
+          <a:xfrm>
+            <a:off x="27209968" y="27416100"/>
+            <a:ext cx="4550588" cy="4577709"/>
+          </a:xfrm>
+          <a:prstGeom prst="rect">
+            <a:avLst/>
+          </a:prstGeom>
+          <a:noFill/>
+          <a:extLst>
+            <a:ext uri="{909E8E84-426E-40DD-AFC4-6F175D3DCCD1}">
+              <a14:hiddenFill xmlns:a14="http://schemas.microsoft.com/office/drawing/2010/main">
+                <a:solidFill>
+                  <a:srgbClr val="FFFFFF"/>
+                </a:solidFill>
+              </a14:hiddenFill>
+            </a:ext>
+          </a:extLst>
         </p:spPr>
       </p:pic>
     </p:spTree>

</xml_diff>

<commit_message>
update poster. needs background but hopefully good enough for now?
</commit_message>
<xml_diff>
--- a/Senior Design Poster.pptx
+++ b/Senior Design Poster.pptx
@@ -104,7 +104,27 @@
       </a:defRPr>
     </a:lvl9pPr>
   </p:defaultTextStyle>
+  <p:extLst>
+    <p:ext uri="{EFAFB233-063F-42B5-8137-9DF3F51BA10A}">
+      <p15:sldGuideLst xmlns:p15="http://schemas.microsoft.com/office/powerpoint/2012/main">
+        <p15:guide id="1" orient="horz" pos="10368">
+          <p15:clr>
+            <a:srgbClr val="A4A3A4"/>
+          </p15:clr>
+        </p15:guide>
+        <p15:guide id="2" pos="13824">
+          <p15:clr>
+            <a:srgbClr val="A4A3A4"/>
+          </p15:clr>
+        </p15:guide>
+      </p15:sldGuideLst>
+    </p:ext>
+  </p:extLst>
 </p:presentation>
+</file>
+
+<file path=ppt/revisionInfo.xml><?xml version="1.0" encoding="utf-8"?>
+<p1510:revInfo xmlns:a="http://schemas.openxmlformats.org/drawingml/2006/main" xmlns:r="http://schemas.openxmlformats.org/officeDocument/2006/relationships" xmlns:p1510="http://schemas.microsoft.com/office/powerpoint/2015/10/main"/>
 </file>
 
 <file path=ppt/slideLayouts/slideLayout1.xml><?xml version="1.0" encoding="utf-8"?>
@@ -145,10 +165,9 @@
           <a:lstStyle/>
           <a:p>
             <a:r>
-              <a:rPr lang="en-US" smtClean="0"/>
+              <a:rPr lang="en-US"/>
               <a:t>Click to edit Master title style</a:t>
             </a:r>
-            <a:endParaRPr lang="en-US"/>
           </a:p>
         </p:txBody>
       </p:sp>
@@ -264,10 +283,9 @@
           </a:lstStyle>
           <a:p>
             <a:r>
-              <a:rPr lang="en-US" smtClean="0"/>
+              <a:rPr lang="en-US"/>
               <a:t>Click to edit Master subtitle style</a:t>
             </a:r>
-            <a:endParaRPr lang="en-US"/>
           </a:p>
         </p:txBody>
       </p:sp>
@@ -288,7 +306,7 @@
           <a:p>
             <a:fld id="{466FE519-D025-4205-95BE-FAF045E3FBF1}" type="datetimeFigureOut">
               <a:rPr lang="en-US" smtClean="0"/>
-              <a:t>2/22/2018</a:t>
+              <a:t>2/26/2018</a:t>
             </a:fld>
             <a:endParaRPr lang="en-US"/>
           </a:p>
@@ -382,10 +400,9 @@
           <a:lstStyle/>
           <a:p>
             <a:r>
-              <a:rPr lang="en-US" smtClean="0"/>
+              <a:rPr lang="en-US"/>
               <a:t>Click to edit Master title style</a:t>
             </a:r>
-            <a:endParaRPr lang="en-US"/>
           </a:p>
         </p:txBody>
       </p:sp>
@@ -406,38 +423,37 @@
           <a:p>
             <a:pPr lvl="0"/>
             <a:r>
-              <a:rPr lang="en-US" smtClean="0"/>
+              <a:rPr lang="en-US"/>
               <a:t>Click to edit Master text styles</a:t>
             </a:r>
           </a:p>
           <a:p>
             <a:pPr lvl="1"/>
             <a:r>
-              <a:rPr lang="en-US" smtClean="0"/>
+              <a:rPr lang="en-US"/>
               <a:t>Second level</a:t>
             </a:r>
           </a:p>
           <a:p>
             <a:pPr lvl="2"/>
             <a:r>
-              <a:rPr lang="en-US" smtClean="0"/>
+              <a:rPr lang="en-US"/>
               <a:t>Third level</a:t>
             </a:r>
           </a:p>
           <a:p>
             <a:pPr lvl="3"/>
             <a:r>
-              <a:rPr lang="en-US" smtClean="0"/>
+              <a:rPr lang="en-US"/>
               <a:t>Fourth level</a:t>
             </a:r>
           </a:p>
           <a:p>
             <a:pPr lvl="4"/>
             <a:r>
-              <a:rPr lang="en-US" smtClean="0"/>
+              <a:rPr lang="en-US"/>
               <a:t>Fifth level</a:t>
             </a:r>
-            <a:endParaRPr lang="en-US"/>
           </a:p>
         </p:txBody>
       </p:sp>
@@ -458,7 +474,7 @@
           <a:p>
             <a:fld id="{466FE519-D025-4205-95BE-FAF045E3FBF1}" type="datetimeFigureOut">
               <a:rPr lang="en-US" smtClean="0"/>
-              <a:t>2/22/2018</a:t>
+              <a:t>2/26/2018</a:t>
             </a:fld>
             <a:endParaRPr lang="en-US"/>
           </a:p>
@@ -557,10 +573,9 @@
           <a:lstStyle/>
           <a:p>
             <a:r>
-              <a:rPr lang="en-US" smtClean="0"/>
+              <a:rPr lang="en-US"/>
               <a:t>Click to edit Master title style</a:t>
             </a:r>
-            <a:endParaRPr lang="en-US"/>
           </a:p>
         </p:txBody>
       </p:sp>
@@ -586,38 +601,37 @@
           <a:p>
             <a:pPr lvl="0"/>
             <a:r>
-              <a:rPr lang="en-US" smtClean="0"/>
+              <a:rPr lang="en-US"/>
               <a:t>Click to edit Master text styles</a:t>
             </a:r>
           </a:p>
           <a:p>
             <a:pPr lvl="1"/>
             <a:r>
-              <a:rPr lang="en-US" smtClean="0"/>
+              <a:rPr lang="en-US"/>
               <a:t>Second level</a:t>
             </a:r>
           </a:p>
           <a:p>
             <a:pPr lvl="2"/>
             <a:r>
-              <a:rPr lang="en-US" smtClean="0"/>
+              <a:rPr lang="en-US"/>
               <a:t>Third level</a:t>
             </a:r>
           </a:p>
           <a:p>
             <a:pPr lvl="3"/>
             <a:r>
-              <a:rPr lang="en-US" smtClean="0"/>
+              <a:rPr lang="en-US"/>
               <a:t>Fourth level</a:t>
             </a:r>
           </a:p>
           <a:p>
             <a:pPr lvl="4"/>
             <a:r>
-              <a:rPr lang="en-US" smtClean="0"/>
+              <a:rPr lang="en-US"/>
               <a:t>Fifth level</a:t>
             </a:r>
-            <a:endParaRPr lang="en-US"/>
           </a:p>
         </p:txBody>
       </p:sp>
@@ -638,7 +652,7 @@
           <a:p>
             <a:fld id="{466FE519-D025-4205-95BE-FAF045E3FBF1}" type="datetimeFigureOut">
               <a:rPr lang="en-US" smtClean="0"/>
-              <a:t>2/22/2018</a:t>
+              <a:t>2/26/2018</a:t>
             </a:fld>
             <a:endParaRPr lang="en-US"/>
           </a:p>
@@ -732,10 +746,9 @@
           <a:lstStyle/>
           <a:p>
             <a:r>
-              <a:rPr lang="en-US" smtClean="0"/>
+              <a:rPr lang="en-US"/>
               <a:t>Click to edit Master title style</a:t>
             </a:r>
-            <a:endParaRPr lang="en-US"/>
           </a:p>
         </p:txBody>
       </p:sp>
@@ -756,38 +769,37 @@
           <a:p>
             <a:pPr lvl="0"/>
             <a:r>
-              <a:rPr lang="en-US" smtClean="0"/>
+              <a:rPr lang="en-US"/>
               <a:t>Click to edit Master text styles</a:t>
             </a:r>
           </a:p>
           <a:p>
             <a:pPr lvl="1"/>
             <a:r>
-              <a:rPr lang="en-US" smtClean="0"/>
+              <a:rPr lang="en-US"/>
               <a:t>Second level</a:t>
             </a:r>
           </a:p>
           <a:p>
             <a:pPr lvl="2"/>
             <a:r>
-              <a:rPr lang="en-US" smtClean="0"/>
+              <a:rPr lang="en-US"/>
               <a:t>Third level</a:t>
             </a:r>
           </a:p>
           <a:p>
             <a:pPr lvl="3"/>
             <a:r>
-              <a:rPr lang="en-US" smtClean="0"/>
+              <a:rPr lang="en-US"/>
               <a:t>Fourth level</a:t>
             </a:r>
           </a:p>
           <a:p>
             <a:pPr lvl="4"/>
             <a:r>
-              <a:rPr lang="en-US" smtClean="0"/>
+              <a:rPr lang="en-US"/>
               <a:t>Fifth level</a:t>
             </a:r>
-            <a:endParaRPr lang="en-US"/>
           </a:p>
         </p:txBody>
       </p:sp>
@@ -808,7 +820,7 @@
           <a:p>
             <a:fld id="{466FE519-D025-4205-95BE-FAF045E3FBF1}" type="datetimeFigureOut">
               <a:rPr lang="en-US" smtClean="0"/>
-              <a:t>2/22/2018</a:t>
+              <a:t>2/26/2018</a:t>
             </a:fld>
             <a:endParaRPr lang="en-US"/>
           </a:p>
@@ -911,10 +923,9 @@
           </a:lstStyle>
           <a:p>
             <a:r>
-              <a:rPr lang="en-US" smtClean="0"/>
+              <a:rPr lang="en-US"/>
               <a:t>Click to edit Master title style</a:t>
             </a:r>
-            <a:endParaRPr lang="en-US"/>
           </a:p>
         </p:txBody>
       </p:sp>
@@ -1031,7 +1042,7 @@
           <a:p>
             <a:pPr lvl="0"/>
             <a:r>
-              <a:rPr lang="en-US" smtClean="0"/>
+              <a:rPr lang="en-US"/>
               <a:t>Click to edit Master text styles</a:t>
             </a:r>
           </a:p>
@@ -1054,7 +1065,7 @@
           <a:p>
             <a:fld id="{466FE519-D025-4205-95BE-FAF045E3FBF1}" type="datetimeFigureOut">
               <a:rPr lang="en-US" smtClean="0"/>
-              <a:t>2/22/2018</a:t>
+              <a:t>2/26/2018</a:t>
             </a:fld>
             <a:endParaRPr lang="en-US"/>
           </a:p>
@@ -1148,10 +1159,9 @@
           <a:lstStyle/>
           <a:p>
             <a:r>
-              <a:rPr lang="en-US" smtClean="0"/>
+              <a:rPr lang="en-US"/>
               <a:t>Click to edit Master title style</a:t>
             </a:r>
-            <a:endParaRPr lang="en-US"/>
           </a:p>
         </p:txBody>
       </p:sp>
@@ -1205,38 +1215,37 @@
           <a:p>
             <a:pPr lvl="0"/>
             <a:r>
-              <a:rPr lang="en-US" smtClean="0"/>
+              <a:rPr lang="en-US"/>
               <a:t>Click to edit Master text styles</a:t>
             </a:r>
           </a:p>
           <a:p>
             <a:pPr lvl="1"/>
             <a:r>
-              <a:rPr lang="en-US" smtClean="0"/>
+              <a:rPr lang="en-US"/>
               <a:t>Second level</a:t>
             </a:r>
           </a:p>
           <a:p>
             <a:pPr lvl="2"/>
             <a:r>
-              <a:rPr lang="en-US" smtClean="0"/>
+              <a:rPr lang="en-US"/>
               <a:t>Third level</a:t>
             </a:r>
           </a:p>
           <a:p>
             <a:pPr lvl="3"/>
             <a:r>
-              <a:rPr lang="en-US" smtClean="0"/>
+              <a:rPr lang="en-US"/>
               <a:t>Fourth level</a:t>
             </a:r>
           </a:p>
           <a:p>
             <a:pPr lvl="4"/>
             <a:r>
-              <a:rPr lang="en-US" smtClean="0"/>
+              <a:rPr lang="en-US"/>
               <a:t>Fifth level</a:t>
             </a:r>
-            <a:endParaRPr lang="en-US"/>
           </a:p>
         </p:txBody>
       </p:sp>
@@ -1290,38 +1299,37 @@
           <a:p>
             <a:pPr lvl="0"/>
             <a:r>
-              <a:rPr lang="en-US" smtClean="0"/>
+              <a:rPr lang="en-US"/>
               <a:t>Click to edit Master text styles</a:t>
             </a:r>
           </a:p>
           <a:p>
             <a:pPr lvl="1"/>
             <a:r>
-              <a:rPr lang="en-US" smtClean="0"/>
+              <a:rPr lang="en-US"/>
               <a:t>Second level</a:t>
             </a:r>
           </a:p>
           <a:p>
             <a:pPr lvl="2"/>
             <a:r>
-              <a:rPr lang="en-US" smtClean="0"/>
+              <a:rPr lang="en-US"/>
               <a:t>Third level</a:t>
             </a:r>
           </a:p>
           <a:p>
             <a:pPr lvl="3"/>
             <a:r>
-              <a:rPr lang="en-US" smtClean="0"/>
+              <a:rPr lang="en-US"/>
               <a:t>Fourth level</a:t>
             </a:r>
           </a:p>
           <a:p>
             <a:pPr lvl="4"/>
             <a:r>
-              <a:rPr lang="en-US" smtClean="0"/>
+              <a:rPr lang="en-US"/>
               <a:t>Fifth level</a:t>
             </a:r>
-            <a:endParaRPr lang="en-US"/>
           </a:p>
         </p:txBody>
       </p:sp>
@@ -1342,7 +1350,7 @@
           <a:p>
             <a:fld id="{466FE519-D025-4205-95BE-FAF045E3FBF1}" type="datetimeFigureOut">
               <a:rPr lang="en-US" smtClean="0"/>
-              <a:t>2/22/2018</a:t>
+              <a:t>2/26/2018</a:t>
             </a:fld>
             <a:endParaRPr lang="en-US"/>
           </a:p>
@@ -1445,10 +1453,9 @@
           </a:lstStyle>
           <a:p>
             <a:r>
-              <a:rPr lang="en-US" smtClean="0"/>
+              <a:rPr lang="en-US"/>
               <a:t>Click to edit Master title style</a:t>
             </a:r>
-            <a:endParaRPr lang="en-US"/>
           </a:p>
         </p:txBody>
       </p:sp>
@@ -1511,7 +1518,7 @@
           <a:p>
             <a:pPr lvl="0"/>
             <a:r>
-              <a:rPr lang="en-US" smtClean="0"/>
+              <a:rPr lang="en-US"/>
               <a:t>Click to edit Master text styles</a:t>
             </a:r>
           </a:p>
@@ -1567,38 +1574,37 @@
           <a:p>
             <a:pPr lvl="0"/>
             <a:r>
-              <a:rPr lang="en-US" smtClean="0"/>
+              <a:rPr lang="en-US"/>
               <a:t>Click to edit Master text styles</a:t>
             </a:r>
           </a:p>
           <a:p>
             <a:pPr lvl="1"/>
             <a:r>
-              <a:rPr lang="en-US" smtClean="0"/>
+              <a:rPr lang="en-US"/>
               <a:t>Second level</a:t>
             </a:r>
           </a:p>
           <a:p>
             <a:pPr lvl="2"/>
             <a:r>
-              <a:rPr lang="en-US" smtClean="0"/>
+              <a:rPr lang="en-US"/>
               <a:t>Third level</a:t>
             </a:r>
           </a:p>
           <a:p>
             <a:pPr lvl="3"/>
             <a:r>
-              <a:rPr lang="en-US" smtClean="0"/>
+              <a:rPr lang="en-US"/>
               <a:t>Fourth level</a:t>
             </a:r>
           </a:p>
           <a:p>
             <a:pPr lvl="4"/>
             <a:r>
-              <a:rPr lang="en-US" smtClean="0"/>
+              <a:rPr lang="en-US"/>
               <a:t>Fifth level</a:t>
             </a:r>
-            <a:endParaRPr lang="en-US"/>
           </a:p>
         </p:txBody>
       </p:sp>
@@ -1661,7 +1667,7 @@
           <a:p>
             <a:pPr lvl="0"/>
             <a:r>
-              <a:rPr lang="en-US" smtClean="0"/>
+              <a:rPr lang="en-US"/>
               <a:t>Click to edit Master text styles</a:t>
             </a:r>
           </a:p>
@@ -1717,38 +1723,37 @@
           <a:p>
             <a:pPr lvl="0"/>
             <a:r>
-              <a:rPr lang="en-US" smtClean="0"/>
+              <a:rPr lang="en-US"/>
               <a:t>Click to edit Master text styles</a:t>
             </a:r>
           </a:p>
           <a:p>
             <a:pPr lvl="1"/>
             <a:r>
-              <a:rPr lang="en-US" smtClean="0"/>
+              <a:rPr lang="en-US"/>
               <a:t>Second level</a:t>
             </a:r>
           </a:p>
           <a:p>
             <a:pPr lvl="2"/>
             <a:r>
-              <a:rPr lang="en-US" smtClean="0"/>
+              <a:rPr lang="en-US"/>
               <a:t>Third level</a:t>
             </a:r>
           </a:p>
           <a:p>
             <a:pPr lvl="3"/>
             <a:r>
-              <a:rPr lang="en-US" smtClean="0"/>
+              <a:rPr lang="en-US"/>
               <a:t>Fourth level</a:t>
             </a:r>
           </a:p>
           <a:p>
             <a:pPr lvl="4"/>
             <a:r>
-              <a:rPr lang="en-US" smtClean="0"/>
+              <a:rPr lang="en-US"/>
               <a:t>Fifth level</a:t>
             </a:r>
-            <a:endParaRPr lang="en-US"/>
           </a:p>
         </p:txBody>
       </p:sp>
@@ -1769,7 +1774,7 @@
           <a:p>
             <a:fld id="{466FE519-D025-4205-95BE-FAF045E3FBF1}" type="datetimeFigureOut">
               <a:rPr lang="en-US" smtClean="0"/>
-              <a:t>2/22/2018</a:t>
+              <a:t>2/26/2018</a:t>
             </a:fld>
             <a:endParaRPr lang="en-US"/>
           </a:p>
@@ -1863,10 +1868,9 @@
           <a:lstStyle/>
           <a:p>
             <a:r>
-              <a:rPr lang="en-US" smtClean="0"/>
+              <a:rPr lang="en-US"/>
               <a:t>Click to edit Master title style</a:t>
             </a:r>
-            <a:endParaRPr lang="en-US"/>
           </a:p>
         </p:txBody>
       </p:sp>
@@ -1887,7 +1891,7 @@
           <a:p>
             <a:fld id="{466FE519-D025-4205-95BE-FAF045E3FBF1}" type="datetimeFigureOut">
               <a:rPr lang="en-US" smtClean="0"/>
-              <a:t>2/22/2018</a:t>
+              <a:t>2/26/2018</a:t>
             </a:fld>
             <a:endParaRPr lang="en-US"/>
           </a:p>
@@ -1982,7 +1986,7 @@
           <a:p>
             <a:fld id="{466FE519-D025-4205-95BE-FAF045E3FBF1}" type="datetimeFigureOut">
               <a:rPr lang="en-US" smtClean="0"/>
-              <a:t>2/22/2018</a:t>
+              <a:t>2/26/2018</a:t>
             </a:fld>
             <a:endParaRPr lang="en-US"/>
           </a:p>
@@ -2085,10 +2089,9 @@
           </a:lstStyle>
           <a:p>
             <a:r>
-              <a:rPr lang="en-US" smtClean="0"/>
+              <a:rPr lang="en-US"/>
               <a:t>Click to edit Master title style</a:t>
             </a:r>
-            <a:endParaRPr lang="en-US"/>
           </a:p>
         </p:txBody>
       </p:sp>
@@ -2142,38 +2145,37 @@
           <a:p>
             <a:pPr lvl="0"/>
             <a:r>
-              <a:rPr lang="en-US" smtClean="0"/>
+              <a:rPr lang="en-US"/>
               <a:t>Click to edit Master text styles</a:t>
             </a:r>
           </a:p>
           <a:p>
             <a:pPr lvl="1"/>
             <a:r>
-              <a:rPr lang="en-US" smtClean="0"/>
+              <a:rPr lang="en-US"/>
               <a:t>Second level</a:t>
             </a:r>
           </a:p>
           <a:p>
             <a:pPr lvl="2"/>
             <a:r>
-              <a:rPr lang="en-US" smtClean="0"/>
+              <a:rPr lang="en-US"/>
               <a:t>Third level</a:t>
             </a:r>
           </a:p>
           <a:p>
             <a:pPr lvl="3"/>
             <a:r>
-              <a:rPr lang="en-US" smtClean="0"/>
+              <a:rPr lang="en-US"/>
               <a:t>Fourth level</a:t>
             </a:r>
           </a:p>
           <a:p>
             <a:pPr lvl="4"/>
             <a:r>
-              <a:rPr lang="en-US" smtClean="0"/>
+              <a:rPr lang="en-US"/>
               <a:t>Fifth level</a:t>
             </a:r>
-            <a:endParaRPr lang="en-US"/>
           </a:p>
         </p:txBody>
       </p:sp>
@@ -2236,7 +2238,7 @@
           <a:p>
             <a:pPr lvl="0"/>
             <a:r>
-              <a:rPr lang="en-US" smtClean="0"/>
+              <a:rPr lang="en-US"/>
               <a:t>Click to edit Master text styles</a:t>
             </a:r>
           </a:p>
@@ -2259,7 +2261,7 @@
           <a:p>
             <a:fld id="{466FE519-D025-4205-95BE-FAF045E3FBF1}" type="datetimeFigureOut">
               <a:rPr lang="en-US" smtClean="0"/>
-              <a:t>2/22/2018</a:t>
+              <a:t>2/26/2018</a:t>
             </a:fld>
             <a:endParaRPr lang="en-US"/>
           </a:p>
@@ -2362,10 +2364,9 @@
           </a:lstStyle>
           <a:p>
             <a:r>
-              <a:rPr lang="en-US" smtClean="0"/>
+              <a:rPr lang="en-US"/>
               <a:t>Click to edit Master title style</a:t>
             </a:r>
-            <a:endParaRPr lang="en-US"/>
           </a:p>
         </p:txBody>
       </p:sp>
@@ -2489,7 +2490,7 @@
           <a:p>
             <a:pPr lvl="0"/>
             <a:r>
-              <a:rPr lang="en-US" smtClean="0"/>
+              <a:rPr lang="en-US"/>
               <a:t>Click to edit Master text styles</a:t>
             </a:r>
           </a:p>
@@ -2512,7 +2513,7 @@
           <a:p>
             <a:fld id="{466FE519-D025-4205-95BE-FAF045E3FBF1}" type="datetimeFigureOut">
               <a:rPr lang="en-US" smtClean="0"/>
-              <a:t>2/22/2018</a:t>
+              <a:t>2/26/2018</a:t>
             </a:fld>
             <a:endParaRPr lang="en-US"/>
           </a:p>
@@ -2621,10 +2622,9 @@
           <a:lstStyle/>
           <a:p>
             <a:r>
-              <a:rPr lang="en-US" smtClean="0"/>
+              <a:rPr lang="en-US"/>
               <a:t>Click to edit Master title style</a:t>
             </a:r>
-            <a:endParaRPr lang="en-US"/>
           </a:p>
         </p:txBody>
       </p:sp>
@@ -2655,38 +2655,37 @@
           <a:p>
             <a:pPr lvl="0"/>
             <a:r>
-              <a:rPr lang="en-US" smtClean="0"/>
+              <a:rPr lang="en-US"/>
               <a:t>Click to edit Master text styles</a:t>
             </a:r>
           </a:p>
           <a:p>
             <a:pPr lvl="1"/>
             <a:r>
-              <a:rPr lang="en-US" smtClean="0"/>
+              <a:rPr lang="en-US"/>
               <a:t>Second level</a:t>
             </a:r>
           </a:p>
           <a:p>
             <a:pPr lvl="2"/>
             <a:r>
-              <a:rPr lang="en-US" smtClean="0"/>
+              <a:rPr lang="en-US"/>
               <a:t>Third level</a:t>
             </a:r>
           </a:p>
           <a:p>
             <a:pPr lvl="3"/>
             <a:r>
-              <a:rPr lang="en-US" smtClean="0"/>
+              <a:rPr lang="en-US"/>
               <a:t>Fourth level</a:t>
             </a:r>
           </a:p>
           <a:p>
             <a:pPr lvl="4"/>
             <a:r>
-              <a:rPr lang="en-US" smtClean="0"/>
+              <a:rPr lang="en-US"/>
               <a:t>Fifth level</a:t>
             </a:r>
-            <a:endParaRPr lang="en-US"/>
           </a:p>
         </p:txBody>
       </p:sp>
@@ -2725,7 +2724,7 @@
           <a:p>
             <a:fld id="{466FE519-D025-4205-95BE-FAF045E3FBF1}" type="datetimeFigureOut">
               <a:rPr lang="en-US" smtClean="0"/>
-              <a:t>2/22/2018</a:t>
+              <a:t>2/26/2018</a:t>
             </a:fld>
             <a:endParaRPr lang="en-US"/>
           </a:p>
@@ -3251,8 +3250,8 @@
         </p:nvSpPr>
         <p:spPr>
           <a:xfrm>
-            <a:off x="13523086" y="8915400"/>
-            <a:ext cx="16975160" cy="4524315"/>
+            <a:off x="17602893" y="4721289"/>
+            <a:ext cx="8654934" cy="1569660"/>
           </a:xfrm>
           <a:prstGeom prst="rect">
             <a:avLst/>
@@ -3267,7 +3266,7 @@
           <a:p>
             <a:pPr algn="ctr"/>
             <a:r>
-              <a:rPr lang="en-US" sz="9600" b="0" cap="none" spc="0" dirty="0" smtClean="0">
+              <a:rPr lang="en-US" sz="9600" b="0" cap="none" spc="0" dirty="0">
                 <a:ln w="18415" cmpd="sng">
                   <a:solidFill>
                     <a:srgbClr val="FFFFFF"/>
@@ -3285,74 +3284,8 @@
                   </a:outerShdw>
                 </a:effectLst>
               </a:rPr>
-              <a:t>Design/Input</a:t>
-            </a:r>
-          </a:p>
-          <a:p>
-            <a:pPr algn="ctr"/>
-            <a:r>
-              <a:rPr lang="en-US" sz="9600" b="0" cap="none" spc="0" dirty="0" smtClean="0">
-                <a:ln w="18415" cmpd="sng">
-                  <a:solidFill>
-                    <a:srgbClr val="FFFFFF"/>
-                  </a:solidFill>
-                  <a:prstDash val="solid"/>
-                </a:ln>
-                <a:solidFill>
-                  <a:srgbClr val="FFFFFF"/>
-                </a:solidFill>
-                <a:effectLst>
-                  <a:outerShdw blurRad="63500" dir="3600000" algn="tl" rotWithShape="0">
-                    <a:srgbClr val="000000">
-                      <a:alpha val="70000"/>
-                    </a:srgbClr>
-                  </a:outerShdw>
-                </a:effectLst>
-              </a:rPr>
-              <a:t>Diagram</a:t>
-            </a:r>
-          </a:p>
-          <a:p>
-            <a:pPr algn="ctr"/>
-            <a:r>
-              <a:rPr lang="en-US" sz="9600" b="0" cap="none" spc="0" dirty="0" smtClean="0">
-                <a:ln w="18415" cmpd="sng">
-                  <a:solidFill>
-                    <a:srgbClr val="FFFFFF"/>
-                  </a:solidFill>
-                  <a:prstDash val="solid"/>
-                </a:ln>
-                <a:solidFill>
-                  <a:srgbClr val="FFFFFF"/>
-                </a:solidFill>
-                <a:effectLst>
-                  <a:outerShdw blurRad="63500" dir="3600000" algn="tl" rotWithShape="0">
-                    <a:srgbClr val="000000">
-                      <a:alpha val="70000"/>
-                    </a:srgbClr>
-                  </a:outerShdw>
-                </a:effectLst>
-              </a:rPr>
-              <a:t>Jon’s Aforementioned Playground</a:t>
-            </a:r>
-            <a:endParaRPr lang="en-US" sz="9600" b="0" cap="none" spc="0" dirty="0">
-              <a:ln w="18415" cmpd="sng">
-                <a:solidFill>
-                  <a:srgbClr val="FFFFFF"/>
-                </a:solidFill>
-                <a:prstDash val="solid"/>
-              </a:ln>
-              <a:solidFill>
-                <a:srgbClr val="FFFFFF"/>
-              </a:solidFill>
-              <a:effectLst>
-                <a:outerShdw blurRad="63500" dir="3600000" algn="tl" rotWithShape="0">
-                  <a:srgbClr val="000000">
-                    <a:alpha val="70000"/>
-                  </a:srgbClr>
-                </a:outerShdw>
-              </a:effectLst>
-            </a:endParaRPr>
+              <a:t>Design and Input</a:t>
+            </a:r>
           </a:p>
         </p:txBody>
       </p:sp>
@@ -3424,7 +3357,7 @@
           <a:lstStyle/>
           <a:p>
             <a:r>
-              <a:rPr lang="en-US" sz="5400" b="1" cap="none" spc="0" dirty="0" smtClean="0">
+              <a:rPr lang="en-US" sz="5400" b="1" cap="none" spc="0" dirty="0">
                 <a:ln w="18415" cmpd="sng">
                   <a:solidFill>
                     <a:srgbClr val="FFFFFF"/>
@@ -3447,7 +3380,7 @@
           </a:p>
           <a:p>
             <a:r>
-              <a:rPr lang="en-US" sz="4800" dirty="0" smtClean="0">
+              <a:rPr lang="en-US" sz="4800" dirty="0">
                 <a:solidFill>
                   <a:schemeClr val="bg1"/>
                 </a:solidFill>
@@ -3455,7 +3388,7 @@
               <a:t>There have been many recent advances in game-playing AIs, such as the </a:t>
             </a:r>
             <a:r>
-              <a:rPr lang="en-US" sz="4800" dirty="0" err="1" smtClean="0">
+              <a:rPr lang="en-US" sz="4800" dirty="0" err="1">
                 <a:solidFill>
                   <a:schemeClr val="bg1"/>
                 </a:solidFill>
@@ -3463,7 +3396,7 @@
               <a:t>Dota</a:t>
             </a:r>
             <a:r>
-              <a:rPr lang="en-US" sz="4800" dirty="0" smtClean="0">
+              <a:rPr lang="en-US" sz="4800" dirty="0">
                 <a:solidFill>
                   <a:schemeClr val="bg1"/>
                 </a:solidFill>
@@ -3471,7 +3404,7 @@
               <a:t> 2 AI and </a:t>
             </a:r>
             <a:r>
-              <a:rPr lang="en-US" sz="4800" dirty="0" err="1" smtClean="0">
+              <a:rPr lang="en-US" sz="4800" dirty="0" err="1">
                 <a:solidFill>
                   <a:schemeClr val="bg1"/>
                 </a:solidFill>
@@ -3479,7 +3412,7 @@
               <a:t>AlphaGo</a:t>
             </a:r>
             <a:r>
-              <a:rPr lang="en-US" sz="4800" dirty="0" smtClean="0">
+              <a:rPr lang="en-US" sz="4800" dirty="0">
                 <a:solidFill>
                   <a:schemeClr val="bg1"/>
                 </a:solidFill>
@@ -3487,7 +3420,7 @@
               <a:t>. With this project, we aim to explore the use of conventional and cutting edge machine learning techniques to create a self-learning </a:t>
             </a:r>
             <a:r>
-              <a:rPr lang="en-US" sz="4800" dirty="0" err="1" smtClean="0">
+              <a:rPr lang="en-US" sz="4800" dirty="0" err="1">
                 <a:solidFill>
                   <a:schemeClr val="bg1"/>
                 </a:solidFill>
@@ -3495,18 +3428,13 @@
               <a:t>Starcraft</a:t>
             </a:r>
             <a:r>
-              <a:rPr lang="en-US" sz="4800" dirty="0" smtClean="0">
+              <a:rPr lang="en-US" sz="4800" dirty="0">
                 <a:solidFill>
                   <a:schemeClr val="bg1"/>
                 </a:solidFill>
               </a:rPr>
-              <a:t> 2AI agent that is capable of playing against Blizzard’s built-in AI.</a:t>
-            </a:r>
-            <a:endParaRPr lang="en-US" sz="4800" dirty="0">
-              <a:solidFill>
-                <a:schemeClr val="bg1"/>
-              </a:solidFill>
-            </a:endParaRPr>
+              <a:t> 2 AI agent that is capable of playing against Blizzard’s built-in AI.</a:t>
+            </a:r>
           </a:p>
         </p:txBody>
       </p:sp>
@@ -3579,7 +3507,7 @@
           <a:p>
             <a:pPr algn="ctr"/>
             <a:r>
-              <a:rPr lang="en-US" sz="5400" b="0" cap="none" spc="0" dirty="0" smtClean="0">
+              <a:rPr lang="en-US" sz="5400" b="0" cap="none" spc="0" dirty="0">
                 <a:ln w="18415" cmpd="sng">
                   <a:solidFill>
                     <a:srgbClr val="FFFFFF"/>
@@ -3603,7 +3531,7 @@
           <a:p>
             <a:pPr algn="ctr"/>
             <a:r>
-              <a:rPr lang="en-US" sz="5400" dirty="0" smtClean="0">
+              <a:rPr lang="en-US" sz="5400" dirty="0">
                 <a:ln w="18415" cmpd="sng">
                   <a:solidFill>
                     <a:srgbClr val="FFFFFF"/>
@@ -3713,7 +3641,7 @@
           <a:p>
             <a:pPr lvl="0"/>
             <a:r>
-              <a:rPr lang="en-US" sz="5400" b="1" dirty="0" smtClean="0">
+              <a:rPr lang="en-US" sz="5400" b="1" dirty="0">
                 <a:ln w="900" cmpd="sng">
                   <a:solidFill>
                     <a:srgbClr val="4F81BD">
@@ -3740,6 +3668,228 @@
                 </a:effectLst>
               </a:rPr>
               <a:t>Ryan Benner</a:t>
+            </a:r>
+          </a:p>
+        </p:txBody>
+      </p:sp>
+      <p:sp>
+        <p:nvSpPr>
+          <p:cNvPr id="35" name="Rectangle 34"/>
+          <p:cNvSpPr/>
+          <p:nvPr/>
+        </p:nvSpPr>
+        <p:spPr>
+          <a:xfrm>
+            <a:off x="33268919" y="4666131"/>
+            <a:ext cx="4617719" cy="1754326"/>
+          </a:xfrm>
+          <a:prstGeom prst="rect">
+            <a:avLst/>
+          </a:prstGeom>
+          <a:noFill/>
+        </p:spPr>
+        <p:txBody>
+          <a:bodyPr wrap="square" lIns="91440" tIns="45720" rIns="91440" bIns="45720">
+            <a:spAutoFit/>
+          </a:bodyPr>
+          <a:lstStyle/>
+          <a:p>
+            <a:r>
+              <a:rPr lang="en-US" sz="5400" b="1" dirty="0">
+                <a:ln w="900" cmpd="sng">
+                  <a:solidFill>
+                    <a:schemeClr val="accent1">
+                      <a:satMod val="190000"/>
+                      <a:alpha val="55000"/>
+                    </a:schemeClr>
+                  </a:solidFill>
+                  <a:prstDash val="solid"/>
+                </a:ln>
+                <a:solidFill>
+                  <a:schemeClr val="accent1">
+                    <a:satMod val="200000"/>
+                    <a:tint val="3000"/>
+                  </a:schemeClr>
+                </a:solidFill>
+                <a:effectLst>
+                  <a:innerShdw blurRad="101600" dist="76200" dir="5400000">
+                    <a:schemeClr val="accent1">
+                      <a:satMod val="190000"/>
+                      <a:tint val="100000"/>
+                      <a:alpha val="74000"/>
+                    </a:schemeClr>
+                  </a:innerShdw>
+                </a:effectLst>
+              </a:rPr>
+              <a:t>Kyle </a:t>
+            </a:r>
+            <a:r>
+              <a:rPr lang="en-US" sz="5400" b="1" dirty="0" err="1">
+                <a:ln w="900" cmpd="sng">
+                  <a:solidFill>
+                    <a:schemeClr val="accent1">
+                      <a:satMod val="190000"/>
+                      <a:alpha val="55000"/>
+                    </a:schemeClr>
+                  </a:solidFill>
+                  <a:prstDash val="solid"/>
+                </a:ln>
+                <a:solidFill>
+                  <a:schemeClr val="accent1">
+                    <a:satMod val="200000"/>
+                    <a:tint val="3000"/>
+                  </a:schemeClr>
+                </a:solidFill>
+                <a:effectLst>
+                  <a:innerShdw blurRad="101600" dist="76200" dir="5400000">
+                    <a:schemeClr val="accent1">
+                      <a:satMod val="190000"/>
+                      <a:tint val="100000"/>
+                      <a:alpha val="74000"/>
+                    </a:schemeClr>
+                  </a:innerShdw>
+                </a:effectLst>
+              </a:rPr>
+              <a:t>Arens</a:t>
+            </a:r>
+            <a:endParaRPr lang="en-US" sz="5400" b="1" dirty="0">
+              <a:ln w="900" cmpd="sng">
+                <a:solidFill>
+                  <a:schemeClr val="accent1">
+                    <a:satMod val="190000"/>
+                    <a:alpha val="55000"/>
+                  </a:schemeClr>
+                </a:solidFill>
+                <a:prstDash val="solid"/>
+              </a:ln>
+              <a:solidFill>
+                <a:schemeClr val="accent1">
+                  <a:satMod val="200000"/>
+                  <a:tint val="3000"/>
+                </a:schemeClr>
+              </a:solidFill>
+              <a:effectLst>
+                <a:innerShdw blurRad="101600" dist="76200" dir="5400000">
+                  <a:schemeClr val="accent1">
+                    <a:satMod val="190000"/>
+                    <a:tint val="100000"/>
+                    <a:alpha val="74000"/>
+                  </a:schemeClr>
+                </a:innerShdw>
+              </a:effectLst>
+            </a:endParaRPr>
+          </a:p>
+          <a:p>
+            <a:pPr algn="ctr"/>
+            <a:endParaRPr lang="en-US" sz="5400" b="1" dirty="0">
+              <a:ln w="900" cmpd="sng">
+                <a:solidFill>
+                  <a:schemeClr val="accent1">
+                    <a:satMod val="190000"/>
+                    <a:alpha val="55000"/>
+                  </a:schemeClr>
+                </a:solidFill>
+                <a:prstDash val="solid"/>
+              </a:ln>
+              <a:solidFill>
+                <a:schemeClr val="accent1">
+                  <a:satMod val="200000"/>
+                  <a:tint val="3000"/>
+                </a:schemeClr>
+              </a:solidFill>
+              <a:effectLst>
+                <a:innerShdw blurRad="101600" dist="76200" dir="5400000">
+                  <a:schemeClr val="accent1">
+                    <a:satMod val="190000"/>
+                    <a:tint val="100000"/>
+                    <a:alpha val="74000"/>
+                  </a:schemeClr>
+                </a:innerShdw>
+              </a:effectLst>
+            </a:endParaRPr>
+          </a:p>
+        </p:txBody>
+      </p:sp>
+      <p:sp>
+        <p:nvSpPr>
+          <p:cNvPr id="36" name="TextBox 35"/>
+          <p:cNvSpPr txBox="1"/>
+          <p:nvPr/>
+        </p:nvSpPr>
+        <p:spPr>
+          <a:xfrm>
+            <a:off x="33238438" y="10214575"/>
+            <a:ext cx="4648200" cy="923330"/>
+          </a:xfrm>
+          <a:prstGeom prst="rect">
+            <a:avLst/>
+          </a:prstGeom>
+          <a:noFill/>
+        </p:spPr>
+        <p:txBody>
+          <a:bodyPr wrap="square" rtlCol="0">
+            <a:spAutoFit/>
+          </a:bodyPr>
+          <a:lstStyle/>
+          <a:p>
+            <a:pPr lvl="0"/>
+            <a:r>
+              <a:rPr lang="en-US" sz="5400" b="1" dirty="0">
+                <a:ln w="900" cmpd="sng">
+                  <a:solidFill>
+                    <a:srgbClr val="4F81BD">
+                      <a:satMod val="190000"/>
+                      <a:alpha val="55000"/>
+                    </a:srgbClr>
+                  </a:solidFill>
+                  <a:prstDash val="solid"/>
+                </a:ln>
+                <a:solidFill>
+                  <a:srgbClr val="4F81BD">
+                    <a:satMod val="200000"/>
+                    <a:tint val="3000"/>
+                  </a:srgbClr>
+                </a:solidFill>
+                <a:effectLst>
+                  <a:innerShdw blurRad="101600" dist="76200" dir="5400000">
+                    <a:srgbClr val="4F81BD">
+                      <a:satMod val="190000"/>
+                      <a:tint val="100000"/>
+                      <a:alpha val="74000"/>
+                    </a:srgbClr>
+                  </a:innerShdw>
+                </a:effectLst>
+              </a:rPr>
+              <a:t>Jon </a:t>
+            </a:r>
+            <a:r>
+              <a:rPr lang="en-US" sz="5400" b="1" dirty="0" err="1">
+                <a:ln w="900" cmpd="sng">
+                  <a:solidFill>
+                    <a:srgbClr val="4F81BD">
+                      <a:satMod val="190000"/>
+                      <a:alpha val="55000"/>
+                    </a:srgbClr>
+                  </a:solidFill>
+                  <a:prstDash val="solid"/>
+                </a:ln>
+                <a:solidFill>
+                  <a:srgbClr val="4F81BD">
+                    <a:satMod val="200000"/>
+                    <a:tint val="3000"/>
+                  </a:srgbClr>
+                </a:solidFill>
+                <a:effectLst>
+                  <a:innerShdw blurRad="101600" dist="76200" dir="5400000">
+                    <a:srgbClr val="4F81BD">
+                      <a:satMod val="190000"/>
+                      <a:tint val="100000"/>
+                      <a:alpha val="74000"/>
+                    </a:srgbClr>
+                  </a:innerShdw>
+                </a:effectLst>
+              </a:rPr>
+              <a:t>Deibel</a:t>
             </a:r>
             <a:endParaRPr lang="en-US" sz="5400" b="1" dirty="0">
               <a:ln w="900" cmpd="sng">
@@ -3772,14 +3922,14 @@
       </p:sp>
       <p:sp>
         <p:nvSpPr>
-          <p:cNvPr id="35" name="Rectangle 34"/>
-          <p:cNvSpPr/>
+          <p:cNvPr id="37" name="TextBox 36"/>
+          <p:cNvSpPr txBox="1"/>
           <p:nvPr/>
         </p:nvSpPr>
         <p:spPr>
           <a:xfrm>
-            <a:off x="33268919" y="4666131"/>
-            <a:ext cx="4617719" cy="1754326"/>
+            <a:off x="38541957" y="9958355"/>
+            <a:ext cx="4869184" cy="1754326"/>
           </a:xfrm>
           <a:prstGeom prst="rect">
             <a:avLst/>
@@ -3787,144 +3937,6 @@
           <a:noFill/>
         </p:spPr>
         <p:txBody>
-          <a:bodyPr wrap="square" lIns="91440" tIns="45720" rIns="91440" bIns="45720">
-            <a:spAutoFit/>
-          </a:bodyPr>
-          <a:lstStyle/>
-          <a:p>
-            <a:r>
-              <a:rPr lang="en-US" sz="5400" b="1" dirty="0" smtClean="0">
-                <a:ln w="900" cmpd="sng">
-                  <a:solidFill>
-                    <a:schemeClr val="accent1">
-                      <a:satMod val="190000"/>
-                      <a:alpha val="55000"/>
-                    </a:schemeClr>
-                  </a:solidFill>
-                  <a:prstDash val="solid"/>
-                </a:ln>
-                <a:solidFill>
-                  <a:schemeClr val="accent1">
-                    <a:satMod val="200000"/>
-                    <a:tint val="3000"/>
-                  </a:schemeClr>
-                </a:solidFill>
-                <a:effectLst>
-                  <a:innerShdw blurRad="101600" dist="76200" dir="5400000">
-                    <a:schemeClr val="accent1">
-                      <a:satMod val="190000"/>
-                      <a:tint val="100000"/>
-                      <a:alpha val="74000"/>
-                    </a:schemeClr>
-                  </a:innerShdw>
-                </a:effectLst>
-              </a:rPr>
-              <a:t>Kyle </a:t>
-            </a:r>
-            <a:r>
-              <a:rPr lang="en-US" sz="5400" b="1" dirty="0" err="1" smtClean="0">
-                <a:ln w="900" cmpd="sng">
-                  <a:solidFill>
-                    <a:schemeClr val="accent1">
-                      <a:satMod val="190000"/>
-                      <a:alpha val="55000"/>
-                    </a:schemeClr>
-                  </a:solidFill>
-                  <a:prstDash val="solid"/>
-                </a:ln>
-                <a:solidFill>
-                  <a:schemeClr val="accent1">
-                    <a:satMod val="200000"/>
-                    <a:tint val="3000"/>
-                  </a:schemeClr>
-                </a:solidFill>
-                <a:effectLst>
-                  <a:innerShdw blurRad="101600" dist="76200" dir="5400000">
-                    <a:schemeClr val="accent1">
-                      <a:satMod val="190000"/>
-                      <a:tint val="100000"/>
-                      <a:alpha val="74000"/>
-                    </a:schemeClr>
-                  </a:innerShdw>
-                </a:effectLst>
-              </a:rPr>
-              <a:t>Arens</a:t>
-            </a:r>
-            <a:endParaRPr lang="en-US" sz="5400" b="1" dirty="0" smtClean="0">
-              <a:ln w="900" cmpd="sng">
-                <a:solidFill>
-                  <a:schemeClr val="accent1">
-                    <a:satMod val="190000"/>
-                    <a:alpha val="55000"/>
-                  </a:schemeClr>
-                </a:solidFill>
-                <a:prstDash val="solid"/>
-              </a:ln>
-              <a:solidFill>
-                <a:schemeClr val="accent1">
-                  <a:satMod val="200000"/>
-                  <a:tint val="3000"/>
-                </a:schemeClr>
-              </a:solidFill>
-              <a:effectLst>
-                <a:innerShdw blurRad="101600" dist="76200" dir="5400000">
-                  <a:schemeClr val="accent1">
-                    <a:satMod val="190000"/>
-                    <a:tint val="100000"/>
-                    <a:alpha val="74000"/>
-                  </a:schemeClr>
-                </a:innerShdw>
-              </a:effectLst>
-            </a:endParaRPr>
-          </a:p>
-          <a:p>
-            <a:pPr algn="ctr"/>
-            <a:endParaRPr lang="en-US" sz="5400" b="1" dirty="0">
-              <a:ln w="900" cmpd="sng">
-                <a:solidFill>
-                  <a:schemeClr val="accent1">
-                    <a:satMod val="190000"/>
-                    <a:alpha val="55000"/>
-                  </a:schemeClr>
-                </a:solidFill>
-                <a:prstDash val="solid"/>
-              </a:ln>
-              <a:solidFill>
-                <a:schemeClr val="accent1">
-                  <a:satMod val="200000"/>
-                  <a:tint val="3000"/>
-                </a:schemeClr>
-              </a:solidFill>
-              <a:effectLst>
-                <a:innerShdw blurRad="101600" dist="76200" dir="5400000">
-                  <a:schemeClr val="accent1">
-                    <a:satMod val="190000"/>
-                    <a:tint val="100000"/>
-                    <a:alpha val="74000"/>
-                  </a:schemeClr>
-                </a:innerShdw>
-              </a:effectLst>
-            </a:endParaRPr>
-          </a:p>
-        </p:txBody>
-      </p:sp>
-      <p:sp>
-        <p:nvSpPr>
-          <p:cNvPr id="36" name="TextBox 35"/>
-          <p:cNvSpPr txBox="1"/>
-          <p:nvPr/>
-        </p:nvSpPr>
-        <p:spPr>
-          <a:xfrm>
-            <a:off x="33238438" y="10214575"/>
-            <a:ext cx="4648200" cy="923330"/>
-          </a:xfrm>
-          <a:prstGeom prst="rect">
-            <a:avLst/>
-          </a:prstGeom>
-          <a:noFill/>
-        </p:spPr>
-        <p:txBody>
           <a:bodyPr wrap="square" rtlCol="0">
             <a:spAutoFit/>
           </a:bodyPr>
@@ -3932,7 +3944,7 @@
           <a:p>
             <a:pPr lvl="0"/>
             <a:r>
-              <a:rPr lang="en-US" sz="5400" b="1" dirty="0" smtClean="0">
+              <a:rPr lang="en-US" sz="5400" b="1" dirty="0">
                 <a:ln w="900" cmpd="sng">
                   <a:solidFill>
                     <a:srgbClr val="4F81BD">
@@ -3958,10 +3970,10 @@
                   </a:innerShdw>
                 </a:effectLst>
               </a:rPr>
-              <a:t>Jon </a:t>
-            </a:r>
-            <a:r>
-              <a:rPr lang="en-US" sz="5400" b="1" dirty="0" err="1" smtClean="0">
+              <a:t>Dr. Ali </a:t>
+            </a:r>
+            <a:r>
+              <a:rPr lang="en-US" sz="5400" b="1" dirty="0" err="1">
                 <a:ln w="900" cmpd="sng">
                   <a:solidFill>
                     <a:srgbClr val="4F81BD">
@@ -3987,7 +3999,7 @@
                   </a:innerShdw>
                 </a:effectLst>
               </a:rPr>
-              <a:t>Deibel</a:t>
+              <a:t>Minai</a:t>
             </a:r>
             <a:endParaRPr lang="en-US" sz="5400" b="1" dirty="0">
               <a:ln w="900" cmpd="sng">
@@ -4016,33 +4028,10 @@
               </a:effectLst>
             </a:endParaRPr>
           </a:p>
-        </p:txBody>
-      </p:sp>
-      <p:sp>
-        <p:nvSpPr>
-          <p:cNvPr id="37" name="TextBox 36"/>
-          <p:cNvSpPr txBox="1"/>
-          <p:nvPr/>
-        </p:nvSpPr>
-        <p:spPr>
-          <a:xfrm>
-            <a:off x="38541957" y="9958355"/>
-            <a:ext cx="4869184" cy="1754326"/>
-          </a:xfrm>
-          <a:prstGeom prst="rect">
-            <a:avLst/>
-          </a:prstGeom>
-          <a:noFill/>
-        </p:spPr>
-        <p:txBody>
-          <a:bodyPr wrap="square" rtlCol="0">
-            <a:spAutoFit/>
-          </a:bodyPr>
-          <a:lstStyle/>
           <a:p>
             <a:pPr lvl="0"/>
             <a:r>
-              <a:rPr lang="en-US" sz="5400" b="1" dirty="0" smtClean="0">
+              <a:rPr lang="en-US" sz="5400" b="1" dirty="0">
                 <a:ln w="900" cmpd="sng">
                   <a:solidFill>
                     <a:srgbClr val="4F81BD">
@@ -4068,121 +4057,8 @@
                   </a:innerShdw>
                 </a:effectLst>
               </a:rPr>
-              <a:t>Dr. Ali </a:t>
-            </a:r>
-            <a:r>
-              <a:rPr lang="en-US" sz="5400" b="1" dirty="0" err="1" smtClean="0">
-                <a:ln w="900" cmpd="sng">
-                  <a:solidFill>
-                    <a:srgbClr val="4F81BD">
-                      <a:satMod val="190000"/>
-                      <a:alpha val="55000"/>
-                    </a:srgbClr>
-                  </a:solidFill>
-                  <a:prstDash val="solid"/>
-                </a:ln>
-                <a:solidFill>
-                  <a:srgbClr val="4F81BD">
-                    <a:satMod val="200000"/>
-                    <a:tint val="3000"/>
-                  </a:srgbClr>
-                </a:solidFill>
-                <a:effectLst>
-                  <a:innerShdw blurRad="101600" dist="76200" dir="5400000">
-                    <a:srgbClr val="4F81BD">
-                      <a:satMod val="190000"/>
-                      <a:tint val="100000"/>
-                      <a:alpha val="74000"/>
-                    </a:srgbClr>
-                  </a:innerShdw>
-                </a:effectLst>
-              </a:rPr>
-              <a:t>Minai</a:t>
-            </a:r>
-            <a:endParaRPr lang="en-US" sz="5400" b="1" dirty="0">
-              <a:ln w="900" cmpd="sng">
-                <a:solidFill>
-                  <a:srgbClr val="4F81BD">
-                    <a:satMod val="190000"/>
-                    <a:alpha val="55000"/>
-                  </a:srgbClr>
-                </a:solidFill>
-                <a:prstDash val="solid"/>
-              </a:ln>
-              <a:solidFill>
-                <a:srgbClr val="4F81BD">
-                  <a:satMod val="200000"/>
-                  <a:tint val="3000"/>
-                </a:srgbClr>
-              </a:solidFill>
-              <a:effectLst>
-                <a:innerShdw blurRad="101600" dist="76200" dir="5400000">
-                  <a:srgbClr val="4F81BD">
-                    <a:satMod val="190000"/>
-                    <a:tint val="100000"/>
-                    <a:alpha val="74000"/>
-                  </a:srgbClr>
-                </a:innerShdw>
-              </a:effectLst>
-            </a:endParaRPr>
-          </a:p>
-          <a:p>
-            <a:pPr lvl="0"/>
-            <a:r>
-              <a:rPr lang="en-US" sz="5400" b="1" dirty="0" smtClean="0">
-                <a:ln w="900" cmpd="sng">
-                  <a:solidFill>
-                    <a:srgbClr val="4F81BD">
-                      <a:satMod val="190000"/>
-                      <a:alpha val="55000"/>
-                    </a:srgbClr>
-                  </a:solidFill>
-                  <a:prstDash val="solid"/>
-                </a:ln>
-                <a:solidFill>
-                  <a:srgbClr val="4F81BD">
-                    <a:satMod val="200000"/>
-                    <a:tint val="3000"/>
-                  </a:srgbClr>
-                </a:solidFill>
-                <a:effectLst>
-                  <a:innerShdw blurRad="101600" dist="76200" dir="5400000">
-                    <a:srgbClr val="4F81BD">
-                      <a:satMod val="190000"/>
-                      <a:tint val="100000"/>
-                      <a:alpha val="74000"/>
-                    </a:srgbClr>
-                  </a:innerShdw>
-                </a:effectLst>
-              </a:rPr>
               <a:t>Advisor</a:t>
             </a:r>
-            <a:endParaRPr lang="en-US" sz="5400" b="1" dirty="0">
-              <a:ln w="900" cmpd="sng">
-                <a:solidFill>
-                  <a:srgbClr val="4F81BD">
-                    <a:satMod val="190000"/>
-                    <a:alpha val="55000"/>
-                  </a:srgbClr>
-                </a:solidFill>
-                <a:prstDash val="solid"/>
-              </a:ln>
-              <a:solidFill>
-                <a:srgbClr val="4F81BD">
-                  <a:satMod val="200000"/>
-                  <a:tint val="3000"/>
-                </a:srgbClr>
-              </a:solidFill>
-              <a:effectLst>
-                <a:innerShdw blurRad="101600" dist="76200" dir="5400000">
-                  <a:srgbClr val="4F81BD">
-                    <a:satMod val="190000"/>
-                    <a:tint val="100000"/>
-                    <a:alpha val="74000"/>
-                  </a:srgbClr>
-                </a:innerShdw>
-              </a:effectLst>
-            </a:endParaRPr>
           </a:p>
         </p:txBody>
       </p:sp>
@@ -4432,7 +4308,7 @@
           <a:lstStyle/>
           <a:p>
             <a:r>
-              <a:rPr lang="en-US" sz="5400" b="1" cap="none" spc="0" dirty="0" smtClean="0">
+              <a:rPr lang="en-US" sz="5400" b="1" cap="none" spc="0" dirty="0">
                 <a:ln w="18415" cmpd="sng">
                   <a:solidFill>
                     <a:srgbClr val="FFFFFF"/>
@@ -4455,7 +4331,7 @@
           </a:p>
           <a:p>
             <a:r>
-              <a:rPr lang="en-US" sz="4800" dirty="0" smtClean="0">
+              <a:rPr lang="en-US" sz="4800" dirty="0">
                 <a:solidFill>
                   <a:schemeClr val="bg1"/>
                 </a:solidFill>
@@ -4463,7 +4339,7 @@
               <a:t>With 3 distinct factions to play as and an action space of ~10</a:t>
             </a:r>
             <a:r>
-              <a:rPr lang="en-US" sz="4800" baseline="30000" dirty="0" smtClean="0">
+              <a:rPr lang="en-US" sz="4800" baseline="30000" dirty="0">
                 <a:solidFill>
                   <a:schemeClr val="bg1"/>
                 </a:solidFill>
@@ -4471,7 +4347,7 @@
               <a:t>8</a:t>
             </a:r>
             <a:r>
-              <a:rPr lang="en-US" sz="4800" dirty="0" smtClean="0">
+              <a:rPr lang="en-US" sz="4800" dirty="0">
                 <a:solidFill>
                   <a:schemeClr val="bg1"/>
                 </a:solidFill>
@@ -4485,7 +4361,7 @@
               <a:buChar char="•"/>
             </a:pPr>
             <a:r>
-              <a:rPr lang="en-US" sz="4800" dirty="0" smtClean="0">
+              <a:rPr lang="en-US" sz="4800" dirty="0">
                 <a:solidFill>
                   <a:schemeClr val="bg1"/>
                 </a:solidFill>
@@ -4493,7 +4369,7 @@
               <a:t>Only train as </a:t>
             </a:r>
             <a:r>
-              <a:rPr lang="en-US" sz="4800" dirty="0" err="1" smtClean="0">
+              <a:rPr lang="en-US" sz="4800" dirty="0" err="1">
                 <a:solidFill>
                   <a:schemeClr val="bg1"/>
                 </a:solidFill>
@@ -4501,7 +4377,7 @@
               <a:t>Terran</a:t>
             </a:r>
             <a:r>
-              <a:rPr lang="en-US" sz="4800" dirty="0" smtClean="0">
+              <a:rPr lang="en-US" sz="4800" dirty="0">
                 <a:solidFill>
                   <a:schemeClr val="bg1"/>
                 </a:solidFill>
@@ -4515,7 +4391,7 @@
               <a:buChar char="•"/>
             </a:pPr>
             <a:r>
-              <a:rPr lang="en-US" sz="4800" dirty="0" smtClean="0">
+              <a:rPr lang="en-US" sz="4800" dirty="0">
                 <a:solidFill>
                   <a:schemeClr val="bg1"/>
                 </a:solidFill>
@@ -4529,7 +4405,7 @@
               <a:buChar char="•"/>
             </a:pPr>
             <a:r>
-              <a:rPr lang="en-US" sz="4800" dirty="0" smtClean="0">
+              <a:rPr lang="en-US" sz="4800" dirty="0">
                 <a:solidFill>
                   <a:schemeClr val="bg1"/>
                 </a:solidFill>
@@ -4543,7 +4419,7 @@
               <a:buChar char="•"/>
             </a:pPr>
             <a:r>
-              <a:rPr lang="en-US" sz="4800" dirty="0" smtClean="0">
+              <a:rPr lang="en-US" sz="4800" dirty="0">
                 <a:solidFill>
                   <a:schemeClr val="bg1"/>
                 </a:solidFill>
@@ -4557,7 +4433,7 @@
               <a:buChar char="•"/>
             </a:pPr>
             <a:r>
-              <a:rPr lang="en-US" sz="4800" dirty="0" smtClean="0">
+              <a:rPr lang="en-US" sz="4800" dirty="0">
                 <a:solidFill>
                   <a:schemeClr val="bg1"/>
                 </a:solidFill>
@@ -4571,7 +4447,7 @@
               <a:buChar char="•"/>
             </a:pPr>
             <a:r>
-              <a:rPr lang="en-US" sz="4800" dirty="0" smtClean="0">
+              <a:rPr lang="en-US" sz="4800" dirty="0">
                 <a:solidFill>
                   <a:schemeClr val="bg1"/>
                 </a:solidFill>
@@ -4579,7 +4455,7 @@
               <a:t>Feed the AI the current screen region and 7 distinct </a:t>
             </a:r>
             <a:r>
-              <a:rPr lang="en-US" sz="4800" dirty="0" err="1" smtClean="0">
+              <a:rPr lang="en-US" sz="4800" dirty="0" err="1">
                 <a:solidFill>
                   <a:schemeClr val="bg1"/>
                 </a:solidFill>
@@ -4587,18 +4463,13 @@
               <a:t>minimap</a:t>
             </a:r>
             <a:r>
-              <a:rPr lang="en-US" sz="4800" dirty="0" smtClean="0">
+              <a:rPr lang="en-US" sz="4800" dirty="0">
                 <a:solidFill>
                   <a:schemeClr val="bg1"/>
                 </a:solidFill>
               </a:rPr>
               <a:t> layers.</a:t>
             </a:r>
-            <a:endParaRPr lang="en-US" sz="4800" dirty="0">
-              <a:solidFill>
-                <a:schemeClr val="bg1"/>
-              </a:solidFill>
-            </a:endParaRPr>
           </a:p>
         </p:txBody>
       </p:sp>
@@ -4625,7 +4496,7 @@
           <a:lstStyle/>
           <a:p>
             <a:r>
-              <a:rPr lang="en-US" sz="5400" b="1" cap="none" spc="0" dirty="0" smtClean="0">
+              <a:rPr lang="en-US" sz="5400" b="1" cap="none" spc="0" dirty="0">
                 <a:ln w="18415" cmpd="sng">
                   <a:solidFill>
                     <a:srgbClr val="FFFFFF"/>
@@ -4652,18 +4523,13 @@
               <a:buChar char="•"/>
             </a:pPr>
             <a:r>
-              <a:rPr lang="en-US" sz="4800" dirty="0" smtClean="0">
+              <a:rPr lang="en-US" sz="4800" dirty="0">
                 <a:solidFill>
                   <a:prstClr val="white"/>
                 </a:solidFill>
               </a:rPr>
               <a:t>10/31 – Develop a scripted AI using capable of defeating Medium AI opponents.</a:t>
             </a:r>
-            <a:endParaRPr lang="en-US" sz="4800" dirty="0">
-              <a:solidFill>
-                <a:prstClr val="white"/>
-              </a:solidFill>
-            </a:endParaRPr>
           </a:p>
           <a:p>
             <a:pPr marL="685800" lvl="0" indent="-685800">
@@ -4671,7 +4537,7 @@
               <a:buChar char="•"/>
             </a:pPr>
             <a:r>
-              <a:rPr lang="en-US" sz="4800" dirty="0" smtClean="0">
+              <a:rPr lang="en-US" sz="4800" dirty="0">
                 <a:solidFill>
                   <a:prstClr val="white"/>
                 </a:solidFill>
@@ -4685,7 +4551,7 @@
               <a:buChar char="•"/>
             </a:pPr>
             <a:r>
-              <a:rPr lang="en-US" sz="4800" dirty="0" smtClean="0">
+              <a:rPr lang="en-US" sz="4800" dirty="0">
                 <a:solidFill>
                   <a:prstClr val="white"/>
                 </a:solidFill>
@@ -4699,7 +4565,7 @@
               <a:buChar char="•"/>
             </a:pPr>
             <a:r>
-              <a:rPr lang="en-US" sz="4800" dirty="0" smtClean="0">
+              <a:rPr lang="en-US" sz="4800" dirty="0">
                 <a:solidFill>
                   <a:prstClr val="white"/>
                 </a:solidFill>
@@ -4732,7 +4598,7 @@
           <a:lstStyle/>
           <a:p>
             <a:r>
-              <a:rPr lang="en-US" sz="5400" b="1" cap="none" spc="0" dirty="0" smtClean="0">
+              <a:rPr lang="en-US" sz="5400" b="1" cap="none" spc="0" dirty="0">
                 <a:ln w="18415" cmpd="sng">
                   <a:solidFill>
                     <a:srgbClr val="FFFFFF"/>
@@ -4759,7 +4625,7 @@
               <a:buChar char="•"/>
             </a:pPr>
             <a:r>
-              <a:rPr lang="en-US" sz="4800" dirty="0" smtClean="0">
+              <a:rPr lang="en-US" sz="4800" dirty="0">
                 <a:solidFill>
                   <a:prstClr val="white"/>
                 </a:solidFill>
@@ -4767,7 +4633,7 @@
               <a:t>Expand action space to the full possibility of </a:t>
             </a:r>
             <a:r>
-              <a:rPr lang="en-US" sz="4800" dirty="0" err="1" smtClean="0">
+              <a:rPr lang="en-US" sz="4800" dirty="0" err="1">
                 <a:solidFill>
                   <a:prstClr val="white"/>
                 </a:solidFill>
@@ -4775,7 +4641,7 @@
               <a:t>Terran’s</a:t>
             </a:r>
             <a:r>
-              <a:rPr lang="en-US" sz="4800" dirty="0" smtClean="0">
+              <a:rPr lang="en-US" sz="4800" dirty="0">
                 <a:solidFill>
                   <a:prstClr val="white"/>
                 </a:solidFill>
@@ -4789,7 +4655,7 @@
               <a:buChar char="•"/>
             </a:pPr>
             <a:r>
-              <a:rPr lang="en-US" sz="4800" dirty="0" smtClean="0">
+              <a:rPr lang="en-US" sz="4800" dirty="0">
                 <a:solidFill>
                   <a:prstClr val="white"/>
                 </a:solidFill>
@@ -4803,7 +4669,7 @@
               <a:buChar char="•"/>
             </a:pPr>
             <a:r>
-              <a:rPr lang="en-US" sz="4800" dirty="0" smtClean="0">
+              <a:rPr lang="en-US" sz="4800" dirty="0">
                 <a:solidFill>
                   <a:prstClr val="white"/>
                 </a:solidFill>
@@ -4817,7 +4683,7 @@
               <a:buChar char="•"/>
             </a:pPr>
             <a:r>
-              <a:rPr lang="en-US" sz="4800" dirty="0" smtClean="0">
+              <a:rPr lang="en-US" sz="4800" dirty="0">
                 <a:solidFill>
                   <a:prstClr val="white"/>
                 </a:solidFill>
@@ -4831,7 +4697,7 @@
               <a:buChar char="•"/>
             </a:pPr>
             <a:r>
-              <a:rPr lang="en-US" sz="4800" dirty="0" smtClean="0">
+              <a:rPr lang="en-US" sz="4800" dirty="0">
                 <a:solidFill>
                   <a:prstClr val="white"/>
                 </a:solidFill>
@@ -4845,7 +4711,7 @@
               <a:buChar char="•"/>
             </a:pPr>
             <a:r>
-              <a:rPr lang="en-US" sz="4800" dirty="0" smtClean="0">
+              <a:rPr lang="en-US" sz="4800" dirty="0">
                 <a:solidFill>
                   <a:prstClr val="white"/>
                 </a:solidFill>
@@ -4853,7 +4719,7 @@
               <a:t>Train AI to play as </a:t>
             </a:r>
             <a:r>
-              <a:rPr lang="en-US" sz="4800" dirty="0" err="1" smtClean="0">
+              <a:rPr lang="en-US" sz="4800" dirty="0" err="1">
                 <a:solidFill>
                   <a:prstClr val="white"/>
                 </a:solidFill>
@@ -4861,7 +4727,7 @@
               <a:t>Protoss</a:t>
             </a:r>
             <a:r>
-              <a:rPr lang="en-US" sz="4800" dirty="0" smtClean="0">
+              <a:rPr lang="en-US" sz="4800" dirty="0">
                 <a:solidFill>
                   <a:prstClr val="white"/>
                 </a:solidFill>
@@ -4869,7 +4735,7 @@
               <a:t> and </a:t>
             </a:r>
             <a:r>
-              <a:rPr lang="en-US" sz="4800" dirty="0" err="1" smtClean="0">
+              <a:rPr lang="en-US" sz="4800" dirty="0" err="1">
                 <a:solidFill>
                   <a:prstClr val="white"/>
                 </a:solidFill>
@@ -4877,7 +4743,7 @@
               <a:t>Zerg</a:t>
             </a:r>
             <a:r>
-              <a:rPr lang="en-US" sz="4800" dirty="0" smtClean="0">
+              <a:rPr lang="en-US" sz="4800" dirty="0">
                 <a:solidFill>
                   <a:prstClr val="white"/>
                 </a:solidFill>
@@ -5063,6 +4929,316 @@
           </a:extLst>
         </p:spPr>
       </p:pic>
+      <p:pic>
+        <p:nvPicPr>
+          <p:cNvPr id="3" name="Picture 2">
+            <a:extLst>
+              <a:ext uri="{FF2B5EF4-FFF2-40B4-BE49-F238E27FC236}">
+                <a16:creationId xmlns:a16="http://schemas.microsoft.com/office/drawing/2014/main" id="{CE74A3E7-107E-41A1-B14A-2F197523FC04}"/>
+              </a:ext>
+            </a:extLst>
+          </p:cNvPr>
+          <p:cNvPicPr>
+            <a:picLocks noChangeAspect="1"/>
+          </p:cNvPicPr>
+          <p:nvPr/>
+        </p:nvPicPr>
+        <p:blipFill>
+          <a:blip r:embed="rId12">
+            <a:extLst>
+              <a:ext uri="{28A0092B-C50C-407E-A947-70E740481C1C}">
+                <a14:useLocalDpi xmlns:a14="http://schemas.microsoft.com/office/drawing/2010/main" val="0"/>
+              </a:ext>
+            </a:extLst>
+          </a:blip>
+          <a:stretch>
+            <a:fillRect/>
+          </a:stretch>
+        </p:blipFill>
+        <p:spPr>
+          <a:xfrm>
+            <a:off x="12225835" y="6962387"/>
+            <a:ext cx="19439527" cy="10552886"/>
+          </a:xfrm>
+          <a:prstGeom prst="rect">
+            <a:avLst/>
+          </a:prstGeom>
+        </p:spPr>
+      </p:pic>
+      <p:sp>
+        <p:nvSpPr>
+          <p:cNvPr id="4" name="TextBox 3">
+            <a:extLst>
+              <a:ext uri="{FF2B5EF4-FFF2-40B4-BE49-F238E27FC236}">
+                <a16:creationId xmlns:a16="http://schemas.microsoft.com/office/drawing/2014/main" id="{9EBC1508-8732-4319-877A-B77B8FEF8563}"/>
+              </a:ext>
+            </a:extLst>
+          </p:cNvPr>
+          <p:cNvSpPr txBox="1"/>
+          <p:nvPr/>
+        </p:nvSpPr>
+        <p:spPr>
+          <a:xfrm>
+            <a:off x="12225835" y="17515273"/>
+            <a:ext cx="19439527" cy="2308324"/>
+          </a:xfrm>
+          <a:prstGeom prst="rect">
+            <a:avLst/>
+          </a:prstGeom>
+          <a:noFill/>
+        </p:spPr>
+        <p:txBody>
+          <a:bodyPr wrap="square" rtlCol="0">
+            <a:spAutoFit/>
+          </a:bodyPr>
+          <a:lstStyle/>
+          <a:p>
+            <a:r>
+              <a:rPr lang="en-US" sz="4800" dirty="0">
+                <a:solidFill>
+                  <a:schemeClr val="bg1"/>
+                </a:solidFill>
+              </a:rPr>
+              <a:t>The seven regions boxed in red above serve as a high-level overview of the first layer of inputs that we feed into our machine learning model. These seven layers are:</a:t>
+            </a:r>
+          </a:p>
+        </p:txBody>
+      </p:sp>
+      <p:sp>
+        <p:nvSpPr>
+          <p:cNvPr id="5" name="TextBox 4">
+            <a:extLst>
+              <a:ext uri="{FF2B5EF4-FFF2-40B4-BE49-F238E27FC236}">
+                <a16:creationId xmlns:a16="http://schemas.microsoft.com/office/drawing/2014/main" id="{40F8E454-6B8C-4248-96EC-D7613B64A3CF}"/>
+              </a:ext>
+            </a:extLst>
+          </p:cNvPr>
+          <p:cNvSpPr txBox="1"/>
+          <p:nvPr/>
+        </p:nvSpPr>
+        <p:spPr>
+          <a:xfrm>
+            <a:off x="12225835" y="20132962"/>
+            <a:ext cx="9757864" cy="6740307"/>
+          </a:xfrm>
+          <a:prstGeom prst="rect">
+            <a:avLst/>
+          </a:prstGeom>
+          <a:noFill/>
+        </p:spPr>
+        <p:txBody>
+          <a:bodyPr wrap="square" rtlCol="0">
+            <a:spAutoFit/>
+          </a:bodyPr>
+          <a:lstStyle/>
+          <a:p>
+            <a:pPr marL="914400" indent="-914400">
+              <a:buAutoNum type="arabicParenR"/>
+            </a:pPr>
+            <a:r>
+              <a:rPr lang="en-US" sz="4800" dirty="0">
+                <a:solidFill>
+                  <a:schemeClr val="bg1"/>
+                </a:solidFill>
+              </a:rPr>
+              <a:t>Height Map – observe terrain differences, impacting vision.</a:t>
+            </a:r>
+          </a:p>
+          <a:p>
+            <a:pPr marL="914400" indent="-914400">
+              <a:buAutoNum type="arabicParenR"/>
+            </a:pPr>
+            <a:r>
+              <a:rPr lang="en-US" sz="4800" dirty="0">
+                <a:solidFill>
+                  <a:schemeClr val="bg1"/>
+                </a:solidFill>
+              </a:rPr>
+              <a:t>Visibility Map – observe current and past exploration.</a:t>
+            </a:r>
+          </a:p>
+          <a:p>
+            <a:pPr marL="914400" indent="-914400">
+              <a:buAutoNum type="arabicParenR"/>
+            </a:pPr>
+            <a:r>
+              <a:rPr lang="en-US" sz="4800" dirty="0">
+                <a:solidFill>
+                  <a:schemeClr val="bg1"/>
+                </a:solidFill>
+              </a:rPr>
+              <a:t>Creep – shows where </a:t>
+            </a:r>
+            <a:r>
+              <a:rPr lang="en-US" sz="4800" dirty="0" err="1">
+                <a:solidFill>
+                  <a:schemeClr val="bg1"/>
+                </a:solidFill>
+              </a:rPr>
+              <a:t>Zerg</a:t>
+            </a:r>
+            <a:r>
+              <a:rPr lang="en-US" sz="4800" dirty="0">
+                <a:solidFill>
+                  <a:schemeClr val="bg1"/>
+                </a:solidFill>
+              </a:rPr>
+              <a:t> has spread “creep”. Race-specific.</a:t>
+            </a:r>
+          </a:p>
+          <a:p>
+            <a:pPr marL="914400" indent="-914400">
+              <a:buAutoNum type="arabicParenR"/>
+            </a:pPr>
+            <a:r>
+              <a:rPr lang="en-US" sz="4800" dirty="0">
+                <a:solidFill>
+                  <a:schemeClr val="bg1"/>
+                </a:solidFill>
+              </a:rPr>
+              <a:t>Camera Selection – shows where the camera is currently located.</a:t>
+            </a:r>
+          </a:p>
+          <a:p>
+            <a:pPr marL="914400" indent="-914400">
+              <a:buAutoNum type="arabicParenR"/>
+            </a:pPr>
+            <a:endParaRPr lang="en-US" sz="4800" dirty="0">
+              <a:solidFill>
+                <a:schemeClr val="bg1"/>
+              </a:solidFill>
+            </a:endParaRPr>
+          </a:p>
+        </p:txBody>
+      </p:sp>
+      <p:sp>
+        <p:nvSpPr>
+          <p:cNvPr id="32" name="TextBox 31">
+            <a:extLst>
+              <a:ext uri="{FF2B5EF4-FFF2-40B4-BE49-F238E27FC236}">
+                <a16:creationId xmlns:a16="http://schemas.microsoft.com/office/drawing/2014/main" id="{955E99BD-B36D-45BD-8010-5F71B73ED31F}"/>
+              </a:ext>
+            </a:extLst>
+          </p:cNvPr>
+          <p:cNvSpPr txBox="1"/>
+          <p:nvPr/>
+        </p:nvSpPr>
+        <p:spPr>
+          <a:xfrm>
+            <a:off x="21983699" y="20101381"/>
+            <a:ext cx="9757864" cy="830997"/>
+          </a:xfrm>
+          <a:prstGeom prst="rect">
+            <a:avLst/>
+          </a:prstGeom>
+          <a:noFill/>
+        </p:spPr>
+        <p:txBody>
+          <a:bodyPr wrap="square" rtlCol="0">
+            <a:spAutoFit/>
+          </a:bodyPr>
+          <a:lstStyle/>
+          <a:p>
+            <a:endParaRPr lang="en-US" sz="4800" dirty="0">
+              <a:solidFill>
+                <a:schemeClr val="bg1"/>
+              </a:solidFill>
+            </a:endParaRPr>
+          </a:p>
+        </p:txBody>
+      </p:sp>
+      <p:sp>
+        <p:nvSpPr>
+          <p:cNvPr id="33" name="TextBox 32">
+            <a:extLst>
+              <a:ext uri="{FF2B5EF4-FFF2-40B4-BE49-F238E27FC236}">
+                <a16:creationId xmlns:a16="http://schemas.microsoft.com/office/drawing/2014/main" id="{6A38A447-3AB1-4A26-86D6-65CAD9A4D541}"/>
+              </a:ext>
+            </a:extLst>
+          </p:cNvPr>
+          <p:cNvSpPr txBox="1"/>
+          <p:nvPr/>
+        </p:nvSpPr>
+        <p:spPr>
+          <a:xfrm>
+            <a:off x="21800819" y="20096127"/>
+            <a:ext cx="9757864" cy="5262979"/>
+          </a:xfrm>
+          <a:prstGeom prst="rect">
+            <a:avLst/>
+          </a:prstGeom>
+          <a:noFill/>
+        </p:spPr>
+        <p:txBody>
+          <a:bodyPr wrap="square" rtlCol="0">
+            <a:spAutoFit/>
+          </a:bodyPr>
+          <a:lstStyle/>
+          <a:p>
+            <a:pPr marL="914400" indent="-914400">
+              <a:buFont typeface="+mj-lt"/>
+              <a:buAutoNum type="arabicParenR" startAt="5"/>
+            </a:pPr>
+            <a:r>
+              <a:rPr lang="en-US" sz="4800" dirty="0">
+                <a:solidFill>
+                  <a:schemeClr val="bg1"/>
+                </a:solidFill>
+              </a:rPr>
+              <a:t>Player Id – shows units based on owning-player’s ID.</a:t>
+            </a:r>
+          </a:p>
+          <a:p>
+            <a:pPr marL="914400" indent="-914400">
+              <a:buAutoNum type="arabicParenR" startAt="5"/>
+            </a:pPr>
+            <a:r>
+              <a:rPr lang="en-US" sz="4800" dirty="0">
+                <a:solidFill>
+                  <a:schemeClr val="bg1"/>
+                </a:solidFill>
+              </a:rPr>
+              <a:t>Player Relative Team – shows units relative to their respective teams.</a:t>
+            </a:r>
+          </a:p>
+          <a:p>
+            <a:pPr marL="914400" indent="-914400">
+              <a:buAutoNum type="arabicParenR" startAt="5"/>
+            </a:pPr>
+            <a:r>
+              <a:rPr lang="en-US" sz="4800" dirty="0">
+                <a:solidFill>
+                  <a:schemeClr val="bg1"/>
+                </a:solidFill>
+              </a:rPr>
+              <a:t>Selected – shows the </a:t>
+            </a:r>
+            <a:r>
+              <a:rPr lang="en-US" sz="4800">
+                <a:solidFill>
+                  <a:schemeClr val="bg1"/>
+                </a:solidFill>
+              </a:rPr>
+              <a:t>currently selected unit</a:t>
+            </a:r>
+            <a:endParaRPr lang="en-US" sz="4800" dirty="0">
+              <a:solidFill>
+                <a:schemeClr val="bg1"/>
+              </a:solidFill>
+            </a:endParaRPr>
+          </a:p>
+          <a:p>
+            <a:pPr marL="914400" indent="-914400">
+              <a:buAutoNum type="arabicParenR" startAt="5"/>
+            </a:pPr>
+            <a:endParaRPr lang="en-US" sz="4800" dirty="0">
+              <a:solidFill>
+                <a:schemeClr val="bg1"/>
+              </a:solidFill>
+            </a:endParaRPr>
+          </a:p>
+        </p:txBody>
+      </p:sp>
     </p:spTree>
     <p:extLst>
       <p:ext uri="{BB962C8B-B14F-4D97-AF65-F5344CB8AC3E}">

</xml_diff>

<commit_message>
update post minai feedback
</commit_message>
<xml_diff>
--- a/Senior Design Poster.pptx
+++ b/Senior Design Poster.pptx
@@ -123,10 +123,6 @@
 </p:presentation>
 </file>
 
-<file path=ppt/revisionInfo.xml><?xml version="1.0" encoding="utf-8"?>
-<p1510:revInfo xmlns:a="http://schemas.openxmlformats.org/drawingml/2006/main" xmlns:r="http://schemas.openxmlformats.org/officeDocument/2006/relationships" xmlns:p1510="http://schemas.microsoft.com/office/powerpoint/2015/10/main"/>
-</file>
-
 <file path=ppt/slideLayouts/slideLayout1.xml><?xml version="1.0" encoding="utf-8"?>
 <p:sldLayout xmlns:a="http://schemas.openxmlformats.org/drawingml/2006/main" xmlns:r="http://schemas.openxmlformats.org/officeDocument/2006/relationships" xmlns:p="http://schemas.openxmlformats.org/presentationml/2006/main" type="title" preserve="1">
   <p:cSld name="Title Slide">
@@ -306,7 +302,7 @@
           <a:p>
             <a:fld id="{466FE519-D025-4205-95BE-FAF045E3FBF1}" type="datetimeFigureOut">
               <a:rPr lang="en-US" smtClean="0"/>
-              <a:t>2/26/2018</a:t>
+              <a:t>2/28/18</a:t>
             </a:fld>
             <a:endParaRPr lang="en-US"/>
           </a:p>
@@ -474,7 +470,7 @@
           <a:p>
             <a:fld id="{466FE519-D025-4205-95BE-FAF045E3FBF1}" type="datetimeFigureOut">
               <a:rPr lang="en-US" smtClean="0"/>
-              <a:t>2/26/2018</a:t>
+              <a:t>2/28/18</a:t>
             </a:fld>
             <a:endParaRPr lang="en-US"/>
           </a:p>
@@ -652,7 +648,7 @@
           <a:p>
             <a:fld id="{466FE519-D025-4205-95BE-FAF045E3FBF1}" type="datetimeFigureOut">
               <a:rPr lang="en-US" smtClean="0"/>
-              <a:t>2/26/2018</a:t>
+              <a:t>2/28/18</a:t>
             </a:fld>
             <a:endParaRPr lang="en-US"/>
           </a:p>
@@ -820,7 +816,7 @@
           <a:p>
             <a:fld id="{466FE519-D025-4205-95BE-FAF045E3FBF1}" type="datetimeFigureOut">
               <a:rPr lang="en-US" smtClean="0"/>
-              <a:t>2/26/2018</a:t>
+              <a:t>2/28/18</a:t>
             </a:fld>
             <a:endParaRPr lang="en-US"/>
           </a:p>
@@ -1065,7 +1061,7 @@
           <a:p>
             <a:fld id="{466FE519-D025-4205-95BE-FAF045E3FBF1}" type="datetimeFigureOut">
               <a:rPr lang="en-US" smtClean="0"/>
-              <a:t>2/26/2018</a:t>
+              <a:t>2/28/18</a:t>
             </a:fld>
             <a:endParaRPr lang="en-US"/>
           </a:p>
@@ -1350,7 +1346,7 @@
           <a:p>
             <a:fld id="{466FE519-D025-4205-95BE-FAF045E3FBF1}" type="datetimeFigureOut">
               <a:rPr lang="en-US" smtClean="0"/>
-              <a:t>2/26/2018</a:t>
+              <a:t>2/28/18</a:t>
             </a:fld>
             <a:endParaRPr lang="en-US"/>
           </a:p>
@@ -1774,7 +1770,7 @@
           <a:p>
             <a:fld id="{466FE519-D025-4205-95BE-FAF045E3FBF1}" type="datetimeFigureOut">
               <a:rPr lang="en-US" smtClean="0"/>
-              <a:t>2/26/2018</a:t>
+              <a:t>2/28/18</a:t>
             </a:fld>
             <a:endParaRPr lang="en-US"/>
           </a:p>
@@ -1891,7 +1887,7 @@
           <a:p>
             <a:fld id="{466FE519-D025-4205-95BE-FAF045E3FBF1}" type="datetimeFigureOut">
               <a:rPr lang="en-US" smtClean="0"/>
-              <a:t>2/26/2018</a:t>
+              <a:t>2/28/18</a:t>
             </a:fld>
             <a:endParaRPr lang="en-US"/>
           </a:p>
@@ -1986,7 +1982,7 @@
           <a:p>
             <a:fld id="{466FE519-D025-4205-95BE-FAF045E3FBF1}" type="datetimeFigureOut">
               <a:rPr lang="en-US" smtClean="0"/>
-              <a:t>2/26/2018</a:t>
+              <a:t>2/28/18</a:t>
             </a:fld>
             <a:endParaRPr lang="en-US"/>
           </a:p>
@@ -2261,7 +2257,7 @@
           <a:p>
             <a:fld id="{466FE519-D025-4205-95BE-FAF045E3FBF1}" type="datetimeFigureOut">
               <a:rPr lang="en-US" smtClean="0"/>
-              <a:t>2/26/2018</a:t>
+              <a:t>2/28/18</a:t>
             </a:fld>
             <a:endParaRPr lang="en-US"/>
           </a:p>
@@ -2513,7 +2509,7 @@
           <a:p>
             <a:fld id="{466FE519-D025-4205-95BE-FAF045E3FBF1}" type="datetimeFigureOut">
               <a:rPr lang="en-US" smtClean="0"/>
-              <a:t>2/26/2018</a:t>
+              <a:t>2/28/18</a:t>
             </a:fld>
             <a:endParaRPr lang="en-US"/>
           </a:p>
@@ -2724,7 +2720,7 @@
           <a:p>
             <a:fld id="{466FE519-D025-4205-95BE-FAF045E3FBF1}" type="datetimeFigureOut">
               <a:rPr lang="en-US" smtClean="0"/>
-              <a:t>2/26/2018</a:t>
+              <a:t>2/28/18</a:t>
             </a:fld>
             <a:endParaRPr lang="en-US"/>
           </a:p>
@@ -3117,8 +3113,8 @@
         </p:nvSpPr>
         <p:spPr>
           <a:xfrm>
-            <a:off x="91440" y="4610326"/>
-            <a:ext cx="10515600" cy="8429578"/>
+            <a:off x="-30481" y="4610326"/>
+            <a:ext cx="10637521" cy="8429578"/>
           </a:xfrm>
           <a:prstGeom prst="roundRect">
             <a:avLst/>
@@ -3211,7 +3207,9 @@
             <a:ext cx="21945599" cy="21747820"/>
           </a:xfrm>
           <a:prstGeom prst="roundRect">
-            <a:avLst/>
+            <a:avLst>
+              <a:gd name="adj" fmla="val 6055"/>
+            </a:avLst>
           </a:prstGeom>
           <a:solidFill>
             <a:schemeClr val="tx1">
@@ -3240,7 +3238,7 @@
           <a:lstStyle/>
           <a:p>
             <a:pPr algn="ctr"/>
-            <a:endParaRPr lang="en-US"/>
+            <a:endParaRPr lang="en-US" dirty="0"/>
           </a:p>
         </p:txBody>
       </p:sp>
@@ -3299,8 +3297,8 @@
         </p:nvSpPr>
         <p:spPr>
           <a:xfrm>
-            <a:off x="33375600" y="12420599"/>
-            <a:ext cx="10515600" cy="11132091"/>
+            <a:off x="33317063" y="16654680"/>
+            <a:ext cx="10660382" cy="7648600"/>
           </a:xfrm>
           <a:prstGeom prst="roundRect">
             <a:avLst/>
@@ -3387,55 +3385,7 @@
                   <a:schemeClr val="bg1"/>
                 </a:solidFill>
               </a:rPr>
-              <a:t>There have been many recent advances in game-playing AIs, such as the </a:t>
-            </a:r>
-            <a:r>
-              <a:rPr lang="en-US" sz="4800" dirty="0" err="1">
-                <a:solidFill>
-                  <a:schemeClr val="bg1"/>
-                </a:solidFill>
-              </a:rPr>
-              <a:t>Dota</a:t>
-            </a:r>
-            <a:r>
-              <a:rPr lang="en-US" sz="4800" dirty="0">
-                <a:solidFill>
-                  <a:schemeClr val="bg1"/>
-                </a:solidFill>
-              </a:rPr>
-              <a:t> 2 AI and </a:t>
-            </a:r>
-            <a:r>
-              <a:rPr lang="en-US" sz="4800" dirty="0" err="1">
-                <a:solidFill>
-                  <a:schemeClr val="bg1"/>
-                </a:solidFill>
-              </a:rPr>
-              <a:t>AlphaGo</a:t>
-            </a:r>
-            <a:r>
-              <a:rPr lang="en-US" sz="4800" dirty="0">
-                <a:solidFill>
-                  <a:schemeClr val="bg1"/>
-                </a:solidFill>
-              </a:rPr>
-              <a:t>. With this project, we aim to explore the use of conventional and cutting edge machine learning techniques to create a self-learning </a:t>
-            </a:r>
-            <a:r>
-              <a:rPr lang="en-US" sz="4800" dirty="0" err="1">
-                <a:solidFill>
-                  <a:schemeClr val="bg1"/>
-                </a:solidFill>
-              </a:rPr>
-              <a:t>Starcraft</a:t>
-            </a:r>
-            <a:r>
-              <a:rPr lang="en-US" sz="4800" dirty="0">
-                <a:solidFill>
-                  <a:schemeClr val="bg1"/>
-                </a:solidFill>
-              </a:rPr>
-              <a:t> 2 AI agent that is capable of playing against Blizzard’s built-in AI.</a:t>
+              <a:t>Starcraft2 is a real-time, player versus player, strategy game that has two players fighting each other for victory. Real time strategy games are an interesting challenge for AI due to the presence of delayed rewards, high complexity action space, and incomplete game state knowledge (unlike Chess or Go).</a:t>
             </a:r>
           </a:p>
         </p:txBody>
@@ -3448,8 +3398,8 @@
         </p:nvSpPr>
         <p:spPr>
           <a:xfrm>
-            <a:off x="-30481" y="13501568"/>
-            <a:ext cx="10515600" cy="19264432"/>
+            <a:off x="-70276" y="13447364"/>
+            <a:ext cx="10515600" cy="10105327"/>
           </a:xfrm>
           <a:prstGeom prst="roundRect">
             <a:avLst/>
@@ -3493,8 +3443,8 @@
         </p:nvSpPr>
         <p:spPr>
           <a:xfrm>
-            <a:off x="33299399" y="23926800"/>
-            <a:ext cx="10515600" cy="8839200"/>
+            <a:off x="33317063" y="24656764"/>
+            <a:ext cx="10515600" cy="8067009"/>
           </a:xfrm>
           <a:prstGeom prst="roundRect">
             <a:avLst/>
@@ -3538,8 +3488,8 @@
         </p:nvSpPr>
         <p:spPr>
           <a:xfrm>
-            <a:off x="38633402" y="4639375"/>
-            <a:ext cx="4648198" cy="923330"/>
+            <a:off x="39424777" y="3270099"/>
+            <a:ext cx="3455128" cy="830997"/>
           </a:xfrm>
           <a:prstGeom prst="rect">
             <a:avLst/>
@@ -3554,7 +3504,7 @@
           <a:p>
             <a:pPr lvl="0"/>
             <a:r>
-              <a:rPr lang="en-US" sz="5400" dirty="0">
+              <a:rPr lang="en-US" sz="4800" dirty="0">
                 <a:ln w="0"/>
                 <a:effectLst>
                   <a:outerShdw blurRad="38100" dist="19050" dir="2700000" algn="tl" rotWithShape="0">
@@ -3577,8 +3527,8 @@
         </p:nvSpPr>
         <p:spPr>
           <a:xfrm>
-            <a:off x="33406081" y="4666131"/>
-            <a:ext cx="4617719" cy="1754326"/>
+            <a:off x="35585400" y="3258256"/>
+            <a:ext cx="3176861" cy="830997"/>
           </a:xfrm>
           <a:prstGeom prst="rect">
             <a:avLst/>
@@ -3591,56 +3541,53 @@
           </a:bodyPr>
           <a:lstStyle/>
           <a:p>
-            <a:r>
-              <a:rPr lang="en-US" sz="5400" dirty="0">
+            <a:pPr lvl="0"/>
+            <a:r>
+              <a:rPr lang="en-US" sz="4800" dirty="0">
                 <a:ln w="0"/>
+                <a:solidFill>
+                  <a:prstClr val="black"/>
+                </a:solidFill>
                 <a:effectLst>
                   <a:outerShdw blurRad="38100" dist="19050" dir="2700000" algn="tl" rotWithShape="0">
-                    <a:schemeClr val="dk1">
+                    <a:prstClr val="black">
                       <a:alpha val="40000"/>
-                    </a:schemeClr>
+                    </a:prstClr>
                   </a:outerShdw>
                 </a:effectLst>
               </a:rPr>
               <a:t>Kyle </a:t>
             </a:r>
             <a:r>
-              <a:rPr lang="en-US" sz="5400" dirty="0" err="1">
+              <a:rPr lang="en-US" sz="4800" dirty="0" err="1">
                 <a:ln w="0"/>
+                <a:solidFill>
+                  <a:prstClr val="black"/>
+                </a:solidFill>
                 <a:effectLst>
                   <a:outerShdw blurRad="38100" dist="19050" dir="2700000" algn="tl" rotWithShape="0">
-                    <a:schemeClr val="dk1">
+                    <a:prstClr val="black">
                       <a:alpha val="40000"/>
-                    </a:schemeClr>
+                    </a:prstClr>
                   </a:outerShdw>
                 </a:effectLst>
               </a:rPr>
               <a:t>Arens</a:t>
             </a:r>
-            <a:endParaRPr lang="en-US" sz="5400" dirty="0">
+            <a:endParaRPr lang="en-US" sz="4800" dirty="0">
               <a:ln w="0"/>
+              <a:solidFill>
+                <a:prstClr val="black"/>
+              </a:solidFill>
               <a:effectLst>
                 <a:outerShdw blurRad="38100" dist="19050" dir="2700000" algn="tl" rotWithShape="0">
-                  <a:schemeClr val="dk1">
+                  <a:prstClr val="black">
                     <a:alpha val="40000"/>
-                  </a:schemeClr>
+                  </a:prstClr>
                 </a:outerShdw>
               </a:effectLst>
             </a:endParaRPr>
           </a:p>
-          <a:p>
-            <a:pPr algn="ctr"/>
-            <a:endParaRPr lang="en-US" sz="5400" dirty="0">
-              <a:ln w="0"/>
-              <a:effectLst>
-                <a:outerShdw blurRad="38100" dist="19050" dir="2700000" algn="tl" rotWithShape="0">
-                  <a:schemeClr val="dk1">
-                    <a:alpha val="40000"/>
-                  </a:schemeClr>
-                </a:outerShdw>
-              </a:effectLst>
-            </a:endParaRPr>
-          </a:p>
         </p:txBody>
       </p:sp>
       <p:sp>
@@ -3651,8 +3598,8 @@
         </p:nvSpPr>
         <p:spPr>
           <a:xfrm>
-            <a:off x="33528000" y="9973270"/>
-            <a:ext cx="4648200" cy="923330"/>
+            <a:off x="35585400" y="7262230"/>
+            <a:ext cx="3176861" cy="830997"/>
           </a:xfrm>
           <a:prstGeom prst="rect">
             <a:avLst/>
@@ -3667,38 +3614,47 @@
           <a:p>
             <a:pPr lvl="0"/>
             <a:r>
-              <a:rPr lang="en-US" sz="5400" dirty="0">
+              <a:rPr lang="en-US" sz="4800" dirty="0">
                 <a:ln w="0"/>
+                <a:solidFill>
+                  <a:prstClr val="black"/>
+                </a:solidFill>
                 <a:effectLst>
                   <a:outerShdw blurRad="38100" dist="19050" dir="2700000" algn="tl" rotWithShape="0">
-                    <a:schemeClr val="dk1">
+                    <a:prstClr val="black">
                       <a:alpha val="40000"/>
-                    </a:schemeClr>
+                    </a:prstClr>
                   </a:outerShdw>
                 </a:effectLst>
               </a:rPr>
               <a:t>Jon </a:t>
             </a:r>
             <a:r>
-              <a:rPr lang="en-US" sz="5400" dirty="0" err="1">
+              <a:rPr lang="en-US" sz="4800" dirty="0" err="1">
                 <a:ln w="0"/>
+                <a:solidFill>
+                  <a:prstClr val="black"/>
+                </a:solidFill>
                 <a:effectLst>
                   <a:outerShdw blurRad="38100" dist="19050" dir="2700000" algn="tl" rotWithShape="0">
-                    <a:schemeClr val="dk1">
+                    <a:prstClr val="black">
                       <a:alpha val="40000"/>
-                    </a:schemeClr>
+                    </a:prstClr>
                   </a:outerShdw>
                 </a:effectLst>
               </a:rPr>
               <a:t>Deibel</a:t>
             </a:r>
-            <a:endParaRPr lang="en-US" sz="5400" dirty="0">
+            <a:endParaRPr lang="en-US" sz="4800" dirty="0">
               <a:ln w="0"/>
+              <a:solidFill>
+                <a:prstClr val="black"/>
+              </a:solidFill>
               <a:effectLst>
                 <a:outerShdw blurRad="38100" dist="19050" dir="2700000" algn="tl" rotWithShape="0">
-                  <a:schemeClr val="dk1">
+                  <a:prstClr val="black">
                     <a:alpha val="40000"/>
-                  </a:schemeClr>
+                  </a:prstClr>
                 </a:outerShdw>
               </a:effectLst>
             </a:endParaRPr>
@@ -3713,8 +3669,8 @@
         </p:nvSpPr>
         <p:spPr>
           <a:xfrm>
-            <a:off x="38541957" y="9958355"/>
-            <a:ext cx="4869184" cy="1754326"/>
+            <a:off x="39281303" y="7317031"/>
+            <a:ext cx="3836128" cy="1569660"/>
           </a:xfrm>
           <a:prstGeom prst="rect">
             <a:avLst/>
@@ -3729,38 +3685,47 @@
           <a:p>
             <a:pPr lvl="0"/>
             <a:r>
-              <a:rPr lang="en-US" sz="5400" dirty="0">
+              <a:rPr lang="en-US" sz="4800" dirty="0">
                 <a:ln w="0"/>
+                <a:solidFill>
+                  <a:prstClr val="black"/>
+                </a:solidFill>
                 <a:effectLst>
                   <a:outerShdw blurRad="38100" dist="19050" dir="2700000" algn="tl" rotWithShape="0">
-                    <a:schemeClr val="dk1">
+                    <a:prstClr val="black">
                       <a:alpha val="40000"/>
-                    </a:schemeClr>
+                    </a:prstClr>
                   </a:outerShdw>
                 </a:effectLst>
               </a:rPr>
               <a:t>Dr. Ali </a:t>
             </a:r>
             <a:r>
-              <a:rPr lang="en-US" sz="5400" dirty="0" err="1">
+              <a:rPr lang="en-US" sz="4800" dirty="0" err="1">
                 <a:ln w="0"/>
+                <a:solidFill>
+                  <a:prstClr val="black"/>
+                </a:solidFill>
                 <a:effectLst>
                   <a:outerShdw blurRad="38100" dist="19050" dir="2700000" algn="tl" rotWithShape="0">
-                    <a:schemeClr val="dk1">
+                    <a:prstClr val="black">
                       <a:alpha val="40000"/>
-                    </a:schemeClr>
+                    </a:prstClr>
                   </a:outerShdw>
                 </a:effectLst>
               </a:rPr>
               <a:t>Minai</a:t>
             </a:r>
-            <a:endParaRPr lang="en-US" sz="5400" dirty="0">
+            <a:endParaRPr lang="en-US" sz="4800" dirty="0">
               <a:ln w="0"/>
+              <a:solidFill>
+                <a:prstClr val="black"/>
+              </a:solidFill>
               <a:effectLst>
                 <a:outerShdw blurRad="38100" dist="19050" dir="2700000" algn="tl" rotWithShape="0">
-                  <a:schemeClr val="dk1">
+                  <a:prstClr val="black">
                     <a:alpha val="40000"/>
-                  </a:schemeClr>
+                  </a:prstClr>
                 </a:outerShdw>
               </a:effectLst>
             </a:endParaRPr>
@@ -3768,13 +3733,16 @@
           <a:p>
             <a:pPr lvl="0"/>
             <a:r>
-              <a:rPr lang="en-US" sz="5400" dirty="0">
+              <a:rPr lang="en-US" sz="4800" dirty="0">
                 <a:ln w="0"/>
+                <a:solidFill>
+                  <a:prstClr val="black"/>
+                </a:solidFill>
                 <a:effectLst>
                   <a:outerShdw blurRad="38100" dist="19050" dir="2700000" algn="tl" rotWithShape="0">
-                    <a:schemeClr val="dk1">
+                    <a:prstClr val="black">
                       <a:alpha val="40000"/>
-                    </a:schemeClr>
+                    </a:prstClr>
                   </a:outerShdw>
                 </a:effectLst>
               </a:rPr>
@@ -3806,7 +3774,7 @@
         </p:blipFill>
         <p:spPr bwMode="auto">
           <a:xfrm>
-            <a:off x="914400" y="448462"/>
+            <a:off x="1999405" y="493315"/>
             <a:ext cx="31299994" cy="4245118"/>
           </a:xfrm>
           <a:prstGeom prst="rect">
@@ -3828,7 +3796,7 @@
         <p:nvPicPr>
           <p:cNvPr id="40" name="Picture 39"/>
           <p:cNvPicPr>
-            <a:picLocks/>
+            <a:picLocks noChangeAspect="1"/>
           </p:cNvPicPr>
           <p:nvPr/>
         </p:nvPicPr>
@@ -3846,8 +3814,8 @@
         </p:blipFill>
         <p:spPr>
           <a:xfrm>
-            <a:off x="33553715" y="531717"/>
-            <a:ext cx="4078224" cy="4078224"/>
+            <a:off x="35802231" y="448462"/>
+            <a:ext cx="2743200" cy="2743200"/>
           </a:xfrm>
           <a:prstGeom prst="round2DiagRect">
             <a:avLst>
@@ -3874,7 +3842,7 @@
         <p:nvPicPr>
           <p:cNvPr id="42" name="Picture 41"/>
           <p:cNvPicPr preferRelativeResize="0">
-            <a:picLocks/>
+            <a:picLocks noChangeAspect="1"/>
           </p:cNvPicPr>
           <p:nvPr/>
         </p:nvPicPr>
@@ -3891,8 +3859,8 @@
         </p:blipFill>
         <p:spPr>
           <a:xfrm>
-            <a:off x="38826946" y="448462"/>
-            <a:ext cx="4078224" cy="4078608"/>
+            <a:off x="39424777" y="448204"/>
+            <a:ext cx="2743200" cy="2743458"/>
           </a:xfrm>
           <a:prstGeom prst="round2DiagRect">
             <a:avLst>
@@ -3937,8 +3905,8 @@
         </p:blipFill>
         <p:spPr>
           <a:xfrm>
-            <a:off x="33660396" y="5868573"/>
-            <a:ext cx="4078608" cy="4078608"/>
+            <a:off x="35802231" y="4432500"/>
+            <a:ext cx="2743200" cy="2743200"/>
           </a:xfrm>
           <a:prstGeom prst="round2DiagRect">
             <a:avLst>
@@ -3965,7 +3933,7 @@
         <p:nvPicPr>
           <p:cNvPr id="44" name="Picture 43"/>
           <p:cNvPicPr>
-            <a:picLocks/>
+            <a:picLocks noChangeAspect="1"/>
           </p:cNvPicPr>
           <p:nvPr/>
         </p:nvPicPr>
@@ -3982,8 +3950,8 @@
         </p:blipFill>
         <p:spPr>
           <a:xfrm>
-            <a:off x="38541957" y="5821785"/>
-            <a:ext cx="4078224" cy="4078224"/>
+            <a:off x="39424777" y="4499416"/>
+            <a:ext cx="2743200" cy="2743200"/>
           </a:xfrm>
           <a:prstGeom prst="round2DiagRect">
             <a:avLst>
@@ -4015,7 +3983,7 @@
         <p:spPr>
           <a:xfrm>
             <a:off x="434339" y="14099738"/>
-            <a:ext cx="9525000" cy="17912596"/>
+            <a:ext cx="9525000" cy="9787295"/>
           </a:xfrm>
           <a:prstGeom prst="rect">
             <a:avLst/>
@@ -4047,7 +4015,7 @@
                   </a:outerShdw>
                 </a:effectLst>
               </a:rPr>
-              <a:t>Scope &amp; Decisions</a:t>
+              <a:t>Interest in Problem</a:t>
             </a:r>
           </a:p>
           <a:p>
@@ -4057,15 +4025,15 @@
                   <a:schemeClr val="bg1"/>
                 </a:solidFill>
               </a:rPr>
-              <a:t>With 3 distinct factions to play as and an action space of ~10</a:t>
-            </a:r>
-            <a:r>
-              <a:rPr lang="en-US" sz="4800" baseline="30000" dirty="0">
+              <a:t>We wanted to pursue a topic that was related to a hobby we all shared (playing video games). Creating a AI was interesting to us because there are a variety of methods for approaching the problem and each of us had varying domain knowledge about Starcraft2. Furthermore, Blizzard and </a:t>
+            </a:r>
+            <a:r>
+              <a:rPr lang="en-US" sz="4800" dirty="0" err="1">
                 <a:solidFill>
                   <a:schemeClr val="bg1"/>
                 </a:solidFill>
               </a:rPr>
-              <a:t>8</a:t>
+              <a:t>Deepmind</a:t>
             </a:r>
             <a:r>
               <a:rPr lang="en-US" sz="4800" dirty="0">
@@ -4073,192 +4041,28 @@
                   <a:schemeClr val="bg1"/>
                 </a:solidFill>
               </a:rPr>
-              <a:t> possibilities, we limited our project in the following ways:</a:t>
-            </a:r>
-          </a:p>
-          <a:p>
-            <a:pPr marL="685800" indent="-685800">
-              <a:buFont typeface="Arial" panose="020B0604020202020204" pitchFamily="34" charset="0"/>
-              <a:buChar char="•"/>
-            </a:pPr>
-            <a:r>
-              <a:rPr lang="en-US" sz="4800" dirty="0">
-                <a:solidFill>
-                  <a:schemeClr val="bg1"/>
-                </a:solidFill>
-              </a:rPr>
-              <a:t>Only train as Terran.</a:t>
-            </a:r>
-          </a:p>
-          <a:p>
-            <a:pPr marL="685800" indent="-685800">
-              <a:buFont typeface="Arial" panose="020B0604020202020204" pitchFamily="34" charset="0"/>
-              <a:buChar char="•"/>
-            </a:pPr>
-            <a:r>
-              <a:rPr lang="en-US" sz="4800" dirty="0">
-                <a:solidFill>
-                  <a:schemeClr val="bg1"/>
-                </a:solidFill>
-              </a:rPr>
-              <a:t>Only train on a small 64x64 map.</a:t>
-            </a:r>
-          </a:p>
-          <a:p>
-            <a:pPr marL="685800" indent="-685800">
-              <a:buFont typeface="Arial" panose="020B0604020202020204" pitchFamily="34" charset="0"/>
-              <a:buChar char="•"/>
-            </a:pPr>
-            <a:r>
-              <a:rPr lang="en-US" sz="4800" dirty="0">
-                <a:solidFill>
-                  <a:schemeClr val="bg1"/>
-                </a:solidFill>
-              </a:rPr>
-              <a:t>Train via reinforcement only against Blizzard AI.</a:t>
-            </a:r>
-          </a:p>
-          <a:p>
-            <a:pPr marL="685800" indent="-685800">
-              <a:buFont typeface="Arial" panose="020B0604020202020204" pitchFamily="34" charset="0"/>
-              <a:buChar char="•"/>
-            </a:pPr>
-            <a:r>
-              <a:rPr lang="en-US" sz="4800" dirty="0">
-                <a:solidFill>
-                  <a:schemeClr val="bg1"/>
-                </a:solidFill>
-              </a:rPr>
-              <a:t>The Blizzard AI’s race will change each iteration.</a:t>
-            </a:r>
-          </a:p>
-          <a:p>
-            <a:pPr marL="685800" indent="-685800">
-              <a:buFont typeface="Arial" panose="020B0604020202020204" pitchFamily="34" charset="0"/>
-              <a:buChar char="•"/>
-            </a:pPr>
-            <a:r>
-              <a:rPr lang="en-US" sz="4800" dirty="0">
-                <a:solidFill>
-                  <a:schemeClr val="bg1"/>
-                </a:solidFill>
-              </a:rPr>
-              <a:t>Restrict our action space to simple actions, such as:</a:t>
-            </a:r>
-          </a:p>
-          <a:p>
-            <a:pPr marL="2880360" lvl="1" indent="-685800">
-              <a:buFont typeface="Arial" panose="020B0604020202020204" pitchFamily="34" charset="0"/>
-              <a:buChar char="•"/>
-            </a:pPr>
-            <a:r>
-              <a:rPr lang="en-US" sz="4800" dirty="0">
-                <a:solidFill>
-                  <a:schemeClr val="bg1"/>
-                </a:solidFill>
-              </a:rPr>
-              <a:t>Build SCV</a:t>
-            </a:r>
-          </a:p>
-          <a:p>
-            <a:pPr marL="2880360" lvl="1" indent="-685800">
-              <a:buFont typeface="Arial" panose="020B0604020202020204" pitchFamily="34" charset="0"/>
-              <a:buChar char="•"/>
-            </a:pPr>
-            <a:r>
-              <a:rPr lang="en-US" sz="4800" dirty="0">
-                <a:solidFill>
-                  <a:schemeClr val="bg1"/>
-                </a:solidFill>
-              </a:rPr>
-              <a:t>Build Marine</a:t>
-            </a:r>
-          </a:p>
-          <a:p>
-            <a:pPr marL="2880360" lvl="1" indent="-685800">
-              <a:buFont typeface="Arial" panose="020B0604020202020204" pitchFamily="34" charset="0"/>
-              <a:buChar char="•"/>
-            </a:pPr>
-            <a:r>
-              <a:rPr lang="en-US" sz="4800" dirty="0">
-                <a:solidFill>
-                  <a:schemeClr val="bg1"/>
-                </a:solidFill>
-              </a:rPr>
-              <a:t>Build Barracks</a:t>
-            </a:r>
-          </a:p>
-          <a:p>
-            <a:pPr marL="2880360" lvl="1" indent="-685800">
-              <a:buFont typeface="Arial" panose="020B0604020202020204" pitchFamily="34" charset="0"/>
-              <a:buChar char="•"/>
-            </a:pPr>
-            <a:r>
-              <a:rPr lang="en-US" sz="4800" dirty="0">
-                <a:solidFill>
-                  <a:schemeClr val="bg1"/>
-                </a:solidFill>
-              </a:rPr>
-              <a:t>Build Supply Depot</a:t>
-            </a:r>
-          </a:p>
-          <a:p>
-            <a:pPr marL="685800" indent="-685800">
-              <a:buFont typeface="Arial" panose="020B0604020202020204" pitchFamily="34" charset="0"/>
-              <a:buChar char="•"/>
-            </a:pPr>
-            <a:r>
-              <a:rPr lang="en-US" sz="4800" dirty="0">
-                <a:solidFill>
-                  <a:schemeClr val="bg1"/>
-                </a:solidFill>
-              </a:rPr>
-              <a:t>Prevent training bot from moving camera.</a:t>
-            </a:r>
-          </a:p>
-          <a:p>
-            <a:pPr marL="685800" indent="-685800">
-              <a:buFont typeface="Arial" panose="020B0604020202020204" pitchFamily="34" charset="0"/>
-              <a:buChar char="•"/>
-            </a:pPr>
-            <a:r>
-              <a:rPr lang="en-US" sz="4800" dirty="0">
-                <a:solidFill>
-                  <a:schemeClr val="bg1"/>
-                </a:solidFill>
-              </a:rPr>
-              <a:t>Feed the AI the current screen region and 7 distinct </a:t>
-            </a:r>
-            <a:r>
-              <a:rPr lang="en-US" sz="4800" dirty="0" err="1">
-                <a:solidFill>
-                  <a:schemeClr val="bg1"/>
-                </a:solidFill>
-              </a:rPr>
-              <a:t>minimap</a:t>
-            </a:r>
-            <a:r>
-              <a:rPr lang="en-US" sz="4800" dirty="0">
-                <a:solidFill>
-                  <a:schemeClr val="bg1"/>
-                </a:solidFill>
-              </a:rPr>
-              <a:t> layers.</a:t>
-            </a:r>
-          </a:p>
-          <a:p>
-            <a:pPr marL="685800" indent="-685800">
-              <a:buFont typeface="Arial" panose="020B0604020202020204" pitchFamily="34" charset="0"/>
-              <a:buChar char="•"/>
-            </a:pPr>
-            <a:r>
-              <a:rPr lang="en-US" sz="4800" dirty="0">
-                <a:solidFill>
-                  <a:schemeClr val="bg1"/>
-                </a:solidFill>
-              </a:rPr>
-              <a:t>Utilize a Q-learning table to handle multi-dimensional tensors.</a:t>
-            </a:r>
+              <a:t> recently released tools to aid in the development of Starcraft2 AI agents.</a:t>
+            </a:r>
+          </a:p>
+          <a:p>
+            <a:endParaRPr lang="en-US" sz="4800" cap="none" spc="0" dirty="0">
+              <a:ln w="18415" cmpd="sng">
+                <a:solidFill>
+                  <a:srgbClr val="FFFFFF"/>
+                </a:solidFill>
+                <a:prstDash val="solid"/>
+              </a:ln>
+              <a:solidFill>
+                <a:schemeClr val="bg1"/>
+              </a:solidFill>
+              <a:effectLst>
+                <a:outerShdw blurRad="63500" dir="3600000" algn="tl" rotWithShape="0">
+                  <a:srgbClr val="000000">
+                    <a:alpha val="70000"/>
+                  </a:srgbClr>
+                </a:outerShdw>
+              </a:effectLst>
+            </a:endParaRPr>
           </a:p>
         </p:txBody>
       </p:sp>
@@ -4270,8 +4074,8 @@
         </p:nvSpPr>
         <p:spPr>
           <a:xfrm>
-            <a:off x="33886141" y="13026733"/>
-            <a:ext cx="9525000" cy="10525958"/>
+            <a:off x="33972386" y="17151320"/>
+            <a:ext cx="9525000" cy="6832640"/>
           </a:xfrm>
           <a:prstGeom prst="rect">
             <a:avLst/>
@@ -4317,7 +4121,7 @@
                   <a:prstClr val="white"/>
                 </a:solidFill>
               </a:rPr>
-              <a:t>10/31 – Develop a scripted AI using capable of defeating Medium AI opponents.</a:t>
+              <a:t>10/31 – Develop scripted dumb AI.</a:t>
             </a:r>
           </a:p>
           <a:p>
@@ -4331,7 +4135,7 @@
                   <a:prstClr val="white"/>
                 </a:solidFill>
               </a:rPr>
-              <a:t>12/05 – Implemented a simple Q-learned model capable of occasionally winning against Very Easy AI.</a:t>
+              <a:t>12/05 – Develop Q-learned model capable of defeating Very Easy AI.</a:t>
             </a:r>
           </a:p>
           <a:p>
@@ -4359,7 +4163,7 @@
                   <a:prstClr val="white"/>
                 </a:solidFill>
               </a:rPr>
-              <a:t>2/5 – Update reward algorithm to use player score. No noticeable change.</a:t>
+              <a:t>2/5 – Update to sparse and intermittent reward systems. </a:t>
             </a:r>
           </a:p>
         </p:txBody>
@@ -4372,8 +4176,8 @@
         </p:nvSpPr>
         <p:spPr>
           <a:xfrm>
-            <a:off x="33794699" y="24191416"/>
-            <a:ext cx="9395458" cy="8309967"/>
+            <a:off x="33812363" y="24921380"/>
+            <a:ext cx="9395458" cy="7571303"/>
           </a:xfrm>
           <a:prstGeom prst="rect">
             <a:avLst/>
@@ -4505,39 +4309,7 @@
                   <a:prstClr val="white"/>
                 </a:solidFill>
               </a:rPr>
-              <a:t>Train AI to play as </a:t>
-            </a:r>
-            <a:r>
-              <a:rPr lang="en-US" sz="4800" dirty="0" err="1">
-                <a:solidFill>
-                  <a:prstClr val="white"/>
-                </a:solidFill>
-              </a:rPr>
-              <a:t>Protoss</a:t>
-            </a:r>
-            <a:r>
-              <a:rPr lang="en-US" sz="4800" dirty="0">
-                <a:solidFill>
-                  <a:prstClr val="white"/>
-                </a:solidFill>
-              </a:rPr>
-              <a:t> and </a:t>
-            </a:r>
-            <a:r>
-              <a:rPr lang="en-US" sz="4800" dirty="0" err="1">
-                <a:solidFill>
-                  <a:prstClr val="white"/>
-                </a:solidFill>
-              </a:rPr>
-              <a:t>Zerg</a:t>
-            </a:r>
-            <a:r>
-              <a:rPr lang="en-US" sz="4800" dirty="0">
-                <a:solidFill>
-                  <a:prstClr val="white"/>
-                </a:solidFill>
-              </a:rPr>
-              <a:t>.</a:t>
+              <a:t>Train AI to play as other races</a:t>
             </a:r>
           </a:p>
         </p:txBody>
@@ -4979,6 +4751,536 @@
           </a:p>
         </p:txBody>
       </p:sp>
+      <p:sp>
+        <p:nvSpPr>
+          <p:cNvPr id="30" name="Rounded Rectangle 29">
+            <a:extLst>
+              <a:ext uri="{FF2B5EF4-FFF2-40B4-BE49-F238E27FC236}">
+                <a16:creationId xmlns:a16="http://schemas.microsoft.com/office/drawing/2014/main" id="{DE73C9F6-216E-804C-8ADB-FE5D010D3793}"/>
+              </a:ext>
+            </a:extLst>
+          </p:cNvPr>
+          <p:cNvSpPr/>
+          <p:nvPr/>
+        </p:nvSpPr>
+        <p:spPr>
+          <a:xfrm>
+            <a:off x="80307" y="23894143"/>
+            <a:ext cx="10515600" cy="8839200"/>
+          </a:xfrm>
+          <a:prstGeom prst="roundRect">
+            <a:avLst/>
+          </a:prstGeom>
+          <a:solidFill>
+            <a:schemeClr val="tx1">
+              <a:alpha val="75000"/>
+            </a:schemeClr>
+          </a:solidFill>
+        </p:spPr>
+        <p:style>
+          <a:lnRef idx="2">
+            <a:schemeClr val="accent1">
+              <a:shade val="50000"/>
+            </a:schemeClr>
+          </a:lnRef>
+          <a:fillRef idx="1">
+            <a:schemeClr val="accent1"/>
+          </a:fillRef>
+          <a:effectRef idx="0">
+            <a:schemeClr val="accent1"/>
+          </a:effectRef>
+          <a:fontRef idx="minor">
+            <a:schemeClr val="lt1"/>
+          </a:fontRef>
+        </p:style>
+        <p:txBody>
+          <a:bodyPr rtlCol="0" anchor="ctr"/>
+          <a:lstStyle/>
+          <a:p>
+            <a:pPr algn="ctr"/>
+            <a:endParaRPr lang="en-US"/>
+          </a:p>
+        </p:txBody>
+      </p:sp>
+      <p:sp>
+        <p:nvSpPr>
+          <p:cNvPr id="32" name="Rectangle 31">
+            <a:extLst>
+              <a:ext uri="{FF2B5EF4-FFF2-40B4-BE49-F238E27FC236}">
+                <a16:creationId xmlns:a16="http://schemas.microsoft.com/office/drawing/2014/main" id="{496AC655-5F1F-DF43-A526-2752994F2936}"/>
+              </a:ext>
+            </a:extLst>
+          </p:cNvPr>
+          <p:cNvSpPr/>
+          <p:nvPr/>
+        </p:nvSpPr>
+        <p:spPr>
+          <a:xfrm>
+            <a:off x="586740" y="24303280"/>
+            <a:ext cx="9525000" cy="9048631"/>
+          </a:xfrm>
+          <a:prstGeom prst="rect">
+            <a:avLst/>
+          </a:prstGeom>
+          <a:noFill/>
+        </p:spPr>
+        <p:txBody>
+          <a:bodyPr wrap="square" lIns="91440" tIns="45720" rIns="91440" bIns="45720">
+            <a:spAutoFit/>
+          </a:bodyPr>
+          <a:lstStyle/>
+          <a:p>
+            <a:r>
+              <a:rPr lang="en-US" sz="5400" b="1" cap="none" spc="0" dirty="0">
+                <a:ln w="18415" cmpd="sng">
+                  <a:solidFill>
+                    <a:srgbClr val="FFFFFF"/>
+                  </a:solidFill>
+                  <a:prstDash val="solid"/>
+                </a:ln>
+                <a:solidFill>
+                  <a:schemeClr val="bg1"/>
+                </a:solidFill>
+                <a:effectLst>
+                  <a:outerShdw blurRad="63500" dir="3600000" algn="tl" rotWithShape="0">
+                    <a:srgbClr val="000000">
+                      <a:alpha val="70000"/>
+                    </a:srgbClr>
+                  </a:outerShdw>
+                </a:effectLst>
+              </a:rPr>
+              <a:t>Important Challenges</a:t>
+            </a:r>
+          </a:p>
+          <a:p>
+            <a:r>
+              <a:rPr lang="en-US" sz="4800" dirty="0">
+                <a:solidFill>
+                  <a:schemeClr val="bg1"/>
+                </a:solidFill>
+              </a:rPr>
+              <a:t>The challenges related to our project include:</a:t>
+            </a:r>
+          </a:p>
+          <a:p>
+            <a:pPr marL="685800" indent="-685800">
+              <a:buFont typeface="Arial" panose="020B0604020202020204" pitchFamily="34" charset="0"/>
+              <a:buChar char="•"/>
+            </a:pPr>
+            <a:r>
+              <a:rPr lang="en-US" sz="4800" dirty="0">
+                <a:solidFill>
+                  <a:schemeClr val="bg1"/>
+                </a:solidFill>
+              </a:rPr>
+              <a:t>Long term rewarding</a:t>
+            </a:r>
+          </a:p>
+          <a:p>
+            <a:pPr marL="685800" indent="-685800">
+              <a:buFont typeface="Arial" panose="020B0604020202020204" pitchFamily="34" charset="0"/>
+              <a:buChar char="•"/>
+            </a:pPr>
+            <a:r>
+              <a:rPr lang="en-US" sz="4800" dirty="0">
+                <a:solidFill>
+                  <a:schemeClr val="bg1"/>
+                </a:solidFill>
+              </a:rPr>
+              <a:t>Long term stochasticity</a:t>
+            </a:r>
+          </a:p>
+          <a:p>
+            <a:pPr marL="685800" indent="-685800">
+              <a:buFont typeface="Arial" panose="020B0604020202020204" pitchFamily="34" charset="0"/>
+              <a:buChar char="•"/>
+            </a:pPr>
+            <a:r>
+              <a:rPr lang="en-US" sz="4800" dirty="0">
+                <a:solidFill>
+                  <a:schemeClr val="bg1"/>
+                </a:solidFill>
+              </a:rPr>
+              <a:t>Managing Action Input Space</a:t>
+            </a:r>
+          </a:p>
+          <a:p>
+            <a:pPr marL="685800" indent="-685800">
+              <a:buFont typeface="Arial" panose="020B0604020202020204" pitchFamily="34" charset="0"/>
+              <a:buChar char="•"/>
+            </a:pPr>
+            <a:r>
+              <a:rPr lang="en-US" sz="4800" dirty="0">
+                <a:solidFill>
+                  <a:schemeClr val="bg1"/>
+                </a:solidFill>
+              </a:rPr>
+              <a:t>Training the AI “as a human”</a:t>
+            </a:r>
+          </a:p>
+          <a:p>
+            <a:endParaRPr lang="en-US" sz="4800" dirty="0">
+              <a:solidFill>
+                <a:schemeClr val="bg1"/>
+              </a:solidFill>
+            </a:endParaRPr>
+          </a:p>
+          <a:p>
+            <a:r>
+              <a:rPr lang="en-US" sz="4800" dirty="0">
+                <a:solidFill>
+                  <a:schemeClr val="bg1"/>
+                </a:solidFill>
+              </a:rPr>
+              <a:t>To account for some of these challenges, we developed a deep Q-learning solution.</a:t>
+            </a:r>
+          </a:p>
+          <a:p>
+            <a:pPr marL="685800" indent="-685800">
+              <a:buFont typeface="Arial" panose="020B0604020202020204" pitchFamily="34" charset="0"/>
+              <a:buChar char="•"/>
+            </a:pPr>
+            <a:endParaRPr lang="en-US" sz="4800" dirty="0">
+              <a:solidFill>
+                <a:schemeClr val="bg1"/>
+              </a:solidFill>
+            </a:endParaRPr>
+          </a:p>
+        </p:txBody>
+      </p:sp>
+      <p:sp>
+        <p:nvSpPr>
+          <p:cNvPr id="38" name="Rounded Rectangle 37">
+            <a:extLst>
+              <a:ext uri="{FF2B5EF4-FFF2-40B4-BE49-F238E27FC236}">
+                <a16:creationId xmlns:a16="http://schemas.microsoft.com/office/drawing/2014/main" id="{17388C3C-2703-2B4C-8E09-FE498740CCE4}"/>
+              </a:ext>
+            </a:extLst>
+          </p:cNvPr>
+          <p:cNvSpPr/>
+          <p:nvPr/>
+        </p:nvSpPr>
+        <p:spPr>
+          <a:xfrm>
+            <a:off x="33371791" y="8893152"/>
+            <a:ext cx="10660382" cy="7408044"/>
+          </a:xfrm>
+          <a:prstGeom prst="roundRect">
+            <a:avLst/>
+          </a:prstGeom>
+          <a:solidFill>
+            <a:schemeClr val="tx1">
+              <a:alpha val="75000"/>
+            </a:schemeClr>
+          </a:solidFill>
+        </p:spPr>
+        <p:style>
+          <a:lnRef idx="2">
+            <a:schemeClr val="accent1">
+              <a:shade val="50000"/>
+            </a:schemeClr>
+          </a:lnRef>
+          <a:fillRef idx="1">
+            <a:schemeClr val="accent1"/>
+          </a:fillRef>
+          <a:effectRef idx="0">
+            <a:schemeClr val="accent1"/>
+          </a:effectRef>
+          <a:fontRef idx="minor">
+            <a:schemeClr val="lt1"/>
+          </a:fontRef>
+        </p:style>
+        <p:txBody>
+          <a:bodyPr rtlCol="0" anchor="ctr"/>
+          <a:lstStyle/>
+          <a:p>
+            <a:pPr algn="ctr"/>
+            <a:endParaRPr lang="en-US"/>
+          </a:p>
+        </p:txBody>
+      </p:sp>
+      <p:sp>
+        <p:nvSpPr>
+          <p:cNvPr id="39" name="Rectangle 38">
+            <a:extLst>
+              <a:ext uri="{FF2B5EF4-FFF2-40B4-BE49-F238E27FC236}">
+                <a16:creationId xmlns:a16="http://schemas.microsoft.com/office/drawing/2014/main" id="{A12D1386-A095-1243-8DEE-BD8E8AA74461}"/>
+              </a:ext>
+            </a:extLst>
+          </p:cNvPr>
+          <p:cNvSpPr/>
+          <p:nvPr/>
+        </p:nvSpPr>
+        <p:spPr>
+          <a:xfrm>
+            <a:off x="33939729" y="9140085"/>
+            <a:ext cx="9525000" cy="1661993"/>
+          </a:xfrm>
+          <a:prstGeom prst="rect">
+            <a:avLst/>
+          </a:prstGeom>
+          <a:noFill/>
+        </p:spPr>
+        <p:txBody>
+          <a:bodyPr wrap="square" lIns="91440" tIns="45720" rIns="91440" bIns="45720">
+            <a:spAutoFit/>
+          </a:bodyPr>
+          <a:lstStyle/>
+          <a:p>
+            <a:r>
+              <a:rPr lang="en-US" sz="5400" b="1" cap="none" spc="0" dirty="0">
+                <a:ln w="18415" cmpd="sng">
+                  <a:solidFill>
+                    <a:srgbClr val="FFFFFF"/>
+                  </a:solidFill>
+                  <a:prstDash val="solid"/>
+                </a:ln>
+                <a:solidFill>
+                  <a:schemeClr val="bg1"/>
+                </a:solidFill>
+                <a:effectLst>
+                  <a:outerShdw blurRad="63500" dir="3600000" algn="tl" rotWithShape="0">
+                    <a:srgbClr val="000000">
+                      <a:alpha val="70000"/>
+                    </a:srgbClr>
+                  </a:outerShdw>
+                </a:effectLst>
+              </a:rPr>
+              <a:t>Results</a:t>
+            </a:r>
+          </a:p>
+          <a:p>
+            <a:pPr lvl="0"/>
+            <a:endParaRPr lang="en-US" sz="4800" dirty="0">
+              <a:solidFill>
+                <a:prstClr val="white"/>
+              </a:solidFill>
+            </a:endParaRPr>
+          </a:p>
+        </p:txBody>
+      </p:sp>
+      <p:graphicFrame>
+        <p:nvGraphicFramePr>
+          <p:cNvPr id="2" name="Table 1">
+            <a:extLst>
+              <a:ext uri="{FF2B5EF4-FFF2-40B4-BE49-F238E27FC236}">
+                <a16:creationId xmlns:a16="http://schemas.microsoft.com/office/drawing/2014/main" id="{AE5265D8-5D26-1745-9A48-35B200A3BD8B}"/>
+              </a:ext>
+            </a:extLst>
+          </p:cNvPr>
+          <p:cNvGraphicFramePr>
+            <a:graphicFrameLocks noGrp="1"/>
+          </p:cNvGraphicFramePr>
+          <p:nvPr>
+            <p:extLst>
+              <p:ext uri="{D42A27DB-BD31-4B8C-83A1-F6EECF244321}">
+                <p14:modId xmlns:p14="http://schemas.microsoft.com/office/powerpoint/2010/main" val="2228455861"/>
+              </p:ext>
+            </p:extLst>
+          </p:nvPr>
+        </p:nvGraphicFramePr>
+        <p:xfrm>
+          <a:off x="33742816" y="10112932"/>
+          <a:ext cx="9808876" cy="5853944"/>
+        </p:xfrm>
+        <a:graphic>
+          <a:graphicData uri="http://schemas.openxmlformats.org/drawingml/2006/table">
+            <a:tbl>
+              <a:tblPr firstRow="1" bandRow="1">
+                <a:tableStyleId>{2D5ABB26-0587-4C30-8999-92F81FD0307C}</a:tableStyleId>
+              </a:tblPr>
+              <a:tblGrid>
+                <a:gridCol w="4904438">
+                  <a:extLst>
+                    <a:ext uri="{9D8B030D-6E8A-4147-A177-3AD203B41FA5}">
+                      <a16:colId xmlns:a16="http://schemas.microsoft.com/office/drawing/2014/main" val="1404240551"/>
+                    </a:ext>
+                  </a:extLst>
+                </a:gridCol>
+                <a:gridCol w="4904438">
+                  <a:extLst>
+                    <a:ext uri="{9D8B030D-6E8A-4147-A177-3AD203B41FA5}">
+                      <a16:colId xmlns:a16="http://schemas.microsoft.com/office/drawing/2014/main" val="2303060108"/>
+                    </a:ext>
+                  </a:extLst>
+                </a:gridCol>
+              </a:tblGrid>
+              <a:tr h="1190504">
+                <a:tc>
+                  <a:txBody>
+                    <a:bodyPr/>
+                    <a:lstStyle/>
+                    <a:p>
+                      <a:pPr algn="ctr"/>
+                      <a:r>
+                        <a:rPr lang="en-US" sz="4800" b="1" dirty="0">
+                          <a:solidFill>
+                            <a:schemeClr val="bg1"/>
+                          </a:solidFill>
+                        </a:rPr>
+                        <a:t>AI Type</a:t>
+                      </a:r>
+                    </a:p>
+                  </a:txBody>
+                  <a:tcPr anchor="b"/>
+                </a:tc>
+                <a:tc>
+                  <a:txBody>
+                    <a:bodyPr/>
+                    <a:lstStyle/>
+                    <a:p>
+                      <a:pPr algn="ctr"/>
+                      <a:r>
+                        <a:rPr lang="en-US" sz="4800" b="1" dirty="0">
+                          <a:solidFill>
+                            <a:schemeClr val="bg1"/>
+                          </a:solidFill>
+                        </a:rPr>
+                        <a:t>Win Rate vs. Very Easy Random AI</a:t>
+                      </a:r>
+                    </a:p>
+                  </a:txBody>
+                  <a:tcPr anchor="ctr"/>
+                </a:tc>
+                <a:extLst>
+                  <a:ext uri="{0D108BD9-81ED-4DB2-BD59-A6C34878D82A}">
+                    <a16:rowId xmlns:a16="http://schemas.microsoft.com/office/drawing/2014/main" val="417556600"/>
+                  </a:ext>
+                </a:extLst>
+              </a:tr>
+              <a:tr h="1190504">
+                <a:tc>
+                  <a:txBody>
+                    <a:bodyPr/>
+                    <a:lstStyle/>
+                    <a:p>
+                      <a:pPr algn="ctr"/>
+                      <a:r>
+                        <a:rPr lang="en-US" sz="4800" dirty="0">
+                          <a:solidFill>
+                            <a:schemeClr val="bg1"/>
+                          </a:solidFill>
+                        </a:rPr>
+                        <a:t>Random Action</a:t>
+                      </a:r>
+                    </a:p>
+                  </a:txBody>
+                  <a:tcPr anchor="ctr"/>
+                </a:tc>
+                <a:tc>
+                  <a:txBody>
+                    <a:bodyPr/>
+                    <a:lstStyle/>
+                    <a:p>
+                      <a:pPr algn="ctr"/>
+                      <a:r>
+                        <a:rPr lang="en-US" sz="4800" dirty="0">
+                          <a:solidFill>
+                            <a:schemeClr val="bg1"/>
+                          </a:solidFill>
+                        </a:rPr>
+                        <a:t>0%</a:t>
+                      </a:r>
+                    </a:p>
+                  </a:txBody>
+                  <a:tcPr anchor="ctr"/>
+                </a:tc>
+                <a:extLst>
+                  <a:ext uri="{0D108BD9-81ED-4DB2-BD59-A6C34878D82A}">
+                    <a16:rowId xmlns:a16="http://schemas.microsoft.com/office/drawing/2014/main" val="677520262"/>
+                  </a:ext>
+                </a:extLst>
+              </a:tr>
+              <a:tr h="1190504">
+                <a:tc>
+                  <a:txBody>
+                    <a:bodyPr/>
+                    <a:lstStyle/>
+                    <a:p>
+                      <a:pPr algn="ctr"/>
+                      <a:r>
+                        <a:rPr lang="en-US" sz="4800" dirty="0">
+                          <a:solidFill>
+                            <a:schemeClr val="bg1"/>
+                          </a:solidFill>
+                        </a:rPr>
+                        <a:t>Network with No Training</a:t>
+                      </a:r>
+                    </a:p>
+                  </a:txBody>
+                  <a:tcPr anchor="ctr"/>
+                </a:tc>
+                <a:tc>
+                  <a:txBody>
+                    <a:bodyPr/>
+                    <a:lstStyle/>
+                    <a:p>
+                      <a:pPr algn="ctr"/>
+                      <a:r>
+                        <a:rPr lang="en-US" sz="4800" dirty="0">
+                          <a:solidFill>
+                            <a:schemeClr val="bg1"/>
+                          </a:solidFill>
+                        </a:rPr>
+                        <a:t>12%</a:t>
+                      </a:r>
+                    </a:p>
+                  </a:txBody>
+                  <a:tcPr anchor="ctr"/>
+                </a:tc>
+                <a:extLst>
+                  <a:ext uri="{0D108BD9-81ED-4DB2-BD59-A6C34878D82A}">
+                    <a16:rowId xmlns:a16="http://schemas.microsoft.com/office/drawing/2014/main" val="4023659251"/>
+                  </a:ext>
+                </a:extLst>
+              </a:tr>
+              <a:tr h="1190504">
+                <a:tc>
+                  <a:txBody>
+                    <a:bodyPr/>
+                    <a:lstStyle/>
+                    <a:p>
+                      <a:pPr algn="ctr"/>
+                      <a:r>
+                        <a:rPr lang="en-US" sz="4800" dirty="0">
+                          <a:solidFill>
+                            <a:schemeClr val="bg1"/>
+                          </a:solidFill>
+                        </a:rPr>
+                        <a:t>Network with Training</a:t>
+                      </a:r>
+                    </a:p>
+                  </a:txBody>
+                  <a:tcPr anchor="ctr"/>
+                </a:tc>
+                <a:tc>
+                  <a:txBody>
+                    <a:bodyPr/>
+                    <a:lstStyle/>
+                    <a:p>
+                      <a:pPr algn="ctr"/>
+                      <a:r>
+                        <a:rPr lang="en-US" sz="4800" dirty="0">
+                          <a:solidFill>
+                            <a:schemeClr val="bg1"/>
+                          </a:solidFill>
+                        </a:rPr>
+                        <a:t>54%</a:t>
+                      </a:r>
+                    </a:p>
+                  </a:txBody>
+                  <a:tcPr anchor="ctr"/>
+                </a:tc>
+                <a:extLst>
+                  <a:ext uri="{0D108BD9-81ED-4DB2-BD59-A6C34878D82A}">
+                    <a16:rowId xmlns:a16="http://schemas.microsoft.com/office/drawing/2014/main" val="1684611308"/>
+                  </a:ext>
+                </a:extLst>
+              </a:tr>
+            </a:tbl>
+          </a:graphicData>
+        </a:graphic>
+      </p:graphicFrame>
     </p:spTree>
     <p:extLst>
       <p:ext uri="{BB962C8B-B14F-4D97-AF65-F5344CB8AC3E}">

</xml_diff>

<commit_message>
Updated senior design poster
</commit_message>
<xml_diff>
--- a/Senior Design Poster.pptx
+++ b/Senior Design Poster.pptx
@@ -302,7 +302,7 @@
           <a:p>
             <a:fld id="{466FE519-D025-4205-95BE-FAF045E3FBF1}" type="datetimeFigureOut">
               <a:rPr lang="en-US" smtClean="0"/>
-              <a:t>2/28/18</a:t>
+              <a:t>3/21/18</a:t>
             </a:fld>
             <a:endParaRPr lang="en-US"/>
           </a:p>
@@ -470,7 +470,7 @@
           <a:p>
             <a:fld id="{466FE519-D025-4205-95BE-FAF045E3FBF1}" type="datetimeFigureOut">
               <a:rPr lang="en-US" smtClean="0"/>
-              <a:t>2/28/18</a:t>
+              <a:t>3/21/18</a:t>
             </a:fld>
             <a:endParaRPr lang="en-US"/>
           </a:p>
@@ -648,7 +648,7 @@
           <a:p>
             <a:fld id="{466FE519-D025-4205-95BE-FAF045E3FBF1}" type="datetimeFigureOut">
               <a:rPr lang="en-US" smtClean="0"/>
-              <a:t>2/28/18</a:t>
+              <a:t>3/21/18</a:t>
             </a:fld>
             <a:endParaRPr lang="en-US"/>
           </a:p>
@@ -816,7 +816,7 @@
           <a:p>
             <a:fld id="{466FE519-D025-4205-95BE-FAF045E3FBF1}" type="datetimeFigureOut">
               <a:rPr lang="en-US" smtClean="0"/>
-              <a:t>2/28/18</a:t>
+              <a:t>3/21/18</a:t>
             </a:fld>
             <a:endParaRPr lang="en-US"/>
           </a:p>
@@ -1061,7 +1061,7 @@
           <a:p>
             <a:fld id="{466FE519-D025-4205-95BE-FAF045E3FBF1}" type="datetimeFigureOut">
               <a:rPr lang="en-US" smtClean="0"/>
-              <a:t>2/28/18</a:t>
+              <a:t>3/21/18</a:t>
             </a:fld>
             <a:endParaRPr lang="en-US"/>
           </a:p>
@@ -1346,7 +1346,7 @@
           <a:p>
             <a:fld id="{466FE519-D025-4205-95BE-FAF045E3FBF1}" type="datetimeFigureOut">
               <a:rPr lang="en-US" smtClean="0"/>
-              <a:t>2/28/18</a:t>
+              <a:t>3/21/18</a:t>
             </a:fld>
             <a:endParaRPr lang="en-US"/>
           </a:p>
@@ -1770,7 +1770,7 @@
           <a:p>
             <a:fld id="{466FE519-D025-4205-95BE-FAF045E3FBF1}" type="datetimeFigureOut">
               <a:rPr lang="en-US" smtClean="0"/>
-              <a:t>2/28/18</a:t>
+              <a:t>3/21/18</a:t>
             </a:fld>
             <a:endParaRPr lang="en-US"/>
           </a:p>
@@ -1887,7 +1887,7 @@
           <a:p>
             <a:fld id="{466FE519-D025-4205-95BE-FAF045E3FBF1}" type="datetimeFigureOut">
               <a:rPr lang="en-US" smtClean="0"/>
-              <a:t>2/28/18</a:t>
+              <a:t>3/21/18</a:t>
             </a:fld>
             <a:endParaRPr lang="en-US"/>
           </a:p>
@@ -1982,7 +1982,7 @@
           <a:p>
             <a:fld id="{466FE519-D025-4205-95BE-FAF045E3FBF1}" type="datetimeFigureOut">
               <a:rPr lang="en-US" smtClean="0"/>
-              <a:t>2/28/18</a:t>
+              <a:t>3/21/18</a:t>
             </a:fld>
             <a:endParaRPr lang="en-US"/>
           </a:p>
@@ -2257,7 +2257,7 @@
           <a:p>
             <a:fld id="{466FE519-D025-4205-95BE-FAF045E3FBF1}" type="datetimeFigureOut">
               <a:rPr lang="en-US" smtClean="0"/>
-              <a:t>2/28/18</a:t>
+              <a:t>3/21/18</a:t>
             </a:fld>
             <a:endParaRPr lang="en-US"/>
           </a:p>
@@ -2509,7 +2509,7 @@
           <a:p>
             <a:fld id="{466FE519-D025-4205-95BE-FAF045E3FBF1}" type="datetimeFigureOut">
               <a:rPr lang="en-US" smtClean="0"/>
-              <a:t>2/28/18</a:t>
+              <a:t>3/21/18</a:t>
             </a:fld>
             <a:endParaRPr lang="en-US"/>
           </a:p>
@@ -2720,7 +2720,7 @@
           <a:p>
             <a:fld id="{466FE519-D025-4205-95BE-FAF045E3FBF1}" type="datetimeFigureOut">
               <a:rPr lang="en-US" smtClean="0"/>
-              <a:t>2/28/18</a:t>
+              <a:t>3/21/18</a:t>
             </a:fld>
             <a:endParaRPr lang="en-US"/>
           </a:p>
@@ -3117,7 +3117,9 @@
             <a:ext cx="10637521" cy="8429578"/>
           </a:xfrm>
           <a:prstGeom prst="roundRect">
-            <a:avLst/>
+            <a:avLst>
+              <a:gd name="adj" fmla="val 7266"/>
+            </a:avLst>
           </a:prstGeom>
           <a:solidFill>
             <a:schemeClr val="tx1">
@@ -3208,7 +3210,7 @@
           </a:xfrm>
           <a:prstGeom prst="roundRect">
             <a:avLst>
-              <a:gd name="adj" fmla="val 6055"/>
+              <a:gd name="adj" fmla="val 2411"/>
             </a:avLst>
           </a:prstGeom>
           <a:solidFill>
@@ -3250,8 +3252,8 @@
         </p:nvSpPr>
         <p:spPr>
           <a:xfrm>
-            <a:off x="17602893" y="4721289"/>
-            <a:ext cx="8654934" cy="1569660"/>
+            <a:off x="17661403" y="4721289"/>
+            <a:ext cx="8537915" cy="1569660"/>
           </a:xfrm>
           <a:prstGeom prst="rect">
             <a:avLst/>
@@ -3266,7 +3268,7 @@
           <a:p>
             <a:pPr algn="ctr"/>
             <a:r>
-              <a:rPr lang="en-US" sz="9600" b="0" cap="none" spc="0" dirty="0">
+              <a:rPr lang="en-US" sz="9600" b="0" cap="none" spc="0" dirty="0" smtClean="0">
                 <a:ln w="18415" cmpd="sng">
                   <a:solidFill>
                     <a:srgbClr val="FFFFFF"/>
@@ -3284,7 +3286,28 @@
                   </a:outerShdw>
                 </a:effectLst>
               </a:rPr>
-              <a:t>Design and Input</a:t>
+              <a:t>Model and </a:t>
+            </a:r>
+            <a:r>
+              <a:rPr lang="en-US" sz="9600" b="0" cap="none" spc="0" dirty="0">
+                <a:ln w="18415" cmpd="sng">
+                  <a:solidFill>
+                    <a:srgbClr val="FFFFFF"/>
+                  </a:solidFill>
+                  <a:prstDash val="solid"/>
+                </a:ln>
+                <a:solidFill>
+                  <a:srgbClr val="FFFFFF"/>
+                </a:solidFill>
+                <a:effectLst>
+                  <a:outerShdw blurRad="63500" dir="3600000" algn="tl" rotWithShape="0">
+                    <a:srgbClr val="000000">
+                      <a:alpha val="70000"/>
+                    </a:srgbClr>
+                  </a:outerShdw>
+                </a:effectLst>
+              </a:rPr>
+              <a:t>Input</a:t>
             </a:r>
           </a:p>
         </p:txBody>
@@ -3301,7 +3324,9 @@
             <a:ext cx="10660382" cy="7648600"/>
           </a:xfrm>
           <a:prstGeom prst="roundRect">
-            <a:avLst/>
+            <a:avLst>
+              <a:gd name="adj" fmla="val 7103"/>
+            </a:avLst>
           </a:prstGeom>
           <a:solidFill>
             <a:schemeClr val="tx1">
@@ -3402,7 +3427,9 @@
             <a:ext cx="10515600" cy="10105327"/>
           </a:xfrm>
           <a:prstGeom prst="roundRect">
-            <a:avLst/>
+            <a:avLst>
+              <a:gd name="adj" fmla="val 7317"/>
+            </a:avLst>
           </a:prstGeom>
           <a:solidFill>
             <a:schemeClr val="tx1">
@@ -3447,7 +3474,9 @@
             <a:ext cx="10515600" cy="8067009"/>
           </a:xfrm>
           <a:prstGeom prst="roundRect">
-            <a:avLst/>
+            <a:avLst>
+              <a:gd name="adj" fmla="val 7977"/>
+            </a:avLst>
           </a:prstGeom>
           <a:solidFill>
             <a:schemeClr val="tx1">
@@ -3774,7 +3803,7 @@
         </p:blipFill>
         <p:spPr bwMode="auto">
           <a:xfrm>
-            <a:off x="1999405" y="493315"/>
+            <a:off x="2017069" y="1069103"/>
             <a:ext cx="31299994" cy="4245118"/>
           </a:xfrm>
           <a:prstGeom prst="rect">
@@ -4177,7 +4206,7 @@
         <p:spPr>
           <a:xfrm>
             <a:off x="33812363" y="24921380"/>
-            <a:ext cx="9395458" cy="7571303"/>
+            <a:ext cx="9395458" cy="6093976"/>
           </a:xfrm>
           <a:prstGeom prst="rect">
             <a:avLst/>
@@ -4217,30 +4246,11 @@
               <a:buFont typeface="Arial" panose="020B0604020202020204" pitchFamily="34" charset="0"/>
               <a:buChar char="•"/>
             </a:pPr>
-            <a:r>
-              <a:rPr lang="en-US" sz="4800" dirty="0">
-                <a:solidFill>
-                  <a:prstClr val="white"/>
-                </a:solidFill>
-              </a:rPr>
-              <a:t>Expand action space to the full possibility of </a:t>
-            </a:r>
-            <a:r>
-              <a:rPr lang="en-US" sz="4800" dirty="0" err="1">
-                <a:solidFill>
-                  <a:prstClr val="white"/>
-                </a:solidFill>
-              </a:rPr>
-              <a:t>Terran’s</a:t>
-            </a:r>
-            <a:r>
-              <a:rPr lang="en-US" sz="4800" dirty="0">
-                <a:solidFill>
-                  <a:prstClr val="white"/>
-                </a:solidFill>
-              </a:rPr>
-              <a:t> actions.</a:t>
-            </a:r>
+            <a:endParaRPr lang="en-US" sz="4800" dirty="0">
+              <a:solidFill>
+                <a:prstClr val="white"/>
+              </a:solidFill>
+            </a:endParaRPr>
           </a:p>
           <a:p>
             <a:pPr marL="685800" lvl="0" indent="-685800">
@@ -4248,12 +4258,36 @@
               <a:buChar char="•"/>
             </a:pPr>
             <a:r>
+              <a:rPr lang="en-US" sz="4800" dirty="0" smtClean="0">
+                <a:solidFill>
+                  <a:prstClr val="white"/>
+                </a:solidFill>
+              </a:rPr>
+              <a:t>Expand </a:t>
+            </a:r>
+            <a:r>
               <a:rPr lang="en-US" sz="4800" dirty="0">
                 <a:solidFill>
                   <a:prstClr val="white"/>
                 </a:solidFill>
               </a:rPr>
-              <a:t>Train against multiple maps.</a:t>
+              <a:t>action space to the full possibility of </a:t>
+            </a:r>
+            <a:r>
+              <a:rPr lang="en-US" sz="4800" dirty="0" err="1">
+                <a:solidFill>
+                  <a:prstClr val="white"/>
+                </a:solidFill>
+              </a:rPr>
+              <a:t>Terran’s</a:t>
+            </a:r>
+            <a:r>
+              <a:rPr lang="en-US" sz="4800" dirty="0">
+                <a:solidFill>
+                  <a:prstClr val="white"/>
+                </a:solidFill>
+              </a:rPr>
+              <a:t> actions.</a:t>
             </a:r>
           </a:p>
           <a:p>
@@ -4267,7 +4301,7 @@
                   <a:prstClr val="white"/>
                 </a:solidFill>
               </a:rPr>
-              <a:t>Train AI to change camera location.</a:t>
+              <a:t>Train against multiple maps.</a:t>
             </a:r>
           </a:p>
           <a:p>
@@ -4281,7 +4315,15 @@
                   <a:prstClr val="white"/>
                 </a:solidFill>
               </a:rPr>
-              <a:t>Utilize Pro-player replay data.</a:t>
+              <a:t>Train AI to change camera location</a:t>
+            </a:r>
+            <a:r>
+              <a:rPr lang="en-US" sz="4800" dirty="0" smtClean="0">
+                <a:solidFill>
+                  <a:prstClr val="white"/>
+                </a:solidFill>
+              </a:rPr>
+              <a:t>. </a:t>
             </a:r>
           </a:p>
           <a:p>
@@ -4290,26 +4332,20 @@
               <a:buChar char="•"/>
             </a:pPr>
             <a:r>
+              <a:rPr lang="en-US" sz="4800" dirty="0" smtClean="0">
+                <a:solidFill>
+                  <a:prstClr val="white"/>
+                </a:solidFill>
+              </a:rPr>
+              <a:t>Train </a:t>
+            </a:r>
+            <a:r>
               <a:rPr lang="en-US" sz="4800" dirty="0">
                 <a:solidFill>
                   <a:prstClr val="white"/>
                 </a:solidFill>
               </a:rPr>
-              <a:t>Expand input space to include all mini-map layers.</a:t>
-            </a:r>
-          </a:p>
-          <a:p>
-            <a:pPr marL="685800" lvl="0" indent="-685800">
-              <a:buFont typeface="Arial" panose="020B0604020202020204" pitchFamily="34" charset="0"/>
-              <a:buChar char="•"/>
-            </a:pPr>
-            <a:r>
-              <a:rPr lang="en-US" sz="4800" dirty="0">
-                <a:solidFill>
-                  <a:prstClr val="white"/>
-                </a:solidFill>
-              </a:rPr>
-              <a:t>Train AI to play as other races</a:t>
+              <a:t>AI to play as other races</a:t>
             </a:r>
           </a:p>
         </p:txBody>
@@ -4337,8 +4373,8 @@
         </p:blipFill>
         <p:spPr bwMode="auto">
           <a:xfrm>
-            <a:off x="13072404" y="27750284"/>
-            <a:ext cx="3909343" cy="3909343"/>
+            <a:off x="12794533" y="27780101"/>
+            <a:ext cx="3465627" cy="3465627"/>
           </a:xfrm>
           <a:prstGeom prst="rect">
             <a:avLst/>
@@ -4378,8 +4414,8 @@
         </p:blipFill>
         <p:spPr bwMode="auto">
           <a:xfrm>
-            <a:off x="17133866" y="27204715"/>
-            <a:ext cx="4876800" cy="4876801"/>
+            <a:off x="17602892" y="27780102"/>
+            <a:ext cx="3599519" cy="3599520"/>
           </a:xfrm>
           <a:prstGeom prst="rect">
             <a:avLst/>
@@ -4433,7 +4469,7 @@
         </p:blipFill>
         <p:spPr bwMode="auto">
           <a:xfrm>
-            <a:off x="22345015" y="27750284"/>
+            <a:off x="21697711" y="27780101"/>
             <a:ext cx="3810000" cy="3810000"/>
           </a:xfrm>
           <a:prstGeom prst="rect">
@@ -4472,8 +4508,8 @@
         </p:blipFill>
         <p:spPr bwMode="auto">
           <a:xfrm>
-            <a:off x="27209968" y="27416100"/>
-            <a:ext cx="4550588" cy="4577709"/>
+            <a:off x="27114811" y="27653969"/>
+            <a:ext cx="3912812" cy="3936132"/>
           </a:xfrm>
           <a:prstGeom prst="rect">
             <a:avLst/>
@@ -4490,273 +4526,12 @@
           </a:extLst>
         </p:spPr>
       </p:pic>
-      <p:pic>
-        <p:nvPicPr>
-          <p:cNvPr id="3" name="Picture 2">
-            <a:extLst>
-              <a:ext uri="{FF2B5EF4-FFF2-40B4-BE49-F238E27FC236}">
-                <a16:creationId xmlns:a16="http://schemas.microsoft.com/office/drawing/2014/main" id="{CE74A3E7-107E-41A1-B14A-2F197523FC04}"/>
-              </a:ext>
-            </a:extLst>
-          </p:cNvPr>
-          <p:cNvPicPr>
-            <a:picLocks noChangeAspect="1"/>
-          </p:cNvPicPr>
-          <p:nvPr/>
-        </p:nvPicPr>
-        <p:blipFill>
-          <a:blip r:embed="rId12">
-            <a:extLst>
-              <a:ext uri="{28A0092B-C50C-407E-A947-70E740481C1C}">
-                <a14:useLocalDpi xmlns:a14="http://schemas.microsoft.com/office/drawing/2010/main" val="0"/>
-              </a:ext>
-            </a:extLst>
-          </a:blip>
-          <a:stretch>
-            <a:fillRect/>
-          </a:stretch>
-        </p:blipFill>
-        <p:spPr>
-          <a:xfrm>
-            <a:off x="12225835" y="6962387"/>
-            <a:ext cx="19439527" cy="10552886"/>
-          </a:xfrm>
-          <a:prstGeom prst="rect">
-            <a:avLst/>
-          </a:prstGeom>
-        </p:spPr>
-      </p:pic>
-      <p:sp>
-        <p:nvSpPr>
-          <p:cNvPr id="4" name="TextBox 3">
-            <a:extLst>
-              <a:ext uri="{FF2B5EF4-FFF2-40B4-BE49-F238E27FC236}">
-                <a16:creationId xmlns:a16="http://schemas.microsoft.com/office/drawing/2014/main" id="{9EBC1508-8732-4319-877A-B77B8FEF8563}"/>
-              </a:ext>
-            </a:extLst>
-          </p:cNvPr>
-          <p:cNvSpPr txBox="1"/>
-          <p:nvPr/>
-        </p:nvSpPr>
-        <p:spPr>
-          <a:xfrm>
-            <a:off x="12225835" y="17515273"/>
-            <a:ext cx="19439527" cy="2308324"/>
-          </a:xfrm>
-          <a:prstGeom prst="rect">
-            <a:avLst/>
-          </a:prstGeom>
-          <a:noFill/>
-        </p:spPr>
-        <p:txBody>
-          <a:bodyPr wrap="square" rtlCol="0">
-            <a:spAutoFit/>
-          </a:bodyPr>
-          <a:lstStyle/>
-          <a:p>
-            <a:r>
-              <a:rPr lang="en-US" sz="4800" dirty="0">
-                <a:solidFill>
-                  <a:schemeClr val="bg1"/>
-                </a:solidFill>
-              </a:rPr>
-              <a:t>The seven regions boxed in red above serve as a high-level overview of the first layer of inputs that we feed into our machine learning model. These seven layers are:</a:t>
-            </a:r>
-          </a:p>
-        </p:txBody>
-      </p:sp>
-      <p:sp>
-        <p:nvSpPr>
-          <p:cNvPr id="5" name="TextBox 4">
-            <a:extLst>
-              <a:ext uri="{FF2B5EF4-FFF2-40B4-BE49-F238E27FC236}">
-                <a16:creationId xmlns:a16="http://schemas.microsoft.com/office/drawing/2014/main" id="{40F8E454-6B8C-4248-96EC-D7613B64A3CF}"/>
-              </a:ext>
-            </a:extLst>
-          </p:cNvPr>
-          <p:cNvSpPr txBox="1"/>
-          <p:nvPr/>
-        </p:nvSpPr>
-        <p:spPr>
-          <a:xfrm>
-            <a:off x="12225835" y="20132962"/>
-            <a:ext cx="9757864" cy="6740307"/>
-          </a:xfrm>
-          <a:prstGeom prst="rect">
-            <a:avLst/>
-          </a:prstGeom>
-          <a:noFill/>
-        </p:spPr>
-        <p:txBody>
-          <a:bodyPr wrap="square" rtlCol="0">
-            <a:spAutoFit/>
-          </a:bodyPr>
-          <a:lstStyle/>
-          <a:p>
-            <a:pPr marL="914400" indent="-914400">
-              <a:buAutoNum type="arabicParenR"/>
-            </a:pPr>
-            <a:r>
-              <a:rPr lang="en-US" sz="4800" dirty="0">
-                <a:solidFill>
-                  <a:schemeClr val="bg1"/>
-                </a:solidFill>
-              </a:rPr>
-              <a:t>Height Map – observe terrain differences, impacting vision.</a:t>
-            </a:r>
-          </a:p>
-          <a:p>
-            <a:pPr marL="914400" indent="-914400">
-              <a:buAutoNum type="arabicParenR"/>
-            </a:pPr>
-            <a:r>
-              <a:rPr lang="en-US" sz="4800" dirty="0">
-                <a:solidFill>
-                  <a:schemeClr val="bg1"/>
-                </a:solidFill>
-              </a:rPr>
-              <a:t>Visibility Map – observe current and past exploration.</a:t>
-            </a:r>
-          </a:p>
-          <a:p>
-            <a:pPr marL="914400" indent="-914400">
-              <a:buAutoNum type="arabicParenR"/>
-            </a:pPr>
-            <a:r>
-              <a:rPr lang="en-US" sz="4800" dirty="0">
-                <a:solidFill>
-                  <a:schemeClr val="bg1"/>
-                </a:solidFill>
-              </a:rPr>
-              <a:t>Creep – shows where </a:t>
-            </a:r>
-            <a:r>
-              <a:rPr lang="en-US" sz="4800" dirty="0" err="1">
-                <a:solidFill>
-                  <a:schemeClr val="bg1"/>
-                </a:solidFill>
-              </a:rPr>
-              <a:t>Zerg</a:t>
-            </a:r>
-            <a:r>
-              <a:rPr lang="en-US" sz="4800" dirty="0">
-                <a:solidFill>
-                  <a:schemeClr val="bg1"/>
-                </a:solidFill>
-              </a:rPr>
-              <a:t> has spread “creep”. Race-specific.</a:t>
-            </a:r>
-          </a:p>
-          <a:p>
-            <a:pPr marL="914400" indent="-914400">
-              <a:buAutoNum type="arabicParenR"/>
-            </a:pPr>
-            <a:r>
-              <a:rPr lang="en-US" sz="4800" dirty="0">
-                <a:solidFill>
-                  <a:schemeClr val="bg1"/>
-                </a:solidFill>
-              </a:rPr>
-              <a:t>Camera Selection – shows where the camera is currently located.</a:t>
-            </a:r>
-          </a:p>
-          <a:p>
-            <a:pPr marL="914400" indent="-914400">
-              <a:buAutoNum type="arabicParenR"/>
-            </a:pPr>
-            <a:endParaRPr lang="en-US" sz="4800" dirty="0">
-              <a:solidFill>
-                <a:schemeClr val="bg1"/>
-              </a:solidFill>
-            </a:endParaRPr>
-          </a:p>
-        </p:txBody>
-      </p:sp>
-      <p:sp>
-        <p:nvSpPr>
-          <p:cNvPr id="33" name="TextBox 32">
-            <a:extLst>
-              <a:ext uri="{FF2B5EF4-FFF2-40B4-BE49-F238E27FC236}">
-                <a16:creationId xmlns:a16="http://schemas.microsoft.com/office/drawing/2014/main" id="{6A38A447-3AB1-4A26-86D6-65CAD9A4D541}"/>
-              </a:ext>
-            </a:extLst>
-          </p:cNvPr>
-          <p:cNvSpPr txBox="1"/>
-          <p:nvPr/>
-        </p:nvSpPr>
-        <p:spPr>
-          <a:xfrm>
-            <a:off x="21800819" y="20096127"/>
-            <a:ext cx="9757864" cy="5262979"/>
-          </a:xfrm>
-          <a:prstGeom prst="rect">
-            <a:avLst/>
-          </a:prstGeom>
-          <a:noFill/>
-        </p:spPr>
-        <p:txBody>
-          <a:bodyPr wrap="square" rtlCol="0">
-            <a:spAutoFit/>
-          </a:bodyPr>
-          <a:lstStyle/>
-          <a:p>
-            <a:pPr marL="914400" indent="-914400">
-              <a:buFont typeface="+mj-lt"/>
-              <a:buAutoNum type="arabicParenR" startAt="5"/>
-            </a:pPr>
-            <a:r>
-              <a:rPr lang="en-US" sz="4800" dirty="0">
-                <a:solidFill>
-                  <a:schemeClr val="bg1"/>
-                </a:solidFill>
-              </a:rPr>
-              <a:t>Player Id – shows units based on owning-player’s ID.</a:t>
-            </a:r>
-          </a:p>
-          <a:p>
-            <a:pPr marL="914400" indent="-914400">
-              <a:buAutoNum type="arabicParenR" startAt="5"/>
-            </a:pPr>
-            <a:r>
-              <a:rPr lang="en-US" sz="4800" dirty="0">
-                <a:solidFill>
-                  <a:schemeClr val="bg1"/>
-                </a:solidFill>
-              </a:rPr>
-              <a:t>Player Relative Team – shows units relative to their respective teams.</a:t>
-            </a:r>
-          </a:p>
-          <a:p>
-            <a:pPr marL="914400" indent="-914400">
-              <a:buAutoNum type="arabicParenR" startAt="5"/>
-            </a:pPr>
-            <a:r>
-              <a:rPr lang="en-US" sz="4800" dirty="0">
-                <a:solidFill>
-                  <a:schemeClr val="bg1"/>
-                </a:solidFill>
-              </a:rPr>
-              <a:t>Selected – shows the currently selected unit.</a:t>
-            </a:r>
-          </a:p>
-          <a:p>
-            <a:pPr marL="914400" indent="-914400">
-              <a:buAutoNum type="arabicParenR" startAt="5"/>
-            </a:pPr>
-            <a:endParaRPr lang="en-US" sz="4800" dirty="0">
-              <a:solidFill>
-                <a:schemeClr val="bg1"/>
-              </a:solidFill>
-            </a:endParaRPr>
-          </a:p>
-        </p:txBody>
-      </p:sp>
       <p:sp>
         <p:nvSpPr>
           <p:cNvPr id="30" name="Rounded Rectangle 29">
             <a:extLst>
               <a:ext uri="{FF2B5EF4-FFF2-40B4-BE49-F238E27FC236}">
-                <a16:creationId xmlns:a16="http://schemas.microsoft.com/office/drawing/2014/main" id="{DE73C9F6-216E-804C-8ADB-FE5D010D3793}"/>
+                <a16:creationId xmlns:a16="http://schemas.microsoft.com/office/drawing/2014/main" xmlns="" id="{DE73C9F6-216E-804C-8ADB-FE5D010D3793}"/>
               </a:ext>
             </a:extLst>
           </p:cNvPr>
@@ -4769,7 +4544,9 @@
             <a:ext cx="10515600" cy="8839200"/>
           </a:xfrm>
           <a:prstGeom prst="roundRect">
-            <a:avLst/>
+            <a:avLst>
+              <a:gd name="adj" fmla="val 5288"/>
+            </a:avLst>
           </a:prstGeom>
           <a:solidFill>
             <a:schemeClr val="tx1">
@@ -4807,7 +4584,7 @@
           <p:cNvPr id="32" name="Rectangle 31">
             <a:extLst>
               <a:ext uri="{FF2B5EF4-FFF2-40B4-BE49-F238E27FC236}">
-                <a16:creationId xmlns:a16="http://schemas.microsoft.com/office/drawing/2014/main" id="{496AC655-5F1F-DF43-A526-2752994F2936}"/>
+                <a16:creationId xmlns:a16="http://schemas.microsoft.com/office/drawing/2014/main" xmlns="" id="{496AC655-5F1F-DF43-A526-2752994F2936}"/>
               </a:ext>
             </a:extLst>
           </p:cNvPr>
@@ -4932,7 +4709,31 @@
                   <a:schemeClr val="bg1"/>
                 </a:solidFill>
               </a:rPr>
-              <a:t>To account for some of these challenges, we developed a deep Q-learning solution.</a:t>
+              <a:t>To account for some of these challenges, we developed a deep </a:t>
+            </a:r>
+            <a:r>
+              <a:rPr lang="en-US" sz="4800" dirty="0" smtClean="0">
+                <a:solidFill>
+                  <a:schemeClr val="bg1"/>
+                </a:solidFill>
+              </a:rPr>
+              <a:t>model </a:t>
+            </a:r>
+            <a:r>
+              <a:rPr lang="en-US" sz="4800" dirty="0" smtClean="0">
+                <a:solidFill>
+                  <a:schemeClr val="bg1"/>
+                </a:solidFill>
+              </a:rPr>
+              <a:t> </a:t>
+            </a:r>
+            <a:r>
+              <a:rPr lang="en-US" sz="4800" dirty="0">
+                <a:solidFill>
+                  <a:schemeClr val="bg1"/>
+                </a:solidFill>
+              </a:rPr>
+              <a:t>solution.</a:t>
             </a:r>
           </a:p>
           <a:p>
@@ -4953,7 +4754,7 @@
           <p:cNvPr id="38" name="Rounded Rectangle 37">
             <a:extLst>
               <a:ext uri="{FF2B5EF4-FFF2-40B4-BE49-F238E27FC236}">
-                <a16:creationId xmlns:a16="http://schemas.microsoft.com/office/drawing/2014/main" id="{17388C3C-2703-2B4C-8E09-FE498740CCE4}"/>
+                <a16:creationId xmlns:a16="http://schemas.microsoft.com/office/drawing/2014/main" xmlns="" id="{17388C3C-2703-2B4C-8E09-FE498740CCE4}"/>
               </a:ext>
             </a:extLst>
           </p:cNvPr>
@@ -4966,7 +4767,9 @@
             <a:ext cx="10660382" cy="7408044"/>
           </a:xfrm>
           <a:prstGeom prst="roundRect">
-            <a:avLst/>
+            <a:avLst>
+              <a:gd name="adj" fmla="val 9672"/>
+            </a:avLst>
           </a:prstGeom>
           <a:solidFill>
             <a:schemeClr val="tx1">
@@ -5004,7 +4807,7 @@
           <p:cNvPr id="39" name="Rectangle 38">
             <a:extLst>
               <a:ext uri="{FF2B5EF4-FFF2-40B4-BE49-F238E27FC236}">
-                <a16:creationId xmlns:a16="http://schemas.microsoft.com/office/drawing/2014/main" id="{A12D1386-A095-1243-8DEE-BD8E8AA74461}"/>
+                <a16:creationId xmlns:a16="http://schemas.microsoft.com/office/drawing/2014/main" xmlns="" id="{A12D1386-A095-1243-8DEE-BD8E8AA74461}"/>
               </a:ext>
             </a:extLst>
           </p:cNvPr>
@@ -5064,7 +4867,7 @@
           <p:cNvPr id="2" name="Table 1">
             <a:extLst>
               <a:ext uri="{FF2B5EF4-FFF2-40B4-BE49-F238E27FC236}">
-                <a16:creationId xmlns:a16="http://schemas.microsoft.com/office/drawing/2014/main" id="{AE5265D8-5D26-1745-9A48-35B200A3BD8B}"/>
+                <a16:creationId xmlns:a16="http://schemas.microsoft.com/office/drawing/2014/main" xmlns="" id="{AE5265D8-5D26-1745-9A48-35B200A3BD8B}"/>
               </a:ext>
             </a:extLst>
           </p:cNvPr>
@@ -5074,14 +4877,14 @@
           <p:nvPr>
             <p:extLst>
               <p:ext uri="{D42A27DB-BD31-4B8C-83A1-F6EECF244321}">
-                <p14:modId xmlns:p14="http://schemas.microsoft.com/office/powerpoint/2010/main" val="2228455861"/>
+                <p14:modId xmlns:p14="http://schemas.microsoft.com/office/powerpoint/2010/main" val="308342248"/>
               </p:ext>
             </p:extLst>
           </p:nvPr>
         </p:nvGraphicFramePr>
         <p:xfrm>
           <a:off x="33742816" y="10112932"/>
-          <a:ext cx="9808876" cy="5853944"/>
+          <a:ext cx="9808876" cy="4299464"/>
         </p:xfrm>
         <a:graphic>
           <a:graphicData uri="http://schemas.openxmlformats.org/drawingml/2006/table">
@@ -5093,14 +4896,14 @@
                 <a:gridCol w="4904438">
                   <a:extLst>
                     <a:ext uri="{9D8B030D-6E8A-4147-A177-3AD203B41FA5}">
-                      <a16:colId xmlns:a16="http://schemas.microsoft.com/office/drawing/2014/main" val="1404240551"/>
+                      <a16:colId xmlns:a16="http://schemas.microsoft.com/office/drawing/2014/main" xmlns="" val="1404240551"/>
                     </a:ext>
                   </a:extLst>
                 </a:gridCol>
                 <a:gridCol w="4904438">
                   <a:extLst>
                     <a:ext uri="{9D8B030D-6E8A-4147-A177-3AD203B41FA5}">
-                      <a16:colId xmlns:a16="http://schemas.microsoft.com/office/drawing/2014/main" val="2303060108"/>
+                      <a16:colId xmlns:a16="http://schemas.microsoft.com/office/drawing/2014/main" xmlns="" val="2303060108"/>
                     </a:ext>
                   </a:extLst>
                 </a:gridCol>
@@ -5144,7 +4947,7 @@
                 </a:tc>
                 <a:extLst>
                   <a:ext uri="{0D108BD9-81ED-4DB2-BD59-A6C34878D82A}">
-                    <a16:rowId xmlns:a16="http://schemas.microsoft.com/office/drawing/2014/main" val="417556600"/>
+                    <a16:rowId xmlns:a16="http://schemas.microsoft.com/office/drawing/2014/main" xmlns="" val="417556600"/>
                   </a:ext>
                 </a:extLst>
               </a:tr>
@@ -5174,12 +4977,20 @@
                     <a:p>
                       <a:pPr algn="ctr"/>
                       <a:r>
+                        <a:rPr lang="en-US" sz="4800" dirty="0" smtClean="0">
+                          <a:solidFill>
+                            <a:schemeClr val="bg1"/>
+                          </a:solidFill>
+                        </a:rPr>
+                        <a:t>50</a:t>
+                      </a:r>
+                      <a:r>
                         <a:rPr lang="en-US" sz="4800" dirty="0">
                           <a:solidFill>
                             <a:schemeClr val="bg1"/>
                           </a:solidFill>
                         </a:rPr>
-                        <a:t>0%</a:t>
+                        <a:t>%</a:t>
                       </a:r>
                     </a:p>
                   </a:txBody>
@@ -5187,50 +4998,7 @@
                 </a:tc>
                 <a:extLst>
                   <a:ext uri="{0D108BD9-81ED-4DB2-BD59-A6C34878D82A}">
-                    <a16:rowId xmlns:a16="http://schemas.microsoft.com/office/drawing/2014/main" val="677520262"/>
-                  </a:ext>
-                </a:extLst>
-              </a:tr>
-              <a:tr h="1190504">
-                <a:tc>
-                  <a:txBody>
-                    <a:bodyPr/>
-                    <a:lstStyle/>
-                    <a:p>
-                      <a:pPr algn="ctr"/>
-                      <a:r>
-                        <a:rPr lang="en-US" sz="4800" dirty="0">
-                          <a:solidFill>
-                            <a:schemeClr val="bg1"/>
-                          </a:solidFill>
-                        </a:rPr>
-                        <a:t>Network with No Training</a:t>
-                      </a:r>
-                    </a:p>
-                  </a:txBody>
-                  <a:tcPr anchor="ctr"/>
-                </a:tc>
-                <a:tc>
-                  <a:txBody>
-                    <a:bodyPr/>
-                    <a:lstStyle/>
-                    <a:p>
-                      <a:pPr algn="ctr"/>
-                      <a:r>
-                        <a:rPr lang="en-US" sz="4800" dirty="0">
-                          <a:solidFill>
-                            <a:schemeClr val="bg1"/>
-                          </a:solidFill>
-                        </a:rPr>
-                        <a:t>12%</a:t>
-                      </a:r>
-                    </a:p>
-                  </a:txBody>
-                  <a:tcPr anchor="ctr"/>
-                </a:tc>
-                <a:extLst>
-                  <a:ext uri="{0D108BD9-81ED-4DB2-BD59-A6C34878D82A}">
-                    <a16:rowId xmlns:a16="http://schemas.microsoft.com/office/drawing/2014/main" val="4023659251"/>
+                    <a16:rowId xmlns:a16="http://schemas.microsoft.com/office/drawing/2014/main" xmlns="" val="677520262"/>
                   </a:ext>
                 </a:extLst>
               </a:tr>
@@ -5265,7 +5033,23 @@
                             <a:schemeClr val="bg1"/>
                           </a:solidFill>
                         </a:rPr>
-                        <a:t>54%</a:t>
+                        <a:t>8</a:t>
+                      </a:r>
+                      <a:r>
+                        <a:rPr lang="en-US" sz="4800" dirty="0" smtClean="0">
+                          <a:solidFill>
+                            <a:schemeClr val="bg1"/>
+                          </a:solidFill>
+                        </a:rPr>
+                        <a:t>4</a:t>
+                      </a:r>
+                      <a:r>
+                        <a:rPr lang="en-US" sz="4800" dirty="0">
+                          <a:solidFill>
+                            <a:schemeClr val="bg1"/>
+                          </a:solidFill>
+                        </a:rPr>
+                        <a:t>%</a:t>
                       </a:r>
                     </a:p>
                   </a:txBody>
@@ -5273,7 +5057,7 @@
                 </a:tc>
                 <a:extLst>
                   <a:ext uri="{0D108BD9-81ED-4DB2-BD59-A6C34878D82A}">
-                    <a16:rowId xmlns:a16="http://schemas.microsoft.com/office/drawing/2014/main" val="1684611308"/>
+                    <a16:rowId xmlns:a16="http://schemas.microsoft.com/office/drawing/2014/main" xmlns="" val="1684611308"/>
                   </a:ext>
                 </a:extLst>
               </a:tr>
@@ -5281,6 +5065,602 @@
           </a:graphicData>
         </a:graphic>
       </p:graphicFrame>
+      <p:pic>
+        <p:nvPicPr>
+          <p:cNvPr id="6" name="Picture 5"/>
+          <p:cNvPicPr>
+            <a:picLocks noChangeAspect="1"/>
+          </p:cNvPicPr>
+          <p:nvPr/>
+        </p:nvPicPr>
+        <p:blipFill rotWithShape="1">
+          <a:blip r:embed="rId12">
+            <a:extLst>
+              <a:ext uri="{28A0092B-C50C-407E-A947-70E740481C1C}">
+                <a14:useLocalDpi xmlns:a14="http://schemas.microsoft.com/office/drawing/2010/main" val="0"/>
+              </a:ext>
+            </a:extLst>
+          </a:blip>
+          <a:srcRect t="5170"/>
+          <a:stretch/>
+        </p:blipFill>
+        <p:spPr>
+          <a:xfrm>
+            <a:off x="12561772" y="5914497"/>
+            <a:ext cx="18667750" cy="11368150"/>
+          </a:xfrm>
+          <a:prstGeom prst="rect">
+            <a:avLst/>
+          </a:prstGeom>
+        </p:spPr>
+      </p:pic>
+      <p:pic>
+        <p:nvPicPr>
+          <p:cNvPr id="7" name="Picture 6"/>
+          <p:cNvPicPr>
+            <a:picLocks noChangeAspect="1"/>
+          </p:cNvPicPr>
+          <p:nvPr/>
+        </p:nvPicPr>
+        <p:blipFill>
+          <a:blip r:embed="rId13"/>
+          <a:stretch>
+            <a:fillRect/>
+          </a:stretch>
+        </p:blipFill>
+        <p:spPr>
+          <a:xfrm>
+            <a:off x="13884042" y="19406129"/>
+            <a:ext cx="2476500" cy="2476500"/>
+          </a:xfrm>
+          <a:prstGeom prst="rect">
+            <a:avLst/>
+          </a:prstGeom>
+        </p:spPr>
+      </p:pic>
+      <p:sp>
+        <p:nvSpPr>
+          <p:cNvPr id="8" name="TextBox 7"/>
+          <p:cNvSpPr txBox="1"/>
+          <p:nvPr/>
+        </p:nvSpPr>
+        <p:spPr>
+          <a:xfrm>
+            <a:off x="13884042" y="18805853"/>
+            <a:ext cx="2476500" cy="584775"/>
+          </a:xfrm>
+          <a:prstGeom prst="rect">
+            <a:avLst/>
+          </a:prstGeom>
+          <a:noFill/>
+        </p:spPr>
+        <p:txBody>
+          <a:bodyPr wrap="square" rtlCol="0">
+            <a:spAutoFit/>
+          </a:bodyPr>
+          <a:lstStyle/>
+          <a:p>
+            <a:pPr algn="ctr"/>
+            <a:r>
+              <a:rPr lang="en-US" sz="3200" dirty="0" smtClean="0">
+                <a:solidFill>
+                  <a:schemeClr val="bg1"/>
+                </a:solidFill>
+              </a:rPr>
+              <a:t>Creep</a:t>
+            </a:r>
+            <a:endParaRPr lang="en-US" sz="3200" dirty="0">
+              <a:solidFill>
+                <a:schemeClr val="bg1"/>
+              </a:solidFill>
+            </a:endParaRPr>
+          </a:p>
+        </p:txBody>
+      </p:sp>
+      <p:pic>
+        <p:nvPicPr>
+          <p:cNvPr id="41" name="Picture 40"/>
+          <p:cNvPicPr>
+            <a:picLocks noChangeAspect="1"/>
+          </p:cNvPicPr>
+          <p:nvPr/>
+        </p:nvPicPr>
+        <p:blipFill>
+          <a:blip r:embed="rId13"/>
+          <a:stretch>
+            <a:fillRect/>
+          </a:stretch>
+        </p:blipFill>
+        <p:spPr>
+          <a:xfrm>
+            <a:off x="16998280" y="19406129"/>
+            <a:ext cx="2476500" cy="2476500"/>
+          </a:xfrm>
+          <a:prstGeom prst="rect">
+            <a:avLst/>
+          </a:prstGeom>
+        </p:spPr>
+      </p:pic>
+      <p:sp>
+        <p:nvSpPr>
+          <p:cNvPr id="45" name="TextBox 44"/>
+          <p:cNvSpPr txBox="1"/>
+          <p:nvPr/>
+        </p:nvSpPr>
+        <p:spPr>
+          <a:xfrm>
+            <a:off x="16855106" y="18805853"/>
+            <a:ext cx="2985434" cy="600276"/>
+          </a:xfrm>
+          <a:prstGeom prst="rect">
+            <a:avLst/>
+          </a:prstGeom>
+          <a:noFill/>
+        </p:spPr>
+        <p:txBody>
+          <a:bodyPr wrap="square" rtlCol="0">
+            <a:spAutoFit/>
+          </a:bodyPr>
+          <a:lstStyle/>
+          <a:p>
+            <a:pPr algn="ctr"/>
+            <a:r>
+              <a:rPr lang="en-US" sz="3200" smtClean="0">
+                <a:solidFill>
+                  <a:schemeClr val="bg1"/>
+                </a:solidFill>
+              </a:rPr>
+              <a:t>Player Relative</a:t>
+            </a:r>
+            <a:endParaRPr lang="en-US" sz="3200" dirty="0">
+              <a:solidFill>
+                <a:schemeClr val="bg1"/>
+              </a:solidFill>
+            </a:endParaRPr>
+          </a:p>
+        </p:txBody>
+      </p:sp>
+      <p:pic>
+        <p:nvPicPr>
+          <p:cNvPr id="48" name="Picture 47"/>
+          <p:cNvPicPr>
+            <a:picLocks noChangeAspect="1"/>
+          </p:cNvPicPr>
+          <p:nvPr/>
+        </p:nvPicPr>
+        <p:blipFill>
+          <a:blip r:embed="rId13"/>
+          <a:stretch>
+            <a:fillRect/>
+          </a:stretch>
+        </p:blipFill>
+        <p:spPr>
+          <a:xfrm>
+            <a:off x="13884042" y="22645282"/>
+            <a:ext cx="2476500" cy="2476500"/>
+          </a:xfrm>
+          <a:prstGeom prst="rect">
+            <a:avLst/>
+          </a:prstGeom>
+        </p:spPr>
+      </p:pic>
+      <p:sp>
+        <p:nvSpPr>
+          <p:cNvPr id="50" name="TextBox 49"/>
+          <p:cNvSpPr txBox="1"/>
+          <p:nvPr/>
+        </p:nvSpPr>
+        <p:spPr>
+          <a:xfrm>
+            <a:off x="13884042" y="22045006"/>
+            <a:ext cx="2476500" cy="584775"/>
+          </a:xfrm>
+          <a:prstGeom prst="rect">
+            <a:avLst/>
+          </a:prstGeom>
+          <a:noFill/>
+        </p:spPr>
+        <p:txBody>
+          <a:bodyPr wrap="square" rtlCol="0">
+            <a:spAutoFit/>
+          </a:bodyPr>
+          <a:lstStyle/>
+          <a:p>
+            <a:pPr algn="ctr"/>
+            <a:r>
+              <a:rPr lang="en-US" sz="3200" dirty="0" smtClean="0">
+                <a:solidFill>
+                  <a:schemeClr val="bg1"/>
+                </a:solidFill>
+              </a:rPr>
+              <a:t>Selected</a:t>
+            </a:r>
+            <a:endParaRPr lang="en-US" sz="3200" dirty="0">
+              <a:solidFill>
+                <a:schemeClr val="bg1"/>
+              </a:solidFill>
+            </a:endParaRPr>
+          </a:p>
+        </p:txBody>
+      </p:sp>
+      <p:pic>
+        <p:nvPicPr>
+          <p:cNvPr id="51" name="Picture 50"/>
+          <p:cNvPicPr>
+            <a:picLocks noChangeAspect="1"/>
+          </p:cNvPicPr>
+          <p:nvPr/>
+        </p:nvPicPr>
+        <p:blipFill>
+          <a:blip r:embed="rId13"/>
+          <a:stretch>
+            <a:fillRect/>
+          </a:stretch>
+        </p:blipFill>
+        <p:spPr>
+          <a:xfrm>
+            <a:off x="16998175" y="22736417"/>
+            <a:ext cx="2476500" cy="2476500"/>
+          </a:xfrm>
+          <a:prstGeom prst="rect">
+            <a:avLst/>
+          </a:prstGeom>
+        </p:spPr>
+      </p:pic>
+      <p:sp>
+        <p:nvSpPr>
+          <p:cNvPr id="52" name="TextBox 51"/>
+          <p:cNvSpPr txBox="1"/>
+          <p:nvPr/>
+        </p:nvSpPr>
+        <p:spPr>
+          <a:xfrm>
+            <a:off x="16998175" y="22136141"/>
+            <a:ext cx="2476500" cy="584775"/>
+          </a:xfrm>
+          <a:prstGeom prst="rect">
+            <a:avLst/>
+          </a:prstGeom>
+          <a:noFill/>
+        </p:spPr>
+        <p:txBody>
+          <a:bodyPr wrap="square" rtlCol="0">
+            <a:spAutoFit/>
+          </a:bodyPr>
+          <a:lstStyle/>
+          <a:p>
+            <a:pPr algn="ctr"/>
+            <a:r>
+              <a:rPr lang="en-US" sz="3200" dirty="0" smtClean="0">
+                <a:solidFill>
+                  <a:schemeClr val="bg1"/>
+                </a:solidFill>
+              </a:rPr>
+              <a:t>Hit Points</a:t>
+            </a:r>
+            <a:endParaRPr lang="en-US" sz="3200" dirty="0">
+              <a:solidFill>
+                <a:schemeClr val="bg1"/>
+              </a:solidFill>
+            </a:endParaRPr>
+          </a:p>
+        </p:txBody>
+      </p:sp>
+      <p:pic>
+        <p:nvPicPr>
+          <p:cNvPr id="53" name="Picture 52"/>
+          <p:cNvPicPr>
+            <a:picLocks noChangeAspect="1"/>
+          </p:cNvPicPr>
+          <p:nvPr/>
+        </p:nvPicPr>
+        <p:blipFill>
+          <a:blip r:embed="rId13"/>
+          <a:stretch>
+            <a:fillRect/>
+          </a:stretch>
+        </p:blipFill>
+        <p:spPr>
+          <a:xfrm>
+            <a:off x="21908954" y="19323091"/>
+            <a:ext cx="2476500" cy="2476500"/>
+          </a:xfrm>
+          <a:prstGeom prst="rect">
+            <a:avLst/>
+          </a:prstGeom>
+        </p:spPr>
+      </p:pic>
+      <p:sp>
+        <p:nvSpPr>
+          <p:cNvPr id="54" name="TextBox 53"/>
+          <p:cNvSpPr txBox="1"/>
+          <p:nvPr/>
+        </p:nvSpPr>
+        <p:spPr>
+          <a:xfrm>
+            <a:off x="21908954" y="18722815"/>
+            <a:ext cx="2476500" cy="584775"/>
+          </a:xfrm>
+          <a:prstGeom prst="rect">
+            <a:avLst/>
+          </a:prstGeom>
+          <a:noFill/>
+        </p:spPr>
+        <p:txBody>
+          <a:bodyPr wrap="square" rtlCol="0">
+            <a:spAutoFit/>
+          </a:bodyPr>
+          <a:lstStyle/>
+          <a:p>
+            <a:pPr algn="ctr"/>
+            <a:r>
+              <a:rPr lang="en-US" sz="3200" dirty="0" smtClean="0">
+                <a:solidFill>
+                  <a:schemeClr val="bg1"/>
+                </a:solidFill>
+              </a:rPr>
+              <a:t>Height Map</a:t>
+            </a:r>
+            <a:endParaRPr lang="en-US" sz="3200" dirty="0">
+              <a:solidFill>
+                <a:schemeClr val="bg1"/>
+              </a:solidFill>
+            </a:endParaRPr>
+          </a:p>
+        </p:txBody>
+      </p:sp>
+      <p:pic>
+        <p:nvPicPr>
+          <p:cNvPr id="55" name="Picture 54"/>
+          <p:cNvPicPr>
+            <a:picLocks noChangeAspect="1"/>
+          </p:cNvPicPr>
+          <p:nvPr/>
+        </p:nvPicPr>
+        <p:blipFill>
+          <a:blip r:embed="rId13"/>
+          <a:stretch>
+            <a:fillRect/>
+          </a:stretch>
+        </p:blipFill>
+        <p:spPr>
+          <a:xfrm>
+            <a:off x="24912930" y="19323091"/>
+            <a:ext cx="2476500" cy="2476500"/>
+          </a:xfrm>
+          <a:prstGeom prst="rect">
+            <a:avLst/>
+          </a:prstGeom>
+        </p:spPr>
+      </p:pic>
+      <p:sp>
+        <p:nvSpPr>
+          <p:cNvPr id="56" name="TextBox 55"/>
+          <p:cNvSpPr txBox="1"/>
+          <p:nvPr/>
+        </p:nvSpPr>
+        <p:spPr>
+          <a:xfrm>
+            <a:off x="24912930" y="18722815"/>
+            <a:ext cx="2476500" cy="584775"/>
+          </a:xfrm>
+          <a:prstGeom prst="rect">
+            <a:avLst/>
+          </a:prstGeom>
+          <a:noFill/>
+        </p:spPr>
+        <p:txBody>
+          <a:bodyPr wrap="square" rtlCol="0">
+            <a:spAutoFit/>
+          </a:bodyPr>
+          <a:lstStyle/>
+          <a:p>
+            <a:pPr algn="ctr"/>
+            <a:r>
+              <a:rPr lang="en-US" sz="3200" dirty="0" smtClean="0">
+                <a:solidFill>
+                  <a:schemeClr val="bg1"/>
+                </a:solidFill>
+              </a:rPr>
+              <a:t>Visibility</a:t>
+            </a:r>
+            <a:endParaRPr lang="en-US" sz="3200" dirty="0">
+              <a:solidFill>
+                <a:schemeClr val="bg1"/>
+              </a:solidFill>
+            </a:endParaRPr>
+          </a:p>
+        </p:txBody>
+      </p:sp>
+      <p:pic>
+        <p:nvPicPr>
+          <p:cNvPr id="57" name="Picture 56"/>
+          <p:cNvPicPr>
+            <a:picLocks noChangeAspect="1"/>
+          </p:cNvPicPr>
+          <p:nvPr/>
+        </p:nvPicPr>
+        <p:blipFill>
+          <a:blip r:embed="rId13"/>
+          <a:stretch>
+            <a:fillRect/>
+          </a:stretch>
+        </p:blipFill>
+        <p:spPr>
+          <a:xfrm>
+            <a:off x="27916906" y="19323091"/>
+            <a:ext cx="2476500" cy="2476500"/>
+          </a:xfrm>
+          <a:prstGeom prst="rect">
+            <a:avLst/>
+          </a:prstGeom>
+        </p:spPr>
+      </p:pic>
+      <p:sp>
+        <p:nvSpPr>
+          <p:cNvPr id="58" name="TextBox 57"/>
+          <p:cNvSpPr txBox="1"/>
+          <p:nvPr/>
+        </p:nvSpPr>
+        <p:spPr>
+          <a:xfrm>
+            <a:off x="27916906" y="18722815"/>
+            <a:ext cx="2476500" cy="584775"/>
+          </a:xfrm>
+          <a:prstGeom prst="rect">
+            <a:avLst/>
+          </a:prstGeom>
+          <a:noFill/>
+        </p:spPr>
+        <p:txBody>
+          <a:bodyPr wrap="square" rtlCol="0">
+            <a:spAutoFit/>
+          </a:bodyPr>
+          <a:lstStyle/>
+          <a:p>
+            <a:pPr algn="ctr"/>
+            <a:r>
+              <a:rPr lang="en-US" sz="3200" dirty="0" smtClean="0">
+                <a:solidFill>
+                  <a:schemeClr val="bg1"/>
+                </a:solidFill>
+              </a:rPr>
+              <a:t>Creep</a:t>
+            </a:r>
+            <a:endParaRPr lang="en-US" sz="3200" dirty="0">
+              <a:solidFill>
+                <a:schemeClr val="bg1"/>
+              </a:solidFill>
+            </a:endParaRPr>
+          </a:p>
+        </p:txBody>
+      </p:sp>
+      <p:pic>
+        <p:nvPicPr>
+          <p:cNvPr id="59" name="Picture 58"/>
+          <p:cNvPicPr>
+            <a:picLocks noChangeAspect="1"/>
+          </p:cNvPicPr>
+          <p:nvPr/>
+        </p:nvPicPr>
+        <p:blipFill>
+          <a:blip r:embed="rId13"/>
+          <a:stretch>
+            <a:fillRect/>
+          </a:stretch>
+        </p:blipFill>
+        <p:spPr>
+          <a:xfrm>
+            <a:off x="23314990" y="22653379"/>
+            <a:ext cx="2476500" cy="2476500"/>
+          </a:xfrm>
+          <a:prstGeom prst="rect">
+            <a:avLst/>
+          </a:prstGeom>
+        </p:spPr>
+      </p:pic>
+      <p:sp>
+        <p:nvSpPr>
+          <p:cNvPr id="60" name="TextBox 59"/>
+          <p:cNvSpPr txBox="1"/>
+          <p:nvPr/>
+        </p:nvSpPr>
+        <p:spPr>
+          <a:xfrm>
+            <a:off x="23176751" y="22053103"/>
+            <a:ext cx="2672861" cy="584775"/>
+          </a:xfrm>
+          <a:prstGeom prst="rect">
+            <a:avLst/>
+          </a:prstGeom>
+          <a:noFill/>
+        </p:spPr>
+        <p:txBody>
+          <a:bodyPr wrap="square" rtlCol="0">
+            <a:spAutoFit/>
+          </a:bodyPr>
+          <a:lstStyle/>
+          <a:p>
+            <a:pPr algn="ctr"/>
+            <a:r>
+              <a:rPr lang="en-US" sz="3200" dirty="0" smtClean="0">
+                <a:solidFill>
+                  <a:schemeClr val="bg1"/>
+                </a:solidFill>
+              </a:rPr>
+              <a:t>Player Relative</a:t>
+            </a:r>
+            <a:endParaRPr lang="en-US" sz="3200" dirty="0">
+              <a:solidFill>
+                <a:schemeClr val="bg1"/>
+              </a:solidFill>
+            </a:endParaRPr>
+          </a:p>
+        </p:txBody>
+      </p:sp>
+      <p:pic>
+        <p:nvPicPr>
+          <p:cNvPr id="61" name="Picture 60"/>
+          <p:cNvPicPr>
+            <a:picLocks noChangeAspect="1"/>
+          </p:cNvPicPr>
+          <p:nvPr/>
+        </p:nvPicPr>
+        <p:blipFill>
+          <a:blip r:embed="rId13"/>
+          <a:stretch>
+            <a:fillRect/>
+          </a:stretch>
+        </p:blipFill>
+        <p:spPr>
+          <a:xfrm>
+            <a:off x="26496442" y="22668625"/>
+            <a:ext cx="2476500" cy="2476500"/>
+          </a:xfrm>
+          <a:prstGeom prst="rect">
+            <a:avLst/>
+          </a:prstGeom>
+        </p:spPr>
+      </p:pic>
+      <p:sp>
+        <p:nvSpPr>
+          <p:cNvPr id="62" name="TextBox 61"/>
+          <p:cNvSpPr txBox="1"/>
+          <p:nvPr/>
+        </p:nvSpPr>
+        <p:spPr>
+          <a:xfrm>
+            <a:off x="26496442" y="22068349"/>
+            <a:ext cx="2476500" cy="584775"/>
+          </a:xfrm>
+          <a:prstGeom prst="rect">
+            <a:avLst/>
+          </a:prstGeom>
+          <a:noFill/>
+        </p:spPr>
+        <p:txBody>
+          <a:bodyPr wrap="square" rtlCol="0">
+            <a:spAutoFit/>
+          </a:bodyPr>
+          <a:lstStyle/>
+          <a:p>
+            <a:pPr algn="ctr"/>
+            <a:r>
+              <a:rPr lang="en-US" sz="3200" dirty="0" smtClean="0">
+                <a:solidFill>
+                  <a:schemeClr val="bg1"/>
+                </a:solidFill>
+              </a:rPr>
+              <a:t>Selected</a:t>
+            </a:r>
+            <a:endParaRPr lang="en-US" sz="3200" dirty="0">
+              <a:solidFill>
+                <a:schemeClr val="bg1"/>
+              </a:solidFill>
+            </a:endParaRPr>
+          </a:p>
+        </p:txBody>
+      </p:sp>
     </p:spTree>
     <p:extLst>
       <p:ext uri="{BB962C8B-B14F-4D97-AF65-F5344CB8AC3E}">
@@ -5291,6 +5671,13 @@
   <p:clrMapOvr>
     <a:masterClrMapping/>
   </p:clrMapOvr>
+  <p:timing>
+    <p:tnLst>
+      <p:par>
+        <p:cTn id="1" dur="indefinite" restart="never" nodeType="tmRoot"/>
+      </p:par>
+    </p:tnLst>
+  </p:timing>
 </p:sld>
 </file>
 

</xml_diff>

<commit_message>
Added titles to layer section
</commit_message>
<xml_diff>
--- a/Senior Design Poster.pptx
+++ b/Senior Design Poster.pptx
@@ -5654,6 +5654,83 @@
               <a:t>Selected</a:t>
             </a:r>
             <a:endParaRPr lang="en-US" sz="3200" dirty="0">
+              <a:solidFill>
+                <a:schemeClr val="bg1"/>
+              </a:solidFill>
+            </a:endParaRPr>
+          </a:p>
+        </p:txBody>
+      </p:sp>
+      <p:sp>
+        <p:nvSpPr>
+          <p:cNvPr id="9" name="TextBox 8"/>
+          <p:cNvSpPr txBox="1"/>
+          <p:nvPr/>
+        </p:nvSpPr>
+        <p:spPr>
+          <a:xfrm>
+            <a:off x="15087600" y="17830800"/>
+            <a:ext cx="3352800" cy="769441"/>
+          </a:xfrm>
+          <a:prstGeom prst="rect">
+            <a:avLst/>
+          </a:prstGeom>
+          <a:noFill/>
+        </p:spPr>
+        <p:txBody>
+          <a:bodyPr wrap="square" rtlCol="0">
+            <a:spAutoFit/>
+          </a:bodyPr>
+          <a:lstStyle/>
+          <a:p>
+            <a:r>
+              <a:rPr lang="en-US" sz="4400" smtClean="0">
+                <a:solidFill>
+                  <a:schemeClr val="bg1"/>
+                </a:solidFill>
+              </a:rPr>
+              <a:t>Screen Layers</a:t>
+            </a:r>
+            <a:endParaRPr lang="en-US" sz="4400" dirty="0">
+              <a:solidFill>
+                <a:schemeClr val="bg1"/>
+              </a:solidFill>
+            </a:endParaRPr>
+          </a:p>
+        </p:txBody>
+      </p:sp>
+      <p:sp>
+        <p:nvSpPr>
+          <p:cNvPr id="63" name="TextBox 62"/>
+          <p:cNvSpPr txBox="1"/>
+          <p:nvPr/>
+        </p:nvSpPr>
+        <p:spPr>
+          <a:xfrm>
+            <a:off x="23602711" y="17744255"/>
+            <a:ext cx="4741714" cy="769441"/>
+          </a:xfrm>
+          <a:prstGeom prst="rect">
+            <a:avLst/>
+          </a:prstGeom>
+          <a:noFill/>
+        </p:spPr>
+        <p:txBody>
+          <a:bodyPr wrap="square" rtlCol="0">
+            <a:spAutoFit/>
+          </a:bodyPr>
+          <a:lstStyle/>
+          <a:p>
+            <a:pPr algn="ctr"/>
+            <a:r>
+              <a:rPr lang="en-US" sz="4400" dirty="0" smtClean="0">
+                <a:solidFill>
+                  <a:schemeClr val="bg1"/>
+                </a:solidFill>
+              </a:rPr>
+              <a:t>Minimap Layers</a:t>
+            </a:r>
+            <a:endParaRPr lang="en-US" sz="4400" dirty="0">
               <a:solidFill>
                 <a:schemeClr val="bg1"/>
               </a:solidFill>

</xml_diff>

<commit_message>
added some small images that are mostly not black boxes
</commit_message>
<xml_diff>
--- a/Senior Design Poster.pptx
+++ b/Senior Design Poster.pptx
@@ -106,7 +106,7 @@
   </p:defaultTextStyle>
   <p:extLst>
     <p:ext uri="{EFAFB233-063F-42B5-8137-9DF3F51BA10A}">
-      <p15:sldGuideLst xmlns:p15="http://schemas.microsoft.com/office/powerpoint/2012/main">
+      <p15:sldGuideLst xmlns:p15="http://schemas.microsoft.com/office/powerpoint/2012/main" xmlns="">
         <p15:guide id="1" orient="horz" pos="10368">
           <p15:clr>
             <a:srgbClr val="A4A3A4"/>
@@ -302,7 +302,7 @@
           <a:p>
             <a:fld id="{466FE519-D025-4205-95BE-FAF045E3FBF1}" type="datetimeFigureOut">
               <a:rPr lang="en-US" smtClean="0"/>
-              <a:t>3/21/18</a:t>
+              <a:t>3/21/2018</a:t>
             </a:fld>
             <a:endParaRPr lang="en-US"/>
           </a:p>
@@ -470,7 +470,7 @@
           <a:p>
             <a:fld id="{466FE519-D025-4205-95BE-FAF045E3FBF1}" type="datetimeFigureOut">
               <a:rPr lang="en-US" smtClean="0"/>
-              <a:t>3/21/18</a:t>
+              <a:t>3/21/2018</a:t>
             </a:fld>
             <a:endParaRPr lang="en-US"/>
           </a:p>
@@ -648,7 +648,7 @@
           <a:p>
             <a:fld id="{466FE519-D025-4205-95BE-FAF045E3FBF1}" type="datetimeFigureOut">
               <a:rPr lang="en-US" smtClean="0"/>
-              <a:t>3/21/18</a:t>
+              <a:t>3/21/2018</a:t>
             </a:fld>
             <a:endParaRPr lang="en-US"/>
           </a:p>
@@ -816,7 +816,7 @@
           <a:p>
             <a:fld id="{466FE519-D025-4205-95BE-FAF045E3FBF1}" type="datetimeFigureOut">
               <a:rPr lang="en-US" smtClean="0"/>
-              <a:t>3/21/18</a:t>
+              <a:t>3/21/2018</a:t>
             </a:fld>
             <a:endParaRPr lang="en-US"/>
           </a:p>
@@ -1061,7 +1061,7 @@
           <a:p>
             <a:fld id="{466FE519-D025-4205-95BE-FAF045E3FBF1}" type="datetimeFigureOut">
               <a:rPr lang="en-US" smtClean="0"/>
-              <a:t>3/21/18</a:t>
+              <a:t>3/21/2018</a:t>
             </a:fld>
             <a:endParaRPr lang="en-US"/>
           </a:p>
@@ -1346,7 +1346,7 @@
           <a:p>
             <a:fld id="{466FE519-D025-4205-95BE-FAF045E3FBF1}" type="datetimeFigureOut">
               <a:rPr lang="en-US" smtClean="0"/>
-              <a:t>3/21/18</a:t>
+              <a:t>3/21/2018</a:t>
             </a:fld>
             <a:endParaRPr lang="en-US"/>
           </a:p>
@@ -1770,7 +1770,7 @@
           <a:p>
             <a:fld id="{466FE519-D025-4205-95BE-FAF045E3FBF1}" type="datetimeFigureOut">
               <a:rPr lang="en-US" smtClean="0"/>
-              <a:t>3/21/18</a:t>
+              <a:t>3/21/2018</a:t>
             </a:fld>
             <a:endParaRPr lang="en-US"/>
           </a:p>
@@ -1887,7 +1887,7 @@
           <a:p>
             <a:fld id="{466FE519-D025-4205-95BE-FAF045E3FBF1}" type="datetimeFigureOut">
               <a:rPr lang="en-US" smtClean="0"/>
-              <a:t>3/21/18</a:t>
+              <a:t>3/21/2018</a:t>
             </a:fld>
             <a:endParaRPr lang="en-US"/>
           </a:p>
@@ -1982,7 +1982,7 @@
           <a:p>
             <a:fld id="{466FE519-D025-4205-95BE-FAF045E3FBF1}" type="datetimeFigureOut">
               <a:rPr lang="en-US" smtClean="0"/>
-              <a:t>3/21/18</a:t>
+              <a:t>3/21/2018</a:t>
             </a:fld>
             <a:endParaRPr lang="en-US"/>
           </a:p>
@@ -2257,7 +2257,7 @@
           <a:p>
             <a:fld id="{466FE519-D025-4205-95BE-FAF045E3FBF1}" type="datetimeFigureOut">
               <a:rPr lang="en-US" smtClean="0"/>
-              <a:t>3/21/18</a:t>
+              <a:t>3/21/2018</a:t>
             </a:fld>
             <a:endParaRPr lang="en-US"/>
           </a:p>
@@ -2509,7 +2509,7 @@
           <a:p>
             <a:fld id="{466FE519-D025-4205-95BE-FAF045E3FBF1}" type="datetimeFigureOut">
               <a:rPr lang="en-US" smtClean="0"/>
-              <a:t>3/21/18</a:t>
+              <a:t>3/21/2018</a:t>
             </a:fld>
             <a:endParaRPr lang="en-US"/>
           </a:p>
@@ -2720,7 +2720,7 @@
           <a:p>
             <a:fld id="{466FE519-D025-4205-95BE-FAF045E3FBF1}" type="datetimeFigureOut">
               <a:rPr lang="en-US" smtClean="0"/>
-              <a:t>3/21/18</a:t>
+              <a:t>3/21/2018</a:t>
             </a:fld>
             <a:endParaRPr lang="en-US"/>
           </a:p>
@@ -4496,7 +4496,7 @@
           <p:nvPr/>
         </p:nvPicPr>
         <p:blipFill rotWithShape="1">
-          <a:blip r:embed="rId11">
+          <a:blip r:embed="rId11" cstate="print">
             <a:extLst>
               <a:ext uri="{28A0092B-C50C-407E-A947-70E740481C1C}">
                 <a14:useLocalDpi xmlns:a14="http://schemas.microsoft.com/office/drawing/2010/main" val="0"/>
@@ -4531,7 +4531,7 @@
           <p:cNvPr id="30" name="Rounded Rectangle 29">
             <a:extLst>
               <a:ext uri="{FF2B5EF4-FFF2-40B4-BE49-F238E27FC236}">
-                <a16:creationId xmlns:a16="http://schemas.microsoft.com/office/drawing/2014/main" xmlns="" id="{DE73C9F6-216E-804C-8ADB-FE5D010D3793}"/>
+                <a16:creationId xmlns="" xmlns:a16="http://schemas.microsoft.com/office/drawing/2014/main" id="{DE73C9F6-216E-804C-8ADB-FE5D010D3793}"/>
               </a:ext>
             </a:extLst>
           </p:cNvPr>
@@ -4584,7 +4584,7 @@
           <p:cNvPr id="32" name="Rectangle 31">
             <a:extLst>
               <a:ext uri="{FF2B5EF4-FFF2-40B4-BE49-F238E27FC236}">
-                <a16:creationId xmlns:a16="http://schemas.microsoft.com/office/drawing/2014/main" xmlns="" id="{496AC655-5F1F-DF43-A526-2752994F2936}"/>
+                <a16:creationId xmlns="" xmlns:a16="http://schemas.microsoft.com/office/drawing/2014/main" id="{496AC655-5F1F-DF43-A526-2752994F2936}"/>
               </a:ext>
             </a:extLst>
           </p:cNvPr>
@@ -4722,23 +4722,7 @@
                   <a:schemeClr val="bg1"/>
                 </a:solidFill>
               </a:rPr>
-              <a:t>action critic </a:t>
-            </a:r>
-            <a:r>
-              <a:rPr lang="en-US" sz="4800" smtClean="0">
-                <a:solidFill>
-                  <a:schemeClr val="bg1"/>
-                </a:solidFill>
-              </a:rPr>
-              <a:t>model</a:t>
-            </a:r>
-            <a:r>
-              <a:rPr lang="en-US" sz="4800" smtClean="0">
-                <a:solidFill>
-                  <a:schemeClr val="bg1"/>
-                </a:solidFill>
-              </a:rPr>
-              <a:t>.</a:t>
+              <a:t>action critic model.</a:t>
             </a:r>
             <a:endParaRPr lang="en-US" sz="4800" dirty="0">
               <a:solidFill>
@@ -4764,7 +4748,7 @@
           <p:cNvPr id="38" name="Rounded Rectangle 37">
             <a:extLst>
               <a:ext uri="{FF2B5EF4-FFF2-40B4-BE49-F238E27FC236}">
-                <a16:creationId xmlns:a16="http://schemas.microsoft.com/office/drawing/2014/main" xmlns="" id="{17388C3C-2703-2B4C-8E09-FE498740CCE4}"/>
+                <a16:creationId xmlns="" xmlns:a16="http://schemas.microsoft.com/office/drawing/2014/main" id="{17388C3C-2703-2B4C-8E09-FE498740CCE4}"/>
               </a:ext>
             </a:extLst>
           </p:cNvPr>
@@ -4817,7 +4801,7 @@
           <p:cNvPr id="39" name="Rectangle 38">
             <a:extLst>
               <a:ext uri="{FF2B5EF4-FFF2-40B4-BE49-F238E27FC236}">
-                <a16:creationId xmlns:a16="http://schemas.microsoft.com/office/drawing/2014/main" xmlns="" id="{A12D1386-A095-1243-8DEE-BD8E8AA74461}"/>
+                <a16:creationId xmlns="" xmlns:a16="http://schemas.microsoft.com/office/drawing/2014/main" id="{A12D1386-A095-1243-8DEE-BD8E8AA74461}"/>
               </a:ext>
             </a:extLst>
           </p:cNvPr>
@@ -4877,7 +4861,7 @@
           <p:cNvPr id="2" name="Table 1">
             <a:extLst>
               <a:ext uri="{FF2B5EF4-FFF2-40B4-BE49-F238E27FC236}">
-                <a16:creationId xmlns:a16="http://schemas.microsoft.com/office/drawing/2014/main" xmlns="" id="{AE5265D8-5D26-1745-9A48-35B200A3BD8B}"/>
+                <a16:creationId xmlns="" xmlns:a16="http://schemas.microsoft.com/office/drawing/2014/main" id="{AE5265D8-5D26-1745-9A48-35B200A3BD8B}"/>
               </a:ext>
             </a:extLst>
           </p:cNvPr>
@@ -4906,14 +4890,14 @@
                 <a:gridCol w="4904438">
                   <a:extLst>
                     <a:ext uri="{9D8B030D-6E8A-4147-A177-3AD203B41FA5}">
-                      <a16:colId xmlns:a16="http://schemas.microsoft.com/office/drawing/2014/main" xmlns="" val="1404240551"/>
+                      <a16:colId xmlns="" xmlns:a16="http://schemas.microsoft.com/office/drawing/2014/main" val="1404240551"/>
                     </a:ext>
                   </a:extLst>
                 </a:gridCol>
                 <a:gridCol w="4904438">
                   <a:extLst>
                     <a:ext uri="{9D8B030D-6E8A-4147-A177-3AD203B41FA5}">
-                      <a16:colId xmlns:a16="http://schemas.microsoft.com/office/drawing/2014/main" xmlns="" val="2303060108"/>
+                      <a16:colId xmlns="" xmlns:a16="http://schemas.microsoft.com/office/drawing/2014/main" val="2303060108"/>
                     </a:ext>
                   </a:extLst>
                 </a:gridCol>
@@ -4957,7 +4941,7 @@
                 </a:tc>
                 <a:extLst>
                   <a:ext uri="{0D108BD9-81ED-4DB2-BD59-A6C34878D82A}">
-                    <a16:rowId xmlns:a16="http://schemas.microsoft.com/office/drawing/2014/main" xmlns="" val="417556600"/>
+                    <a16:rowId xmlns="" xmlns:a16="http://schemas.microsoft.com/office/drawing/2014/main" val="417556600"/>
                   </a:ext>
                 </a:extLst>
               </a:tr>
@@ -5008,7 +4992,7 @@
                 </a:tc>
                 <a:extLst>
                   <a:ext uri="{0D108BD9-81ED-4DB2-BD59-A6C34878D82A}">
-                    <a16:rowId xmlns:a16="http://schemas.microsoft.com/office/drawing/2014/main" xmlns="" val="677520262"/>
+                    <a16:rowId xmlns="" xmlns:a16="http://schemas.microsoft.com/office/drawing/2014/main" val="677520262"/>
                   </a:ext>
                 </a:extLst>
               </a:tr>
@@ -5067,7 +5051,7 @@
                 </a:tc>
                 <a:extLst>
                   <a:ext uri="{0D108BD9-81ED-4DB2-BD59-A6C34878D82A}">
-                    <a16:rowId xmlns:a16="http://schemas.microsoft.com/office/drawing/2014/main" xmlns="" val="1684611308"/>
+                    <a16:rowId xmlns="" xmlns:a16="http://schemas.microsoft.com/office/drawing/2014/main" val="1684611308"/>
                   </a:ext>
                 </a:extLst>
               </a:tr>
@@ -5230,524 +5214,715 @@
           </a:p>
         </p:txBody>
       </p:sp>
+      <p:sp>
+        <p:nvSpPr>
+          <p:cNvPr id="50" name="TextBox 49"/>
+          <p:cNvSpPr txBox="1"/>
+          <p:nvPr/>
+        </p:nvSpPr>
+        <p:spPr>
+          <a:xfrm>
+            <a:off x="13884042" y="22045006"/>
+            <a:ext cx="2476500" cy="584775"/>
+          </a:xfrm>
+          <a:prstGeom prst="rect">
+            <a:avLst/>
+          </a:prstGeom>
+          <a:noFill/>
+        </p:spPr>
+        <p:txBody>
+          <a:bodyPr wrap="square" rtlCol="0">
+            <a:spAutoFit/>
+          </a:bodyPr>
+          <a:lstStyle/>
+          <a:p>
+            <a:pPr algn="ctr"/>
+            <a:r>
+              <a:rPr lang="en-US" sz="3200" dirty="0" smtClean="0">
+                <a:solidFill>
+                  <a:schemeClr val="bg1"/>
+                </a:solidFill>
+              </a:rPr>
+              <a:t>Selected</a:t>
+            </a:r>
+            <a:endParaRPr lang="en-US" sz="3200" dirty="0">
+              <a:solidFill>
+                <a:schemeClr val="bg1"/>
+              </a:solidFill>
+            </a:endParaRPr>
+          </a:p>
+        </p:txBody>
+      </p:sp>
+      <p:sp>
+        <p:nvSpPr>
+          <p:cNvPr id="52" name="TextBox 51"/>
+          <p:cNvSpPr txBox="1"/>
+          <p:nvPr/>
+        </p:nvSpPr>
+        <p:spPr>
+          <a:xfrm>
+            <a:off x="16998175" y="22045005"/>
+            <a:ext cx="2476500" cy="584775"/>
+          </a:xfrm>
+          <a:prstGeom prst="rect">
+            <a:avLst/>
+          </a:prstGeom>
+          <a:noFill/>
+        </p:spPr>
+        <p:txBody>
+          <a:bodyPr wrap="square" rtlCol="0">
+            <a:spAutoFit/>
+          </a:bodyPr>
+          <a:lstStyle/>
+          <a:p>
+            <a:pPr algn="ctr"/>
+            <a:r>
+              <a:rPr lang="en-US" sz="3200" dirty="0" smtClean="0">
+                <a:solidFill>
+                  <a:schemeClr val="bg1"/>
+                </a:solidFill>
+              </a:rPr>
+              <a:t>Hit Points</a:t>
+            </a:r>
+            <a:endParaRPr lang="en-US" sz="3200" dirty="0">
+              <a:solidFill>
+                <a:schemeClr val="bg1"/>
+              </a:solidFill>
+            </a:endParaRPr>
+          </a:p>
+        </p:txBody>
+      </p:sp>
+      <p:sp>
+        <p:nvSpPr>
+          <p:cNvPr id="54" name="TextBox 53"/>
+          <p:cNvSpPr txBox="1"/>
+          <p:nvPr/>
+        </p:nvSpPr>
+        <p:spPr>
+          <a:xfrm>
+            <a:off x="21947124" y="18805853"/>
+            <a:ext cx="2476500" cy="584775"/>
+          </a:xfrm>
+          <a:prstGeom prst="rect">
+            <a:avLst/>
+          </a:prstGeom>
+          <a:noFill/>
+        </p:spPr>
+        <p:txBody>
+          <a:bodyPr wrap="square" rtlCol="0">
+            <a:spAutoFit/>
+          </a:bodyPr>
+          <a:lstStyle/>
+          <a:p>
+            <a:pPr algn="ctr"/>
+            <a:r>
+              <a:rPr lang="en-US" sz="3200" dirty="0" smtClean="0">
+                <a:solidFill>
+                  <a:schemeClr val="bg1"/>
+                </a:solidFill>
+              </a:rPr>
+              <a:t>Height Map</a:t>
+            </a:r>
+            <a:endParaRPr lang="en-US" sz="3200" dirty="0">
+              <a:solidFill>
+                <a:schemeClr val="bg1"/>
+              </a:solidFill>
+            </a:endParaRPr>
+          </a:p>
+        </p:txBody>
+      </p:sp>
+      <p:sp>
+        <p:nvSpPr>
+          <p:cNvPr id="56" name="TextBox 55"/>
+          <p:cNvSpPr txBox="1"/>
+          <p:nvPr/>
+        </p:nvSpPr>
+        <p:spPr>
+          <a:xfrm>
+            <a:off x="24912930" y="18805852"/>
+            <a:ext cx="2476500" cy="584775"/>
+          </a:xfrm>
+          <a:prstGeom prst="rect">
+            <a:avLst/>
+          </a:prstGeom>
+          <a:noFill/>
+        </p:spPr>
+        <p:txBody>
+          <a:bodyPr wrap="square" rtlCol="0">
+            <a:spAutoFit/>
+          </a:bodyPr>
+          <a:lstStyle/>
+          <a:p>
+            <a:pPr algn="ctr"/>
+            <a:r>
+              <a:rPr lang="en-US" sz="3200" dirty="0" smtClean="0">
+                <a:solidFill>
+                  <a:schemeClr val="bg1"/>
+                </a:solidFill>
+              </a:rPr>
+              <a:t>Visibility</a:t>
+            </a:r>
+            <a:endParaRPr lang="en-US" sz="3200" dirty="0">
+              <a:solidFill>
+                <a:schemeClr val="bg1"/>
+              </a:solidFill>
+            </a:endParaRPr>
+          </a:p>
+        </p:txBody>
+      </p:sp>
+      <p:sp>
+        <p:nvSpPr>
+          <p:cNvPr id="58" name="TextBox 57"/>
+          <p:cNvSpPr txBox="1"/>
+          <p:nvPr/>
+        </p:nvSpPr>
+        <p:spPr>
+          <a:xfrm>
+            <a:off x="27894046" y="18805851"/>
+            <a:ext cx="2476500" cy="584775"/>
+          </a:xfrm>
+          <a:prstGeom prst="rect">
+            <a:avLst/>
+          </a:prstGeom>
+          <a:noFill/>
+        </p:spPr>
+        <p:txBody>
+          <a:bodyPr wrap="square" rtlCol="0">
+            <a:spAutoFit/>
+          </a:bodyPr>
+          <a:lstStyle/>
+          <a:p>
+            <a:pPr algn="ctr"/>
+            <a:r>
+              <a:rPr lang="en-US" sz="3200" dirty="0" smtClean="0">
+                <a:solidFill>
+                  <a:schemeClr val="bg1"/>
+                </a:solidFill>
+              </a:rPr>
+              <a:t>Creep</a:t>
+            </a:r>
+            <a:endParaRPr lang="en-US" sz="3200" dirty="0">
+              <a:solidFill>
+                <a:schemeClr val="bg1"/>
+              </a:solidFill>
+            </a:endParaRPr>
+          </a:p>
+        </p:txBody>
+      </p:sp>
+      <p:sp>
+        <p:nvSpPr>
+          <p:cNvPr id="60" name="TextBox 59"/>
+          <p:cNvSpPr txBox="1"/>
+          <p:nvPr/>
+        </p:nvSpPr>
+        <p:spPr>
+          <a:xfrm>
+            <a:off x="23176751" y="22053103"/>
+            <a:ext cx="2672861" cy="584775"/>
+          </a:xfrm>
+          <a:prstGeom prst="rect">
+            <a:avLst/>
+          </a:prstGeom>
+          <a:noFill/>
+        </p:spPr>
+        <p:txBody>
+          <a:bodyPr wrap="square" rtlCol="0">
+            <a:spAutoFit/>
+          </a:bodyPr>
+          <a:lstStyle/>
+          <a:p>
+            <a:pPr algn="ctr"/>
+            <a:r>
+              <a:rPr lang="en-US" sz="3200" dirty="0" smtClean="0">
+                <a:solidFill>
+                  <a:schemeClr val="bg1"/>
+                </a:solidFill>
+              </a:rPr>
+              <a:t>Player Relative</a:t>
+            </a:r>
+            <a:endParaRPr lang="en-US" sz="3200" dirty="0">
+              <a:solidFill>
+                <a:schemeClr val="bg1"/>
+              </a:solidFill>
+            </a:endParaRPr>
+          </a:p>
+        </p:txBody>
+      </p:sp>
+      <p:sp>
+        <p:nvSpPr>
+          <p:cNvPr id="62" name="TextBox 61"/>
+          <p:cNvSpPr txBox="1"/>
+          <p:nvPr/>
+        </p:nvSpPr>
+        <p:spPr>
+          <a:xfrm>
+            <a:off x="26496442" y="22038783"/>
+            <a:ext cx="2476500" cy="584775"/>
+          </a:xfrm>
+          <a:prstGeom prst="rect">
+            <a:avLst/>
+          </a:prstGeom>
+          <a:noFill/>
+        </p:spPr>
+        <p:txBody>
+          <a:bodyPr wrap="square" rtlCol="0">
+            <a:spAutoFit/>
+          </a:bodyPr>
+          <a:lstStyle/>
+          <a:p>
+            <a:pPr algn="ctr"/>
+            <a:r>
+              <a:rPr lang="en-US" sz="3200" dirty="0" smtClean="0">
+                <a:solidFill>
+                  <a:schemeClr val="bg1"/>
+                </a:solidFill>
+              </a:rPr>
+              <a:t>Selected</a:t>
+            </a:r>
+            <a:endParaRPr lang="en-US" sz="3200" dirty="0">
+              <a:solidFill>
+                <a:schemeClr val="bg1"/>
+              </a:solidFill>
+            </a:endParaRPr>
+          </a:p>
+        </p:txBody>
+      </p:sp>
+      <p:sp>
+        <p:nvSpPr>
+          <p:cNvPr id="9" name="TextBox 8"/>
+          <p:cNvSpPr txBox="1"/>
+          <p:nvPr/>
+        </p:nvSpPr>
+        <p:spPr>
+          <a:xfrm>
+            <a:off x="15087600" y="17830800"/>
+            <a:ext cx="3352800" cy="769441"/>
+          </a:xfrm>
+          <a:prstGeom prst="rect">
+            <a:avLst/>
+          </a:prstGeom>
+          <a:noFill/>
+        </p:spPr>
+        <p:txBody>
+          <a:bodyPr wrap="square" rtlCol="0">
+            <a:spAutoFit/>
+          </a:bodyPr>
+          <a:lstStyle/>
+          <a:p>
+            <a:r>
+              <a:rPr lang="en-US" sz="4400" smtClean="0">
+                <a:solidFill>
+                  <a:schemeClr val="bg1"/>
+                </a:solidFill>
+              </a:rPr>
+              <a:t>Screen Layers</a:t>
+            </a:r>
+            <a:endParaRPr lang="en-US" sz="4400" dirty="0">
+              <a:solidFill>
+                <a:schemeClr val="bg1"/>
+              </a:solidFill>
+            </a:endParaRPr>
+          </a:p>
+        </p:txBody>
+      </p:sp>
+      <p:sp>
+        <p:nvSpPr>
+          <p:cNvPr id="63" name="TextBox 62"/>
+          <p:cNvSpPr txBox="1"/>
+          <p:nvPr/>
+        </p:nvSpPr>
+        <p:spPr>
+          <a:xfrm>
+            <a:off x="23602711" y="17744255"/>
+            <a:ext cx="4741714" cy="769441"/>
+          </a:xfrm>
+          <a:prstGeom prst="rect">
+            <a:avLst/>
+          </a:prstGeom>
+          <a:noFill/>
+        </p:spPr>
+        <p:txBody>
+          <a:bodyPr wrap="square" rtlCol="0">
+            <a:spAutoFit/>
+          </a:bodyPr>
+          <a:lstStyle/>
+          <a:p>
+            <a:pPr algn="ctr"/>
+            <a:r>
+              <a:rPr lang="en-US" sz="4400" dirty="0" smtClean="0">
+                <a:solidFill>
+                  <a:schemeClr val="bg1"/>
+                </a:solidFill>
+              </a:rPr>
+              <a:t>Minimap Layers</a:t>
+            </a:r>
+            <a:endParaRPr lang="en-US" sz="4400" dirty="0">
+              <a:solidFill>
+                <a:schemeClr val="bg1"/>
+              </a:solidFill>
+            </a:endParaRPr>
+          </a:p>
+        </p:txBody>
+      </p:sp>
       <p:pic>
         <p:nvPicPr>
-          <p:cNvPr id="48" name="Picture 47"/>
+          <p:cNvPr id="3" name="Picture 2"/>
           <p:cNvPicPr>
             <a:picLocks noChangeAspect="1"/>
           </p:cNvPicPr>
           <p:nvPr/>
         </p:nvPicPr>
         <p:blipFill>
-          <a:blip r:embed="rId13"/>
+          <a:blip r:embed="rId14">
+            <a:extLst>
+              <a:ext uri="{28A0092B-C50C-407E-A947-70E740481C1C}">
+                <a14:useLocalDpi xmlns:a14="http://schemas.microsoft.com/office/drawing/2010/main" val="0"/>
+              </a:ext>
+            </a:extLst>
+          </a:blip>
           <a:stretch>
             <a:fillRect/>
           </a:stretch>
         </p:blipFill>
         <p:spPr>
           <a:xfrm>
-            <a:off x="13884042" y="22645282"/>
-            <a:ext cx="2476500" cy="2476500"/>
+            <a:off x="13882518" y="19406129"/>
+            <a:ext cx="2478024" cy="2478024"/>
           </a:xfrm>
           <a:prstGeom prst="rect">
             <a:avLst/>
           </a:prstGeom>
         </p:spPr>
       </p:pic>
-      <p:sp>
-        <p:nvSpPr>
-          <p:cNvPr id="50" name="TextBox 49"/>
-          <p:cNvSpPr txBox="1"/>
+      <p:pic>
+        <p:nvPicPr>
+          <p:cNvPr id="4" name="Picture 3"/>
+          <p:cNvPicPr>
+            <a:picLocks/>
+          </p:cNvPicPr>
           <p:nvPr/>
-        </p:nvSpPr>
-        <p:spPr>
-          <a:xfrm>
-            <a:off x="13884042" y="22045006"/>
-            <a:ext cx="2476500" cy="584775"/>
+        </p:nvPicPr>
+        <p:blipFill rotWithShape="1">
+          <a:blip r:embed="rId15">
+            <a:extLst>
+              <a:ext uri="{28A0092B-C50C-407E-A947-70E740481C1C}">
+                <a14:useLocalDpi xmlns:a14="http://schemas.microsoft.com/office/drawing/2010/main" val="0"/>
+              </a:ext>
+            </a:extLst>
+          </a:blip>
+          <a:srcRect t="1388"/>
+          <a:stretch/>
+        </p:blipFill>
+        <p:spPr>
+          <a:xfrm>
+            <a:off x="16998280" y="19440525"/>
+            <a:ext cx="2478024" cy="2443628"/>
           </a:xfrm>
           <a:prstGeom prst="rect">
             <a:avLst/>
           </a:prstGeom>
-          <a:noFill/>
-        </p:spPr>
-        <p:txBody>
-          <a:bodyPr wrap="square" rtlCol="0">
-            <a:spAutoFit/>
-          </a:bodyPr>
-          <a:lstStyle/>
-          <a:p>
-            <a:pPr algn="ctr"/>
-            <a:r>
-              <a:rPr lang="en-US" sz="3200" dirty="0" smtClean="0">
-                <a:solidFill>
-                  <a:schemeClr val="bg1"/>
-                </a:solidFill>
-              </a:rPr>
-              <a:t>Selected</a:t>
-            </a:r>
-            <a:endParaRPr lang="en-US" sz="3200" dirty="0">
-              <a:solidFill>
-                <a:schemeClr val="bg1"/>
-              </a:solidFill>
-            </a:endParaRPr>
-          </a:p>
-        </p:txBody>
-      </p:sp>
+        </p:spPr>
+      </p:pic>
       <p:pic>
         <p:nvPicPr>
-          <p:cNvPr id="51" name="Picture 50"/>
+          <p:cNvPr id="5" name="Picture 4"/>
+          <p:cNvPicPr>
+            <a:picLocks/>
+          </p:cNvPicPr>
+          <p:nvPr/>
+        </p:nvPicPr>
+        <p:blipFill>
+          <a:blip r:embed="rId16">
+            <a:extLst>
+              <a:ext uri="{28A0092B-C50C-407E-A947-70E740481C1C}">
+                <a14:useLocalDpi xmlns:a14="http://schemas.microsoft.com/office/drawing/2010/main" val="0"/>
+              </a:ext>
+            </a:extLst>
+          </a:blip>
+          <a:stretch>
+            <a:fillRect/>
+          </a:stretch>
+        </p:blipFill>
+        <p:spPr>
+          <a:xfrm>
+            <a:off x="13884042" y="22631400"/>
+            <a:ext cx="2478024" cy="2478024"/>
+          </a:xfrm>
+          <a:prstGeom prst="rect">
+            <a:avLst/>
+          </a:prstGeom>
+        </p:spPr>
+      </p:pic>
+      <p:pic>
+        <p:nvPicPr>
+          <p:cNvPr id="10" name="Picture 9"/>
+          <p:cNvPicPr>
+            <a:picLocks/>
+          </p:cNvPicPr>
+          <p:nvPr/>
+        </p:nvPicPr>
+        <p:blipFill>
+          <a:blip r:embed="rId17">
+            <a:extLst>
+              <a:ext uri="{28A0092B-C50C-407E-A947-70E740481C1C}">
+                <a14:useLocalDpi xmlns:a14="http://schemas.microsoft.com/office/drawing/2010/main" val="0"/>
+              </a:ext>
+            </a:extLst>
+          </a:blip>
+          <a:stretch>
+            <a:fillRect/>
+          </a:stretch>
+        </p:blipFill>
+        <p:spPr>
+          <a:xfrm>
+            <a:off x="16996651" y="22629781"/>
+            <a:ext cx="2478024" cy="2478024"/>
+          </a:xfrm>
+          <a:prstGeom prst="rect">
+            <a:avLst/>
+          </a:prstGeom>
+        </p:spPr>
+      </p:pic>
+      <p:pic>
+        <p:nvPicPr>
+          <p:cNvPr id="11" name="Picture 10"/>
+          <p:cNvPicPr>
+            <a:picLocks/>
+          </p:cNvPicPr>
+          <p:nvPr/>
+        </p:nvPicPr>
+        <p:blipFill>
+          <a:blip r:embed="rId18">
+            <a:extLst>
+              <a:ext uri="{28A0092B-C50C-407E-A947-70E740481C1C}">
+                <a14:useLocalDpi xmlns:a14="http://schemas.microsoft.com/office/drawing/2010/main" val="0"/>
+              </a:ext>
+            </a:extLst>
+          </a:blip>
+          <a:stretch>
+            <a:fillRect/>
+          </a:stretch>
+        </p:blipFill>
+        <p:spPr>
+          <a:xfrm>
+            <a:off x="16998280" y="19406129"/>
+            <a:ext cx="2478024" cy="2478024"/>
+          </a:xfrm>
+          <a:prstGeom prst="rect">
+            <a:avLst/>
+          </a:prstGeom>
+        </p:spPr>
+      </p:pic>
+      <p:pic>
+        <p:nvPicPr>
+          <p:cNvPr id="64" name="Picture 63"/>
           <p:cNvPicPr>
             <a:picLocks noChangeAspect="1"/>
           </p:cNvPicPr>
           <p:nvPr/>
         </p:nvPicPr>
         <p:blipFill>
-          <a:blip r:embed="rId13"/>
+          <a:blip r:embed="rId14">
+            <a:extLst>
+              <a:ext uri="{28A0092B-C50C-407E-A947-70E740481C1C}">
+                <a14:useLocalDpi xmlns:a14="http://schemas.microsoft.com/office/drawing/2010/main" val="0"/>
+              </a:ext>
+            </a:extLst>
+          </a:blip>
           <a:stretch>
             <a:fillRect/>
           </a:stretch>
         </p:blipFill>
         <p:spPr>
           <a:xfrm>
-            <a:off x="16998175" y="22736417"/>
-            <a:ext cx="2476500" cy="2476500"/>
+            <a:off x="13884042" y="22631400"/>
+            <a:ext cx="2478024" cy="2478024"/>
           </a:xfrm>
           <a:prstGeom prst="rect">
             <a:avLst/>
           </a:prstGeom>
         </p:spPr>
       </p:pic>
-      <p:sp>
-        <p:nvSpPr>
-          <p:cNvPr id="52" name="TextBox 51"/>
-          <p:cNvSpPr txBox="1"/>
-          <p:nvPr/>
-        </p:nvSpPr>
-        <p:spPr>
-          <a:xfrm>
-            <a:off x="16998175" y="22136141"/>
-            <a:ext cx="2476500" cy="584775"/>
-          </a:xfrm>
-          <a:prstGeom prst="rect">
-            <a:avLst/>
-          </a:prstGeom>
-          <a:noFill/>
-        </p:spPr>
-        <p:txBody>
-          <a:bodyPr wrap="square" rtlCol="0">
-            <a:spAutoFit/>
-          </a:bodyPr>
-          <a:lstStyle/>
-          <a:p>
-            <a:pPr algn="ctr"/>
-            <a:r>
-              <a:rPr lang="en-US" sz="3200" dirty="0" smtClean="0">
-                <a:solidFill>
-                  <a:schemeClr val="bg1"/>
-                </a:solidFill>
-              </a:rPr>
-              <a:t>Hit Points</a:t>
-            </a:r>
-            <a:endParaRPr lang="en-US" sz="3200" dirty="0">
-              <a:solidFill>
-                <a:schemeClr val="bg1"/>
-              </a:solidFill>
-            </a:endParaRPr>
-          </a:p>
-        </p:txBody>
-      </p:sp>
       <p:pic>
         <p:nvPicPr>
-          <p:cNvPr id="53" name="Picture 52"/>
+          <p:cNvPr id="12" name="Picture 11"/>
           <p:cNvPicPr>
             <a:picLocks noChangeAspect="1"/>
           </p:cNvPicPr>
           <p:nvPr/>
         </p:nvPicPr>
         <p:blipFill>
-          <a:blip r:embed="rId13"/>
+          <a:blip r:embed="rId19">
+            <a:extLst>
+              <a:ext uri="{28A0092B-C50C-407E-A947-70E740481C1C}">
+                <a14:useLocalDpi xmlns:a14="http://schemas.microsoft.com/office/drawing/2010/main" val="0"/>
+              </a:ext>
+            </a:extLst>
+          </a:blip>
           <a:stretch>
             <a:fillRect/>
           </a:stretch>
         </p:blipFill>
         <p:spPr>
           <a:xfrm>
-            <a:off x="21908954" y="19323091"/>
-            <a:ext cx="2476500" cy="2476500"/>
+            <a:off x="22004677" y="19390628"/>
+            <a:ext cx="2478024" cy="2478024"/>
           </a:xfrm>
           <a:prstGeom prst="rect">
             <a:avLst/>
           </a:prstGeom>
         </p:spPr>
       </p:pic>
-      <p:sp>
-        <p:nvSpPr>
-          <p:cNvPr id="54" name="TextBox 53"/>
-          <p:cNvSpPr txBox="1"/>
+      <p:pic>
+        <p:nvPicPr>
+          <p:cNvPr id="13" name="Picture 12"/>
+          <p:cNvPicPr>
+            <a:picLocks/>
+          </p:cNvPicPr>
           <p:nvPr/>
-        </p:nvSpPr>
-        <p:spPr>
-          <a:xfrm>
-            <a:off x="21908954" y="18722815"/>
-            <a:ext cx="2476500" cy="584775"/>
+        </p:nvPicPr>
+        <p:blipFill>
+          <a:blip r:embed="rId20">
+            <a:extLst>
+              <a:ext uri="{28A0092B-C50C-407E-A947-70E740481C1C}">
+                <a14:useLocalDpi xmlns:a14="http://schemas.microsoft.com/office/drawing/2010/main" val="0"/>
+              </a:ext>
+            </a:extLst>
+          </a:blip>
+          <a:stretch>
+            <a:fillRect/>
+          </a:stretch>
+        </p:blipFill>
+        <p:spPr>
+          <a:xfrm>
+            <a:off x="22004677" y="19390626"/>
+            <a:ext cx="2478024" cy="2478024"/>
           </a:xfrm>
           <a:prstGeom prst="rect">
             <a:avLst/>
           </a:prstGeom>
-          <a:noFill/>
-        </p:spPr>
-        <p:txBody>
-          <a:bodyPr wrap="square" rtlCol="0">
-            <a:spAutoFit/>
-          </a:bodyPr>
-          <a:lstStyle/>
-          <a:p>
-            <a:pPr algn="ctr"/>
-            <a:r>
-              <a:rPr lang="en-US" sz="3200" dirty="0" smtClean="0">
-                <a:solidFill>
-                  <a:schemeClr val="bg1"/>
-                </a:solidFill>
-              </a:rPr>
-              <a:t>Height Map</a:t>
-            </a:r>
-            <a:endParaRPr lang="en-US" sz="3200" dirty="0">
-              <a:solidFill>
-                <a:schemeClr val="bg1"/>
-              </a:solidFill>
-            </a:endParaRPr>
-          </a:p>
-        </p:txBody>
-      </p:sp>
+        </p:spPr>
+      </p:pic>
       <p:pic>
         <p:nvPicPr>
-          <p:cNvPr id="55" name="Picture 54"/>
+          <p:cNvPr id="15" name="Picture 14"/>
           <p:cNvPicPr>
             <a:picLocks noChangeAspect="1"/>
           </p:cNvPicPr>
           <p:nvPr/>
         </p:nvPicPr>
         <p:blipFill>
-          <a:blip r:embed="rId13"/>
+          <a:blip r:embed="rId21">
+            <a:extLst>
+              <a:ext uri="{28A0092B-C50C-407E-A947-70E740481C1C}">
+                <a14:useLocalDpi xmlns:a14="http://schemas.microsoft.com/office/drawing/2010/main" val="0"/>
+              </a:ext>
+            </a:extLst>
+          </a:blip>
           <a:stretch>
             <a:fillRect/>
           </a:stretch>
         </p:blipFill>
         <p:spPr>
           <a:xfrm>
-            <a:off x="24912930" y="19323091"/>
-            <a:ext cx="2476500" cy="2476500"/>
+            <a:off x="24960306" y="19390626"/>
+            <a:ext cx="2478024" cy="2478024"/>
           </a:xfrm>
           <a:prstGeom prst="rect">
             <a:avLst/>
           </a:prstGeom>
         </p:spPr>
       </p:pic>
-      <p:sp>
-        <p:nvSpPr>
-          <p:cNvPr id="56" name="TextBox 55"/>
-          <p:cNvSpPr txBox="1"/>
+      <p:pic>
+        <p:nvPicPr>
+          <p:cNvPr id="18" name="Picture 17"/>
+          <p:cNvPicPr>
+            <a:picLocks/>
+          </p:cNvPicPr>
           <p:nvPr/>
-        </p:nvSpPr>
-        <p:spPr>
-          <a:xfrm>
-            <a:off x="24912930" y="18722815"/>
-            <a:ext cx="2476500" cy="584775"/>
+        </p:nvPicPr>
+        <p:blipFill>
+          <a:blip r:embed="rId22">
+            <a:extLst>
+              <a:ext uri="{28A0092B-C50C-407E-A947-70E740481C1C}">
+                <a14:useLocalDpi xmlns:a14="http://schemas.microsoft.com/office/drawing/2010/main" val="0"/>
+              </a:ext>
+            </a:extLst>
+          </a:blip>
+          <a:stretch>
+            <a:fillRect/>
+          </a:stretch>
+        </p:blipFill>
+        <p:spPr>
+          <a:xfrm>
+            <a:off x="27894046" y="19390628"/>
+            <a:ext cx="2478024" cy="2478024"/>
           </a:xfrm>
           <a:prstGeom prst="rect">
             <a:avLst/>
           </a:prstGeom>
-          <a:noFill/>
-        </p:spPr>
-        <p:txBody>
-          <a:bodyPr wrap="square" rtlCol="0">
-            <a:spAutoFit/>
-          </a:bodyPr>
-          <a:lstStyle/>
-          <a:p>
-            <a:pPr algn="ctr"/>
-            <a:r>
-              <a:rPr lang="en-US" sz="3200" dirty="0" smtClean="0">
-                <a:solidFill>
-                  <a:schemeClr val="bg1"/>
-                </a:solidFill>
-              </a:rPr>
-              <a:t>Visibility</a:t>
-            </a:r>
-            <a:endParaRPr lang="en-US" sz="3200" dirty="0">
-              <a:solidFill>
-                <a:schemeClr val="bg1"/>
-              </a:solidFill>
-            </a:endParaRPr>
-          </a:p>
-        </p:txBody>
-      </p:sp>
+        </p:spPr>
+      </p:pic>
       <p:pic>
         <p:nvPicPr>
-          <p:cNvPr id="57" name="Picture 56"/>
+          <p:cNvPr id="21" name="Picture 20"/>
           <p:cNvPicPr>
             <a:picLocks noChangeAspect="1"/>
           </p:cNvPicPr>
           <p:nvPr/>
         </p:nvPicPr>
         <p:blipFill>
-          <a:blip r:embed="rId13"/>
+          <a:blip r:embed="rId23">
+            <a:extLst>
+              <a:ext uri="{28A0092B-C50C-407E-A947-70E740481C1C}">
+                <a14:useLocalDpi xmlns:a14="http://schemas.microsoft.com/office/drawing/2010/main" val="0"/>
+              </a:ext>
+            </a:extLst>
+          </a:blip>
           <a:stretch>
             <a:fillRect/>
           </a:stretch>
         </p:blipFill>
         <p:spPr>
           <a:xfrm>
-            <a:off x="27916906" y="19323091"/>
-            <a:ext cx="2476500" cy="2476500"/>
+            <a:off x="23274169" y="22631400"/>
+            <a:ext cx="2478024" cy="2478024"/>
           </a:xfrm>
           <a:prstGeom prst="rect">
             <a:avLst/>
           </a:prstGeom>
         </p:spPr>
       </p:pic>
-      <p:sp>
-        <p:nvSpPr>
-          <p:cNvPr id="58" name="TextBox 57"/>
-          <p:cNvSpPr txBox="1"/>
-          <p:nvPr/>
-        </p:nvSpPr>
-        <p:spPr>
-          <a:xfrm>
-            <a:off x="27916906" y="18722815"/>
-            <a:ext cx="2476500" cy="584775"/>
-          </a:xfrm>
-          <a:prstGeom prst="rect">
-            <a:avLst/>
-          </a:prstGeom>
-          <a:noFill/>
-        </p:spPr>
-        <p:txBody>
-          <a:bodyPr wrap="square" rtlCol="0">
-            <a:spAutoFit/>
-          </a:bodyPr>
-          <a:lstStyle/>
-          <a:p>
-            <a:pPr algn="ctr"/>
-            <a:r>
-              <a:rPr lang="en-US" sz="3200" dirty="0" smtClean="0">
-                <a:solidFill>
-                  <a:schemeClr val="bg1"/>
-                </a:solidFill>
-              </a:rPr>
-              <a:t>Creep</a:t>
-            </a:r>
-            <a:endParaRPr lang="en-US" sz="3200" dirty="0">
-              <a:solidFill>
-                <a:schemeClr val="bg1"/>
-              </a:solidFill>
-            </a:endParaRPr>
-          </a:p>
-        </p:txBody>
-      </p:sp>
       <p:pic>
         <p:nvPicPr>
-          <p:cNvPr id="59" name="Picture 58"/>
+          <p:cNvPr id="23" name="Picture 22"/>
           <p:cNvPicPr>
-            <a:picLocks noChangeAspect="1"/>
+            <a:picLocks/>
           </p:cNvPicPr>
           <p:nvPr/>
         </p:nvPicPr>
         <p:blipFill>
-          <a:blip r:embed="rId13"/>
+          <a:blip r:embed="rId24">
+            <a:extLst>
+              <a:ext uri="{28A0092B-C50C-407E-A947-70E740481C1C}">
+                <a14:useLocalDpi xmlns:a14="http://schemas.microsoft.com/office/drawing/2010/main" val="0"/>
+              </a:ext>
+            </a:extLst>
+          </a:blip>
           <a:stretch>
             <a:fillRect/>
           </a:stretch>
         </p:blipFill>
         <p:spPr>
           <a:xfrm>
-            <a:off x="23314990" y="22653379"/>
-            <a:ext cx="2476500" cy="2476500"/>
+            <a:off x="26494918" y="22631400"/>
+            <a:ext cx="2478024" cy="2478024"/>
           </a:xfrm>
           <a:prstGeom prst="rect">
             <a:avLst/>
           </a:prstGeom>
         </p:spPr>
       </p:pic>
-      <p:sp>
-        <p:nvSpPr>
-          <p:cNvPr id="60" name="TextBox 59"/>
-          <p:cNvSpPr txBox="1"/>
-          <p:nvPr/>
-        </p:nvSpPr>
-        <p:spPr>
-          <a:xfrm>
-            <a:off x="23176751" y="22053103"/>
-            <a:ext cx="2672861" cy="584775"/>
-          </a:xfrm>
-          <a:prstGeom prst="rect">
-            <a:avLst/>
-          </a:prstGeom>
-          <a:noFill/>
-        </p:spPr>
-        <p:txBody>
-          <a:bodyPr wrap="square" rtlCol="0">
-            <a:spAutoFit/>
-          </a:bodyPr>
-          <a:lstStyle/>
-          <a:p>
-            <a:pPr algn="ctr"/>
-            <a:r>
-              <a:rPr lang="en-US" sz="3200" dirty="0" smtClean="0">
-                <a:solidFill>
-                  <a:schemeClr val="bg1"/>
-                </a:solidFill>
-              </a:rPr>
-              <a:t>Player Relative</a:t>
-            </a:r>
-            <a:endParaRPr lang="en-US" sz="3200" dirty="0">
-              <a:solidFill>
-                <a:schemeClr val="bg1"/>
-              </a:solidFill>
-            </a:endParaRPr>
-          </a:p>
-        </p:txBody>
-      </p:sp>
-      <p:pic>
-        <p:nvPicPr>
-          <p:cNvPr id="61" name="Picture 60"/>
-          <p:cNvPicPr>
-            <a:picLocks noChangeAspect="1"/>
-          </p:cNvPicPr>
-          <p:nvPr/>
-        </p:nvPicPr>
-        <p:blipFill>
-          <a:blip r:embed="rId13"/>
-          <a:stretch>
-            <a:fillRect/>
-          </a:stretch>
-        </p:blipFill>
-        <p:spPr>
-          <a:xfrm>
-            <a:off x="26496442" y="22668625"/>
-            <a:ext cx="2476500" cy="2476500"/>
-          </a:xfrm>
-          <a:prstGeom prst="rect">
-            <a:avLst/>
-          </a:prstGeom>
-        </p:spPr>
-      </p:pic>
-      <p:sp>
-        <p:nvSpPr>
-          <p:cNvPr id="62" name="TextBox 61"/>
-          <p:cNvSpPr txBox="1"/>
-          <p:nvPr/>
-        </p:nvSpPr>
-        <p:spPr>
-          <a:xfrm>
-            <a:off x="26496442" y="22068349"/>
-            <a:ext cx="2476500" cy="584775"/>
-          </a:xfrm>
-          <a:prstGeom prst="rect">
-            <a:avLst/>
-          </a:prstGeom>
-          <a:noFill/>
-        </p:spPr>
-        <p:txBody>
-          <a:bodyPr wrap="square" rtlCol="0">
-            <a:spAutoFit/>
-          </a:bodyPr>
-          <a:lstStyle/>
-          <a:p>
-            <a:pPr algn="ctr"/>
-            <a:r>
-              <a:rPr lang="en-US" sz="3200" dirty="0" smtClean="0">
-                <a:solidFill>
-                  <a:schemeClr val="bg1"/>
-                </a:solidFill>
-              </a:rPr>
-              <a:t>Selected</a:t>
-            </a:r>
-            <a:endParaRPr lang="en-US" sz="3200" dirty="0">
-              <a:solidFill>
-                <a:schemeClr val="bg1"/>
-              </a:solidFill>
-            </a:endParaRPr>
-          </a:p>
-        </p:txBody>
-      </p:sp>
-      <p:sp>
-        <p:nvSpPr>
-          <p:cNvPr id="9" name="TextBox 8"/>
-          <p:cNvSpPr txBox="1"/>
-          <p:nvPr/>
-        </p:nvSpPr>
-        <p:spPr>
-          <a:xfrm>
-            <a:off x="15087600" y="17830800"/>
-            <a:ext cx="3352800" cy="769441"/>
-          </a:xfrm>
-          <a:prstGeom prst="rect">
-            <a:avLst/>
-          </a:prstGeom>
-          <a:noFill/>
-        </p:spPr>
-        <p:txBody>
-          <a:bodyPr wrap="square" rtlCol="0">
-            <a:spAutoFit/>
-          </a:bodyPr>
-          <a:lstStyle/>
-          <a:p>
-            <a:r>
-              <a:rPr lang="en-US" sz="4400" smtClean="0">
-                <a:solidFill>
-                  <a:schemeClr val="bg1"/>
-                </a:solidFill>
-              </a:rPr>
-              <a:t>Screen Layers</a:t>
-            </a:r>
-            <a:endParaRPr lang="en-US" sz="4400" dirty="0">
-              <a:solidFill>
-                <a:schemeClr val="bg1"/>
-              </a:solidFill>
-            </a:endParaRPr>
-          </a:p>
-        </p:txBody>
-      </p:sp>
-      <p:sp>
-        <p:nvSpPr>
-          <p:cNvPr id="63" name="TextBox 62"/>
-          <p:cNvSpPr txBox="1"/>
-          <p:nvPr/>
-        </p:nvSpPr>
-        <p:spPr>
-          <a:xfrm>
-            <a:off x="23602711" y="17744255"/>
-            <a:ext cx="4741714" cy="769441"/>
-          </a:xfrm>
-          <a:prstGeom prst="rect">
-            <a:avLst/>
-          </a:prstGeom>
-          <a:noFill/>
-        </p:spPr>
-        <p:txBody>
-          <a:bodyPr wrap="square" rtlCol="0">
-            <a:spAutoFit/>
-          </a:bodyPr>
-          <a:lstStyle/>
-          <a:p>
-            <a:pPr algn="ctr"/>
-            <a:r>
-              <a:rPr lang="en-US" sz="4400" dirty="0" smtClean="0">
-                <a:solidFill>
-                  <a:schemeClr val="bg1"/>
-                </a:solidFill>
-              </a:rPr>
-              <a:t>Minimap Layers</a:t>
-            </a:r>
-            <a:endParaRPr lang="en-US" sz="4400" dirty="0">
-              <a:solidFill>
-                <a:schemeClr val="bg1"/>
-              </a:solidFill>
-            </a:endParaRPr>
-          </a:p>
-        </p:txBody>
-      </p:sp>
     </p:spTree>
     <p:extLst>
       <p:ext uri="{BB962C8B-B14F-4D97-AF65-F5344CB8AC3E}">

</xml_diff>

<commit_message>
finished poster hopefully maybe?
</commit_message>
<xml_diff>
--- a/Senior Design Poster.pptx
+++ b/Senior Design Poster.pptx
@@ -4,6 +4,9 @@
   <p:sldMasterIdLst>
     <p:sldMasterId id="2147483648" r:id="rId1"/>
   </p:sldMasterIdLst>
+  <p:notesMasterIdLst>
+    <p:notesMasterId r:id="rId3"/>
+  </p:notesMasterIdLst>
   <p:sldIdLst>
     <p:sldId id="258" r:id="rId2"/>
   </p:sldIdLst>
@@ -106,7 +109,7 @@
   </p:defaultTextStyle>
   <p:extLst>
     <p:ext uri="{EFAFB233-063F-42B5-8137-9DF3F51BA10A}">
-      <p15:sldGuideLst xmlns:p15="http://schemas.microsoft.com/office/powerpoint/2012/main" xmlns="">
+      <p15:sldGuideLst xmlns:p15="http://schemas.microsoft.com/office/powerpoint/2012/main">
         <p15:guide id="1" orient="horz" pos="10368">
           <p15:clr>
             <a:srgbClr val="A4A3A4"/>
@@ -121,6 +124,439 @@
     </p:ext>
   </p:extLst>
 </p:presentation>
+</file>
+
+<file path=ppt/notesMasters/notesMaster1.xml><?xml version="1.0" encoding="utf-8"?>
+<p:notesMaster xmlns:a="http://schemas.openxmlformats.org/drawingml/2006/main" xmlns:r="http://schemas.openxmlformats.org/officeDocument/2006/relationships" xmlns:p="http://schemas.openxmlformats.org/presentationml/2006/main">
+  <p:cSld>
+    <p:bg>
+      <p:bgRef idx="1001">
+        <a:schemeClr val="bg1"/>
+      </p:bgRef>
+    </p:bg>
+    <p:spTree>
+      <p:nvGrpSpPr>
+        <p:cNvPr id="1" name=""/>
+        <p:cNvGrpSpPr/>
+        <p:nvPr/>
+      </p:nvGrpSpPr>
+      <p:grpSpPr>
+        <a:xfrm>
+          <a:off x="0" y="0"/>
+          <a:ext cx="0" cy="0"/>
+          <a:chOff x="0" y="0"/>
+          <a:chExt cx="0" cy="0"/>
+        </a:xfrm>
+      </p:grpSpPr>
+      <p:sp>
+        <p:nvSpPr>
+          <p:cNvPr id="2" name="Header Placeholder 1"/>
+          <p:cNvSpPr>
+            <a:spLocks noGrp="1"/>
+          </p:cNvSpPr>
+          <p:nvPr>
+            <p:ph type="hdr" sz="quarter"/>
+          </p:nvPr>
+        </p:nvSpPr>
+        <p:spPr>
+          <a:xfrm>
+            <a:off x="0" y="0"/>
+            <a:ext cx="2971800" cy="458788"/>
+          </a:xfrm>
+          <a:prstGeom prst="rect">
+            <a:avLst/>
+          </a:prstGeom>
+        </p:spPr>
+        <p:txBody>
+          <a:bodyPr vert="horz" lIns="91440" tIns="45720" rIns="91440" bIns="45720" rtlCol="0"/>
+          <a:lstStyle>
+            <a:lvl1pPr algn="l">
+              <a:defRPr sz="1200"/>
+            </a:lvl1pPr>
+          </a:lstStyle>
+          <a:p>
+            <a:endParaRPr lang="en-US"/>
+          </a:p>
+        </p:txBody>
+      </p:sp>
+      <p:sp>
+        <p:nvSpPr>
+          <p:cNvPr id="3" name="Date Placeholder 2"/>
+          <p:cNvSpPr>
+            <a:spLocks noGrp="1"/>
+          </p:cNvSpPr>
+          <p:nvPr>
+            <p:ph type="dt" idx="1"/>
+          </p:nvPr>
+        </p:nvSpPr>
+        <p:spPr>
+          <a:xfrm>
+            <a:off x="3884613" y="0"/>
+            <a:ext cx="2971800" cy="458788"/>
+          </a:xfrm>
+          <a:prstGeom prst="rect">
+            <a:avLst/>
+          </a:prstGeom>
+        </p:spPr>
+        <p:txBody>
+          <a:bodyPr vert="horz" lIns="91440" tIns="45720" rIns="91440" bIns="45720" rtlCol="0"/>
+          <a:lstStyle>
+            <a:lvl1pPr algn="r">
+              <a:defRPr sz="1200"/>
+            </a:lvl1pPr>
+          </a:lstStyle>
+          <a:p>
+            <a:fld id="{A9756973-A4BC-4EEE-BAF8-1E6391CA74A1}" type="datetimeFigureOut">
+              <a:rPr lang="en-US" smtClean="0"/>
+              <a:t>3/21/2018</a:t>
+            </a:fld>
+            <a:endParaRPr lang="en-US"/>
+          </a:p>
+        </p:txBody>
+      </p:sp>
+      <p:sp>
+        <p:nvSpPr>
+          <p:cNvPr id="4" name="Slide Image Placeholder 3"/>
+          <p:cNvSpPr>
+            <a:spLocks noGrp="1" noRot="1" noChangeAspect="1"/>
+          </p:cNvSpPr>
+          <p:nvPr>
+            <p:ph type="sldImg" idx="2"/>
+          </p:nvPr>
+        </p:nvSpPr>
+        <p:spPr>
+          <a:xfrm>
+            <a:off x="1371600" y="1143000"/>
+            <a:ext cx="4114800" cy="3086100"/>
+          </a:xfrm>
+          <a:prstGeom prst="rect">
+            <a:avLst/>
+          </a:prstGeom>
+          <a:noFill/>
+          <a:ln w="12700">
+            <a:solidFill>
+              <a:prstClr val="black"/>
+            </a:solidFill>
+          </a:ln>
+        </p:spPr>
+        <p:txBody>
+          <a:bodyPr vert="horz" lIns="91440" tIns="45720" rIns="91440" bIns="45720" rtlCol="0" anchor="ctr"/>
+          <a:lstStyle/>
+          <a:p>
+            <a:endParaRPr lang="en-US"/>
+          </a:p>
+        </p:txBody>
+      </p:sp>
+      <p:sp>
+        <p:nvSpPr>
+          <p:cNvPr id="5" name="Notes Placeholder 4"/>
+          <p:cNvSpPr>
+            <a:spLocks noGrp="1"/>
+          </p:cNvSpPr>
+          <p:nvPr>
+            <p:ph type="body" sz="quarter" idx="3"/>
+          </p:nvPr>
+        </p:nvSpPr>
+        <p:spPr>
+          <a:xfrm>
+            <a:off x="685800" y="4400550"/>
+            <a:ext cx="5486400" cy="3600450"/>
+          </a:xfrm>
+          <a:prstGeom prst="rect">
+            <a:avLst/>
+          </a:prstGeom>
+        </p:spPr>
+        <p:txBody>
+          <a:bodyPr vert="horz" lIns="91440" tIns="45720" rIns="91440" bIns="45720" rtlCol="0"/>
+          <a:lstStyle/>
+          <a:p>
+            <a:pPr lvl="0"/>
+            <a:r>
+              <a:rPr lang="en-US"/>
+              <a:t>Edit Master text styles</a:t>
+            </a:r>
+          </a:p>
+          <a:p>
+            <a:pPr lvl="1"/>
+            <a:r>
+              <a:rPr lang="en-US"/>
+              <a:t>Second level</a:t>
+            </a:r>
+          </a:p>
+          <a:p>
+            <a:pPr lvl="2"/>
+            <a:r>
+              <a:rPr lang="en-US"/>
+              <a:t>Third level</a:t>
+            </a:r>
+          </a:p>
+          <a:p>
+            <a:pPr lvl="3"/>
+            <a:r>
+              <a:rPr lang="en-US"/>
+              <a:t>Fourth level</a:t>
+            </a:r>
+          </a:p>
+          <a:p>
+            <a:pPr lvl="4"/>
+            <a:r>
+              <a:rPr lang="en-US"/>
+              <a:t>Fifth level</a:t>
+            </a:r>
+          </a:p>
+        </p:txBody>
+      </p:sp>
+      <p:sp>
+        <p:nvSpPr>
+          <p:cNvPr id="6" name="Footer Placeholder 5"/>
+          <p:cNvSpPr>
+            <a:spLocks noGrp="1"/>
+          </p:cNvSpPr>
+          <p:nvPr>
+            <p:ph type="ftr" sz="quarter" idx="4"/>
+          </p:nvPr>
+        </p:nvSpPr>
+        <p:spPr>
+          <a:xfrm>
+            <a:off x="0" y="8685213"/>
+            <a:ext cx="2971800" cy="458787"/>
+          </a:xfrm>
+          <a:prstGeom prst="rect">
+            <a:avLst/>
+          </a:prstGeom>
+        </p:spPr>
+        <p:txBody>
+          <a:bodyPr vert="horz" lIns="91440" tIns="45720" rIns="91440" bIns="45720" rtlCol="0" anchor="b"/>
+          <a:lstStyle>
+            <a:lvl1pPr algn="l">
+              <a:defRPr sz="1200"/>
+            </a:lvl1pPr>
+          </a:lstStyle>
+          <a:p>
+            <a:endParaRPr lang="en-US"/>
+          </a:p>
+        </p:txBody>
+      </p:sp>
+      <p:sp>
+        <p:nvSpPr>
+          <p:cNvPr id="7" name="Slide Number Placeholder 6"/>
+          <p:cNvSpPr>
+            <a:spLocks noGrp="1"/>
+          </p:cNvSpPr>
+          <p:nvPr>
+            <p:ph type="sldNum" sz="quarter" idx="5"/>
+          </p:nvPr>
+        </p:nvSpPr>
+        <p:spPr>
+          <a:xfrm>
+            <a:off x="3884613" y="8685213"/>
+            <a:ext cx="2971800" cy="458787"/>
+          </a:xfrm>
+          <a:prstGeom prst="rect">
+            <a:avLst/>
+          </a:prstGeom>
+        </p:spPr>
+        <p:txBody>
+          <a:bodyPr vert="horz" lIns="91440" tIns="45720" rIns="91440" bIns="45720" rtlCol="0" anchor="b"/>
+          <a:lstStyle>
+            <a:lvl1pPr algn="r">
+              <a:defRPr sz="1200"/>
+            </a:lvl1pPr>
+          </a:lstStyle>
+          <a:p>
+            <a:fld id="{F4D475ED-A05B-42D9-A68C-943DB295FED1}" type="slidenum">
+              <a:rPr lang="en-US" smtClean="0"/>
+              <a:t>‹#›</a:t>
+            </a:fld>
+            <a:endParaRPr lang="en-US"/>
+          </a:p>
+        </p:txBody>
+      </p:sp>
+    </p:spTree>
+    <p:extLst>
+      <p:ext uri="{BB962C8B-B14F-4D97-AF65-F5344CB8AC3E}">
+        <p14:creationId xmlns:p14="http://schemas.microsoft.com/office/powerpoint/2010/main" val="1399727060"/>
+      </p:ext>
+    </p:extLst>
+  </p:cSld>
+  <p:clrMap bg1="lt1" tx1="dk1" bg2="lt2" tx2="dk2" accent1="accent1" accent2="accent2" accent3="accent3" accent4="accent4" accent5="accent5" accent6="accent6" hlink="hlink" folHlink="folHlink"/>
+  <p:notesStyle>
+    <a:lvl1pPr marL="0" algn="l" defTabSz="914400" rtl="0" eaLnBrk="1" latinLnBrk="0" hangingPunct="1">
+      <a:defRPr sz="1200" kern="1200">
+        <a:solidFill>
+          <a:schemeClr val="tx1"/>
+        </a:solidFill>
+        <a:latin typeface="+mn-lt"/>
+        <a:ea typeface="+mn-ea"/>
+        <a:cs typeface="+mn-cs"/>
+      </a:defRPr>
+    </a:lvl1pPr>
+    <a:lvl2pPr marL="457200" algn="l" defTabSz="914400" rtl="0" eaLnBrk="1" latinLnBrk="0" hangingPunct="1">
+      <a:defRPr sz="1200" kern="1200">
+        <a:solidFill>
+          <a:schemeClr val="tx1"/>
+        </a:solidFill>
+        <a:latin typeface="+mn-lt"/>
+        <a:ea typeface="+mn-ea"/>
+        <a:cs typeface="+mn-cs"/>
+      </a:defRPr>
+    </a:lvl2pPr>
+    <a:lvl3pPr marL="914400" algn="l" defTabSz="914400" rtl="0" eaLnBrk="1" latinLnBrk="0" hangingPunct="1">
+      <a:defRPr sz="1200" kern="1200">
+        <a:solidFill>
+          <a:schemeClr val="tx1"/>
+        </a:solidFill>
+        <a:latin typeface="+mn-lt"/>
+        <a:ea typeface="+mn-ea"/>
+        <a:cs typeface="+mn-cs"/>
+      </a:defRPr>
+    </a:lvl3pPr>
+    <a:lvl4pPr marL="1371600" algn="l" defTabSz="914400" rtl="0" eaLnBrk="1" latinLnBrk="0" hangingPunct="1">
+      <a:defRPr sz="1200" kern="1200">
+        <a:solidFill>
+          <a:schemeClr val="tx1"/>
+        </a:solidFill>
+        <a:latin typeface="+mn-lt"/>
+        <a:ea typeface="+mn-ea"/>
+        <a:cs typeface="+mn-cs"/>
+      </a:defRPr>
+    </a:lvl4pPr>
+    <a:lvl5pPr marL="1828800" algn="l" defTabSz="914400" rtl="0" eaLnBrk="1" latinLnBrk="0" hangingPunct="1">
+      <a:defRPr sz="1200" kern="1200">
+        <a:solidFill>
+          <a:schemeClr val="tx1"/>
+        </a:solidFill>
+        <a:latin typeface="+mn-lt"/>
+        <a:ea typeface="+mn-ea"/>
+        <a:cs typeface="+mn-cs"/>
+      </a:defRPr>
+    </a:lvl5pPr>
+    <a:lvl6pPr marL="2286000" algn="l" defTabSz="914400" rtl="0" eaLnBrk="1" latinLnBrk="0" hangingPunct="1">
+      <a:defRPr sz="1200" kern="1200">
+        <a:solidFill>
+          <a:schemeClr val="tx1"/>
+        </a:solidFill>
+        <a:latin typeface="+mn-lt"/>
+        <a:ea typeface="+mn-ea"/>
+        <a:cs typeface="+mn-cs"/>
+      </a:defRPr>
+    </a:lvl6pPr>
+    <a:lvl7pPr marL="2743200" algn="l" defTabSz="914400" rtl="0" eaLnBrk="1" latinLnBrk="0" hangingPunct="1">
+      <a:defRPr sz="1200" kern="1200">
+        <a:solidFill>
+          <a:schemeClr val="tx1"/>
+        </a:solidFill>
+        <a:latin typeface="+mn-lt"/>
+        <a:ea typeface="+mn-ea"/>
+        <a:cs typeface="+mn-cs"/>
+      </a:defRPr>
+    </a:lvl7pPr>
+    <a:lvl8pPr marL="3200400" algn="l" defTabSz="914400" rtl="0" eaLnBrk="1" latinLnBrk="0" hangingPunct="1">
+      <a:defRPr sz="1200" kern="1200">
+        <a:solidFill>
+          <a:schemeClr val="tx1"/>
+        </a:solidFill>
+        <a:latin typeface="+mn-lt"/>
+        <a:ea typeface="+mn-ea"/>
+        <a:cs typeface="+mn-cs"/>
+      </a:defRPr>
+    </a:lvl8pPr>
+    <a:lvl9pPr marL="3657600" algn="l" defTabSz="914400" rtl="0" eaLnBrk="1" latinLnBrk="0" hangingPunct="1">
+      <a:defRPr sz="1200" kern="1200">
+        <a:solidFill>
+          <a:schemeClr val="tx1"/>
+        </a:solidFill>
+        <a:latin typeface="+mn-lt"/>
+        <a:ea typeface="+mn-ea"/>
+        <a:cs typeface="+mn-cs"/>
+      </a:defRPr>
+    </a:lvl9pPr>
+  </p:notesStyle>
+</p:notesMaster>
+</file>
+
+<file path=ppt/notesSlides/notesSlide1.xml><?xml version="1.0" encoding="utf-8"?>
+<p:notes xmlns:a="http://schemas.openxmlformats.org/drawingml/2006/main" xmlns:r="http://schemas.openxmlformats.org/officeDocument/2006/relationships" xmlns:p="http://schemas.openxmlformats.org/presentationml/2006/main">
+  <p:cSld>
+    <p:spTree>
+      <p:nvGrpSpPr>
+        <p:cNvPr id="1" name=""/>
+        <p:cNvGrpSpPr/>
+        <p:nvPr/>
+      </p:nvGrpSpPr>
+      <p:grpSpPr>
+        <a:xfrm>
+          <a:off x="0" y="0"/>
+          <a:ext cx="0" cy="0"/>
+          <a:chOff x="0" y="0"/>
+          <a:chExt cx="0" cy="0"/>
+        </a:xfrm>
+      </p:grpSpPr>
+      <p:sp>
+        <p:nvSpPr>
+          <p:cNvPr id="2" name="Slide Image Placeholder 1"/>
+          <p:cNvSpPr>
+            <a:spLocks noGrp="1" noRot="1" noChangeAspect="1"/>
+          </p:cNvSpPr>
+          <p:nvPr>
+            <p:ph type="sldImg"/>
+          </p:nvPr>
+        </p:nvSpPr>
+        <p:spPr/>
+      </p:sp>
+      <p:sp>
+        <p:nvSpPr>
+          <p:cNvPr id="3" name="Notes Placeholder 2"/>
+          <p:cNvSpPr>
+            <a:spLocks noGrp="1"/>
+          </p:cNvSpPr>
+          <p:nvPr>
+            <p:ph type="body" idx="1"/>
+          </p:nvPr>
+        </p:nvSpPr>
+        <p:spPr/>
+        <p:txBody>
+          <a:bodyPr/>
+          <a:lstStyle/>
+          <a:p>
+            <a:endParaRPr lang="en-US" dirty="0"/>
+          </a:p>
+        </p:txBody>
+      </p:sp>
+      <p:sp>
+        <p:nvSpPr>
+          <p:cNvPr id="4" name="Slide Number Placeholder 3"/>
+          <p:cNvSpPr>
+            <a:spLocks noGrp="1"/>
+          </p:cNvSpPr>
+          <p:nvPr>
+            <p:ph type="sldNum" sz="quarter" idx="10"/>
+          </p:nvPr>
+        </p:nvSpPr>
+        <p:spPr/>
+        <p:txBody>
+          <a:bodyPr/>
+          <a:lstStyle/>
+          <a:p>
+            <a:fld id="{F4D475ED-A05B-42D9-A68C-943DB295FED1}" type="slidenum">
+              <a:rPr lang="en-US" smtClean="0"/>
+              <a:t>1</a:t>
+            </a:fld>
+            <a:endParaRPr lang="en-US"/>
+          </a:p>
+        </p:txBody>
+      </p:sp>
+    </p:spTree>
+    <p:extLst>
+      <p:ext uri="{BB962C8B-B14F-4D97-AF65-F5344CB8AC3E}">
+        <p14:creationId xmlns:p14="http://schemas.microsoft.com/office/powerpoint/2010/main" val="3398146243"/>
+      </p:ext>
+    </p:extLst>
+  </p:cSld>
+  <p:clrMapOvr>
+    <a:masterClrMapping/>
+  </p:clrMapOvr>
+</p:notes>
 </file>
 
 <file path=ppt/slideLayouts/slideLayout1.xml><?xml version="1.0" encoding="utf-8"?>
@@ -3107,18 +3543,24 @@
       </p:grpSpPr>
       <p:sp>
         <p:nvSpPr>
-          <p:cNvPr id="34" name="Rounded Rectangle 33"/>
+          <p:cNvPr id="61" name="Rounded Rectangle 15">
+            <a:extLst>
+              <a:ext uri="{FF2B5EF4-FFF2-40B4-BE49-F238E27FC236}">
+                <a16:creationId xmlns:a16="http://schemas.microsoft.com/office/drawing/2014/main" id="{D2B9EE50-4F9D-4AD8-A5FF-C10B84AE9801}"/>
+              </a:ext>
+            </a:extLst>
+          </p:cNvPr>
           <p:cNvSpPr/>
           <p:nvPr/>
         </p:nvSpPr>
         <p:spPr>
           <a:xfrm>
-            <a:off x="-30481" y="4610326"/>
-            <a:ext cx="10637521" cy="8429578"/>
+            <a:off x="10998889" y="18188537"/>
+            <a:ext cx="21945599" cy="10490524"/>
           </a:xfrm>
           <a:prstGeom prst="roundRect">
             <a:avLst>
-              <a:gd name="adj" fmla="val 7266"/>
+              <a:gd name="adj" fmla="val 2411"/>
             </a:avLst>
           </a:prstGeom>
           <a:solidFill>
@@ -3148,23 +3590,25 @@
           <a:lstStyle/>
           <a:p>
             <a:pPr algn="ctr"/>
-            <a:endParaRPr lang="en-US"/>
-          </a:p>
-        </p:txBody>
-      </p:sp>
-      <p:sp>
-        <p:nvSpPr>
-          <p:cNvPr id="14" name="Rounded Rectangle 13"/>
+            <a:endParaRPr lang="en-US" dirty="0"/>
+          </a:p>
+        </p:txBody>
+      </p:sp>
+      <p:sp>
+        <p:nvSpPr>
+          <p:cNvPr id="34" name="Rounded Rectangle 33"/>
           <p:cNvSpPr/>
           <p:nvPr/>
         </p:nvSpPr>
         <p:spPr>
           <a:xfrm>
-            <a:off x="10957559" y="27078846"/>
-            <a:ext cx="21945600" cy="5152876"/>
+            <a:off x="-30481" y="4610326"/>
+            <a:ext cx="10637521" cy="8429578"/>
           </a:xfrm>
           <a:prstGeom prst="roundRect">
-            <a:avLst/>
+            <a:avLst>
+              <a:gd name="adj" fmla="val 7266"/>
+            </a:avLst>
           </a:prstGeom>
           <a:solidFill>
             <a:schemeClr val="tx1">
@@ -3199,18 +3643,18 @@
       </p:sp>
       <p:sp>
         <p:nvSpPr>
-          <p:cNvPr id="16" name="Rounded Rectangle 15"/>
+          <p:cNvPr id="14" name="Rounded Rectangle 13"/>
           <p:cNvSpPr/>
           <p:nvPr/>
         </p:nvSpPr>
         <p:spPr>
           <a:xfrm>
-            <a:off x="10972800" y="4693580"/>
-            <a:ext cx="21945599" cy="21747820"/>
+            <a:off x="10922846" y="28872162"/>
+            <a:ext cx="22021641" cy="3861181"/>
           </a:xfrm>
           <a:prstGeom prst="roundRect">
             <a:avLst>
-              <a:gd name="adj" fmla="val 2411"/>
+              <a:gd name="adj" fmla="val 5897"/>
             </a:avLst>
           </a:prstGeom>
           <a:solidFill>
@@ -3240,92 +3684,24 @@
           <a:lstStyle/>
           <a:p>
             <a:pPr algn="ctr"/>
-            <a:endParaRPr lang="en-US" dirty="0"/>
-          </a:p>
-        </p:txBody>
-      </p:sp>
-      <p:sp>
-        <p:nvSpPr>
-          <p:cNvPr id="17" name="Rectangle 16"/>
+            <a:endParaRPr lang="en-US"/>
+          </a:p>
+        </p:txBody>
+      </p:sp>
+      <p:sp>
+        <p:nvSpPr>
+          <p:cNvPr id="16" name="Rounded Rectangle 15"/>
           <p:cNvSpPr/>
           <p:nvPr/>
         </p:nvSpPr>
         <p:spPr>
           <a:xfrm>
-            <a:off x="17661403" y="4721289"/>
-            <a:ext cx="8537915" cy="1569660"/>
-          </a:xfrm>
-          <a:prstGeom prst="rect">
-            <a:avLst/>
-          </a:prstGeom>
-          <a:noFill/>
-        </p:spPr>
-        <p:txBody>
-          <a:bodyPr wrap="none" lIns="91440" tIns="45720" rIns="91440" bIns="45720">
-            <a:spAutoFit/>
-          </a:bodyPr>
-          <a:lstStyle/>
-          <a:p>
-            <a:pPr algn="ctr"/>
-            <a:r>
-              <a:rPr lang="en-US" sz="9600" b="0" cap="none" spc="0" dirty="0" smtClean="0">
-                <a:ln w="18415" cmpd="sng">
-                  <a:solidFill>
-                    <a:srgbClr val="FFFFFF"/>
-                  </a:solidFill>
-                  <a:prstDash val="solid"/>
-                </a:ln>
-                <a:solidFill>
-                  <a:srgbClr val="FFFFFF"/>
-                </a:solidFill>
-                <a:effectLst>
-                  <a:outerShdw blurRad="63500" dir="3600000" algn="tl" rotWithShape="0">
-                    <a:srgbClr val="000000">
-                      <a:alpha val="70000"/>
-                    </a:srgbClr>
-                  </a:outerShdw>
-                </a:effectLst>
-              </a:rPr>
-              <a:t>Model and </a:t>
-            </a:r>
-            <a:r>
-              <a:rPr lang="en-US" sz="9600" b="0" cap="none" spc="0" dirty="0">
-                <a:ln w="18415" cmpd="sng">
-                  <a:solidFill>
-                    <a:srgbClr val="FFFFFF"/>
-                  </a:solidFill>
-                  <a:prstDash val="solid"/>
-                </a:ln>
-                <a:solidFill>
-                  <a:srgbClr val="FFFFFF"/>
-                </a:solidFill>
-                <a:effectLst>
-                  <a:outerShdw blurRad="63500" dir="3600000" algn="tl" rotWithShape="0">
-                    <a:srgbClr val="000000">
-                      <a:alpha val="70000"/>
-                    </a:srgbClr>
-                  </a:outerShdw>
-                </a:effectLst>
-              </a:rPr>
-              <a:t>Input</a:t>
-            </a:r>
-          </a:p>
-        </p:txBody>
-      </p:sp>
-      <p:sp>
-        <p:nvSpPr>
-          <p:cNvPr id="19" name="Rounded Rectangle 18"/>
-          <p:cNvSpPr/>
-          <p:nvPr/>
-        </p:nvSpPr>
-        <p:spPr>
-          <a:xfrm>
-            <a:off x="33317063" y="16654680"/>
-            <a:ext cx="10660382" cy="7648600"/>
+            <a:off x="10972800" y="4693579"/>
+            <a:ext cx="21945599" cy="13275431"/>
           </a:xfrm>
           <a:prstGeom prst="roundRect">
             <a:avLst>
-              <a:gd name="adj" fmla="val 7103"/>
+              <a:gd name="adj" fmla="val 2411"/>
             </a:avLst>
           </a:prstGeom>
           <a:solidFill>
@@ -3355,20 +3731,20 @@
           <a:lstStyle/>
           <a:p>
             <a:pPr algn="ctr"/>
-            <a:endParaRPr lang="en-US"/>
-          </a:p>
-        </p:txBody>
-      </p:sp>
-      <p:sp>
-        <p:nvSpPr>
-          <p:cNvPr id="20" name="Rectangle 19"/>
+            <a:endParaRPr lang="en-US" dirty="0"/>
+          </a:p>
+        </p:txBody>
+      </p:sp>
+      <p:sp>
+        <p:nvSpPr>
+          <p:cNvPr id="17" name="Rectangle 16"/>
           <p:cNvSpPr/>
           <p:nvPr/>
         </p:nvSpPr>
         <p:spPr>
           <a:xfrm>
-            <a:off x="586740" y="5101040"/>
-            <a:ext cx="9525000" cy="7571303"/>
+            <a:off x="20215788" y="4721289"/>
+            <a:ext cx="3429144" cy="1569660"/>
           </a:xfrm>
           <a:prstGeom prst="rect">
             <a:avLst/>
@@ -3376,13 +3752,14 @@
           <a:noFill/>
         </p:spPr>
         <p:txBody>
-          <a:bodyPr wrap="square" lIns="91440" tIns="45720" rIns="91440" bIns="45720">
+          <a:bodyPr wrap="none" lIns="91440" tIns="45720" rIns="91440" bIns="45720">
             <a:spAutoFit/>
           </a:bodyPr>
           <a:lstStyle/>
           <a:p>
-            <a:r>
-              <a:rPr lang="en-US" sz="5400" b="1" cap="none" spc="0" dirty="0">
+            <a:pPr algn="ctr"/>
+            <a:r>
+              <a:rPr lang="en-US" sz="9600" b="0" cap="none" spc="0" dirty="0">
                 <a:ln w="18415" cmpd="sng">
                   <a:solidFill>
                     <a:srgbClr val="FFFFFF"/>
@@ -3390,7 +3767,7 @@
                   <a:prstDash val="solid"/>
                 </a:ln>
                 <a:solidFill>
-                  <a:schemeClr val="bg1"/>
+                  <a:srgbClr val="FFFFFF"/>
                 </a:solidFill>
                 <a:effectLst>
                   <a:outerShdw blurRad="63500" dir="3600000" algn="tl" rotWithShape="0">
@@ -3400,35 +3777,25 @@
                   </a:outerShdw>
                 </a:effectLst>
               </a:rPr>
-              <a:t>Background</a:t>
-            </a:r>
-          </a:p>
-          <a:p>
-            <a:r>
-              <a:rPr lang="en-US" sz="4800" dirty="0">
-                <a:solidFill>
-                  <a:schemeClr val="bg1"/>
-                </a:solidFill>
-              </a:rPr>
-              <a:t>Starcraft2 is a real-time, player versus player, strategy game that has two players fighting each other for victory. Real time strategy games are an interesting challenge for AI due to the presence of delayed rewards, high complexity action space, and incomplete game state knowledge (unlike Chess or Go).</a:t>
-            </a:r>
-          </a:p>
-        </p:txBody>
-      </p:sp>
-      <p:sp>
-        <p:nvSpPr>
-          <p:cNvPr id="22" name="Rounded Rectangle 21"/>
+              <a:t>Model</a:t>
+            </a:r>
+          </a:p>
+        </p:txBody>
+      </p:sp>
+      <p:sp>
+        <p:nvSpPr>
+          <p:cNvPr id="19" name="Rounded Rectangle 18"/>
           <p:cNvSpPr/>
           <p:nvPr/>
         </p:nvSpPr>
         <p:spPr>
           <a:xfrm>
-            <a:off x="-70276" y="13447364"/>
-            <a:ext cx="10515600" cy="10105327"/>
+            <a:off x="33317063" y="15210879"/>
+            <a:ext cx="10574137" cy="9896926"/>
           </a:xfrm>
           <a:prstGeom prst="roundRect">
             <a:avLst>
-              <a:gd name="adj" fmla="val 7317"/>
+              <a:gd name="adj" fmla="val 7103"/>
             </a:avLst>
           </a:prstGeom>
           <a:solidFill>
@@ -3464,18 +3831,74 @@
       </p:sp>
       <p:sp>
         <p:nvSpPr>
-          <p:cNvPr id="24" name="Rounded Rectangle 23"/>
+          <p:cNvPr id="20" name="Rectangle 19"/>
           <p:cNvSpPr/>
           <p:nvPr/>
         </p:nvSpPr>
         <p:spPr>
           <a:xfrm>
-            <a:off x="33317063" y="24656764"/>
-            <a:ext cx="10515600" cy="8067009"/>
+            <a:off x="586740" y="5101040"/>
+            <a:ext cx="9525000" cy="7571303"/>
+          </a:xfrm>
+          <a:prstGeom prst="rect">
+            <a:avLst/>
+          </a:prstGeom>
+          <a:noFill/>
+        </p:spPr>
+        <p:txBody>
+          <a:bodyPr wrap="square" lIns="91440" tIns="45720" rIns="91440" bIns="45720">
+            <a:spAutoFit/>
+          </a:bodyPr>
+          <a:lstStyle/>
+          <a:p>
+            <a:r>
+              <a:rPr lang="en-US" sz="5400" b="1" cap="none" spc="0" dirty="0">
+                <a:ln w="18415" cmpd="sng">
+                  <a:solidFill>
+                    <a:srgbClr val="FFFFFF"/>
+                  </a:solidFill>
+                  <a:prstDash val="solid"/>
+                </a:ln>
+                <a:solidFill>
+                  <a:schemeClr val="bg1"/>
+                </a:solidFill>
+                <a:effectLst>
+                  <a:outerShdw blurRad="63500" dir="3600000" algn="tl" rotWithShape="0">
+                    <a:srgbClr val="000000">
+                      <a:alpha val="70000"/>
+                    </a:srgbClr>
+                  </a:outerShdw>
+                </a:effectLst>
+              </a:rPr>
+              <a:t>Background</a:t>
+            </a:r>
+          </a:p>
+          <a:p>
+            <a:r>
+              <a:rPr lang="en-US" sz="4800" dirty="0">
+                <a:solidFill>
+                  <a:schemeClr val="bg1"/>
+                </a:solidFill>
+              </a:rPr>
+              <a:t>Starcraft2 is a real-time, player versus player, strategy game that has two players fighting each other for victory. Real time strategy games are an interesting challenge for AI due to the presence of delayed rewards, high complexity action space, and incomplete game state knowledge (unlike Chess or Go).</a:t>
+            </a:r>
+          </a:p>
+        </p:txBody>
+      </p:sp>
+      <p:sp>
+        <p:nvSpPr>
+          <p:cNvPr id="22" name="Rounded Rectangle 21"/>
+          <p:cNvSpPr/>
+          <p:nvPr/>
+        </p:nvSpPr>
+        <p:spPr>
+          <a:xfrm>
+            <a:off x="0" y="13447364"/>
+            <a:ext cx="10445324" cy="10105327"/>
           </a:xfrm>
           <a:prstGeom prst="roundRect">
             <a:avLst>
-              <a:gd name="adj" fmla="val 7977"/>
+              <a:gd name="adj" fmla="val 7317"/>
             </a:avLst>
           </a:prstGeom>
           <a:solidFill>
@@ -3511,6 +3934,53 @@
       </p:sp>
       <p:sp>
         <p:nvSpPr>
+          <p:cNvPr id="24" name="Rounded Rectangle 23"/>
+          <p:cNvSpPr/>
+          <p:nvPr/>
+        </p:nvSpPr>
+        <p:spPr>
+          <a:xfrm>
+            <a:off x="33317063" y="25372421"/>
+            <a:ext cx="10515600" cy="7351352"/>
+          </a:xfrm>
+          <a:prstGeom prst="roundRect">
+            <a:avLst>
+              <a:gd name="adj" fmla="val 7977"/>
+            </a:avLst>
+          </a:prstGeom>
+          <a:solidFill>
+            <a:schemeClr val="tx1">
+              <a:alpha val="75000"/>
+            </a:schemeClr>
+          </a:solidFill>
+        </p:spPr>
+        <p:style>
+          <a:lnRef idx="2">
+            <a:schemeClr val="accent1">
+              <a:shade val="50000"/>
+            </a:schemeClr>
+          </a:lnRef>
+          <a:fillRef idx="1">
+            <a:schemeClr val="accent1"/>
+          </a:fillRef>
+          <a:effectRef idx="0">
+            <a:schemeClr val="accent1"/>
+          </a:effectRef>
+          <a:fontRef idx="minor">
+            <a:schemeClr val="lt1"/>
+          </a:fontRef>
+        </p:style>
+        <p:txBody>
+          <a:bodyPr rtlCol="0" anchor="ctr"/>
+          <a:lstStyle/>
+          <a:p>
+            <a:pPr algn="ctr"/>
+            <a:endParaRPr lang="en-US"/>
+          </a:p>
+        </p:txBody>
+      </p:sp>
+      <p:sp>
+        <p:nvSpPr>
           <p:cNvPr id="31" name="TextBox 30"/>
           <p:cNvSpPr txBox="1"/>
           <p:nvPr/>
@@ -3550,13 +4020,13 @@
       </p:sp>
       <p:sp>
         <p:nvSpPr>
-          <p:cNvPr id="35" name="Rectangle 34"/>
-          <p:cNvSpPr/>
+          <p:cNvPr id="36" name="TextBox 35"/>
+          <p:cNvSpPr txBox="1"/>
           <p:nvPr/>
         </p:nvSpPr>
         <p:spPr>
           <a:xfrm>
-            <a:off x="35585400" y="3258256"/>
+            <a:off x="35585400" y="7262230"/>
             <a:ext cx="3176861" cy="830997"/>
           </a:xfrm>
           <a:prstGeom prst="rect">
@@ -3565,7 +4035,7 @@
           <a:noFill/>
         </p:spPr>
         <p:txBody>
-          <a:bodyPr wrap="square" lIns="91440" tIns="45720" rIns="91440" bIns="45720">
+          <a:bodyPr wrap="square" rtlCol="0">
             <a:spAutoFit/>
           </a:bodyPr>
           <a:lstStyle/>
@@ -3585,7 +4055,7 @@
                   </a:outerShdw>
                 </a:effectLst>
               </a:rPr>
-              <a:t>Kyle </a:t>
+              <a:t>Jon </a:t>
             </a:r>
             <a:r>
               <a:rPr lang="en-US" sz="4800" dirty="0" err="1">
@@ -3601,7 +4071,7 @@
                   </a:outerShdw>
                 </a:effectLst>
               </a:rPr>
-              <a:t>Arens</a:t>
+              <a:t>Deibel</a:t>
             </a:r>
             <a:endParaRPr lang="en-US" sz="4800" dirty="0">
               <a:ln w="0"/>
@@ -3621,14 +4091,14 @@
       </p:sp>
       <p:sp>
         <p:nvSpPr>
-          <p:cNvPr id="36" name="TextBox 35"/>
+          <p:cNvPr id="37" name="TextBox 36"/>
           <p:cNvSpPr txBox="1"/>
           <p:nvPr/>
         </p:nvSpPr>
         <p:spPr>
           <a:xfrm>
-            <a:off x="35585400" y="7262230"/>
-            <a:ext cx="3176861" cy="830997"/>
+            <a:off x="39281303" y="7317031"/>
+            <a:ext cx="3836128" cy="1569660"/>
           </a:xfrm>
           <a:prstGeom prst="rect">
             <a:avLst/>
@@ -3656,7 +4126,7 @@
                   </a:outerShdw>
                 </a:effectLst>
               </a:rPr>
-              <a:t>Jon </a:t>
+              <a:t>Dr. Ali </a:t>
             </a:r>
             <a:r>
               <a:rPr lang="en-US" sz="4800" dirty="0" err="1">
@@ -3672,7 +4142,7 @@
                   </a:outerShdw>
                 </a:effectLst>
               </a:rPr>
-              <a:t>Deibel</a:t>
+              <a:t>Minai</a:t>
             </a:r>
             <a:endParaRPr lang="en-US" sz="4800" dirty="0">
               <a:ln w="0"/>
@@ -3688,77 +4158,6 @@
               </a:effectLst>
             </a:endParaRPr>
           </a:p>
-        </p:txBody>
-      </p:sp>
-      <p:sp>
-        <p:nvSpPr>
-          <p:cNvPr id="37" name="TextBox 36"/>
-          <p:cNvSpPr txBox="1"/>
-          <p:nvPr/>
-        </p:nvSpPr>
-        <p:spPr>
-          <a:xfrm>
-            <a:off x="39281303" y="7317031"/>
-            <a:ext cx="3836128" cy="1569660"/>
-          </a:xfrm>
-          <a:prstGeom prst="rect">
-            <a:avLst/>
-          </a:prstGeom>
-          <a:noFill/>
-        </p:spPr>
-        <p:txBody>
-          <a:bodyPr wrap="square" rtlCol="0">
-            <a:spAutoFit/>
-          </a:bodyPr>
-          <a:lstStyle/>
-          <a:p>
-            <a:pPr lvl="0"/>
-            <a:r>
-              <a:rPr lang="en-US" sz="4800" dirty="0">
-                <a:ln w="0"/>
-                <a:solidFill>
-                  <a:prstClr val="black"/>
-                </a:solidFill>
-                <a:effectLst>
-                  <a:outerShdw blurRad="38100" dist="19050" dir="2700000" algn="tl" rotWithShape="0">
-                    <a:prstClr val="black">
-                      <a:alpha val="40000"/>
-                    </a:prstClr>
-                  </a:outerShdw>
-                </a:effectLst>
-              </a:rPr>
-              <a:t>Dr. Ali </a:t>
-            </a:r>
-            <a:r>
-              <a:rPr lang="en-US" sz="4800" dirty="0" err="1">
-                <a:ln w="0"/>
-                <a:solidFill>
-                  <a:prstClr val="black"/>
-                </a:solidFill>
-                <a:effectLst>
-                  <a:outerShdw blurRad="38100" dist="19050" dir="2700000" algn="tl" rotWithShape="0">
-                    <a:prstClr val="black">
-                      <a:alpha val="40000"/>
-                    </a:prstClr>
-                  </a:outerShdw>
-                </a:effectLst>
-              </a:rPr>
-              <a:t>Minai</a:t>
-            </a:r>
-            <a:endParaRPr lang="en-US" sz="4800" dirty="0">
-              <a:ln w="0"/>
-              <a:solidFill>
-                <a:prstClr val="black"/>
-              </a:solidFill>
-              <a:effectLst>
-                <a:outerShdw blurRad="38100" dist="19050" dir="2700000" algn="tl" rotWithShape="0">
-                  <a:prstClr val="black">
-                    <a:alpha val="40000"/>
-                  </a:prstClr>
-                </a:outerShdw>
-              </a:effectLst>
-            </a:endParaRPr>
-          </a:p>
           <a:p>
             <a:pPr lvl="0"/>
             <a:r>
@@ -3789,7 +4188,7 @@
           <p:nvPr/>
         </p:nvPicPr>
         <p:blipFill>
-          <a:blip r:embed="rId2">
+          <a:blip r:embed="rId3">
             <a:extLst>
               <a:ext uri="{28A0092B-C50C-407E-A947-70E740481C1C}">
                 <a14:useLocalDpi xmlns:a14="http://schemas.microsoft.com/office/drawing/2010/main" val="0"/>
@@ -3803,7 +4202,7 @@
         </p:blipFill>
         <p:spPr bwMode="auto">
           <a:xfrm>
-            <a:off x="2017069" y="1069103"/>
+            <a:off x="2017069" y="228600"/>
             <a:ext cx="31299994" cy="4245118"/>
           </a:xfrm>
           <a:prstGeom prst="rect">
@@ -3830,7 +4229,7 @@
           <p:nvPr/>
         </p:nvPicPr>
         <p:blipFill>
-          <a:blip r:embed="rId3">
+          <a:blip r:embed="rId4">
             <a:extLst>
               <a:ext uri="{28A0092B-C50C-407E-A947-70E740481C1C}">
                 <a14:useLocalDpi xmlns:a14="http://schemas.microsoft.com/office/drawing/2010/main" val="0"/>
@@ -3876,7 +4275,7 @@
           <p:nvPr/>
         </p:nvPicPr>
         <p:blipFill rotWithShape="1">
-          <a:blip r:embed="rId4">
+          <a:blip r:embed="rId5">
             <a:extLst>
               <a:ext uri="{28A0092B-C50C-407E-A947-70E740481C1C}">
                 <a14:useLocalDpi xmlns:a14="http://schemas.microsoft.com/office/drawing/2010/main" val="0"/>
@@ -3921,7 +4320,7 @@
           <p:nvPr/>
         </p:nvPicPr>
         <p:blipFill>
-          <a:blip r:embed="rId5">
+          <a:blip r:embed="rId6">
             <a:extLst>
               <a:ext uri="{28A0092B-C50C-407E-A947-70E740481C1C}">
                 <a14:useLocalDpi xmlns:a14="http://schemas.microsoft.com/office/drawing/2010/main" val="0"/>
@@ -3967,7 +4366,7 @@
           <p:nvPr/>
         </p:nvPicPr>
         <p:blipFill rotWithShape="1">
-          <a:blip r:embed="rId6">
+          <a:blip r:embed="rId7">
             <a:extLst>
               <a:ext uri="{28A0092B-C50C-407E-A947-70E740481C1C}">
                 <a14:useLocalDpi xmlns:a14="http://schemas.microsoft.com/office/drawing/2010/main" val="0"/>
@@ -4103,8 +4502,8 @@
         </p:nvSpPr>
         <p:spPr>
           <a:xfrm>
-            <a:off x="33972386" y="17151320"/>
-            <a:ext cx="9525000" cy="6832640"/>
+            <a:off x="34026692" y="15367029"/>
+            <a:ext cx="9525000" cy="9048631"/>
           </a:xfrm>
           <a:prstGeom prst="rect">
             <a:avLst/>
@@ -4195,6 +4594,34 @@
               <a:t>2/5 – Update to sparse and intermittent reward systems. </a:t>
             </a:r>
           </a:p>
+          <a:p>
+            <a:pPr marL="685800" lvl="0" indent="-685800">
+              <a:buFont typeface="Arial" panose="020B0604020202020204" pitchFamily="34" charset="0"/>
+              <a:buChar char="•"/>
+            </a:pPr>
+            <a:r>
+              <a:rPr lang="en-US" sz="4800" dirty="0">
+                <a:solidFill>
+                  <a:prstClr val="white"/>
+                </a:solidFill>
+              </a:rPr>
+              <a:t>3/10 – Included new units and abilities in action space</a:t>
+            </a:r>
+          </a:p>
+          <a:p>
+            <a:pPr marL="685800" lvl="0" indent="-685800">
+              <a:buFont typeface="Arial" panose="020B0604020202020204" pitchFamily="34" charset="0"/>
+              <a:buChar char="•"/>
+            </a:pPr>
+            <a:r>
+              <a:rPr lang="en-US" sz="4800" dirty="0">
+                <a:solidFill>
+                  <a:prstClr val="white"/>
+                </a:solidFill>
+              </a:rPr>
+              <a:t>3/16 – LSTM model implemented</a:t>
+            </a:r>
+          </a:p>
         </p:txBody>
       </p:sp>
       <p:sp>
@@ -4205,8 +4632,8 @@
         </p:nvSpPr>
         <p:spPr>
           <a:xfrm>
-            <a:off x="33812363" y="24921380"/>
-            <a:ext cx="9395458" cy="6093976"/>
+            <a:off x="33881908" y="25693323"/>
+            <a:ext cx="9395458" cy="6832640"/>
           </a:xfrm>
           <a:prstGeom prst="rect">
             <a:avLst/>
@@ -4240,12 +4667,6 @@
               </a:rPr>
               <a:t>Future Work</a:t>
             </a:r>
-          </a:p>
-          <a:p>
-            <a:pPr marL="685800" lvl="0" indent="-685800">
-              <a:buFont typeface="Arial" panose="020B0604020202020204" pitchFamily="34" charset="0"/>
-              <a:buChar char="•"/>
-            </a:pPr>
             <a:endParaRPr lang="en-US" sz="4800" dirty="0">
               <a:solidFill>
                 <a:prstClr val="white"/>
@@ -4258,20 +4679,12 @@
               <a:buChar char="•"/>
             </a:pPr>
             <a:r>
-              <a:rPr lang="en-US" sz="4800" dirty="0" smtClean="0">
+              <a:rPr lang="en-US" sz="4800" dirty="0">
                 <a:solidFill>
                   <a:prstClr val="white"/>
                 </a:solidFill>
               </a:rPr>
-              <a:t>Expand </a:t>
-            </a:r>
-            <a:r>
-              <a:rPr lang="en-US" sz="4800" dirty="0">
-                <a:solidFill>
-                  <a:prstClr val="white"/>
-                </a:solidFill>
-              </a:rPr>
-              <a:t>action space to the full possibility of </a:t>
+              <a:t>Expand action space to the full possibility of </a:t>
             </a:r>
             <a:r>
               <a:rPr lang="en-US" sz="4800" dirty="0" err="1">
@@ -4315,15 +4728,7 @@
                   <a:prstClr val="white"/>
                 </a:solidFill>
               </a:rPr>
-              <a:t>Train AI to change camera location</a:t>
-            </a:r>
-            <a:r>
-              <a:rPr lang="en-US" sz="4800" dirty="0" smtClean="0">
-                <a:solidFill>
-                  <a:prstClr val="white"/>
-                </a:solidFill>
-              </a:rPr>
-              <a:t>. </a:t>
+              <a:t>Train AI to change camera location. </a:t>
             </a:r>
           </a:p>
           <a:p>
@@ -4332,20 +4737,26 @@
               <a:buChar char="•"/>
             </a:pPr>
             <a:r>
-              <a:rPr lang="en-US" sz="4800" dirty="0" smtClean="0">
+              <a:rPr lang="en-US" sz="4800" dirty="0">
                 <a:solidFill>
                   <a:prstClr val="white"/>
                 </a:solidFill>
               </a:rPr>
-              <a:t>Train </a:t>
-            </a:r>
+              <a:t>Train AI to play as other races.</a:t>
+            </a:r>
+          </a:p>
+          <a:p>
+            <a:pPr marL="685800" lvl="0" indent="-685800">
+              <a:buFont typeface="Arial" panose="020B0604020202020204" pitchFamily="34" charset="0"/>
+              <a:buChar char="•"/>
+            </a:pPr>
             <a:r>
               <a:rPr lang="en-US" sz="4800" dirty="0">
                 <a:solidFill>
                   <a:prstClr val="white"/>
                 </a:solidFill>
               </a:rPr>
-              <a:t>AI to play as other races</a:t>
+              <a:t>Train against higher difficulty Blizzard AIs.</a:t>
             </a:r>
           </a:p>
         </p:txBody>
@@ -4359,7 +4770,7 @@
           <p:nvPr/>
         </p:nvPicPr>
         <p:blipFill>
-          <a:blip r:embed="rId7" cstate="print">
+          <a:blip r:embed="rId8" cstate="print">
             <a:extLst>
               <a:ext uri="{28A0092B-C50C-407E-A947-70E740481C1C}">
                 <a14:useLocalDpi xmlns:a14="http://schemas.microsoft.com/office/drawing/2010/main" val="0"/>
@@ -4373,8 +4784,8 @@
         </p:blipFill>
         <p:spPr bwMode="auto">
           <a:xfrm>
-            <a:off x="12794533" y="27780101"/>
-            <a:ext cx="3465627" cy="3465627"/>
+            <a:off x="12553294" y="29435939"/>
+            <a:ext cx="2677248" cy="2677248"/>
           </a:xfrm>
           <a:prstGeom prst="rect">
             <a:avLst/>
@@ -4400,7 +4811,7 @@
           <p:nvPr/>
         </p:nvPicPr>
         <p:blipFill>
-          <a:blip r:embed="rId8">
+          <a:blip r:embed="rId9">
             <a:extLst>
               <a:ext uri="{28A0092B-C50C-407E-A947-70E740481C1C}">
                 <a14:useLocalDpi xmlns:a14="http://schemas.microsoft.com/office/drawing/2010/main" val="0"/>
@@ -4414,8 +4825,8 @@
         </p:blipFill>
         <p:spPr bwMode="auto">
           <a:xfrm>
-            <a:off x="17602892" y="27780102"/>
-            <a:ext cx="3599519" cy="3599520"/>
+            <a:off x="17938937" y="29426932"/>
+            <a:ext cx="2780681" cy="2780682"/>
           </a:xfrm>
           <a:prstGeom prst="rect">
             <a:avLst/>
@@ -4441,11 +4852,11 @@
           <p:nvPr/>
         </p:nvPicPr>
         <p:blipFill>
-          <a:blip r:embed="rId9">
+          <a:blip r:embed="rId10">
             <a:extLst>
               <a:ext uri="{BEBA8EAE-BF5A-486C-A8C5-ECC9F3942E4B}">
                 <a14:imgProps xmlns:a14="http://schemas.microsoft.com/office/drawing/2010/main">
-                  <a14:imgLayer r:embed="rId10">
+                  <a14:imgLayer r:embed="rId11">
                     <a14:imgEffect>
                       <a14:backgroundRemoval t="4500" b="95250" l="5750" r="94750">
                         <a14:foregroundMark x1="32500" y1="56250" x2="27500" y2="41750"/>
@@ -4469,8 +4880,8 @@
         </p:blipFill>
         <p:spPr bwMode="auto">
           <a:xfrm>
-            <a:off x="21697711" y="27780101"/>
-            <a:ext cx="3810000" cy="3810000"/>
+            <a:off x="22500430" y="29426932"/>
+            <a:ext cx="2943281" cy="2943281"/>
           </a:xfrm>
           <a:prstGeom prst="rect">
             <a:avLst/>
@@ -4496,7 +4907,7 @@
           <p:nvPr/>
         </p:nvPicPr>
         <p:blipFill rotWithShape="1">
-          <a:blip r:embed="rId11" cstate="print">
+          <a:blip r:embed="rId12" cstate="print">
             <a:extLst>
               <a:ext uri="{28A0092B-C50C-407E-A947-70E740481C1C}">
                 <a14:useLocalDpi xmlns:a14="http://schemas.microsoft.com/office/drawing/2010/main" val="0"/>
@@ -4508,8 +4919,8 @@
         </p:blipFill>
         <p:spPr bwMode="auto">
           <a:xfrm>
-            <a:off x="27114811" y="27653969"/>
-            <a:ext cx="3912812" cy="3936132"/>
+            <a:off x="28206817" y="29254203"/>
+            <a:ext cx="3022705" cy="3040720"/>
           </a:xfrm>
           <a:prstGeom prst="rect">
             <a:avLst/>
@@ -4531,7 +4942,7 @@
           <p:cNvPr id="30" name="Rounded Rectangle 29">
             <a:extLst>
               <a:ext uri="{FF2B5EF4-FFF2-40B4-BE49-F238E27FC236}">
-                <a16:creationId xmlns="" xmlns:a16="http://schemas.microsoft.com/office/drawing/2014/main" id="{DE73C9F6-216E-804C-8ADB-FE5D010D3793}"/>
+                <a16:creationId xmlns:a16="http://schemas.microsoft.com/office/drawing/2014/main" id="{DE73C9F6-216E-804C-8ADB-FE5D010D3793}"/>
               </a:ext>
             </a:extLst>
           </p:cNvPr>
@@ -4540,7 +4951,7 @@
         </p:nvSpPr>
         <p:spPr>
           <a:xfrm>
-            <a:off x="80307" y="23894143"/>
+            <a:off x="0" y="23894143"/>
             <a:ext cx="10515600" cy="8839200"/>
           </a:xfrm>
           <a:prstGeom prst="roundRect">
@@ -4584,7 +4995,7 @@
           <p:cNvPr id="32" name="Rectangle 31">
             <a:extLst>
               <a:ext uri="{FF2B5EF4-FFF2-40B4-BE49-F238E27FC236}">
-                <a16:creationId xmlns="" xmlns:a16="http://schemas.microsoft.com/office/drawing/2014/main" id="{496AC655-5F1F-DF43-A526-2752994F2936}"/>
+                <a16:creationId xmlns:a16="http://schemas.microsoft.com/office/drawing/2014/main" id="{496AC655-5F1F-DF43-A526-2752994F2936}"/>
               </a:ext>
             </a:extLst>
           </p:cNvPr>
@@ -4687,13 +5098,15 @@
               <a:buChar char="•"/>
             </a:pPr>
             <a:r>
-              <a:rPr lang="en-US" sz="4800" dirty="0" smtClean="0">
+              <a:rPr lang="en-US" sz="4800" dirty="0">
                 <a:solidFill>
                   <a:schemeClr val="bg1"/>
                 </a:solidFill>
               </a:rPr>
               <a:t>Real Time Action Selection</a:t>
             </a:r>
+          </a:p>
+          <a:p>
             <a:endParaRPr lang="en-US" sz="4800" dirty="0">
               <a:solidFill>
                 <a:schemeClr val="bg1"/>
@@ -4701,13 +5114,6 @@
             </a:endParaRPr>
           </a:p>
           <a:p>
-            <a:endParaRPr lang="en-US" sz="4800" dirty="0">
-              <a:solidFill>
-                <a:schemeClr val="bg1"/>
-              </a:solidFill>
-            </a:endParaRPr>
-          </a:p>
-          <a:p>
             <a:r>
               <a:rPr lang="en-US" sz="4800" dirty="0">
                 <a:solidFill>
@@ -4717,7 +5123,7 @@
               <a:t>To account for some of these challenges, we developed a deep </a:t>
             </a:r>
             <a:r>
-              <a:rPr lang="en-US" sz="4800" smtClean="0">
+              <a:rPr lang="en-US" sz="4800">
                 <a:solidFill>
                   <a:schemeClr val="bg1"/>
                 </a:solidFill>
@@ -4748,7 +5154,7 @@
           <p:cNvPr id="38" name="Rounded Rectangle 37">
             <a:extLst>
               <a:ext uri="{FF2B5EF4-FFF2-40B4-BE49-F238E27FC236}">
-                <a16:creationId xmlns="" xmlns:a16="http://schemas.microsoft.com/office/drawing/2014/main" id="{17388C3C-2703-2B4C-8E09-FE498740CCE4}"/>
+                <a16:creationId xmlns:a16="http://schemas.microsoft.com/office/drawing/2014/main" id="{17388C3C-2703-2B4C-8E09-FE498740CCE4}"/>
               </a:ext>
             </a:extLst>
           </p:cNvPr>
@@ -4758,7 +5164,7 @@
         <p:spPr>
           <a:xfrm>
             <a:off x="33371791" y="8893152"/>
-            <a:ext cx="10660382" cy="7408044"/>
+            <a:ext cx="10460872" cy="6053111"/>
           </a:xfrm>
           <a:prstGeom prst="roundRect">
             <a:avLst>
@@ -4801,7 +5207,7 @@
           <p:cNvPr id="39" name="Rectangle 38">
             <a:extLst>
               <a:ext uri="{FF2B5EF4-FFF2-40B4-BE49-F238E27FC236}">
-                <a16:creationId xmlns="" xmlns:a16="http://schemas.microsoft.com/office/drawing/2014/main" id="{A12D1386-A095-1243-8DEE-BD8E8AA74461}"/>
+                <a16:creationId xmlns:a16="http://schemas.microsoft.com/office/drawing/2014/main" id="{A12D1386-A095-1243-8DEE-BD8E8AA74461}"/>
               </a:ext>
             </a:extLst>
           </p:cNvPr>
@@ -4861,7 +5267,7 @@
           <p:cNvPr id="2" name="Table 1">
             <a:extLst>
               <a:ext uri="{FF2B5EF4-FFF2-40B4-BE49-F238E27FC236}">
-                <a16:creationId xmlns="" xmlns:a16="http://schemas.microsoft.com/office/drawing/2014/main" id="{AE5265D8-5D26-1745-9A48-35B200A3BD8B}"/>
+                <a16:creationId xmlns:a16="http://schemas.microsoft.com/office/drawing/2014/main" id="{AE5265D8-5D26-1745-9A48-35B200A3BD8B}"/>
               </a:ext>
             </a:extLst>
           </p:cNvPr>
@@ -4890,14 +5296,14 @@
                 <a:gridCol w="4904438">
                   <a:extLst>
                     <a:ext uri="{9D8B030D-6E8A-4147-A177-3AD203B41FA5}">
-                      <a16:colId xmlns="" xmlns:a16="http://schemas.microsoft.com/office/drawing/2014/main" val="1404240551"/>
+                      <a16:colId xmlns:a16="http://schemas.microsoft.com/office/drawing/2014/main" val="1404240551"/>
                     </a:ext>
                   </a:extLst>
                 </a:gridCol>
                 <a:gridCol w="4904438">
                   <a:extLst>
                     <a:ext uri="{9D8B030D-6E8A-4147-A177-3AD203B41FA5}">
-                      <a16:colId xmlns="" xmlns:a16="http://schemas.microsoft.com/office/drawing/2014/main" val="2303060108"/>
+                      <a16:colId xmlns:a16="http://schemas.microsoft.com/office/drawing/2014/main" val="2303060108"/>
                     </a:ext>
                   </a:extLst>
                 </a:gridCol>
@@ -4941,7 +5347,7 @@
                 </a:tc>
                 <a:extLst>
                   <a:ext uri="{0D108BD9-81ED-4DB2-BD59-A6C34878D82A}">
-                    <a16:rowId xmlns="" xmlns:a16="http://schemas.microsoft.com/office/drawing/2014/main" val="417556600"/>
+                    <a16:rowId xmlns:a16="http://schemas.microsoft.com/office/drawing/2014/main" val="417556600"/>
                   </a:ext>
                 </a:extLst>
               </a:tr>
@@ -4971,20 +5377,12 @@
                     <a:p>
                       <a:pPr algn="ctr"/>
                       <a:r>
-                        <a:rPr lang="en-US" sz="4800" dirty="0" smtClean="0">
-                          <a:solidFill>
-                            <a:schemeClr val="bg1"/>
-                          </a:solidFill>
-                        </a:rPr>
-                        <a:t>50</a:t>
-                      </a:r>
-                      <a:r>
                         <a:rPr lang="en-US" sz="4800" dirty="0">
                           <a:solidFill>
                             <a:schemeClr val="bg1"/>
                           </a:solidFill>
                         </a:rPr>
-                        <a:t>%</a:t>
+                        <a:t>50%</a:t>
                       </a:r>
                     </a:p>
                   </a:txBody>
@@ -4992,7 +5390,7 @@
                 </a:tc>
                 <a:extLst>
                   <a:ext uri="{0D108BD9-81ED-4DB2-BD59-A6C34878D82A}">
-                    <a16:rowId xmlns="" xmlns:a16="http://schemas.microsoft.com/office/drawing/2014/main" val="677520262"/>
+                    <a16:rowId xmlns:a16="http://schemas.microsoft.com/office/drawing/2014/main" val="677520262"/>
                   </a:ext>
                 </a:extLst>
               </a:tr>
@@ -5027,23 +5425,7 @@
                             <a:schemeClr val="bg1"/>
                           </a:solidFill>
                         </a:rPr>
-                        <a:t>8</a:t>
-                      </a:r>
-                      <a:r>
-                        <a:rPr lang="en-US" sz="4800" dirty="0" smtClean="0">
-                          <a:solidFill>
-                            <a:schemeClr val="bg1"/>
-                          </a:solidFill>
-                        </a:rPr>
-                        <a:t>4</a:t>
-                      </a:r>
-                      <a:r>
-                        <a:rPr lang="en-US" sz="4800" dirty="0">
-                          <a:solidFill>
-                            <a:schemeClr val="bg1"/>
-                          </a:solidFill>
-                        </a:rPr>
-                        <a:t>%</a:t>
+                        <a:t>84%</a:t>
                       </a:r>
                     </a:p>
                   </a:txBody>
@@ -5051,7 +5433,7 @@
                 </a:tc>
                 <a:extLst>
                   <a:ext uri="{0D108BD9-81ED-4DB2-BD59-A6C34878D82A}">
-                    <a16:rowId xmlns="" xmlns:a16="http://schemas.microsoft.com/office/drawing/2014/main" val="1684611308"/>
+                    <a16:rowId xmlns:a16="http://schemas.microsoft.com/office/drawing/2014/main" val="1684611308"/>
                   </a:ext>
                 </a:extLst>
               </a:tr>
@@ -5068,7 +5450,7 @@
           <p:nvPr/>
         </p:nvPicPr>
         <p:blipFill rotWithShape="1">
-          <a:blip r:embed="rId12">
+          <a:blip r:embed="rId13">
             <a:extLst>
               <a:ext uri="{28A0092B-C50C-407E-A947-70E740481C1C}">
                 <a14:useLocalDpi xmlns:a14="http://schemas.microsoft.com/office/drawing/2010/main" val="0"/>
@@ -5088,30 +5470,6 @@
           </a:prstGeom>
         </p:spPr>
       </p:pic>
-      <p:pic>
-        <p:nvPicPr>
-          <p:cNvPr id="7" name="Picture 6"/>
-          <p:cNvPicPr>
-            <a:picLocks noChangeAspect="1"/>
-          </p:cNvPicPr>
-          <p:nvPr/>
-        </p:nvPicPr>
-        <p:blipFill>
-          <a:blip r:embed="rId13"/>
-          <a:stretch>
-            <a:fillRect/>
-          </a:stretch>
-        </p:blipFill>
-        <p:spPr>
-          <a:xfrm>
-            <a:off x="13884042" y="19406129"/>
-            <a:ext cx="2476500" cy="2476500"/>
-          </a:xfrm>
-          <a:prstGeom prst="rect">
-            <a:avLst/>
-          </a:prstGeom>
-        </p:spPr>
-      </p:pic>
       <p:sp>
         <p:nvSpPr>
           <p:cNvPr id="8" name="TextBox 7"/>
@@ -5120,7 +5478,7 @@
         </p:nvSpPr>
         <p:spPr>
           <a:xfrm>
-            <a:off x="13884042" y="18805853"/>
+            <a:off x="13366681" y="20442792"/>
             <a:ext cx="2476500" cy="584775"/>
           </a:xfrm>
           <a:prstGeom prst="rect">
@@ -5136,12 +5494,46 @@
           <a:p>
             <a:pPr algn="ctr"/>
             <a:r>
-              <a:rPr lang="en-US" sz="3200" dirty="0" smtClean="0">
+              <a:rPr lang="en-US" sz="3200" dirty="0">
                 <a:solidFill>
                   <a:schemeClr val="bg1"/>
                 </a:solidFill>
               </a:rPr>
               <a:t>Creep</a:t>
+            </a:r>
+          </a:p>
+        </p:txBody>
+      </p:sp>
+      <p:sp>
+        <p:nvSpPr>
+          <p:cNvPr id="45" name="TextBox 44"/>
+          <p:cNvSpPr txBox="1"/>
+          <p:nvPr/>
+        </p:nvSpPr>
+        <p:spPr>
+          <a:xfrm>
+            <a:off x="16337745" y="20442792"/>
+            <a:ext cx="2985434" cy="600276"/>
+          </a:xfrm>
+          <a:prstGeom prst="rect">
+            <a:avLst/>
+          </a:prstGeom>
+          <a:noFill/>
+        </p:spPr>
+        <p:txBody>
+          <a:bodyPr wrap="square" rtlCol="0">
+            <a:spAutoFit/>
+          </a:bodyPr>
+          <a:lstStyle/>
+          <a:p>
+            <a:pPr algn="ctr"/>
+            <a:r>
+              <a:rPr lang="en-US" sz="3200">
+                <a:solidFill>
+                  <a:schemeClr val="bg1"/>
+                </a:solidFill>
+              </a:rPr>
+              <a:t>Player Relative</a:t>
             </a:r>
             <a:endParaRPr lang="en-US" sz="3200" dirty="0">
               <a:solidFill>
@@ -5151,40 +5543,16 @@
           </a:p>
         </p:txBody>
       </p:sp>
-      <p:pic>
-        <p:nvPicPr>
-          <p:cNvPr id="41" name="Picture 40"/>
-          <p:cNvPicPr>
-            <a:picLocks noChangeAspect="1"/>
-          </p:cNvPicPr>
-          <p:nvPr/>
-        </p:nvPicPr>
-        <p:blipFill>
-          <a:blip r:embed="rId13"/>
-          <a:stretch>
-            <a:fillRect/>
-          </a:stretch>
-        </p:blipFill>
-        <p:spPr>
-          <a:xfrm>
-            <a:off x="16998280" y="19406129"/>
-            <a:ext cx="2476500" cy="2476500"/>
-          </a:xfrm>
-          <a:prstGeom prst="rect">
-            <a:avLst/>
-          </a:prstGeom>
-        </p:spPr>
-      </p:pic>
-      <p:sp>
-        <p:nvSpPr>
-          <p:cNvPr id="45" name="TextBox 44"/>
+      <p:sp>
+        <p:nvSpPr>
+          <p:cNvPr id="50" name="TextBox 49"/>
           <p:cNvSpPr txBox="1"/>
           <p:nvPr/>
         </p:nvSpPr>
         <p:spPr>
           <a:xfrm>
-            <a:off x="16855106" y="18805853"/>
-            <a:ext cx="2985434" cy="600276"/>
+            <a:off x="13366681" y="23681945"/>
+            <a:ext cx="2476500" cy="584775"/>
           </a:xfrm>
           <a:prstGeom prst="rect">
             <a:avLst/>
@@ -5199,30 +5567,25 @@
           <a:p>
             <a:pPr algn="ctr"/>
             <a:r>
-              <a:rPr lang="en-US" sz="3200" smtClean="0">
+              <a:rPr lang="en-US" sz="3200" dirty="0">
                 <a:solidFill>
                   <a:schemeClr val="bg1"/>
                 </a:solidFill>
               </a:rPr>
-              <a:t>Player Relative</a:t>
-            </a:r>
-            <a:endParaRPr lang="en-US" sz="3200" dirty="0">
-              <a:solidFill>
-                <a:schemeClr val="bg1"/>
-              </a:solidFill>
-            </a:endParaRPr>
-          </a:p>
-        </p:txBody>
-      </p:sp>
-      <p:sp>
-        <p:nvSpPr>
-          <p:cNvPr id="50" name="TextBox 49"/>
+              <a:t>Selected</a:t>
+            </a:r>
+          </a:p>
+        </p:txBody>
+      </p:sp>
+      <p:sp>
+        <p:nvSpPr>
+          <p:cNvPr id="52" name="TextBox 51"/>
           <p:cNvSpPr txBox="1"/>
           <p:nvPr/>
         </p:nvSpPr>
         <p:spPr>
           <a:xfrm>
-            <a:off x="13884042" y="22045006"/>
+            <a:off x="16480814" y="23681944"/>
             <a:ext cx="2476500" cy="584775"/>
           </a:xfrm>
           <a:prstGeom prst="rect">
@@ -5238,30 +5601,25 @@
           <a:p>
             <a:pPr algn="ctr"/>
             <a:r>
-              <a:rPr lang="en-US" sz="3200" dirty="0" smtClean="0">
+              <a:rPr lang="en-US" sz="3200" dirty="0">
                 <a:solidFill>
                   <a:schemeClr val="bg1"/>
                 </a:solidFill>
               </a:rPr>
-              <a:t>Selected</a:t>
-            </a:r>
-            <a:endParaRPr lang="en-US" sz="3200" dirty="0">
-              <a:solidFill>
-                <a:schemeClr val="bg1"/>
-              </a:solidFill>
-            </a:endParaRPr>
-          </a:p>
-        </p:txBody>
-      </p:sp>
-      <p:sp>
-        <p:nvSpPr>
-          <p:cNvPr id="52" name="TextBox 51"/>
+              <a:t>Hit Points</a:t>
+            </a:r>
+          </a:p>
+        </p:txBody>
+      </p:sp>
+      <p:sp>
+        <p:nvSpPr>
+          <p:cNvPr id="54" name="TextBox 53"/>
           <p:cNvSpPr txBox="1"/>
           <p:nvPr/>
         </p:nvSpPr>
         <p:spPr>
           <a:xfrm>
-            <a:off x="16998175" y="22045005"/>
+            <a:off x="22729430" y="20423714"/>
             <a:ext cx="2476500" cy="584775"/>
           </a:xfrm>
           <a:prstGeom prst="rect">
@@ -5277,30 +5635,25 @@
           <a:p>
             <a:pPr algn="ctr"/>
             <a:r>
-              <a:rPr lang="en-US" sz="3200" dirty="0" smtClean="0">
+              <a:rPr lang="en-US" sz="3200" dirty="0">
                 <a:solidFill>
                   <a:schemeClr val="bg1"/>
                 </a:solidFill>
               </a:rPr>
-              <a:t>Hit Points</a:t>
-            </a:r>
-            <a:endParaRPr lang="en-US" sz="3200" dirty="0">
-              <a:solidFill>
-                <a:schemeClr val="bg1"/>
-              </a:solidFill>
-            </a:endParaRPr>
-          </a:p>
-        </p:txBody>
-      </p:sp>
-      <p:sp>
-        <p:nvSpPr>
-          <p:cNvPr id="54" name="TextBox 53"/>
+              <a:t>Height Map</a:t>
+            </a:r>
+          </a:p>
+        </p:txBody>
+      </p:sp>
+      <p:sp>
+        <p:nvSpPr>
+          <p:cNvPr id="56" name="TextBox 55"/>
           <p:cNvSpPr txBox="1"/>
           <p:nvPr/>
         </p:nvSpPr>
         <p:spPr>
           <a:xfrm>
-            <a:off x="21947124" y="18805853"/>
+            <a:off x="25695236" y="20423713"/>
             <a:ext cx="2476500" cy="584775"/>
           </a:xfrm>
           <a:prstGeom prst="rect">
@@ -5316,30 +5669,25 @@
           <a:p>
             <a:pPr algn="ctr"/>
             <a:r>
-              <a:rPr lang="en-US" sz="3200" dirty="0" smtClean="0">
+              <a:rPr lang="en-US" sz="3200" dirty="0">
                 <a:solidFill>
                   <a:schemeClr val="bg1"/>
                 </a:solidFill>
               </a:rPr>
-              <a:t>Height Map</a:t>
-            </a:r>
-            <a:endParaRPr lang="en-US" sz="3200" dirty="0">
-              <a:solidFill>
-                <a:schemeClr val="bg1"/>
-              </a:solidFill>
-            </a:endParaRPr>
-          </a:p>
-        </p:txBody>
-      </p:sp>
-      <p:sp>
-        <p:nvSpPr>
-          <p:cNvPr id="56" name="TextBox 55"/>
+              <a:t>Visibility</a:t>
+            </a:r>
+          </a:p>
+        </p:txBody>
+      </p:sp>
+      <p:sp>
+        <p:nvSpPr>
+          <p:cNvPr id="58" name="TextBox 57"/>
           <p:cNvSpPr txBox="1"/>
           <p:nvPr/>
         </p:nvSpPr>
         <p:spPr>
           <a:xfrm>
-            <a:off x="24912930" y="18805852"/>
+            <a:off x="28725301" y="20427082"/>
             <a:ext cx="2476500" cy="584775"/>
           </a:xfrm>
           <a:prstGeom prst="rect">
@@ -5355,31 +5703,26 @@
           <a:p>
             <a:pPr algn="ctr"/>
             <a:r>
-              <a:rPr lang="en-US" sz="3200" dirty="0" smtClean="0">
+              <a:rPr lang="en-US" sz="3200" dirty="0">
                 <a:solidFill>
                   <a:schemeClr val="bg1"/>
                 </a:solidFill>
               </a:rPr>
-              <a:t>Visibility</a:t>
-            </a:r>
-            <a:endParaRPr lang="en-US" sz="3200" dirty="0">
-              <a:solidFill>
-                <a:schemeClr val="bg1"/>
-              </a:solidFill>
-            </a:endParaRPr>
-          </a:p>
-        </p:txBody>
-      </p:sp>
-      <p:sp>
-        <p:nvSpPr>
-          <p:cNvPr id="58" name="TextBox 57"/>
+              <a:t>Creep</a:t>
+            </a:r>
+          </a:p>
+        </p:txBody>
+      </p:sp>
+      <p:sp>
+        <p:nvSpPr>
+          <p:cNvPr id="60" name="TextBox 59"/>
           <p:cNvSpPr txBox="1"/>
           <p:nvPr/>
         </p:nvSpPr>
         <p:spPr>
           <a:xfrm>
-            <a:off x="27894046" y="18805851"/>
-            <a:ext cx="2476500" cy="584775"/>
+            <a:off x="24196838" y="23737142"/>
+            <a:ext cx="2672861" cy="584775"/>
           </a:xfrm>
           <a:prstGeom prst="rect">
             <a:avLst/>
@@ -5394,31 +5737,26 @@
           <a:p>
             <a:pPr algn="ctr"/>
             <a:r>
-              <a:rPr lang="en-US" sz="3200" dirty="0" smtClean="0">
+              <a:rPr lang="en-US" sz="3200" dirty="0">
                 <a:solidFill>
                   <a:schemeClr val="bg1"/>
                 </a:solidFill>
               </a:rPr>
-              <a:t>Creep</a:t>
-            </a:r>
-            <a:endParaRPr lang="en-US" sz="3200" dirty="0">
-              <a:solidFill>
-                <a:schemeClr val="bg1"/>
-              </a:solidFill>
-            </a:endParaRPr>
-          </a:p>
-        </p:txBody>
-      </p:sp>
-      <p:sp>
-        <p:nvSpPr>
-          <p:cNvPr id="60" name="TextBox 59"/>
+              <a:t>Player Relative</a:t>
+            </a:r>
+          </a:p>
+        </p:txBody>
+      </p:sp>
+      <p:sp>
+        <p:nvSpPr>
+          <p:cNvPr id="62" name="TextBox 61"/>
           <p:cNvSpPr txBox="1"/>
           <p:nvPr/>
         </p:nvSpPr>
         <p:spPr>
           <a:xfrm>
-            <a:off x="23176751" y="22053103"/>
-            <a:ext cx="2672861" cy="584775"/>
+            <a:off x="27184149" y="23681943"/>
+            <a:ext cx="2476500" cy="584775"/>
           </a:xfrm>
           <a:prstGeom prst="rect">
             <a:avLst/>
@@ -5433,31 +5771,26 @@
           <a:p>
             <a:pPr algn="ctr"/>
             <a:r>
-              <a:rPr lang="en-US" sz="3200" dirty="0" smtClean="0">
+              <a:rPr lang="en-US" sz="3200" dirty="0">
                 <a:solidFill>
                   <a:schemeClr val="bg1"/>
                 </a:solidFill>
               </a:rPr>
-              <a:t>Player Relative</a:t>
-            </a:r>
-            <a:endParaRPr lang="en-US" sz="3200" dirty="0">
-              <a:solidFill>
-                <a:schemeClr val="bg1"/>
-              </a:solidFill>
-            </a:endParaRPr>
-          </a:p>
-        </p:txBody>
-      </p:sp>
-      <p:sp>
-        <p:nvSpPr>
-          <p:cNvPr id="62" name="TextBox 61"/>
+              <a:t>Selected</a:t>
+            </a:r>
+          </a:p>
+        </p:txBody>
+      </p:sp>
+      <p:sp>
+        <p:nvSpPr>
+          <p:cNvPr id="9" name="TextBox 8"/>
           <p:cNvSpPr txBox="1"/>
           <p:nvPr/>
         </p:nvSpPr>
         <p:spPr>
           <a:xfrm>
-            <a:off x="26496442" y="22038783"/>
-            <a:ext cx="2476500" cy="584775"/>
+            <a:off x="14570239" y="19467739"/>
+            <a:ext cx="3352800" cy="769441"/>
           </a:xfrm>
           <a:prstGeom prst="rect">
             <a:avLst/>
@@ -5470,47 +5803,8 @@
           </a:bodyPr>
           <a:lstStyle/>
           <a:p>
-            <a:pPr algn="ctr"/>
-            <a:r>
-              <a:rPr lang="en-US" sz="3200" dirty="0" smtClean="0">
-                <a:solidFill>
-                  <a:schemeClr val="bg1"/>
-                </a:solidFill>
-              </a:rPr>
-              <a:t>Selected</a:t>
-            </a:r>
-            <a:endParaRPr lang="en-US" sz="3200" dirty="0">
-              <a:solidFill>
-                <a:schemeClr val="bg1"/>
-              </a:solidFill>
-            </a:endParaRPr>
-          </a:p>
-        </p:txBody>
-      </p:sp>
-      <p:sp>
-        <p:nvSpPr>
-          <p:cNvPr id="9" name="TextBox 8"/>
-          <p:cNvSpPr txBox="1"/>
-          <p:nvPr/>
-        </p:nvSpPr>
-        <p:spPr>
-          <a:xfrm>
-            <a:off x="15087600" y="17830800"/>
-            <a:ext cx="3352800" cy="769441"/>
-          </a:xfrm>
-          <a:prstGeom prst="rect">
-            <a:avLst/>
-          </a:prstGeom>
-          <a:noFill/>
-        </p:spPr>
-        <p:txBody>
-          <a:bodyPr wrap="square" rtlCol="0">
-            <a:spAutoFit/>
-          </a:bodyPr>
-          <a:lstStyle/>
-          <a:p>
-            <a:r>
-              <a:rPr lang="en-US" sz="4400" smtClean="0">
+            <a:r>
+              <a:rPr lang="en-US" sz="4400">
                 <a:solidFill>
                   <a:schemeClr val="bg1"/>
                 </a:solidFill>
@@ -5533,7 +5827,7 @@
         </p:nvSpPr>
         <p:spPr>
           <a:xfrm>
-            <a:off x="23602711" y="17744255"/>
+            <a:off x="24622798" y="19428294"/>
             <a:ext cx="4741714" cy="769441"/>
           </a:xfrm>
           <a:prstGeom prst="rect">
@@ -5549,18 +5843,13 @@
           <a:p>
             <a:pPr algn="ctr"/>
             <a:r>
-              <a:rPr lang="en-US" sz="4400" dirty="0" smtClean="0">
+              <a:rPr lang="en-US" sz="4400" dirty="0">
                 <a:solidFill>
                   <a:schemeClr val="bg1"/>
                 </a:solidFill>
               </a:rPr>
               <a:t>Minimap Layers</a:t>
             </a:r>
-            <a:endParaRPr lang="en-US" sz="4400" dirty="0">
-              <a:solidFill>
-                <a:schemeClr val="bg1"/>
-              </a:solidFill>
-            </a:endParaRPr>
           </a:p>
         </p:txBody>
       </p:sp>
@@ -5586,7 +5875,7 @@
         </p:blipFill>
         <p:spPr>
           <a:xfrm>
-            <a:off x="13882518" y="19406129"/>
+            <a:off x="13365157" y="21043068"/>
             <a:ext cx="2478024" cy="2478024"/>
           </a:xfrm>
           <a:prstGeom prst="rect">
@@ -5596,13 +5885,13 @@
       </p:pic>
       <p:pic>
         <p:nvPicPr>
-          <p:cNvPr id="4" name="Picture 3"/>
+          <p:cNvPr id="10" name="Picture 9"/>
           <p:cNvPicPr>
             <a:picLocks/>
           </p:cNvPicPr>
           <p:nvPr/>
         </p:nvPicPr>
-        <p:blipFill rotWithShape="1">
+        <p:blipFill>
           <a:blip r:embed="rId15">
             <a:extLst>
               <a:ext uri="{28A0092B-C50C-407E-A947-70E740481C1C}">
@@ -5610,13 +5899,14 @@
               </a:ext>
             </a:extLst>
           </a:blip>
-          <a:srcRect t="1388"/>
-          <a:stretch/>
+          <a:stretch>
+            <a:fillRect/>
+          </a:stretch>
         </p:blipFill>
         <p:spPr>
           <a:xfrm>
-            <a:off x="16998280" y="19440525"/>
-            <a:ext cx="2478024" cy="2443628"/>
+            <a:off x="16479290" y="24266720"/>
+            <a:ext cx="2478024" cy="2478024"/>
           </a:xfrm>
           <a:prstGeom prst="rect">
             <a:avLst/>
@@ -5625,7 +5915,7 @@
       </p:pic>
       <p:pic>
         <p:nvPicPr>
-          <p:cNvPr id="5" name="Picture 4"/>
+          <p:cNvPr id="11" name="Picture 10"/>
           <p:cNvPicPr>
             <a:picLocks/>
           </p:cNvPicPr>
@@ -5645,67 +5935,7 @@
         </p:blipFill>
         <p:spPr>
           <a:xfrm>
-            <a:off x="13884042" y="22631400"/>
-            <a:ext cx="2478024" cy="2478024"/>
-          </a:xfrm>
-          <a:prstGeom prst="rect">
-            <a:avLst/>
-          </a:prstGeom>
-        </p:spPr>
-      </p:pic>
-      <p:pic>
-        <p:nvPicPr>
-          <p:cNvPr id="10" name="Picture 9"/>
-          <p:cNvPicPr>
-            <a:picLocks/>
-          </p:cNvPicPr>
-          <p:nvPr/>
-        </p:nvPicPr>
-        <p:blipFill>
-          <a:blip r:embed="rId17">
-            <a:extLst>
-              <a:ext uri="{28A0092B-C50C-407E-A947-70E740481C1C}">
-                <a14:useLocalDpi xmlns:a14="http://schemas.microsoft.com/office/drawing/2010/main" val="0"/>
-              </a:ext>
-            </a:extLst>
-          </a:blip>
-          <a:stretch>
-            <a:fillRect/>
-          </a:stretch>
-        </p:blipFill>
-        <p:spPr>
-          <a:xfrm>
-            <a:off x="16996651" y="22629781"/>
-            <a:ext cx="2478024" cy="2478024"/>
-          </a:xfrm>
-          <a:prstGeom prst="rect">
-            <a:avLst/>
-          </a:prstGeom>
-        </p:spPr>
-      </p:pic>
-      <p:pic>
-        <p:nvPicPr>
-          <p:cNvPr id="11" name="Picture 10"/>
-          <p:cNvPicPr>
-            <a:picLocks/>
-          </p:cNvPicPr>
-          <p:nvPr/>
-        </p:nvPicPr>
-        <p:blipFill>
-          <a:blip r:embed="rId18">
-            <a:extLst>
-              <a:ext uri="{28A0092B-C50C-407E-A947-70E740481C1C}">
-                <a14:useLocalDpi xmlns:a14="http://schemas.microsoft.com/office/drawing/2010/main" val="0"/>
-              </a:ext>
-            </a:extLst>
-          </a:blip>
-          <a:stretch>
-            <a:fillRect/>
-          </a:stretch>
-        </p:blipFill>
-        <p:spPr>
-          <a:xfrm>
-            <a:off x="16998280" y="19406129"/>
+            <a:off x="16480919" y="21043068"/>
             <a:ext cx="2478024" cy="2478024"/>
           </a:xfrm>
           <a:prstGeom prst="rect">
@@ -5735,7 +5965,7 @@
         </p:blipFill>
         <p:spPr>
           <a:xfrm>
-            <a:off x="13884042" y="22631400"/>
+            <a:off x="13366681" y="24268339"/>
             <a:ext cx="2478024" cy="2478024"/>
           </a:xfrm>
           <a:prstGeom prst="rect">
@@ -5745,9 +5975,69 @@
       </p:pic>
       <p:pic>
         <p:nvPicPr>
-          <p:cNvPr id="12" name="Picture 11"/>
+          <p:cNvPr id="13" name="Picture 12"/>
+          <p:cNvPicPr>
+            <a:picLocks/>
+          </p:cNvPicPr>
+          <p:nvPr/>
+        </p:nvPicPr>
+        <p:blipFill>
+          <a:blip r:embed="rId17">
+            <a:extLst>
+              <a:ext uri="{28A0092B-C50C-407E-A947-70E740481C1C}">
+                <a14:useLocalDpi xmlns:a14="http://schemas.microsoft.com/office/drawing/2010/main" val="0"/>
+              </a:ext>
+            </a:extLst>
+          </a:blip>
+          <a:stretch>
+            <a:fillRect/>
+          </a:stretch>
+        </p:blipFill>
+        <p:spPr>
+          <a:xfrm>
+            <a:off x="22786983" y="21008487"/>
+            <a:ext cx="2478024" cy="2478024"/>
+          </a:xfrm>
+          <a:prstGeom prst="rect">
+            <a:avLst/>
+          </a:prstGeom>
+        </p:spPr>
+      </p:pic>
+      <p:pic>
+        <p:nvPicPr>
+          <p:cNvPr id="15" name="Picture 14"/>
           <p:cNvPicPr>
             <a:picLocks noChangeAspect="1"/>
+          </p:cNvPicPr>
+          <p:nvPr/>
+        </p:nvPicPr>
+        <p:blipFill>
+          <a:blip r:embed="rId18">
+            <a:extLst>
+              <a:ext uri="{28A0092B-C50C-407E-A947-70E740481C1C}">
+                <a14:useLocalDpi xmlns:a14="http://schemas.microsoft.com/office/drawing/2010/main" val="0"/>
+              </a:ext>
+            </a:extLst>
+          </a:blip>
+          <a:stretch>
+            <a:fillRect/>
+          </a:stretch>
+        </p:blipFill>
+        <p:spPr>
+          <a:xfrm>
+            <a:off x="25742612" y="21008487"/>
+            <a:ext cx="2478024" cy="2478024"/>
+          </a:xfrm>
+          <a:prstGeom prst="rect">
+            <a:avLst/>
+          </a:prstGeom>
+        </p:spPr>
+      </p:pic>
+      <p:pic>
+        <p:nvPicPr>
+          <p:cNvPr id="18" name="Picture 17"/>
+          <p:cNvPicPr>
+            <a:picLocks/>
           </p:cNvPicPr>
           <p:nvPr/>
         </p:nvPicPr>
@@ -5765,7 +6055,7 @@
         </p:blipFill>
         <p:spPr>
           <a:xfrm>
-            <a:off x="22004677" y="19390628"/>
+            <a:off x="28725301" y="21011859"/>
             <a:ext cx="2478024" cy="2478024"/>
           </a:xfrm>
           <a:prstGeom prst="rect">
@@ -5775,9 +6065,9 @@
       </p:pic>
       <p:pic>
         <p:nvPicPr>
-          <p:cNvPr id="13" name="Picture 12"/>
+          <p:cNvPr id="21" name="Picture 20"/>
           <p:cNvPicPr>
-            <a:picLocks/>
+            <a:picLocks noChangeAspect="1"/>
           </p:cNvPicPr>
           <p:nvPr/>
         </p:nvPicPr>
@@ -5795,7 +6085,7 @@
         </p:blipFill>
         <p:spPr>
           <a:xfrm>
-            <a:off x="22004677" y="19390626"/>
+            <a:off x="24294256" y="24315439"/>
             <a:ext cx="2478024" cy="2478024"/>
           </a:xfrm>
           <a:prstGeom prst="rect">
@@ -5805,9 +6095,9 @@
       </p:pic>
       <p:pic>
         <p:nvPicPr>
-          <p:cNvPr id="15" name="Picture 14"/>
+          <p:cNvPr id="23" name="Picture 22"/>
           <p:cNvPicPr>
-            <a:picLocks noChangeAspect="1"/>
+            <a:picLocks/>
           </p:cNvPicPr>
           <p:nvPr/>
         </p:nvPicPr>
@@ -5825,7 +6115,7 @@
         </p:blipFill>
         <p:spPr>
           <a:xfrm>
-            <a:off x="24960306" y="19390626"/>
+            <a:off x="27182625" y="24342989"/>
             <a:ext cx="2478024" cy="2478024"/>
           </a:xfrm>
           <a:prstGeom prst="rect">
@@ -5833,96 +6123,227 @@
           </a:prstGeom>
         </p:spPr>
       </p:pic>
-      <p:pic>
-        <p:nvPicPr>
-          <p:cNvPr id="18" name="Picture 17"/>
-          <p:cNvPicPr>
-            <a:picLocks/>
-          </p:cNvPicPr>
-          <p:nvPr/>
-        </p:nvPicPr>
-        <p:blipFill>
-          <a:blip r:embed="rId22">
+      <p:sp>
+        <p:nvSpPr>
+          <p:cNvPr id="57" name="TextBox 56">
             <a:extLst>
-              <a:ext uri="{28A0092B-C50C-407E-A947-70E740481C1C}">
-                <a14:useLocalDpi xmlns:a14="http://schemas.microsoft.com/office/drawing/2010/main" val="0"/>
+              <a:ext uri="{FF2B5EF4-FFF2-40B4-BE49-F238E27FC236}">
+                <a16:creationId xmlns:a16="http://schemas.microsoft.com/office/drawing/2014/main" id="{8B0B4026-60C8-475B-A67E-AA2B100CBE43}"/>
               </a:ext>
             </a:extLst>
-          </a:blip>
-          <a:stretch>
-            <a:fillRect/>
-          </a:stretch>
-        </p:blipFill>
-        <p:spPr>
-          <a:xfrm>
-            <a:off x="27894046" y="19390628"/>
-            <a:ext cx="2478024" cy="2478024"/>
+          </p:cNvPr>
+          <p:cNvSpPr txBox="1"/>
+          <p:nvPr/>
+        </p:nvSpPr>
+        <p:spPr>
+          <a:xfrm>
+            <a:off x="35585400" y="3264717"/>
+            <a:ext cx="3455128" cy="830997"/>
           </a:xfrm>
           <a:prstGeom prst="rect">
             <a:avLst/>
           </a:prstGeom>
-        </p:spPr>
-      </p:pic>
-      <p:pic>
-        <p:nvPicPr>
-          <p:cNvPr id="21" name="Picture 20"/>
-          <p:cNvPicPr>
-            <a:picLocks noChangeAspect="1"/>
-          </p:cNvPicPr>
-          <p:nvPr/>
-        </p:nvPicPr>
-        <p:blipFill>
-          <a:blip r:embed="rId23">
+          <a:noFill/>
+        </p:spPr>
+        <p:txBody>
+          <a:bodyPr wrap="square" rtlCol="0">
+            <a:spAutoFit/>
+          </a:bodyPr>
+          <a:lstStyle/>
+          <a:p>
+            <a:pPr lvl="0"/>
+            <a:r>
+              <a:rPr lang="en-US" sz="4800" dirty="0">
+                <a:ln w="0"/>
+                <a:effectLst>
+                  <a:outerShdw blurRad="38100" dist="19050" dir="2700000" algn="tl" rotWithShape="0">
+                    <a:schemeClr val="dk1">
+                      <a:alpha val="40000"/>
+                    </a:schemeClr>
+                  </a:outerShdw>
+                </a:effectLst>
+              </a:rPr>
+              <a:t>Kyle </a:t>
+            </a:r>
+            <a:r>
+              <a:rPr lang="en-US" sz="4800" dirty="0" err="1">
+                <a:ln w="0"/>
+                <a:effectLst>
+                  <a:outerShdw blurRad="38100" dist="19050" dir="2700000" algn="tl" rotWithShape="0">
+                    <a:schemeClr val="dk1">
+                      <a:alpha val="40000"/>
+                    </a:schemeClr>
+                  </a:outerShdw>
+                </a:effectLst>
+              </a:rPr>
+              <a:t>Arens</a:t>
+            </a:r>
+            <a:endParaRPr lang="en-US" sz="4800" dirty="0">
+              <a:ln w="0"/>
+              <a:effectLst>
+                <a:outerShdw blurRad="38100" dist="19050" dir="2700000" algn="tl" rotWithShape="0">
+                  <a:schemeClr val="dk1">
+                    <a:alpha val="40000"/>
+                  </a:schemeClr>
+                </a:outerShdw>
+              </a:effectLst>
+            </a:endParaRPr>
+          </a:p>
+        </p:txBody>
+      </p:sp>
+      <p:sp>
+        <p:nvSpPr>
+          <p:cNvPr id="25" name="TextBox 24">
             <a:extLst>
-              <a:ext uri="{28A0092B-C50C-407E-A947-70E740481C1C}">
-                <a14:useLocalDpi xmlns:a14="http://schemas.microsoft.com/office/drawing/2010/main" val="0"/>
+              <a:ext uri="{FF2B5EF4-FFF2-40B4-BE49-F238E27FC236}">
+                <a16:creationId xmlns:a16="http://schemas.microsoft.com/office/drawing/2014/main" id="{836CE79B-74F2-4B30-BA6E-C613D3B8B7EB}"/>
               </a:ext>
             </a:extLst>
-          </a:blip>
-          <a:stretch>
-            <a:fillRect/>
-          </a:stretch>
-        </p:blipFill>
-        <p:spPr>
-          <a:xfrm>
-            <a:off x="23274169" y="22631400"/>
-            <a:ext cx="2478024" cy="2478024"/>
+          </p:cNvPr>
+          <p:cNvSpPr txBox="1"/>
+          <p:nvPr/>
+        </p:nvSpPr>
+        <p:spPr>
+          <a:xfrm>
+            <a:off x="21409351" y="26744744"/>
+            <a:ext cx="10920696" cy="1754326"/>
           </a:xfrm>
           <a:prstGeom prst="rect">
             <a:avLst/>
           </a:prstGeom>
-        </p:spPr>
-      </p:pic>
-      <p:pic>
-        <p:nvPicPr>
-          <p:cNvPr id="23" name="Picture 22"/>
-          <p:cNvPicPr>
-            <a:picLocks/>
-          </p:cNvPicPr>
-          <p:nvPr/>
-        </p:nvPicPr>
-        <p:blipFill>
-          <a:blip r:embed="rId24">
+          <a:noFill/>
+        </p:spPr>
+        <p:txBody>
+          <a:bodyPr wrap="square" rtlCol="0">
+            <a:spAutoFit/>
+          </a:bodyPr>
+          <a:lstStyle/>
+          <a:p>
+            <a:r>
+              <a:rPr lang="en-US" sz="3600" dirty="0">
+                <a:solidFill>
+                  <a:schemeClr val="bg1"/>
+                </a:solidFill>
+              </a:rPr>
+              <a:t>Figure 2.</a:t>
+            </a:r>
+          </a:p>
+          <a:p>
+            <a:r>
+              <a:rPr lang="en-US" sz="3600" dirty="0">
+                <a:solidFill>
+                  <a:schemeClr val="bg1"/>
+                </a:solidFill>
+              </a:rPr>
+              <a:t>Raw spatial inputs we feed our neural net. Each layer contains different information for a given screen region.</a:t>
+            </a:r>
+            <a:endParaRPr lang="en-US" sz="3600" dirty="0"/>
+          </a:p>
+        </p:txBody>
+      </p:sp>
+      <p:sp>
+        <p:nvSpPr>
+          <p:cNvPr id="26" name="TextBox 25">
             <a:extLst>
-              <a:ext uri="{28A0092B-C50C-407E-A947-70E740481C1C}">
-                <a14:useLocalDpi xmlns:a14="http://schemas.microsoft.com/office/drawing/2010/main" val="0"/>
+              <a:ext uri="{FF2B5EF4-FFF2-40B4-BE49-F238E27FC236}">
+                <a16:creationId xmlns:a16="http://schemas.microsoft.com/office/drawing/2014/main" id="{77C994A1-0919-4482-9566-19C1FE9F9489}"/>
               </a:ext>
             </a:extLst>
-          </a:blip>
-          <a:stretch>
-            <a:fillRect/>
-          </a:stretch>
-        </p:blipFill>
-        <p:spPr>
-          <a:xfrm>
-            <a:off x="26494918" y="22631400"/>
-            <a:ext cx="2478024" cy="2478024"/>
+          </p:cNvPr>
+          <p:cNvSpPr txBox="1"/>
+          <p:nvPr/>
+        </p:nvSpPr>
+        <p:spPr>
+          <a:xfrm>
+            <a:off x="22208588" y="15467585"/>
+            <a:ext cx="8204455" cy="2308324"/>
           </a:xfrm>
           <a:prstGeom prst="rect">
             <a:avLst/>
           </a:prstGeom>
-        </p:spPr>
-      </p:pic>
+          <a:noFill/>
+        </p:spPr>
+        <p:txBody>
+          <a:bodyPr wrap="square" rtlCol="0">
+            <a:spAutoFit/>
+          </a:bodyPr>
+          <a:lstStyle/>
+          <a:p>
+            <a:r>
+              <a:rPr lang="en-US" sz="3600" dirty="0">
+                <a:solidFill>
+                  <a:schemeClr val="bg1"/>
+                </a:solidFill>
+              </a:rPr>
+              <a:t>Figure 1. </a:t>
+            </a:r>
+          </a:p>
+          <a:p>
+            <a:r>
+              <a:rPr lang="en-US" sz="3600" dirty="0">
+                <a:solidFill>
+                  <a:schemeClr val="bg1"/>
+                </a:solidFill>
+              </a:rPr>
+              <a:t>An abstract overview of our learning model. Non-spatial features include items such as unit count and current resources.</a:t>
+            </a:r>
+            <a:endParaRPr lang="en-US" sz="3600" dirty="0"/>
+          </a:p>
+        </p:txBody>
+      </p:sp>
+      <p:sp>
+        <p:nvSpPr>
+          <p:cNvPr id="65" name="Rectangle 64">
+            <a:extLst>
+              <a:ext uri="{FF2B5EF4-FFF2-40B4-BE49-F238E27FC236}">
+                <a16:creationId xmlns:a16="http://schemas.microsoft.com/office/drawing/2014/main" id="{A1A0386B-4DB5-4695-8FAA-B29E990D611E}"/>
+              </a:ext>
+            </a:extLst>
+          </p:cNvPr>
+          <p:cNvSpPr/>
+          <p:nvPr/>
+        </p:nvSpPr>
+        <p:spPr>
+          <a:xfrm>
+            <a:off x="20186128" y="18256781"/>
+            <a:ext cx="2850460" cy="1569660"/>
+          </a:xfrm>
+          <a:prstGeom prst="rect">
+            <a:avLst/>
+          </a:prstGeom>
+          <a:noFill/>
+        </p:spPr>
+        <p:txBody>
+          <a:bodyPr wrap="none" lIns="91440" tIns="45720" rIns="91440" bIns="45720">
+            <a:spAutoFit/>
+          </a:bodyPr>
+          <a:lstStyle/>
+          <a:p>
+            <a:pPr algn="ctr"/>
+            <a:r>
+              <a:rPr lang="en-US" sz="9600" b="0" cap="none" spc="0" dirty="0">
+                <a:ln w="18415" cmpd="sng">
+                  <a:solidFill>
+                    <a:srgbClr val="FFFFFF"/>
+                  </a:solidFill>
+                  <a:prstDash val="solid"/>
+                </a:ln>
+                <a:solidFill>
+                  <a:srgbClr val="FFFFFF"/>
+                </a:solidFill>
+                <a:effectLst>
+                  <a:outerShdw blurRad="63500" dir="3600000" algn="tl" rotWithShape="0">
+                    <a:srgbClr val="000000">
+                      <a:alpha val="70000"/>
+                    </a:srgbClr>
+                  </a:outerShdw>
+                </a:effectLst>
+              </a:rPr>
+              <a:t>Input</a:t>
+            </a:r>
+          </a:p>
+        </p:txBody>
+      </p:sp>
     </p:spTree>
     <p:extLst>
       <p:ext uri="{BB962C8B-B14F-4D97-AF65-F5344CB8AC3E}">
@@ -5933,13 +6354,6 @@
   <p:clrMapOvr>
     <a:masterClrMapping/>
   </p:clrMapOvr>
-  <p:timing>
-    <p:tnLst>
-      <p:par>
-        <p:cTn id="1" dur="indefinite" restart="never" nodeType="tmRoot"/>
-      </p:par>
-    </p:tnLst>
-  </p:timing>
 </p:sld>
 </file>
 
@@ -6226,4 +6640,299 @@
   <a:objectDefaults/>
   <a:extraClrSchemeLst/>
 </a:theme>
+</file>
+
+<file path=ppt/theme/theme2.xml><?xml version="1.0" encoding="utf-8"?>
+<a:theme xmlns:a="http://schemas.openxmlformats.org/drawingml/2006/main" name="Office Theme">
+  <a:themeElements>
+    <a:clrScheme name="Office">
+      <a:dk1>
+        <a:sysClr val="windowText" lastClr="000000"/>
+      </a:dk1>
+      <a:lt1>
+        <a:sysClr val="window" lastClr="FFFFFF"/>
+      </a:lt1>
+      <a:dk2>
+        <a:srgbClr val="44546A"/>
+      </a:dk2>
+      <a:lt2>
+        <a:srgbClr val="E7E6E6"/>
+      </a:lt2>
+      <a:accent1>
+        <a:srgbClr val="4472C4"/>
+      </a:accent1>
+      <a:accent2>
+        <a:srgbClr val="ED7D31"/>
+      </a:accent2>
+      <a:accent3>
+        <a:srgbClr val="A5A5A5"/>
+      </a:accent3>
+      <a:accent4>
+        <a:srgbClr val="FFC000"/>
+      </a:accent4>
+      <a:accent5>
+        <a:srgbClr val="5B9BD5"/>
+      </a:accent5>
+      <a:accent6>
+        <a:srgbClr val="70AD47"/>
+      </a:accent6>
+      <a:hlink>
+        <a:srgbClr val="0563C1"/>
+      </a:hlink>
+      <a:folHlink>
+        <a:srgbClr val="954F72"/>
+      </a:folHlink>
+    </a:clrScheme>
+    <a:fontScheme name="Office">
+      <a:majorFont>
+        <a:latin typeface="Calibri Light" panose="020F0302020204030204"/>
+        <a:ea typeface=""/>
+        <a:cs typeface=""/>
+        <a:font script="Jpan" typeface="游ゴシック Light"/>
+        <a:font script="Hang" typeface="맑은 고딕"/>
+        <a:font script="Hans" typeface="等线 Light"/>
+        <a:font script="Hant" typeface="新細明體"/>
+        <a:font script="Arab" typeface="Times New Roman"/>
+        <a:font script="Hebr" typeface="Times New Roman"/>
+        <a:font script="Thai" typeface="Angsana New"/>
+        <a:font script="Ethi" typeface="Nyala"/>
+        <a:font script="Beng" typeface="Vrinda"/>
+        <a:font script="Gujr" typeface="Shruti"/>
+        <a:font script="Khmr" typeface="MoolBoran"/>
+        <a:font script="Knda" typeface="Tunga"/>
+        <a:font script="Guru" typeface="Raavi"/>
+        <a:font script="Cans" typeface="Euphemia"/>
+        <a:font script="Cher" typeface="Plantagenet Cherokee"/>
+        <a:font script="Yiii" typeface="Microsoft Yi Baiti"/>
+        <a:font script="Tibt" typeface="Microsoft Himalaya"/>
+        <a:font script="Thaa" typeface="MV Boli"/>
+        <a:font script="Deva" typeface="Mangal"/>
+        <a:font script="Telu" typeface="Gautami"/>
+        <a:font script="Taml" typeface="Latha"/>
+        <a:font script="Syrc" typeface="Estrangelo Edessa"/>
+        <a:font script="Orya" typeface="Kalinga"/>
+        <a:font script="Mlym" typeface="Kartika"/>
+        <a:font script="Laoo" typeface="DokChampa"/>
+        <a:font script="Sinh" typeface="Iskoola Pota"/>
+        <a:font script="Mong" typeface="Mongolian Baiti"/>
+        <a:font script="Viet" typeface="Times New Roman"/>
+        <a:font script="Uigh" typeface="Microsoft Uighur"/>
+        <a:font script="Geor" typeface="Sylfaen"/>
+        <a:font script="Armn" typeface="Arial"/>
+        <a:font script="Bugi" typeface="Leelawadee UI"/>
+        <a:font script="Bopo" typeface="Microsoft JhengHei"/>
+        <a:font script="Java" typeface="Javanese Text"/>
+        <a:font script="Lisu" typeface="Segoe UI"/>
+        <a:font script="Mymr" typeface="Myanmar Text"/>
+        <a:font script="Nkoo" typeface="Ebrima"/>
+        <a:font script="Olck" typeface="Nirmala UI"/>
+        <a:font script="Osma" typeface="Ebrima"/>
+        <a:font script="Phag" typeface="Phagspa"/>
+        <a:font script="Syrn" typeface="Estrangelo Edessa"/>
+        <a:font script="Syrj" typeface="Estrangelo Edessa"/>
+        <a:font script="Syre" typeface="Estrangelo Edessa"/>
+        <a:font script="Sora" typeface="Nirmala UI"/>
+        <a:font script="Tale" typeface="Microsoft Tai Le"/>
+        <a:font script="Talu" typeface="Microsoft New Tai Lue"/>
+        <a:font script="Tfng" typeface="Ebrima"/>
+      </a:majorFont>
+      <a:minorFont>
+        <a:latin typeface="Calibri" panose="020F0502020204030204"/>
+        <a:ea typeface=""/>
+        <a:cs typeface=""/>
+        <a:font script="Jpan" typeface="游ゴシック"/>
+        <a:font script="Hang" typeface="맑은 고딕"/>
+        <a:font script="Hans" typeface="等线"/>
+        <a:font script="Hant" typeface="新細明體"/>
+        <a:font script="Arab" typeface="Arial"/>
+        <a:font script="Hebr" typeface="Arial"/>
+        <a:font script="Thai" typeface="Cordia New"/>
+        <a:font script="Ethi" typeface="Nyala"/>
+        <a:font script="Beng" typeface="Vrinda"/>
+        <a:font script="Gujr" typeface="Shruti"/>
+        <a:font script="Khmr" typeface="DaunPenh"/>
+        <a:font script="Knda" typeface="Tunga"/>
+        <a:font script="Guru" typeface="Raavi"/>
+        <a:font script="Cans" typeface="Euphemia"/>
+        <a:font script="Cher" typeface="Plantagenet Cherokee"/>
+        <a:font script="Yiii" typeface="Microsoft Yi Baiti"/>
+        <a:font script="Tibt" typeface="Microsoft Himalaya"/>
+        <a:font script="Thaa" typeface="MV Boli"/>
+        <a:font script="Deva" typeface="Mangal"/>
+        <a:font script="Telu" typeface="Gautami"/>
+        <a:font script="Taml" typeface="Latha"/>
+        <a:font script="Syrc" typeface="Estrangelo Edessa"/>
+        <a:font script="Orya" typeface="Kalinga"/>
+        <a:font script="Mlym" typeface="Kartika"/>
+        <a:font script="Laoo" typeface="DokChampa"/>
+        <a:font script="Sinh" typeface="Iskoola Pota"/>
+        <a:font script="Mong" typeface="Mongolian Baiti"/>
+        <a:font script="Viet" typeface="Arial"/>
+        <a:font script="Uigh" typeface="Microsoft Uighur"/>
+        <a:font script="Geor" typeface="Sylfaen"/>
+        <a:font script="Armn" typeface="Arial"/>
+        <a:font script="Bugi" typeface="Leelawadee UI"/>
+        <a:font script="Bopo" typeface="Microsoft JhengHei"/>
+        <a:font script="Java" typeface="Javanese Text"/>
+        <a:font script="Lisu" typeface="Segoe UI"/>
+        <a:font script="Mymr" typeface="Myanmar Text"/>
+        <a:font script="Nkoo" typeface="Ebrima"/>
+        <a:font script="Olck" typeface="Nirmala UI"/>
+        <a:font script="Osma" typeface="Ebrima"/>
+        <a:font script="Phag" typeface="Phagspa"/>
+        <a:font script="Syrn" typeface="Estrangelo Edessa"/>
+        <a:font script="Syrj" typeface="Estrangelo Edessa"/>
+        <a:font script="Syre" typeface="Estrangelo Edessa"/>
+        <a:font script="Sora" typeface="Nirmala UI"/>
+        <a:font script="Tale" typeface="Microsoft Tai Le"/>
+        <a:font script="Talu" typeface="Microsoft New Tai Lue"/>
+        <a:font script="Tfng" typeface="Ebrima"/>
+      </a:minorFont>
+    </a:fontScheme>
+    <a:fmtScheme name="Office">
+      <a:fillStyleLst>
+        <a:solidFill>
+          <a:schemeClr val="phClr"/>
+        </a:solidFill>
+        <a:gradFill rotWithShape="1">
+          <a:gsLst>
+            <a:gs pos="0">
+              <a:schemeClr val="phClr">
+                <a:lumMod val="110000"/>
+                <a:satMod val="105000"/>
+                <a:tint val="67000"/>
+              </a:schemeClr>
+            </a:gs>
+            <a:gs pos="50000">
+              <a:schemeClr val="phClr">
+                <a:lumMod val="105000"/>
+                <a:satMod val="103000"/>
+                <a:tint val="73000"/>
+              </a:schemeClr>
+            </a:gs>
+            <a:gs pos="100000">
+              <a:schemeClr val="phClr">
+                <a:lumMod val="105000"/>
+                <a:satMod val="109000"/>
+                <a:tint val="81000"/>
+              </a:schemeClr>
+            </a:gs>
+          </a:gsLst>
+          <a:lin ang="5400000" scaled="0"/>
+        </a:gradFill>
+        <a:gradFill rotWithShape="1">
+          <a:gsLst>
+            <a:gs pos="0">
+              <a:schemeClr val="phClr">
+                <a:satMod val="103000"/>
+                <a:lumMod val="102000"/>
+                <a:tint val="94000"/>
+              </a:schemeClr>
+            </a:gs>
+            <a:gs pos="50000">
+              <a:schemeClr val="phClr">
+                <a:satMod val="110000"/>
+                <a:lumMod val="100000"/>
+                <a:shade val="100000"/>
+              </a:schemeClr>
+            </a:gs>
+            <a:gs pos="100000">
+              <a:schemeClr val="phClr">
+                <a:lumMod val="99000"/>
+                <a:satMod val="120000"/>
+                <a:shade val="78000"/>
+              </a:schemeClr>
+            </a:gs>
+          </a:gsLst>
+          <a:lin ang="5400000" scaled="0"/>
+        </a:gradFill>
+      </a:fillStyleLst>
+      <a:lnStyleLst>
+        <a:ln w="6350" cap="flat" cmpd="sng" algn="ctr">
+          <a:solidFill>
+            <a:schemeClr val="phClr"/>
+          </a:solidFill>
+          <a:prstDash val="solid"/>
+          <a:miter lim="800000"/>
+        </a:ln>
+        <a:ln w="12700" cap="flat" cmpd="sng" algn="ctr">
+          <a:solidFill>
+            <a:schemeClr val="phClr"/>
+          </a:solidFill>
+          <a:prstDash val="solid"/>
+          <a:miter lim="800000"/>
+        </a:ln>
+        <a:ln w="19050" cap="flat" cmpd="sng" algn="ctr">
+          <a:solidFill>
+            <a:schemeClr val="phClr"/>
+          </a:solidFill>
+          <a:prstDash val="solid"/>
+          <a:miter lim="800000"/>
+        </a:ln>
+      </a:lnStyleLst>
+      <a:effectStyleLst>
+        <a:effectStyle>
+          <a:effectLst/>
+        </a:effectStyle>
+        <a:effectStyle>
+          <a:effectLst/>
+        </a:effectStyle>
+        <a:effectStyle>
+          <a:effectLst>
+            <a:outerShdw blurRad="57150" dist="19050" dir="5400000" algn="ctr" rotWithShape="0">
+              <a:srgbClr val="000000">
+                <a:alpha val="63000"/>
+              </a:srgbClr>
+            </a:outerShdw>
+          </a:effectLst>
+        </a:effectStyle>
+      </a:effectStyleLst>
+      <a:bgFillStyleLst>
+        <a:solidFill>
+          <a:schemeClr val="phClr"/>
+        </a:solidFill>
+        <a:solidFill>
+          <a:schemeClr val="phClr">
+            <a:tint val="95000"/>
+            <a:satMod val="170000"/>
+          </a:schemeClr>
+        </a:solidFill>
+        <a:gradFill rotWithShape="1">
+          <a:gsLst>
+            <a:gs pos="0">
+              <a:schemeClr val="phClr">
+                <a:tint val="93000"/>
+                <a:satMod val="150000"/>
+                <a:shade val="98000"/>
+                <a:lumMod val="102000"/>
+              </a:schemeClr>
+            </a:gs>
+            <a:gs pos="50000">
+              <a:schemeClr val="phClr">
+                <a:tint val="98000"/>
+                <a:satMod val="130000"/>
+                <a:shade val="90000"/>
+                <a:lumMod val="103000"/>
+              </a:schemeClr>
+            </a:gs>
+            <a:gs pos="100000">
+              <a:schemeClr val="phClr">
+                <a:shade val="63000"/>
+                <a:satMod val="120000"/>
+              </a:schemeClr>
+            </a:gs>
+          </a:gsLst>
+          <a:lin ang="5400000" scaled="0"/>
+        </a:gradFill>
+      </a:bgFillStyleLst>
+    </a:fmtScheme>
+  </a:themeElements>
+  <a:objectDefaults/>
+  <a:extraClrSchemeLst/>
+  <a:extLst>
+    <a:ext uri="{05A4C25C-085E-4340-85A3-A5531E510DB2}">
+      <thm15:themeFamily xmlns:thm15="http://schemas.microsoft.com/office/thememl/2012/main" name="Office Theme" id="{62F939B6-93AF-4DB8-9C6B-D6C7DFDC589F}" vid="{4A3C46E8-61CC-4603-A589-7422A47A8E4A}"/>
+    </a:ext>
+  </a:extLst>
+</a:theme>
 </file>
</xml_diff>